<commit_message>
Adding guide on how to create tables in SSMS
</commit_message>
<xml_diff>
--- a/Courses/Software-Sciences/Module-3-Databases-New/07-Modeling-Databases/06-Modeling-Databases.pptx
+++ b/Courses/Software-Sciences/Module-3-Databases-New/07-Modeling-Databases/06-Modeling-Databases.pptx
@@ -5,10 +5,10 @@
     <p:sldMasterId id="2147483675" r:id="rId1"/>
   </p:sldMasterIdLst>
   <p:notesMasterIdLst>
-    <p:notesMasterId r:id="rId20"/>
+    <p:notesMasterId r:id="rId27"/>
   </p:notesMasterIdLst>
   <p:handoutMasterIdLst>
-    <p:handoutMasterId r:id="rId21"/>
+    <p:handoutMasterId r:id="rId28"/>
   </p:handoutMasterIdLst>
   <p:sldIdLst>
     <p:sldId id="503" r:id="rId2"/>
@@ -26,9 +26,16 @@
     <p:sldId id="1253" r:id="rId14"/>
     <p:sldId id="1250" r:id="rId15"/>
     <p:sldId id="1249" r:id="rId16"/>
-    <p:sldId id="349" r:id="rId17"/>
-    <p:sldId id="504" r:id="rId18"/>
-    <p:sldId id="505" r:id="rId19"/>
+    <p:sldId id="1255" r:id="rId17"/>
+    <p:sldId id="1256" r:id="rId18"/>
+    <p:sldId id="1257" r:id="rId19"/>
+    <p:sldId id="1260" r:id="rId20"/>
+    <p:sldId id="1258" r:id="rId21"/>
+    <p:sldId id="1259" r:id="rId22"/>
+    <p:sldId id="1261" r:id="rId23"/>
+    <p:sldId id="349" r:id="rId24"/>
+    <p:sldId id="504" r:id="rId25"/>
+    <p:sldId id="505" r:id="rId26"/>
   </p:sldIdLst>
   <p:sldSz cx="12192000" cy="6858000"/>
   <p:notesSz cx="6858000" cy="9144000"/>
@@ -155,6 +162,17 @@
             <p14:sldId id="1253"/>
             <p14:sldId id="1250"/>
             <p14:sldId id="1249"/>
+          </p14:sldIdLst>
+        </p14:section>
+        <p14:section name="Визуално създаване и свързване на таблици" id="{5119ABC9-35C0-4A6E-8D87-2EC5E4347A32}">
+          <p14:sldIdLst>
+            <p14:sldId id="1255"/>
+            <p14:sldId id="1256"/>
+            <p14:sldId id="1257"/>
+            <p14:sldId id="1260"/>
+            <p14:sldId id="1258"/>
+            <p14:sldId id="1259"/>
+            <p14:sldId id="1261"/>
           </p14:sldIdLst>
         </p14:section>
         <p14:section name="Обобщение" id="{775FCB14-B379-495B-B965-30B707A8FDA5}">
@@ -417,7 +435,7 @@
           <a:p>
             <a:fld id="{4E087215-0C8F-4762-A664-737A353EC9A4}" type="datetimeFigureOut">
               <a:rPr lang="bg-BG" smtClean="0"/>
-              <a:t>15.10.2023 г.</a:t>
+              <a:t>2.12.2023 г.</a:t>
             </a:fld>
             <a:endParaRPr lang="bg-BG"/>
           </a:p>
@@ -613,7 +631,7 @@
           <a:p>
             <a:fld id="{72D84649-876A-46C9-8472-14CB09C070D8}" type="datetimeFigureOut">
               <a:rPr lang="en-US" smtClean="0"/>
-              <a:t>10/15/2023</a:t>
+              <a:t>12/2/2023</a:t>
             </a:fld>
             <a:endParaRPr lang="en-US"/>
           </a:p>
@@ -1229,7 +1247,7 @@
             <a:fld id="{3EBA5BD7-F043-4D1B-AA17-CD412FC534DE}" type="slidenum">
               <a:rPr lang="en-US" smtClean="0"/>
               <a:pPr/>
-              <a:t>18</a:t>
+              <a:t>25</a:t>
             </a:fld>
             <a:endParaRPr lang="en-US" dirty="0"/>
           </a:p>
@@ -2424,7 +2442,7 @@
             <a:fld id="{3EBA5BD7-F043-4D1B-AA17-CD412FC534DE}" type="slidenum">
               <a:rPr lang="en-US" smtClean="0"/>
               <a:pPr/>
-              <a:t>16</a:t>
+              <a:t>23</a:t>
             </a:fld>
             <a:endParaRPr lang="en-US" dirty="0"/>
           </a:p>
@@ -2670,7 +2688,7 @@
             <a:fld id="{3EBA5BD7-F043-4D1B-AA17-CD412FC534DE}" type="slidenum">
               <a:rPr lang="en-US" smtClean="0"/>
               <a:pPr/>
-              <a:t>17</a:t>
+              <a:t>24</a:t>
             </a:fld>
             <a:endParaRPr lang="en-US" dirty="0"/>
           </a:p>
@@ -7946,40 +7964,46 @@
       </p:sp>
       <p:pic>
         <p:nvPicPr>
-          <p:cNvPr id="13" name="Picture 4" descr="https://o.remove.bg/downloads/4fea28bc-78a4-4ba2-b4aa-080d9d833290/r-db-removebg-preview.png"/>
+          <p:cNvPr id="4" name="Picture 3" descr="A yellow and blue sign with white text&#10;&#10;Description automatically generated">
+            <a:extLst>
+              <a:ext uri="{FF2B5EF4-FFF2-40B4-BE49-F238E27FC236}">
+                <a16:creationId xmlns:a16="http://schemas.microsoft.com/office/drawing/2014/main" id="{0277C45F-41D3-C515-3872-CF1271EBDCEB}"/>
+              </a:ext>
+            </a:extLst>
+          </p:cNvPr>
           <p:cNvPicPr>
-            <a:picLocks noChangeAspect="1" noChangeArrowheads="1"/>
+            <a:picLocks noChangeAspect="1"/>
           </p:cNvPicPr>
           <p:nvPr/>
         </p:nvPicPr>
         <p:blipFill>
-          <a:blip r:embed="rId4" cstate="print">
-            <a:lum bright="10000" contrast="60000"/>
+          <a:blip r:embed="rId4">
+            <a:extLst>
+              <a:ext uri="{28A0092B-C50C-407E-A947-70E740481C1C}">
+                <a14:useLocalDpi xmlns:a14="http://schemas.microsoft.com/office/drawing/2010/main" val="0"/>
+              </a:ext>
+            </a:extLst>
           </a:blip>
           <a:stretch>
             <a:fillRect/>
           </a:stretch>
         </p:blipFill>
-        <p:spPr bwMode="auto">
+        <p:spPr>
           <a:xfrm>
-            <a:off x="7452696" y="2621192"/>
-            <a:ext cx="4739640" cy="3055620"/>
+            <a:off x="584311" y="3001428"/>
+            <a:ext cx="1956689" cy="877572"/>
           </a:xfrm>
           <a:prstGeom prst="rect">
             <a:avLst/>
           </a:prstGeom>
-          <a:noFill/>
-          <a:ln>
-            <a:noFill/>
-          </a:ln>
         </p:spPr>
       </p:pic>
       <p:pic>
         <p:nvPicPr>
-          <p:cNvPr id="4" name="Picture 3" descr="A yellow and blue sign with white text&#10;&#10;Description automatically generated">
+          <p:cNvPr id="5" name="Picture 4" descr="A logo of a network&#10;&#10;Description automatically generated">
             <a:extLst>
               <a:ext uri="{FF2B5EF4-FFF2-40B4-BE49-F238E27FC236}">
-                <a16:creationId xmlns:a16="http://schemas.microsoft.com/office/drawing/2014/main" id="{0277C45F-41D3-C515-3872-CF1271EBDCEB}"/>
+                <a16:creationId xmlns:a16="http://schemas.microsoft.com/office/drawing/2014/main" id="{4F4538C6-9034-0816-7542-EA323E77B943}"/>
               </a:ext>
             </a:extLst>
           </p:cNvPr>
@@ -8002,8 +8026,8 @@
         </p:blipFill>
         <p:spPr>
           <a:xfrm>
-            <a:off x="584311" y="3001428"/>
-            <a:ext cx="1956689" cy="877572"/>
+            <a:off x="8493687" y="2321999"/>
+            <a:ext cx="3114002" cy="3114002"/>
           </a:xfrm>
           <a:prstGeom prst="rect">
             <a:avLst/>
@@ -13279,6 +13303,2332 @@
           <a:chExt cx="0" cy="0"/>
         </a:xfrm>
       </p:grpSpPr>
+      <p:sp>
+        <p:nvSpPr>
+          <p:cNvPr id="5" name="Заглавие 4">
+            <a:extLst>
+              <a:ext uri="{FF2B5EF4-FFF2-40B4-BE49-F238E27FC236}">
+                <a16:creationId xmlns:a16="http://schemas.microsoft.com/office/drawing/2014/main" id="{F9BEC40A-61C9-D1C1-8943-23AD94E749AE}"/>
+              </a:ext>
+            </a:extLst>
+          </p:cNvPr>
+          <p:cNvSpPr>
+            <a:spLocks noGrp="1"/>
+          </p:cNvSpPr>
+          <p:nvPr>
+            <p:ph type="title" sz="quarter" idx="10"/>
+          </p:nvPr>
+        </p:nvSpPr>
+        <p:spPr>
+          <a:xfrm>
+            <a:off x="579217" y="5090916"/>
+            <a:ext cx="10961783" cy="768084"/>
+          </a:xfrm>
+        </p:spPr>
+        <p:txBody>
+          <a:bodyPr/>
+          <a:lstStyle/>
+          <a:p>
+            <a:r>
+              <a:rPr lang="ru-RU" dirty="0"/>
+              <a:t>Визуално създаване и свързване на таблици</a:t>
+            </a:r>
+            <a:endParaRPr lang="bg-BG" dirty="0"/>
+          </a:p>
+        </p:txBody>
+      </p:sp>
+      <p:pic>
+        <p:nvPicPr>
+          <p:cNvPr id="10" name="Picture 9" descr="A black and white logo&#10;&#10;Description automatically generated">
+            <a:extLst>
+              <a:ext uri="{FF2B5EF4-FFF2-40B4-BE49-F238E27FC236}">
+                <a16:creationId xmlns:a16="http://schemas.microsoft.com/office/drawing/2014/main" id="{465F7477-5537-DBEA-8CF0-78B8821D449C}"/>
+              </a:ext>
+            </a:extLst>
+          </p:cNvPr>
+          <p:cNvPicPr>
+            <a:picLocks noChangeAspect="1"/>
+          </p:cNvPicPr>
+          <p:nvPr/>
+        </p:nvPicPr>
+        <p:blipFill rotWithShape="1">
+          <a:blip r:embed="rId2">
+            <a:extLst>
+              <a:ext uri="{28A0092B-C50C-407E-A947-70E740481C1C}">
+                <a14:useLocalDpi xmlns:a14="http://schemas.microsoft.com/office/drawing/2010/main" val="0"/>
+              </a:ext>
+            </a:extLst>
+          </a:blip>
+          <a:srcRect l="19230" t="22189" r="21599" b="18640"/>
+          <a:stretch/>
+        </p:blipFill>
+        <p:spPr>
+          <a:xfrm>
+            <a:off x="4532250" y="1089000"/>
+            <a:ext cx="3127500" cy="3127500"/>
+          </a:xfrm>
+          <a:prstGeom prst="flowChartConnector">
+            <a:avLst/>
+          </a:prstGeom>
+        </p:spPr>
+      </p:pic>
+    </p:spTree>
+    <p:extLst>
+      <p:ext uri="{BB962C8B-B14F-4D97-AF65-F5344CB8AC3E}">
+        <p14:creationId xmlns:p14="http://schemas.microsoft.com/office/powerpoint/2010/main" val="4069589893"/>
+      </p:ext>
+    </p:extLst>
+  </p:cSld>
+  <p:clrMapOvr>
+    <a:masterClrMapping/>
+  </p:clrMapOvr>
+  <mc:AlternateContent xmlns:mc="http://schemas.openxmlformats.org/markup-compatibility/2006" xmlns:p14="http://schemas.microsoft.com/office/powerpoint/2010/main">
+    <mc:Choice Requires="p14">
+      <p:transition spd="slow" p14:dur="2000" advClick="0" advTm="5000"/>
+    </mc:Choice>
+    <mc:Fallback xmlns="">
+      <p:transition spd="slow" advClick="0" advTm="5000"/>
+    </mc:Fallback>
+  </mc:AlternateContent>
+</p:sld>
+</file>
+
+<file path=ppt/slides/slide17.xml><?xml version="1.0" encoding="utf-8"?>
+<p:sld xmlns:a="http://schemas.openxmlformats.org/drawingml/2006/main" xmlns:r="http://schemas.openxmlformats.org/officeDocument/2006/relationships" xmlns:p="http://schemas.openxmlformats.org/presentationml/2006/main">
+  <p:cSld>
+    <p:spTree>
+      <p:nvGrpSpPr>
+        <p:cNvPr id="1" name=""/>
+        <p:cNvGrpSpPr/>
+        <p:nvPr/>
+      </p:nvGrpSpPr>
+      <p:grpSpPr>
+        <a:xfrm>
+          <a:off x="0" y="0"/>
+          <a:ext cx="0" cy="0"/>
+          <a:chOff x="0" y="0"/>
+          <a:chExt cx="0" cy="0"/>
+        </a:xfrm>
+      </p:grpSpPr>
+      <p:sp>
+        <p:nvSpPr>
+          <p:cNvPr id="2" name="Slide Number Placeholder 1">
+            <a:extLst>
+              <a:ext uri="{FF2B5EF4-FFF2-40B4-BE49-F238E27FC236}">
+                <a16:creationId xmlns:a16="http://schemas.microsoft.com/office/drawing/2014/main" id="{83E7E477-8D6C-6B6F-45D7-C05208C7C3E0}"/>
+              </a:ext>
+            </a:extLst>
+          </p:cNvPr>
+          <p:cNvSpPr>
+            <a:spLocks noGrp="1"/>
+          </p:cNvSpPr>
+          <p:nvPr>
+            <p:ph type="sldNum" sz="quarter" idx="5"/>
+          </p:nvPr>
+        </p:nvSpPr>
+        <p:spPr/>
+        <p:txBody>
+          <a:bodyPr/>
+          <a:lstStyle/>
+          <a:p>
+            <a:fld id="{2BF067CD-8E6B-4360-9AA8-C5DF2A48A6D1}" type="slidenum">
+              <a:rPr lang="en-US" noProof="0" smtClean="0"/>
+              <a:pPr/>
+              <a:t>17</a:t>
+            </a:fld>
+            <a:endParaRPr lang="en-US" noProof="0" dirty="0"/>
+          </a:p>
+        </p:txBody>
+      </p:sp>
+      <p:sp>
+        <p:nvSpPr>
+          <p:cNvPr id="3" name="Text Placeholder 2">
+            <a:extLst>
+              <a:ext uri="{FF2B5EF4-FFF2-40B4-BE49-F238E27FC236}">
+                <a16:creationId xmlns:a16="http://schemas.microsoft.com/office/drawing/2014/main" id="{82F17528-5CCD-327B-4EA1-F13AF17C7FCC}"/>
+              </a:ext>
+            </a:extLst>
+          </p:cNvPr>
+          <p:cNvSpPr>
+            <a:spLocks noGrp="1"/>
+          </p:cNvSpPr>
+          <p:nvPr>
+            <p:ph type="body" sz="quarter" idx="10"/>
+          </p:nvPr>
+        </p:nvSpPr>
+        <p:spPr/>
+        <p:txBody>
+          <a:bodyPr/>
+          <a:lstStyle/>
+          <a:p>
+            <a:r>
+              <a:rPr lang="bg-BG" sz="3600" dirty="0"/>
+              <a:t>Натиснете с </a:t>
+            </a:r>
+            <a:r>
+              <a:rPr lang="bg-BG" sz="3600" b="1" dirty="0"/>
+              <a:t>десния бутон </a:t>
+            </a:r>
+            <a:r>
+              <a:rPr lang="bg-BG" sz="3600" dirty="0"/>
+              <a:t>върху базата данни, в която ще създадете </a:t>
+            </a:r>
+            <a:r>
+              <a:rPr lang="bg-BG" sz="3600" b="1" dirty="0">
+                <a:solidFill>
+                  <a:schemeClr val="bg1"/>
+                </a:solidFill>
+              </a:rPr>
+              <a:t>таблици</a:t>
+            </a:r>
+            <a:r>
+              <a:rPr lang="en-US" sz="3600" dirty="0"/>
+              <a:t> </a:t>
+            </a:r>
+            <a:r>
+              <a:rPr lang="bg-BG" sz="3600" dirty="0"/>
+              <a:t>и я разгънете чрез </a:t>
+            </a:r>
+            <a:r>
+              <a:rPr lang="en-US" sz="3600" dirty="0"/>
+              <a:t>"</a:t>
+            </a:r>
+            <a:r>
+              <a:rPr lang="en-US" sz="3600" b="1" dirty="0">
+                <a:latin typeface="Consolas" panose="020B0609020204030204" pitchFamily="49" charset="0"/>
+              </a:rPr>
+              <a:t>+</a:t>
+            </a:r>
+            <a:r>
+              <a:rPr lang="en-US" sz="3600" dirty="0"/>
+              <a:t>"</a:t>
+            </a:r>
+            <a:endParaRPr lang="bg-BG" sz="3600" dirty="0"/>
+          </a:p>
+          <a:p>
+            <a:pPr lvl="1"/>
+            <a:r>
+              <a:rPr lang="bg-BG" sz="3200" dirty="0"/>
+              <a:t>Изберете </a:t>
+            </a:r>
+            <a:r>
+              <a:rPr lang="en-US" sz="3200" dirty="0"/>
+              <a:t>[</a:t>
+            </a:r>
+            <a:r>
+              <a:rPr lang="en-US" sz="3200" b="1" dirty="0">
+                <a:latin typeface="Consolas" panose="020B0609020204030204" pitchFamily="49" charset="0"/>
+              </a:rPr>
+              <a:t>New</a:t>
+            </a:r>
+            <a:r>
+              <a:rPr lang="en-US" sz="3200" dirty="0"/>
+              <a:t>] -&gt; [</a:t>
+            </a:r>
+            <a:r>
+              <a:rPr lang="en-US" sz="3200" b="1" dirty="0">
+                <a:latin typeface="Consolas" panose="020B0609020204030204" pitchFamily="49" charset="0"/>
+              </a:rPr>
+              <a:t>Table…</a:t>
+            </a:r>
+            <a:r>
+              <a:rPr lang="en-US" sz="3200" dirty="0"/>
+              <a:t>]</a:t>
+            </a:r>
+          </a:p>
+          <a:p>
+            <a:pPr lvl="1"/>
+            <a:endParaRPr lang="en-US" dirty="0"/>
+          </a:p>
+          <a:p>
+            <a:pPr marL="442912" lvl="1" indent="0">
+              <a:buNone/>
+            </a:pPr>
+            <a:endParaRPr lang="en-US" dirty="0"/>
+          </a:p>
+          <a:p>
+            <a:pPr marL="442912" lvl="1" indent="0">
+              <a:buNone/>
+            </a:pPr>
+            <a:endParaRPr lang="en-US" dirty="0"/>
+          </a:p>
+          <a:p>
+            <a:endParaRPr lang="en-US" dirty="0"/>
+          </a:p>
+        </p:txBody>
+      </p:sp>
+      <p:sp>
+        <p:nvSpPr>
+          <p:cNvPr id="4" name="Title 3">
+            <a:extLst>
+              <a:ext uri="{FF2B5EF4-FFF2-40B4-BE49-F238E27FC236}">
+                <a16:creationId xmlns:a16="http://schemas.microsoft.com/office/drawing/2014/main" id="{F736FE2B-8FFF-6BCB-3568-4B43B84D36B9}"/>
+              </a:ext>
+            </a:extLst>
+          </p:cNvPr>
+          <p:cNvSpPr>
+            <a:spLocks noGrp="1"/>
+          </p:cNvSpPr>
+          <p:nvPr>
+            <p:ph type="title"/>
+          </p:nvPr>
+        </p:nvSpPr>
+        <p:spPr/>
+        <p:txBody>
+          <a:bodyPr/>
+          <a:lstStyle/>
+          <a:p>
+            <a:r>
+              <a:rPr lang="bg-BG" dirty="0"/>
+              <a:t>Създаване на таблици</a:t>
+            </a:r>
+            <a:r>
+              <a:rPr lang="en-US" dirty="0"/>
+              <a:t> (1)</a:t>
+            </a:r>
+          </a:p>
+        </p:txBody>
+      </p:sp>
+      <p:pic>
+        <p:nvPicPr>
+          <p:cNvPr id="10" name="Picture 9">
+            <a:extLst>
+              <a:ext uri="{FF2B5EF4-FFF2-40B4-BE49-F238E27FC236}">
+                <a16:creationId xmlns:a16="http://schemas.microsoft.com/office/drawing/2014/main" id="{365CE4B2-7EFC-6E27-64B4-F6E9FD0A4F7F}"/>
+              </a:ext>
+            </a:extLst>
+          </p:cNvPr>
+          <p:cNvPicPr>
+            <a:picLocks noChangeAspect="1"/>
+          </p:cNvPicPr>
+          <p:nvPr/>
+        </p:nvPicPr>
+        <p:blipFill>
+          <a:blip r:embed="rId2"/>
+          <a:stretch>
+            <a:fillRect/>
+          </a:stretch>
+        </p:blipFill>
+        <p:spPr>
+          <a:xfrm>
+            <a:off x="3002250" y="3744000"/>
+            <a:ext cx="6187499" cy="2250000"/>
+          </a:xfrm>
+          <a:prstGeom prst="rect">
+            <a:avLst/>
+          </a:prstGeom>
+          <a:ln>
+            <a:solidFill>
+              <a:schemeClr val="bg2">
+                <a:lumMod val="75000"/>
+              </a:schemeClr>
+            </a:solidFill>
+          </a:ln>
+        </p:spPr>
+      </p:pic>
+      <p:sp>
+        <p:nvSpPr>
+          <p:cNvPr id="11" name="Rectangle: Rounded Corners 10">
+            <a:extLst>
+              <a:ext uri="{FF2B5EF4-FFF2-40B4-BE49-F238E27FC236}">
+                <a16:creationId xmlns:a16="http://schemas.microsoft.com/office/drawing/2014/main" id="{C77AA45D-6DC0-BFBE-EFF9-670C3C36E8A2}"/>
+              </a:ext>
+            </a:extLst>
+          </p:cNvPr>
+          <p:cNvSpPr/>
+          <p:nvPr/>
+        </p:nvSpPr>
+        <p:spPr>
+          <a:xfrm>
+            <a:off x="5871000" y="4374000"/>
+            <a:ext cx="2385000" cy="270000"/>
+          </a:xfrm>
+          <a:prstGeom prst="roundRect">
+            <a:avLst>
+              <a:gd name="adj" fmla="val 5385"/>
+            </a:avLst>
+          </a:prstGeom>
+          <a:noFill/>
+          <a:ln w="57150">
+            <a:solidFill>
+              <a:schemeClr val="tx1"/>
+            </a:solidFill>
+            <a:prstDash val="solid"/>
+          </a:ln>
+        </p:spPr>
+        <p:style>
+          <a:lnRef idx="2">
+            <a:schemeClr val="accent1">
+              <a:shade val="50000"/>
+            </a:schemeClr>
+          </a:lnRef>
+          <a:fillRef idx="1">
+            <a:schemeClr val="accent1"/>
+          </a:fillRef>
+          <a:effectRef idx="0">
+            <a:schemeClr val="accent1"/>
+          </a:effectRef>
+          <a:fontRef idx="minor">
+            <a:schemeClr val="lt1"/>
+          </a:fontRef>
+        </p:style>
+        <p:txBody>
+          <a:bodyPr rtlCol="0" anchor="t"/>
+          <a:lstStyle/>
+          <a:p>
+            <a:pPr algn="ctr"/>
+            <a:endParaRPr lang="en-US" sz="2799" b="1" dirty="0">
+              <a:solidFill>
+                <a:srgbClr val="FBEEDC"/>
+              </a:solidFill>
+              <a:effectLst>
+                <a:outerShdw blurRad="38100" dist="38100" dir="2700000" algn="tl">
+                  <a:srgbClr val="000000">
+                    <a:alpha val="43137"/>
+                  </a:srgbClr>
+                </a:outerShdw>
+              </a:effectLst>
+              <a:latin typeface="Consolas" panose="020B0609020204030204" pitchFamily="49" charset="0"/>
+            </a:endParaRPr>
+          </a:p>
+        </p:txBody>
+      </p:sp>
+    </p:spTree>
+    <p:extLst>
+      <p:ext uri="{BB962C8B-B14F-4D97-AF65-F5344CB8AC3E}">
+        <p14:creationId xmlns:p14="http://schemas.microsoft.com/office/powerpoint/2010/main" val="1948557198"/>
+      </p:ext>
+    </p:extLst>
+  </p:cSld>
+  <p:clrMapOvr>
+    <a:masterClrMapping/>
+  </p:clrMapOvr>
+  <mc:AlternateContent xmlns:mc="http://schemas.openxmlformats.org/markup-compatibility/2006" xmlns:p14="http://schemas.microsoft.com/office/powerpoint/2010/main">
+    <mc:Choice Requires="p14">
+      <p:transition spd="slow" p14:dur="2000" advClick="0" advTm="5000"/>
+    </mc:Choice>
+    <mc:Fallback xmlns="">
+      <p:transition spd="slow" advClick="0" advTm="5000"/>
+    </mc:Fallback>
+  </mc:AlternateContent>
+</p:sld>
+</file>
+
+<file path=ppt/slides/slide18.xml><?xml version="1.0" encoding="utf-8"?>
+<p:sld xmlns:a="http://schemas.openxmlformats.org/drawingml/2006/main" xmlns:r="http://schemas.openxmlformats.org/officeDocument/2006/relationships" xmlns:p="http://schemas.openxmlformats.org/presentationml/2006/main">
+  <p:cSld>
+    <p:spTree>
+      <p:nvGrpSpPr>
+        <p:cNvPr id="1" name=""/>
+        <p:cNvGrpSpPr/>
+        <p:nvPr/>
+      </p:nvGrpSpPr>
+      <p:grpSpPr>
+        <a:xfrm>
+          <a:off x="0" y="0"/>
+          <a:ext cx="0" cy="0"/>
+          <a:chOff x="0" y="0"/>
+          <a:chExt cx="0" cy="0"/>
+        </a:xfrm>
+      </p:grpSpPr>
+      <p:sp>
+        <p:nvSpPr>
+          <p:cNvPr id="2" name="Slide Number Placeholder 1">
+            <a:extLst>
+              <a:ext uri="{FF2B5EF4-FFF2-40B4-BE49-F238E27FC236}">
+                <a16:creationId xmlns:a16="http://schemas.microsoft.com/office/drawing/2014/main" id="{3B7544ED-BABA-6AB6-1F36-C4BA78D08E78}"/>
+              </a:ext>
+            </a:extLst>
+          </p:cNvPr>
+          <p:cNvSpPr>
+            <a:spLocks noGrp="1"/>
+          </p:cNvSpPr>
+          <p:nvPr>
+            <p:ph type="sldNum" sz="quarter" idx="5"/>
+          </p:nvPr>
+        </p:nvSpPr>
+        <p:spPr/>
+        <p:txBody>
+          <a:bodyPr/>
+          <a:lstStyle/>
+          <a:p>
+            <a:fld id="{2BF067CD-8E6B-4360-9AA8-C5DF2A48A6D1}" type="slidenum">
+              <a:rPr lang="en-US" noProof="0" smtClean="0"/>
+              <a:pPr/>
+              <a:t>18</a:t>
+            </a:fld>
+            <a:endParaRPr lang="en-US" noProof="0" dirty="0"/>
+          </a:p>
+        </p:txBody>
+      </p:sp>
+      <p:sp>
+        <p:nvSpPr>
+          <p:cNvPr id="3" name="Text Placeholder 2">
+            <a:extLst>
+              <a:ext uri="{FF2B5EF4-FFF2-40B4-BE49-F238E27FC236}">
+                <a16:creationId xmlns:a16="http://schemas.microsoft.com/office/drawing/2014/main" id="{D7299046-F2F6-3298-392C-BE1985116001}"/>
+              </a:ext>
+            </a:extLst>
+          </p:cNvPr>
+          <p:cNvSpPr>
+            <a:spLocks noGrp="1"/>
+          </p:cNvSpPr>
+          <p:nvPr>
+            <p:ph type="body" sz="quarter" idx="10"/>
+          </p:nvPr>
+        </p:nvSpPr>
+        <p:spPr/>
+        <p:txBody>
+          <a:bodyPr/>
+          <a:lstStyle/>
+          <a:p>
+            <a:r>
+              <a:rPr lang="bg-BG" dirty="0"/>
+              <a:t>Създайте колона </a:t>
+            </a:r>
+            <a:r>
+              <a:rPr lang="en-US" dirty="0"/>
+              <a:t>"</a:t>
+            </a:r>
+            <a:r>
+              <a:rPr lang="en-US" b="1" dirty="0"/>
+              <a:t>Id</a:t>
+            </a:r>
+            <a:r>
+              <a:rPr lang="en-US" dirty="0"/>
+              <a:t>" </a:t>
+            </a:r>
+            <a:r>
+              <a:rPr lang="bg-BG" dirty="0"/>
+              <a:t>и за </a:t>
+            </a:r>
+            <a:r>
+              <a:rPr lang="bg-BG" b="1" dirty="0"/>
+              <a:t>типа данни </a:t>
+            </a:r>
+            <a:r>
+              <a:rPr lang="bg-BG" dirty="0"/>
+              <a:t>изберете </a:t>
+            </a:r>
+            <a:r>
+              <a:rPr lang="en-US" dirty="0"/>
+              <a:t>"</a:t>
+            </a:r>
+            <a:r>
+              <a:rPr lang="en-US" b="1" dirty="0"/>
+              <a:t>int</a:t>
+            </a:r>
+            <a:r>
+              <a:rPr lang="en-US" dirty="0"/>
+              <a:t>"</a:t>
+            </a:r>
+          </a:p>
+          <a:p>
+            <a:endParaRPr lang="bg-BG" dirty="0"/>
+          </a:p>
+          <a:p>
+            <a:endParaRPr lang="bg-BG" dirty="0"/>
+          </a:p>
+          <a:p>
+            <a:r>
+              <a:rPr lang="bg-BG" dirty="0"/>
+              <a:t>Нека добавим още </a:t>
+            </a:r>
+            <a:r>
+              <a:rPr lang="bg-BG" b="1" dirty="0"/>
+              <a:t>колони</a:t>
+            </a:r>
+            <a:r>
+              <a:rPr lang="bg-BG" dirty="0"/>
+              <a:t> в таблицата:</a:t>
+            </a:r>
+            <a:endParaRPr lang="en-US" dirty="0"/>
+          </a:p>
+          <a:p>
+            <a:endParaRPr lang="en-US" dirty="0"/>
+          </a:p>
+          <a:p>
+            <a:endParaRPr lang="en-US" dirty="0"/>
+          </a:p>
+          <a:p>
+            <a:pPr marL="0" indent="0">
+              <a:buNone/>
+            </a:pPr>
+            <a:endParaRPr lang="bg-BG" dirty="0"/>
+          </a:p>
+        </p:txBody>
+      </p:sp>
+      <p:sp>
+        <p:nvSpPr>
+          <p:cNvPr id="4" name="Title 3">
+            <a:extLst>
+              <a:ext uri="{FF2B5EF4-FFF2-40B4-BE49-F238E27FC236}">
+                <a16:creationId xmlns:a16="http://schemas.microsoft.com/office/drawing/2014/main" id="{0AF5DF7D-F18A-0E25-CEDC-8F1CB503B6CF}"/>
+              </a:ext>
+            </a:extLst>
+          </p:cNvPr>
+          <p:cNvSpPr>
+            <a:spLocks noGrp="1"/>
+          </p:cNvSpPr>
+          <p:nvPr>
+            <p:ph type="title"/>
+          </p:nvPr>
+        </p:nvSpPr>
+        <p:spPr/>
+        <p:txBody>
+          <a:bodyPr/>
+          <a:lstStyle/>
+          <a:p>
+            <a:r>
+              <a:rPr lang="bg-BG" dirty="0"/>
+              <a:t>Създаване на таблици</a:t>
+            </a:r>
+            <a:r>
+              <a:rPr lang="en-US" dirty="0"/>
+              <a:t> (2)</a:t>
+            </a:r>
+          </a:p>
+        </p:txBody>
+      </p:sp>
+      <p:pic>
+        <p:nvPicPr>
+          <p:cNvPr id="8" name="Picture 7">
+            <a:extLst>
+              <a:ext uri="{FF2B5EF4-FFF2-40B4-BE49-F238E27FC236}">
+                <a16:creationId xmlns:a16="http://schemas.microsoft.com/office/drawing/2014/main" id="{9DE1F37C-C4E0-18F7-D3B6-C3BC3C919BE3}"/>
+              </a:ext>
+            </a:extLst>
+          </p:cNvPr>
+          <p:cNvPicPr>
+            <a:picLocks noChangeAspect="1"/>
+          </p:cNvPicPr>
+          <p:nvPr/>
+        </p:nvPicPr>
+        <p:blipFill>
+          <a:blip r:embed="rId2"/>
+          <a:stretch>
+            <a:fillRect/>
+          </a:stretch>
+        </p:blipFill>
+        <p:spPr>
+          <a:xfrm>
+            <a:off x="3981451" y="2259000"/>
+            <a:ext cx="4229097" cy="567448"/>
+          </a:xfrm>
+          <a:prstGeom prst="rect">
+            <a:avLst/>
+          </a:prstGeom>
+          <a:ln>
+            <a:solidFill>
+              <a:schemeClr val="bg2">
+                <a:lumMod val="75000"/>
+              </a:schemeClr>
+            </a:solidFill>
+          </a:ln>
+        </p:spPr>
+      </p:pic>
+      <p:pic>
+        <p:nvPicPr>
+          <p:cNvPr id="10" name="Picture 9">
+            <a:extLst>
+              <a:ext uri="{FF2B5EF4-FFF2-40B4-BE49-F238E27FC236}">
+                <a16:creationId xmlns:a16="http://schemas.microsoft.com/office/drawing/2014/main" id="{AF0E45C9-DD17-279F-B223-65D8ED602A6E}"/>
+              </a:ext>
+            </a:extLst>
+          </p:cNvPr>
+          <p:cNvPicPr>
+            <a:picLocks noChangeAspect="1"/>
+          </p:cNvPicPr>
+          <p:nvPr/>
+        </p:nvPicPr>
+        <p:blipFill>
+          <a:blip r:embed="rId3"/>
+          <a:stretch>
+            <a:fillRect/>
+          </a:stretch>
+        </p:blipFill>
+        <p:spPr>
+          <a:xfrm>
+            <a:off x="3887589" y="4284000"/>
+            <a:ext cx="4416819" cy="1845000"/>
+          </a:xfrm>
+          <a:prstGeom prst="rect">
+            <a:avLst/>
+          </a:prstGeom>
+          <a:ln>
+            <a:solidFill>
+              <a:schemeClr val="bg2">
+                <a:lumMod val="75000"/>
+              </a:schemeClr>
+            </a:solidFill>
+          </a:ln>
+        </p:spPr>
+      </p:pic>
+    </p:spTree>
+    <p:extLst>
+      <p:ext uri="{BB962C8B-B14F-4D97-AF65-F5344CB8AC3E}">
+        <p14:creationId xmlns:p14="http://schemas.microsoft.com/office/powerpoint/2010/main" val="3142627951"/>
+      </p:ext>
+    </p:extLst>
+  </p:cSld>
+  <p:clrMapOvr>
+    <a:masterClrMapping/>
+  </p:clrMapOvr>
+  <mc:AlternateContent xmlns:mc="http://schemas.openxmlformats.org/markup-compatibility/2006" xmlns:p14="http://schemas.microsoft.com/office/powerpoint/2010/main">
+    <mc:Choice Requires="p14">
+      <p:transition spd="slow" p14:dur="2000" advClick="0" advTm="5000"/>
+    </mc:Choice>
+    <mc:Fallback xmlns="">
+      <p:transition spd="slow" advClick="0" advTm="5000"/>
+    </mc:Fallback>
+  </mc:AlternateContent>
+</p:sld>
+</file>
+
+<file path=ppt/slides/slide19.xml><?xml version="1.0" encoding="utf-8"?>
+<p:sld xmlns:a="http://schemas.openxmlformats.org/drawingml/2006/main" xmlns:r="http://schemas.openxmlformats.org/officeDocument/2006/relationships" xmlns:p="http://schemas.openxmlformats.org/presentationml/2006/main">
+  <p:cSld>
+    <p:spTree>
+      <p:nvGrpSpPr>
+        <p:cNvPr id="1" name=""/>
+        <p:cNvGrpSpPr/>
+        <p:nvPr/>
+      </p:nvGrpSpPr>
+      <p:grpSpPr>
+        <a:xfrm>
+          <a:off x="0" y="0"/>
+          <a:ext cx="0" cy="0"/>
+          <a:chOff x="0" y="0"/>
+          <a:chExt cx="0" cy="0"/>
+        </a:xfrm>
+      </p:grpSpPr>
+      <p:sp>
+        <p:nvSpPr>
+          <p:cNvPr id="2" name="Slide Number Placeholder 1">
+            <a:extLst>
+              <a:ext uri="{FF2B5EF4-FFF2-40B4-BE49-F238E27FC236}">
+                <a16:creationId xmlns:a16="http://schemas.microsoft.com/office/drawing/2014/main" id="{62FECA50-9702-DD7D-24F8-DEE2E117C7EF}"/>
+              </a:ext>
+            </a:extLst>
+          </p:cNvPr>
+          <p:cNvSpPr>
+            <a:spLocks noGrp="1"/>
+          </p:cNvSpPr>
+          <p:nvPr>
+            <p:ph type="sldNum" sz="quarter" idx="5"/>
+          </p:nvPr>
+        </p:nvSpPr>
+        <p:spPr/>
+        <p:txBody>
+          <a:bodyPr/>
+          <a:lstStyle/>
+          <a:p>
+            <a:fld id="{2BF067CD-8E6B-4360-9AA8-C5DF2A48A6D1}" type="slidenum">
+              <a:rPr lang="en-US" noProof="0" smtClean="0"/>
+              <a:pPr/>
+              <a:t>19</a:t>
+            </a:fld>
+            <a:endParaRPr lang="en-US" noProof="0" dirty="0"/>
+          </a:p>
+        </p:txBody>
+      </p:sp>
+      <p:sp>
+        <p:nvSpPr>
+          <p:cNvPr id="3" name="Text Placeholder 2">
+            <a:extLst>
+              <a:ext uri="{FF2B5EF4-FFF2-40B4-BE49-F238E27FC236}">
+                <a16:creationId xmlns:a16="http://schemas.microsoft.com/office/drawing/2014/main" id="{5C42E5D8-CF0D-6B3E-3F65-6ADD2BC163C1}"/>
+              </a:ext>
+            </a:extLst>
+          </p:cNvPr>
+          <p:cNvSpPr>
+            <a:spLocks noGrp="1"/>
+          </p:cNvSpPr>
+          <p:nvPr>
+            <p:ph type="body" sz="quarter" idx="10"/>
+          </p:nvPr>
+        </p:nvSpPr>
+        <p:spPr>
+          <a:xfrm>
+            <a:off x="190402" y="1196125"/>
+            <a:ext cx="11755598" cy="5528766"/>
+          </a:xfrm>
+        </p:spPr>
+        <p:txBody>
+          <a:bodyPr/>
+          <a:lstStyle/>
+          <a:p>
+            <a:r>
+              <a:rPr lang="bg-BG" dirty="0"/>
+              <a:t>Сега нека направим колоната </a:t>
+            </a:r>
+            <a:r>
+              <a:rPr lang="en-US" dirty="0"/>
+              <a:t>"</a:t>
+            </a:r>
+            <a:r>
+              <a:rPr lang="en-US" b="1" dirty="0"/>
+              <a:t>Id</a:t>
+            </a:r>
+            <a:r>
+              <a:rPr lang="en-US" dirty="0"/>
+              <a:t>" </a:t>
+            </a:r>
+            <a:r>
+              <a:rPr lang="bg-BG" b="1" dirty="0">
+                <a:solidFill>
+                  <a:schemeClr val="bg1"/>
+                </a:solidFill>
+              </a:rPr>
+              <a:t>първичен ключ</a:t>
+            </a:r>
+            <a:r>
+              <a:rPr lang="bg-BG" dirty="0"/>
+              <a:t>:</a:t>
+            </a:r>
+          </a:p>
+          <a:p>
+            <a:pPr lvl="1"/>
+            <a:r>
+              <a:rPr lang="bg-BG" dirty="0"/>
+              <a:t>С </a:t>
+            </a:r>
+            <a:r>
+              <a:rPr lang="bg-BG" b="1" dirty="0"/>
+              <a:t>десния бутон </a:t>
+            </a:r>
+            <a:r>
+              <a:rPr lang="bg-BG" dirty="0"/>
+              <a:t>натискаме вурху името на колоната и избираме </a:t>
+            </a:r>
+            <a:r>
+              <a:rPr lang="en-US" dirty="0"/>
+              <a:t>[</a:t>
+            </a:r>
+            <a:r>
+              <a:rPr lang="en-US" b="1" dirty="0">
+                <a:latin typeface="Consolas" panose="020B0609020204030204" pitchFamily="49" charset="0"/>
+              </a:rPr>
+              <a:t>Set Primary Key</a:t>
+            </a:r>
+            <a:r>
+              <a:rPr lang="en-US" dirty="0"/>
+              <a:t>]</a:t>
+            </a:r>
+          </a:p>
+        </p:txBody>
+      </p:sp>
+      <p:sp>
+        <p:nvSpPr>
+          <p:cNvPr id="4" name="Title 3">
+            <a:extLst>
+              <a:ext uri="{FF2B5EF4-FFF2-40B4-BE49-F238E27FC236}">
+                <a16:creationId xmlns:a16="http://schemas.microsoft.com/office/drawing/2014/main" id="{BC157A30-F8C2-719F-04B2-77AF0F523CE5}"/>
+              </a:ext>
+            </a:extLst>
+          </p:cNvPr>
+          <p:cNvSpPr>
+            <a:spLocks noGrp="1"/>
+          </p:cNvSpPr>
+          <p:nvPr>
+            <p:ph type="title"/>
+          </p:nvPr>
+        </p:nvSpPr>
+        <p:spPr/>
+        <p:txBody>
+          <a:bodyPr/>
+          <a:lstStyle/>
+          <a:p>
+            <a:r>
+              <a:rPr lang="bg-BG" dirty="0"/>
+              <a:t>Създаване на таблици</a:t>
+            </a:r>
+            <a:r>
+              <a:rPr lang="en-US" dirty="0"/>
+              <a:t> (3)</a:t>
+            </a:r>
+          </a:p>
+        </p:txBody>
+      </p:sp>
+      <p:pic>
+        <p:nvPicPr>
+          <p:cNvPr id="6" name="Picture 5">
+            <a:extLst>
+              <a:ext uri="{FF2B5EF4-FFF2-40B4-BE49-F238E27FC236}">
+                <a16:creationId xmlns:a16="http://schemas.microsoft.com/office/drawing/2014/main" id="{F2D64930-B2E1-F6CD-72A6-2E5DAE6C60F4}"/>
+              </a:ext>
+            </a:extLst>
+          </p:cNvPr>
+          <p:cNvPicPr>
+            <a:picLocks noChangeAspect="1"/>
+          </p:cNvPicPr>
+          <p:nvPr/>
+        </p:nvPicPr>
+        <p:blipFill>
+          <a:blip r:embed="rId2"/>
+          <a:stretch>
+            <a:fillRect/>
+          </a:stretch>
+        </p:blipFill>
+        <p:spPr>
+          <a:xfrm>
+            <a:off x="3373500" y="3960508"/>
+            <a:ext cx="5444999" cy="1350000"/>
+          </a:xfrm>
+          <a:prstGeom prst="rect">
+            <a:avLst/>
+          </a:prstGeom>
+          <a:ln>
+            <a:solidFill>
+              <a:schemeClr val="bg2">
+                <a:lumMod val="75000"/>
+              </a:schemeClr>
+            </a:solidFill>
+          </a:ln>
+        </p:spPr>
+      </p:pic>
+      <p:sp>
+        <p:nvSpPr>
+          <p:cNvPr id="7" name="Rectangle: Rounded Corners 6">
+            <a:extLst>
+              <a:ext uri="{FF2B5EF4-FFF2-40B4-BE49-F238E27FC236}">
+                <a16:creationId xmlns:a16="http://schemas.microsoft.com/office/drawing/2014/main" id="{5BCF6AA5-076A-1D45-F987-5D24E9787B81}"/>
+              </a:ext>
+            </a:extLst>
+          </p:cNvPr>
+          <p:cNvSpPr/>
+          <p:nvPr/>
+        </p:nvSpPr>
+        <p:spPr>
+          <a:xfrm>
+            <a:off x="4431000" y="4734000"/>
+            <a:ext cx="4230000" cy="315000"/>
+          </a:xfrm>
+          <a:prstGeom prst="roundRect">
+            <a:avLst>
+              <a:gd name="adj" fmla="val 5385"/>
+            </a:avLst>
+          </a:prstGeom>
+          <a:noFill/>
+          <a:ln w="57150">
+            <a:solidFill>
+              <a:schemeClr val="tx1"/>
+            </a:solidFill>
+            <a:prstDash val="solid"/>
+          </a:ln>
+        </p:spPr>
+        <p:style>
+          <a:lnRef idx="2">
+            <a:schemeClr val="accent1">
+              <a:shade val="50000"/>
+            </a:schemeClr>
+          </a:lnRef>
+          <a:fillRef idx="1">
+            <a:schemeClr val="accent1"/>
+          </a:fillRef>
+          <a:effectRef idx="0">
+            <a:schemeClr val="accent1"/>
+          </a:effectRef>
+          <a:fontRef idx="minor">
+            <a:schemeClr val="lt1"/>
+          </a:fontRef>
+        </p:style>
+        <p:txBody>
+          <a:bodyPr rtlCol="0" anchor="t"/>
+          <a:lstStyle/>
+          <a:p>
+            <a:pPr algn="ctr"/>
+            <a:endParaRPr lang="en-US" sz="2799" b="1" dirty="0">
+              <a:solidFill>
+                <a:srgbClr val="FBEEDC"/>
+              </a:solidFill>
+              <a:effectLst>
+                <a:outerShdw blurRad="38100" dist="38100" dir="2700000" algn="tl">
+                  <a:srgbClr val="000000">
+                    <a:alpha val="43137"/>
+                  </a:srgbClr>
+                </a:outerShdw>
+              </a:effectLst>
+              <a:latin typeface="Consolas" panose="020B0609020204030204" pitchFamily="49" charset="0"/>
+            </a:endParaRPr>
+          </a:p>
+        </p:txBody>
+      </p:sp>
+    </p:spTree>
+    <p:extLst>
+      <p:ext uri="{BB962C8B-B14F-4D97-AF65-F5344CB8AC3E}">
+        <p14:creationId xmlns:p14="http://schemas.microsoft.com/office/powerpoint/2010/main" val="3082722314"/>
+      </p:ext>
+    </p:extLst>
+  </p:cSld>
+  <p:clrMapOvr>
+    <a:masterClrMapping/>
+  </p:clrMapOvr>
+  <mc:AlternateContent xmlns:mc="http://schemas.openxmlformats.org/markup-compatibility/2006" xmlns:p14="http://schemas.microsoft.com/office/powerpoint/2010/main">
+    <mc:Choice Requires="p14">
+      <p:transition spd="slow" p14:dur="2000" advClick="0" advTm="5000"/>
+    </mc:Choice>
+    <mc:Fallback xmlns="">
+      <p:transition spd="slow" advClick="0" advTm="5000"/>
+    </mc:Fallback>
+  </mc:AlternateContent>
+</p:sld>
+</file>
+
+<file path=ppt/slides/slide2.xml><?xml version="1.0" encoding="utf-8"?>
+<p:sld xmlns:a="http://schemas.openxmlformats.org/drawingml/2006/main" xmlns:r="http://schemas.openxmlformats.org/officeDocument/2006/relationships" xmlns:p="http://schemas.openxmlformats.org/presentationml/2006/main">
+  <p:cSld>
+    <p:spTree>
+      <p:nvGrpSpPr>
+        <p:cNvPr id="1" name=""/>
+        <p:cNvGrpSpPr/>
+        <p:nvPr/>
+      </p:nvGrpSpPr>
+      <p:grpSpPr>
+        <a:xfrm>
+          <a:off x="0" y="0"/>
+          <a:ext cx="0" cy="0"/>
+          <a:chOff x="0" y="0"/>
+          <a:chExt cx="0" cy="0"/>
+        </a:xfrm>
+      </p:grpSpPr>
+      <p:sp>
+        <p:nvSpPr>
+          <p:cNvPr id="444419" name="Slide Body"/>
+          <p:cNvSpPr>
+            <a:spLocks noGrp="1" noChangeArrowheads="1"/>
+          </p:cNvSpPr>
+          <p:nvPr>
+            <p:ph type="body" sz="quarter" idx="13"/>
+          </p:nvPr>
+        </p:nvSpPr>
+        <p:spPr>
+          <a:xfrm>
+            <a:off x="300812" y="1299604"/>
+            <a:ext cx="10671988" cy="5207396"/>
+          </a:xfrm>
+        </p:spPr>
+        <p:txBody>
+          <a:bodyPr>
+            <a:normAutofit/>
+          </a:bodyPr>
+          <a:lstStyle/>
+          <a:p>
+            <a:pPr fontAlgn="base">
+              <a:spcAft>
+                <a:spcPts val="1400"/>
+              </a:spcAft>
+            </a:pPr>
+            <a:r>
+              <a:rPr lang="bg-BG" dirty="0"/>
+              <a:t>Таблици и релации</a:t>
+            </a:r>
+          </a:p>
+          <a:p>
+            <a:pPr lvl="1" fontAlgn="base">
+              <a:spcAft>
+                <a:spcPts val="1400"/>
+              </a:spcAft>
+            </a:pPr>
+            <a:r>
+              <a:rPr lang="bg-BG" b="1" dirty="0"/>
+              <a:t>Основни елементи </a:t>
+            </a:r>
+            <a:r>
+              <a:rPr lang="bg-BG" dirty="0"/>
+              <a:t>на таблиците</a:t>
+            </a:r>
+          </a:p>
+          <a:p>
+            <a:pPr lvl="1" fontAlgn="base">
+              <a:spcAft>
+                <a:spcPts val="1400"/>
+              </a:spcAft>
+            </a:pPr>
+            <a:r>
+              <a:rPr lang="bg-BG" b="1" dirty="0"/>
+              <a:t>Релации</a:t>
+            </a:r>
+            <a:r>
+              <a:rPr lang="bg-BG" dirty="0"/>
+              <a:t> и видове </a:t>
+            </a:r>
+            <a:r>
+              <a:rPr lang="bg-BG" b="1" dirty="0"/>
+              <a:t>ключове</a:t>
+            </a:r>
+          </a:p>
+          <a:p>
+            <a:pPr>
+              <a:spcAft>
+                <a:spcPts val="1400"/>
+              </a:spcAft>
+            </a:pPr>
+            <a:r>
+              <a:rPr lang="ru-RU" dirty="0"/>
+              <a:t>Създаване на </a:t>
+            </a:r>
+            <a:r>
+              <a:rPr lang="ru-RU" b="1" dirty="0"/>
+              <a:t>прости таблици</a:t>
+            </a:r>
+          </a:p>
+          <a:p>
+            <a:pPr>
+              <a:spcAft>
+                <a:spcPts val="1400"/>
+              </a:spcAft>
+            </a:pPr>
+            <a:r>
+              <a:rPr lang="ru-RU" dirty="0"/>
+              <a:t>Създаване на </a:t>
+            </a:r>
+            <a:r>
+              <a:rPr lang="ru-RU" b="1" dirty="0"/>
+              <a:t>връзка между таблици</a:t>
+            </a:r>
+          </a:p>
+          <a:p>
+            <a:pPr fontAlgn="base">
+              <a:spcAft>
+                <a:spcPts val="1400"/>
+              </a:spcAft>
+            </a:pPr>
+            <a:endParaRPr lang="en-US" dirty="0"/>
+          </a:p>
+        </p:txBody>
+      </p:sp>
+      <p:sp>
+        <p:nvSpPr>
+          <p:cNvPr id="444418" name="Slide Title"/>
+          <p:cNvSpPr>
+            <a:spLocks noGrp="1" noChangeArrowheads="1"/>
+          </p:cNvSpPr>
+          <p:nvPr>
+            <p:ph type="title"/>
+          </p:nvPr>
+        </p:nvSpPr>
+        <p:spPr>
+          <a:xfrm>
+            <a:off x="190405" y="100750"/>
+            <a:ext cx="9669213" cy="882654"/>
+          </a:xfrm>
+        </p:spPr>
+        <p:txBody>
+          <a:bodyPr/>
+          <a:lstStyle/>
+          <a:p>
+            <a:r>
+              <a:rPr lang="bg-BG" dirty="0"/>
+              <a:t>Съдържание</a:t>
+            </a:r>
+          </a:p>
+        </p:txBody>
+      </p:sp>
+      <p:sp>
+        <p:nvSpPr>
+          <p:cNvPr id="2" name="Slide Number">
+            <a:extLst>
+              <a:ext uri="{FF2B5EF4-FFF2-40B4-BE49-F238E27FC236}">
+                <a16:creationId xmlns:a16="http://schemas.microsoft.com/office/drawing/2014/main" id="{92BA9744-0A08-051B-04A3-B4621547E8BF}"/>
+              </a:ext>
+            </a:extLst>
+          </p:cNvPr>
+          <p:cNvSpPr txBox="1">
+            <a:spLocks/>
+          </p:cNvSpPr>
+          <p:nvPr/>
+        </p:nvSpPr>
+        <p:spPr>
+          <a:xfrm>
+            <a:off x="11753030" y="6507000"/>
+            <a:ext cx="367414" cy="297000"/>
+          </a:xfrm>
+          <a:prstGeom prst="rect">
+            <a:avLst/>
+          </a:prstGeom>
+        </p:spPr>
+        <p:txBody>
+          <a:bodyPr vert="horz" lIns="91440" tIns="45720" rIns="91440" bIns="45720" rtlCol="0" anchor="b"/>
+          <a:lstStyle>
+            <a:defPPr>
+              <a:defRPr lang="en-US"/>
+            </a:defPPr>
+            <a:lvl1pPr marL="0" algn="r" defTabSz="914400" rtl="0" eaLnBrk="1" latinLnBrk="0" hangingPunct="1">
+              <a:defRPr sz="1000" kern="1200">
+                <a:solidFill>
+                  <a:schemeClr val="tx1"/>
+                </a:solidFill>
+                <a:latin typeface="+mn-lt"/>
+                <a:ea typeface="+mn-ea"/>
+                <a:cs typeface="+mn-cs"/>
+              </a:defRPr>
+            </a:lvl1pPr>
+            <a:lvl2pPr marL="457200" algn="l" defTabSz="914400" rtl="0" eaLnBrk="1" latinLnBrk="0" hangingPunct="1">
+              <a:defRPr sz="1800" kern="1200">
+                <a:solidFill>
+                  <a:schemeClr val="tx1"/>
+                </a:solidFill>
+                <a:latin typeface="+mn-lt"/>
+                <a:ea typeface="+mn-ea"/>
+                <a:cs typeface="+mn-cs"/>
+              </a:defRPr>
+            </a:lvl2pPr>
+            <a:lvl3pPr marL="914400" algn="l" defTabSz="914400" rtl="0" eaLnBrk="1" latinLnBrk="0" hangingPunct="1">
+              <a:defRPr sz="1800" kern="1200">
+                <a:solidFill>
+                  <a:schemeClr val="tx1"/>
+                </a:solidFill>
+                <a:latin typeface="+mn-lt"/>
+                <a:ea typeface="+mn-ea"/>
+                <a:cs typeface="+mn-cs"/>
+              </a:defRPr>
+            </a:lvl3pPr>
+            <a:lvl4pPr marL="1371600" algn="l" defTabSz="914400" rtl="0" eaLnBrk="1" latinLnBrk="0" hangingPunct="1">
+              <a:defRPr sz="1800" kern="1200">
+                <a:solidFill>
+                  <a:schemeClr val="tx1"/>
+                </a:solidFill>
+                <a:latin typeface="+mn-lt"/>
+                <a:ea typeface="+mn-ea"/>
+                <a:cs typeface="+mn-cs"/>
+              </a:defRPr>
+            </a:lvl4pPr>
+            <a:lvl5pPr marL="1828800" algn="l" defTabSz="914400" rtl="0" eaLnBrk="1" latinLnBrk="0" hangingPunct="1">
+              <a:defRPr sz="1800" kern="1200">
+                <a:solidFill>
+                  <a:schemeClr val="tx1"/>
+                </a:solidFill>
+                <a:latin typeface="+mn-lt"/>
+                <a:ea typeface="+mn-ea"/>
+                <a:cs typeface="+mn-cs"/>
+              </a:defRPr>
+            </a:lvl5pPr>
+            <a:lvl6pPr marL="2286000" algn="l" defTabSz="914400" rtl="0" eaLnBrk="1" latinLnBrk="0" hangingPunct="1">
+              <a:defRPr sz="1800" kern="1200">
+                <a:solidFill>
+                  <a:schemeClr val="tx1"/>
+                </a:solidFill>
+                <a:latin typeface="+mn-lt"/>
+                <a:ea typeface="+mn-ea"/>
+                <a:cs typeface="+mn-cs"/>
+              </a:defRPr>
+            </a:lvl6pPr>
+            <a:lvl7pPr marL="2743200" algn="l" defTabSz="914400" rtl="0" eaLnBrk="1" latinLnBrk="0" hangingPunct="1">
+              <a:defRPr sz="1800" kern="1200">
+                <a:solidFill>
+                  <a:schemeClr val="tx1"/>
+                </a:solidFill>
+                <a:latin typeface="+mn-lt"/>
+                <a:ea typeface="+mn-ea"/>
+                <a:cs typeface="+mn-cs"/>
+              </a:defRPr>
+            </a:lvl7pPr>
+            <a:lvl8pPr marL="3200400" algn="l" defTabSz="914400" rtl="0" eaLnBrk="1" latinLnBrk="0" hangingPunct="1">
+              <a:defRPr sz="1800" kern="1200">
+                <a:solidFill>
+                  <a:schemeClr val="tx1"/>
+                </a:solidFill>
+                <a:latin typeface="+mn-lt"/>
+                <a:ea typeface="+mn-ea"/>
+                <a:cs typeface="+mn-cs"/>
+              </a:defRPr>
+            </a:lvl8pPr>
+            <a:lvl9pPr marL="3657600" algn="l" defTabSz="914400" rtl="0" eaLnBrk="1" latinLnBrk="0" hangingPunct="1">
+              <a:defRPr sz="1800" kern="1200">
+                <a:solidFill>
+                  <a:schemeClr val="tx1"/>
+                </a:solidFill>
+                <a:latin typeface="+mn-lt"/>
+                <a:ea typeface="+mn-ea"/>
+                <a:cs typeface="+mn-cs"/>
+              </a:defRPr>
+            </a:lvl9pPr>
+          </a:lstStyle>
+          <a:p>
+            <a:fld id="{2BF067CD-8E6B-4360-9AA8-C5DF2A48A6D1}" type="slidenum">
+              <a:rPr lang="en-US" smtClean="0"/>
+              <a:pPr/>
+              <a:t>2</a:t>
+            </a:fld>
+            <a:endParaRPr lang="en-US" dirty="0"/>
+          </a:p>
+        </p:txBody>
+      </p:sp>
+    </p:spTree>
+    <p:extLst>
+      <p:ext uri="{BB962C8B-B14F-4D97-AF65-F5344CB8AC3E}">
+        <p14:creationId xmlns:p14="http://schemas.microsoft.com/office/powerpoint/2010/main" val="378861557"/>
+      </p:ext>
+    </p:extLst>
+  </p:cSld>
+  <p:clrMapOvr>
+    <a:masterClrMapping/>
+  </p:clrMapOvr>
+  <mc:AlternateContent xmlns:mc="http://schemas.openxmlformats.org/markup-compatibility/2006" xmlns:p14="http://schemas.microsoft.com/office/powerpoint/2010/main">
+    <mc:Choice Requires="p14">
+      <p:transition spd="slow" p14:dur="2000" advClick="0" advTm="5000"/>
+    </mc:Choice>
+    <mc:Fallback xmlns="">
+      <p:transition spd="slow" advClick="0" advTm="5000"/>
+    </mc:Fallback>
+  </mc:AlternateContent>
+  <p:timing>
+    <p:tnLst>
+      <p:par>
+        <p:cTn id="1" dur="indefinite" restart="never" nodeType="tmRoot">
+          <p:childTnLst>
+            <p:seq concurrent="1" nextAc="seek">
+              <p:cTn id="2" dur="indefinite" nodeType="mainSeq">
+                <p:childTnLst>
+                  <p:par>
+                    <p:cTn id="3" fill="hold">
+                      <p:stCondLst>
+                        <p:cond delay="indefinite"/>
+                      </p:stCondLst>
+                      <p:childTnLst>
+                        <p:par>
+                          <p:cTn id="4" fill="hold">
+                            <p:stCondLst>
+                              <p:cond delay="0"/>
+                            </p:stCondLst>
+                            <p:childTnLst>
+                              <p:par>
+                                <p:cTn id="5" presetID="1" presetClass="entr" presetSubtype="0" fill="hold" nodeType="clickEffect">
+                                  <p:stCondLst>
+                                    <p:cond delay="0"/>
+                                  </p:stCondLst>
+                                  <p:childTnLst>
+                                    <p:set>
+                                      <p:cBhvr>
+                                        <p:cTn id="6" dur="1" fill="hold">
+                                          <p:stCondLst>
+                                            <p:cond delay="0"/>
+                                          </p:stCondLst>
+                                        </p:cTn>
+                                        <p:tgtEl>
+                                          <p:spTgt spid="444419">
+                                            <p:txEl>
+                                              <p:pRg st="2" end="2"/>
+                                            </p:txEl>
+                                          </p:spTgt>
+                                        </p:tgtEl>
+                                        <p:attrNameLst>
+                                          <p:attrName>style.visibility</p:attrName>
+                                        </p:attrNameLst>
+                                      </p:cBhvr>
+                                      <p:to>
+                                        <p:strVal val="visible"/>
+                                      </p:to>
+                                    </p:set>
+                                  </p:childTnLst>
+                                </p:cTn>
+                              </p:par>
+                            </p:childTnLst>
+                          </p:cTn>
+                        </p:par>
+                      </p:childTnLst>
+                    </p:cTn>
+                  </p:par>
+                  <p:par>
+                    <p:cTn id="7" fill="hold">
+                      <p:stCondLst>
+                        <p:cond delay="indefinite"/>
+                      </p:stCondLst>
+                      <p:childTnLst>
+                        <p:par>
+                          <p:cTn id="8" fill="hold">
+                            <p:stCondLst>
+                              <p:cond delay="0"/>
+                            </p:stCondLst>
+                            <p:childTnLst>
+                              <p:par>
+                                <p:cTn id="9" presetID="1" presetClass="entr" presetSubtype="0" fill="hold" nodeType="clickEffect">
+                                  <p:stCondLst>
+                                    <p:cond delay="0"/>
+                                  </p:stCondLst>
+                                  <p:childTnLst>
+                                    <p:set>
+                                      <p:cBhvr>
+                                        <p:cTn id="10" dur="1" fill="hold">
+                                          <p:stCondLst>
+                                            <p:cond delay="0"/>
+                                          </p:stCondLst>
+                                        </p:cTn>
+                                        <p:tgtEl>
+                                          <p:spTgt spid="444419">
+                                            <p:txEl>
+                                              <p:pRg st="3" end="3"/>
+                                            </p:txEl>
+                                          </p:spTgt>
+                                        </p:tgtEl>
+                                        <p:attrNameLst>
+                                          <p:attrName>style.visibility</p:attrName>
+                                        </p:attrNameLst>
+                                      </p:cBhvr>
+                                      <p:to>
+                                        <p:strVal val="visible"/>
+                                      </p:to>
+                                    </p:set>
+                                  </p:childTnLst>
+                                </p:cTn>
+                              </p:par>
+                            </p:childTnLst>
+                          </p:cTn>
+                        </p:par>
+                      </p:childTnLst>
+                    </p:cTn>
+                  </p:par>
+                  <p:par>
+                    <p:cTn id="11" fill="hold">
+                      <p:stCondLst>
+                        <p:cond delay="indefinite"/>
+                      </p:stCondLst>
+                      <p:childTnLst>
+                        <p:par>
+                          <p:cTn id="12" fill="hold">
+                            <p:stCondLst>
+                              <p:cond delay="0"/>
+                            </p:stCondLst>
+                            <p:childTnLst>
+                              <p:par>
+                                <p:cTn id="13" presetID="1" presetClass="entr" presetSubtype="0" fill="hold" nodeType="clickEffect">
+                                  <p:stCondLst>
+                                    <p:cond delay="0"/>
+                                  </p:stCondLst>
+                                  <p:childTnLst>
+                                    <p:set>
+                                      <p:cBhvr>
+                                        <p:cTn id="14" dur="1" fill="hold">
+                                          <p:stCondLst>
+                                            <p:cond delay="0"/>
+                                          </p:stCondLst>
+                                        </p:cTn>
+                                        <p:tgtEl>
+                                          <p:spTgt spid="444419">
+                                            <p:txEl>
+                                              <p:pRg st="4" end="4"/>
+                                            </p:txEl>
+                                          </p:spTgt>
+                                        </p:tgtEl>
+                                        <p:attrNameLst>
+                                          <p:attrName>style.visibility</p:attrName>
+                                        </p:attrNameLst>
+                                      </p:cBhvr>
+                                      <p:to>
+                                        <p:strVal val="visible"/>
+                                      </p:to>
+                                    </p:set>
+                                  </p:childTnLst>
+                                </p:cTn>
+                              </p:par>
+                            </p:childTnLst>
+                          </p:cTn>
+                        </p:par>
+                      </p:childTnLst>
+                    </p:cTn>
+                  </p:par>
+                </p:childTnLst>
+              </p:cTn>
+              <p:prevCondLst>
+                <p:cond evt="onPrev" delay="0">
+                  <p:tgtEl>
+                    <p:sldTgt/>
+                  </p:tgtEl>
+                </p:cond>
+              </p:prevCondLst>
+              <p:nextCondLst>
+                <p:cond evt="onNext" delay="0">
+                  <p:tgtEl>
+                    <p:sldTgt/>
+                  </p:tgtEl>
+                </p:cond>
+              </p:nextCondLst>
+            </p:seq>
+          </p:childTnLst>
+        </p:cTn>
+      </p:par>
+    </p:tnLst>
+  </p:timing>
+</p:sld>
+</file>
+
+<file path=ppt/slides/slide20.xml><?xml version="1.0" encoding="utf-8"?>
+<p:sld xmlns:a="http://schemas.openxmlformats.org/drawingml/2006/main" xmlns:r="http://schemas.openxmlformats.org/officeDocument/2006/relationships" xmlns:p="http://schemas.openxmlformats.org/presentationml/2006/main">
+  <p:cSld>
+    <p:spTree>
+      <p:nvGrpSpPr>
+        <p:cNvPr id="1" name=""/>
+        <p:cNvGrpSpPr/>
+        <p:nvPr/>
+      </p:nvGrpSpPr>
+      <p:grpSpPr>
+        <a:xfrm>
+          <a:off x="0" y="0"/>
+          <a:ext cx="0" cy="0"/>
+          <a:chOff x="0" y="0"/>
+          <a:chExt cx="0" cy="0"/>
+        </a:xfrm>
+      </p:grpSpPr>
+      <p:sp>
+        <p:nvSpPr>
+          <p:cNvPr id="2" name="Slide Number Placeholder 1">
+            <a:extLst>
+              <a:ext uri="{FF2B5EF4-FFF2-40B4-BE49-F238E27FC236}">
+                <a16:creationId xmlns:a16="http://schemas.microsoft.com/office/drawing/2014/main" id="{F57FEBFD-1091-0F2E-54A9-436356C622B6}"/>
+              </a:ext>
+            </a:extLst>
+          </p:cNvPr>
+          <p:cNvSpPr>
+            <a:spLocks noGrp="1"/>
+          </p:cNvSpPr>
+          <p:nvPr>
+            <p:ph type="sldNum" sz="quarter" idx="5"/>
+          </p:nvPr>
+        </p:nvSpPr>
+        <p:spPr/>
+        <p:txBody>
+          <a:bodyPr/>
+          <a:lstStyle/>
+          <a:p>
+            <a:fld id="{2BF067CD-8E6B-4360-9AA8-C5DF2A48A6D1}" type="slidenum">
+              <a:rPr lang="en-US" noProof="0" smtClean="0"/>
+              <a:pPr/>
+              <a:t>20</a:t>
+            </a:fld>
+            <a:endParaRPr lang="en-US" noProof="0" dirty="0"/>
+          </a:p>
+        </p:txBody>
+      </p:sp>
+      <p:sp>
+        <p:nvSpPr>
+          <p:cNvPr id="3" name="Text Placeholder 2">
+            <a:extLst>
+              <a:ext uri="{FF2B5EF4-FFF2-40B4-BE49-F238E27FC236}">
+                <a16:creationId xmlns:a16="http://schemas.microsoft.com/office/drawing/2014/main" id="{98D692D2-AE95-BEC3-4C70-9EC621ACAD57}"/>
+              </a:ext>
+            </a:extLst>
+          </p:cNvPr>
+          <p:cNvSpPr>
+            <a:spLocks noGrp="1"/>
+          </p:cNvSpPr>
+          <p:nvPr>
+            <p:ph type="body" sz="quarter" idx="10"/>
+          </p:nvPr>
+        </p:nvSpPr>
+        <p:spPr>
+          <a:xfrm>
+            <a:off x="190402" y="1196125"/>
+            <a:ext cx="7480598" cy="5528766"/>
+          </a:xfrm>
+        </p:spPr>
+        <p:txBody>
+          <a:bodyPr/>
+          <a:lstStyle/>
+          <a:p>
+            <a:r>
+              <a:rPr lang="bg-BG" dirty="0"/>
+              <a:t>За да </a:t>
+            </a:r>
+            <a:r>
+              <a:rPr lang="bg-BG" b="1" dirty="0">
+                <a:solidFill>
+                  <a:schemeClr val="bg1"/>
+                </a:solidFill>
+              </a:rPr>
+              <a:t>запазим</a:t>
+            </a:r>
+            <a:r>
+              <a:rPr lang="bg-BG" dirty="0"/>
+              <a:t> таблицата натискаме с </a:t>
+            </a:r>
+            <a:r>
+              <a:rPr lang="bg-BG" b="1" dirty="0"/>
+              <a:t>десния бутон </a:t>
+            </a:r>
+            <a:r>
+              <a:rPr lang="bg-BG" dirty="0"/>
+              <a:t>върху </a:t>
+            </a:r>
+            <a:r>
+              <a:rPr lang="bg-BG" b="1" dirty="0"/>
+              <a:t>сегашния прозорец </a:t>
+            </a:r>
+            <a:r>
+              <a:rPr lang="bg-BG" dirty="0"/>
+              <a:t>и избираме </a:t>
+            </a:r>
+            <a:r>
+              <a:rPr lang="en-US" dirty="0"/>
+              <a:t>[</a:t>
+            </a:r>
+            <a:r>
+              <a:rPr lang="en-US" b="1" dirty="0">
+                <a:latin typeface="Consolas" panose="020B0609020204030204" pitchFamily="49" charset="0"/>
+              </a:rPr>
+              <a:t>Save</a:t>
+            </a:r>
+            <a:r>
+              <a:rPr lang="en-US" dirty="0"/>
+              <a:t>]</a:t>
+            </a:r>
+          </a:p>
+          <a:p>
+            <a:r>
+              <a:rPr lang="bg-BG" dirty="0"/>
+              <a:t>Задаваме </a:t>
+            </a:r>
+            <a:r>
+              <a:rPr lang="bg-BG" b="1" dirty="0">
+                <a:solidFill>
+                  <a:schemeClr val="bg1"/>
+                </a:solidFill>
+              </a:rPr>
+              <a:t>име</a:t>
+            </a:r>
+            <a:r>
+              <a:rPr lang="bg-BG" dirty="0"/>
+              <a:t> на таблицата:</a:t>
+            </a:r>
+            <a:endParaRPr lang="en-US" dirty="0"/>
+          </a:p>
+        </p:txBody>
+      </p:sp>
+      <p:sp>
+        <p:nvSpPr>
+          <p:cNvPr id="4" name="Title 3">
+            <a:extLst>
+              <a:ext uri="{FF2B5EF4-FFF2-40B4-BE49-F238E27FC236}">
+                <a16:creationId xmlns:a16="http://schemas.microsoft.com/office/drawing/2014/main" id="{9BB0EE14-9FE3-5703-C48B-E082E693B90F}"/>
+              </a:ext>
+            </a:extLst>
+          </p:cNvPr>
+          <p:cNvSpPr>
+            <a:spLocks noGrp="1"/>
+          </p:cNvSpPr>
+          <p:nvPr>
+            <p:ph type="title"/>
+          </p:nvPr>
+        </p:nvSpPr>
+        <p:spPr/>
+        <p:txBody>
+          <a:bodyPr/>
+          <a:lstStyle/>
+          <a:p>
+            <a:r>
+              <a:rPr lang="bg-BG" dirty="0"/>
+              <a:t>Създаване на таблици</a:t>
+            </a:r>
+            <a:r>
+              <a:rPr lang="en-US" dirty="0"/>
+              <a:t> (4)</a:t>
+            </a:r>
+          </a:p>
+        </p:txBody>
+      </p:sp>
+      <p:pic>
+        <p:nvPicPr>
+          <p:cNvPr id="6" name="Picture 5">
+            <a:extLst>
+              <a:ext uri="{FF2B5EF4-FFF2-40B4-BE49-F238E27FC236}">
+                <a16:creationId xmlns:a16="http://schemas.microsoft.com/office/drawing/2014/main" id="{A53E385C-7421-52DF-CEF0-90B8E5F08496}"/>
+              </a:ext>
+            </a:extLst>
+          </p:cNvPr>
+          <p:cNvPicPr>
+            <a:picLocks noChangeAspect="1"/>
+          </p:cNvPicPr>
+          <p:nvPr/>
+        </p:nvPicPr>
+        <p:blipFill>
+          <a:blip r:embed="rId2"/>
+          <a:stretch>
+            <a:fillRect/>
+          </a:stretch>
+        </p:blipFill>
+        <p:spPr>
+          <a:xfrm>
+            <a:off x="7176000" y="2167776"/>
+            <a:ext cx="4414912" cy="3555000"/>
+          </a:xfrm>
+          <a:prstGeom prst="rect">
+            <a:avLst/>
+          </a:prstGeom>
+          <a:ln>
+            <a:solidFill>
+              <a:schemeClr val="bg2">
+                <a:lumMod val="75000"/>
+              </a:schemeClr>
+            </a:solidFill>
+          </a:ln>
+        </p:spPr>
+      </p:pic>
+      <p:pic>
+        <p:nvPicPr>
+          <p:cNvPr id="8" name="Picture 7">
+            <a:extLst>
+              <a:ext uri="{FF2B5EF4-FFF2-40B4-BE49-F238E27FC236}">
+                <a16:creationId xmlns:a16="http://schemas.microsoft.com/office/drawing/2014/main" id="{5088D2C6-2CEE-415E-8BF5-7537498773EC}"/>
+              </a:ext>
+            </a:extLst>
+          </p:cNvPr>
+          <p:cNvPicPr>
+            <a:picLocks noChangeAspect="1"/>
+          </p:cNvPicPr>
+          <p:nvPr/>
+        </p:nvPicPr>
+        <p:blipFill>
+          <a:blip r:embed="rId3"/>
+          <a:stretch>
+            <a:fillRect/>
+          </a:stretch>
+        </p:blipFill>
+        <p:spPr>
+          <a:xfrm>
+            <a:off x="1121989" y="4104000"/>
+            <a:ext cx="4245362" cy="1622911"/>
+          </a:xfrm>
+          <a:prstGeom prst="rect">
+            <a:avLst/>
+          </a:prstGeom>
+          <a:ln>
+            <a:solidFill>
+              <a:schemeClr val="bg2">
+                <a:lumMod val="75000"/>
+              </a:schemeClr>
+            </a:solidFill>
+          </a:ln>
+        </p:spPr>
+      </p:pic>
+      <p:sp>
+        <p:nvSpPr>
+          <p:cNvPr id="9" name="Rectangle: Rounded Corners 8">
+            <a:extLst>
+              <a:ext uri="{FF2B5EF4-FFF2-40B4-BE49-F238E27FC236}">
+                <a16:creationId xmlns:a16="http://schemas.microsoft.com/office/drawing/2014/main" id="{78054072-0135-0342-773E-BEF93AC24101}"/>
+              </a:ext>
+            </a:extLst>
+          </p:cNvPr>
+          <p:cNvSpPr/>
+          <p:nvPr/>
+        </p:nvSpPr>
+        <p:spPr>
+          <a:xfrm>
+            <a:off x="8346000" y="2394000"/>
+            <a:ext cx="2925000" cy="270000"/>
+          </a:xfrm>
+          <a:prstGeom prst="roundRect">
+            <a:avLst>
+              <a:gd name="adj" fmla="val 5385"/>
+            </a:avLst>
+          </a:prstGeom>
+          <a:noFill/>
+          <a:ln w="57150">
+            <a:solidFill>
+              <a:schemeClr val="tx1"/>
+            </a:solidFill>
+            <a:prstDash val="solid"/>
+          </a:ln>
+        </p:spPr>
+        <p:style>
+          <a:lnRef idx="2">
+            <a:schemeClr val="accent1">
+              <a:shade val="50000"/>
+            </a:schemeClr>
+          </a:lnRef>
+          <a:fillRef idx="1">
+            <a:schemeClr val="accent1"/>
+          </a:fillRef>
+          <a:effectRef idx="0">
+            <a:schemeClr val="accent1"/>
+          </a:effectRef>
+          <a:fontRef idx="minor">
+            <a:schemeClr val="lt1"/>
+          </a:fontRef>
+        </p:style>
+        <p:txBody>
+          <a:bodyPr rtlCol="0" anchor="t"/>
+          <a:lstStyle/>
+          <a:p>
+            <a:pPr algn="ctr"/>
+            <a:endParaRPr lang="en-US" sz="2799" b="1" dirty="0">
+              <a:solidFill>
+                <a:srgbClr val="FBEEDC"/>
+              </a:solidFill>
+              <a:effectLst>
+                <a:outerShdw blurRad="38100" dist="38100" dir="2700000" algn="tl">
+                  <a:srgbClr val="000000">
+                    <a:alpha val="43137"/>
+                  </a:srgbClr>
+                </a:outerShdw>
+              </a:effectLst>
+              <a:latin typeface="Consolas" panose="020B0609020204030204" pitchFamily="49" charset="0"/>
+            </a:endParaRPr>
+          </a:p>
+        </p:txBody>
+      </p:sp>
+    </p:spTree>
+    <p:extLst>
+      <p:ext uri="{BB962C8B-B14F-4D97-AF65-F5344CB8AC3E}">
+        <p14:creationId xmlns:p14="http://schemas.microsoft.com/office/powerpoint/2010/main" val="118144450"/>
+      </p:ext>
+    </p:extLst>
+  </p:cSld>
+  <p:clrMapOvr>
+    <a:masterClrMapping/>
+  </p:clrMapOvr>
+  <mc:AlternateContent xmlns:mc="http://schemas.openxmlformats.org/markup-compatibility/2006" xmlns:p14="http://schemas.microsoft.com/office/powerpoint/2010/main">
+    <mc:Choice Requires="p14">
+      <p:transition spd="slow" p14:dur="2000" advClick="0" advTm="5000"/>
+    </mc:Choice>
+    <mc:Fallback xmlns="">
+      <p:transition spd="slow" advClick="0" advTm="5000"/>
+    </mc:Fallback>
+  </mc:AlternateContent>
+  <p:timing>
+    <p:tnLst>
+      <p:par>
+        <p:cTn id="1" dur="indefinite" restart="never" nodeType="tmRoot">
+          <p:childTnLst>
+            <p:seq concurrent="1" nextAc="seek">
+              <p:cTn id="2" dur="indefinite" nodeType="mainSeq">
+                <p:childTnLst>
+                  <p:par>
+                    <p:cTn id="3" fill="hold">
+                      <p:stCondLst>
+                        <p:cond delay="indefinite"/>
+                      </p:stCondLst>
+                      <p:childTnLst>
+                        <p:par>
+                          <p:cTn id="4" fill="hold">
+                            <p:stCondLst>
+                              <p:cond delay="0"/>
+                            </p:stCondLst>
+                            <p:childTnLst>
+                              <p:par>
+                                <p:cTn id="5" presetID="1" presetClass="entr" presetSubtype="0" fill="hold" grpId="0" nodeType="clickEffect">
+                                  <p:stCondLst>
+                                    <p:cond delay="0"/>
+                                  </p:stCondLst>
+                                  <p:childTnLst>
+                                    <p:set>
+                                      <p:cBhvr>
+                                        <p:cTn id="6" dur="1" fill="hold">
+                                          <p:stCondLst>
+                                            <p:cond delay="0"/>
+                                          </p:stCondLst>
+                                        </p:cTn>
+                                        <p:tgtEl>
+                                          <p:spTgt spid="9"/>
+                                        </p:tgtEl>
+                                        <p:attrNameLst>
+                                          <p:attrName>style.visibility</p:attrName>
+                                        </p:attrNameLst>
+                                      </p:cBhvr>
+                                      <p:to>
+                                        <p:strVal val="visible"/>
+                                      </p:to>
+                                    </p:set>
+                                  </p:childTnLst>
+                                </p:cTn>
+                              </p:par>
+                            </p:childTnLst>
+                          </p:cTn>
+                        </p:par>
+                      </p:childTnLst>
+                    </p:cTn>
+                  </p:par>
+                  <p:par>
+                    <p:cTn id="7" fill="hold">
+                      <p:stCondLst>
+                        <p:cond delay="indefinite"/>
+                      </p:stCondLst>
+                      <p:childTnLst>
+                        <p:par>
+                          <p:cTn id="8" fill="hold">
+                            <p:stCondLst>
+                              <p:cond delay="0"/>
+                            </p:stCondLst>
+                            <p:childTnLst>
+                              <p:par>
+                                <p:cTn id="9" presetID="1" presetClass="entr" presetSubtype="0" fill="hold" nodeType="clickEffect">
+                                  <p:stCondLst>
+                                    <p:cond delay="0"/>
+                                  </p:stCondLst>
+                                  <p:childTnLst>
+                                    <p:set>
+                                      <p:cBhvr>
+                                        <p:cTn id="10" dur="1" fill="hold">
+                                          <p:stCondLst>
+                                            <p:cond delay="0"/>
+                                          </p:stCondLst>
+                                        </p:cTn>
+                                        <p:tgtEl>
+                                          <p:spTgt spid="3">
+                                            <p:txEl>
+                                              <p:pRg st="1" end="1"/>
+                                            </p:txEl>
+                                          </p:spTgt>
+                                        </p:tgtEl>
+                                        <p:attrNameLst>
+                                          <p:attrName>style.visibility</p:attrName>
+                                        </p:attrNameLst>
+                                      </p:cBhvr>
+                                      <p:to>
+                                        <p:strVal val="visible"/>
+                                      </p:to>
+                                    </p:set>
+                                  </p:childTnLst>
+                                </p:cTn>
+                              </p:par>
+                              <p:par>
+                                <p:cTn id="11" presetID="1" presetClass="entr" presetSubtype="0" fill="hold" nodeType="withEffect">
+                                  <p:stCondLst>
+                                    <p:cond delay="0"/>
+                                  </p:stCondLst>
+                                  <p:childTnLst>
+                                    <p:set>
+                                      <p:cBhvr>
+                                        <p:cTn id="12" dur="1" fill="hold">
+                                          <p:stCondLst>
+                                            <p:cond delay="0"/>
+                                          </p:stCondLst>
+                                        </p:cTn>
+                                        <p:tgtEl>
+                                          <p:spTgt spid="8"/>
+                                        </p:tgtEl>
+                                        <p:attrNameLst>
+                                          <p:attrName>style.visibility</p:attrName>
+                                        </p:attrNameLst>
+                                      </p:cBhvr>
+                                      <p:to>
+                                        <p:strVal val="visible"/>
+                                      </p:to>
+                                    </p:set>
+                                  </p:childTnLst>
+                                </p:cTn>
+                              </p:par>
+                            </p:childTnLst>
+                          </p:cTn>
+                        </p:par>
+                      </p:childTnLst>
+                    </p:cTn>
+                  </p:par>
+                </p:childTnLst>
+              </p:cTn>
+              <p:prevCondLst>
+                <p:cond evt="onPrev" delay="0">
+                  <p:tgtEl>
+                    <p:sldTgt/>
+                  </p:tgtEl>
+                </p:cond>
+              </p:prevCondLst>
+              <p:nextCondLst>
+                <p:cond evt="onNext" delay="0">
+                  <p:tgtEl>
+                    <p:sldTgt/>
+                  </p:tgtEl>
+                </p:cond>
+              </p:nextCondLst>
+            </p:seq>
+          </p:childTnLst>
+        </p:cTn>
+      </p:par>
+    </p:tnLst>
+    <p:bldLst>
+      <p:bldP spid="9" grpId="0" animBg="1"/>
+    </p:bldLst>
+  </p:timing>
+</p:sld>
+</file>
+
+<file path=ppt/slides/slide21.xml><?xml version="1.0" encoding="utf-8"?>
+<p:sld xmlns:a="http://schemas.openxmlformats.org/drawingml/2006/main" xmlns:r="http://schemas.openxmlformats.org/officeDocument/2006/relationships" xmlns:p="http://schemas.openxmlformats.org/presentationml/2006/main">
+  <p:cSld>
+    <p:spTree>
+      <p:nvGrpSpPr>
+        <p:cNvPr id="1" name=""/>
+        <p:cNvGrpSpPr/>
+        <p:nvPr/>
+      </p:nvGrpSpPr>
+      <p:grpSpPr>
+        <a:xfrm>
+          <a:off x="0" y="0"/>
+          <a:ext cx="0" cy="0"/>
+          <a:chOff x="0" y="0"/>
+          <a:chExt cx="0" cy="0"/>
+        </a:xfrm>
+      </p:grpSpPr>
+      <p:sp>
+        <p:nvSpPr>
+          <p:cNvPr id="2" name="Slide Number Placeholder 1">
+            <a:extLst>
+              <a:ext uri="{FF2B5EF4-FFF2-40B4-BE49-F238E27FC236}">
+                <a16:creationId xmlns:a16="http://schemas.microsoft.com/office/drawing/2014/main" id="{07BE9C50-DB91-1224-AAFF-3380C0D49008}"/>
+              </a:ext>
+            </a:extLst>
+          </p:cNvPr>
+          <p:cNvSpPr>
+            <a:spLocks noGrp="1"/>
+          </p:cNvSpPr>
+          <p:nvPr>
+            <p:ph type="sldNum" sz="quarter" idx="5"/>
+          </p:nvPr>
+        </p:nvSpPr>
+        <p:spPr/>
+        <p:txBody>
+          <a:bodyPr/>
+          <a:lstStyle/>
+          <a:p>
+            <a:fld id="{2BF067CD-8E6B-4360-9AA8-C5DF2A48A6D1}" type="slidenum">
+              <a:rPr lang="en-US" noProof="0" smtClean="0"/>
+              <a:pPr/>
+              <a:t>21</a:t>
+            </a:fld>
+            <a:endParaRPr lang="en-US" noProof="0" dirty="0"/>
+          </a:p>
+        </p:txBody>
+      </p:sp>
+      <p:sp>
+        <p:nvSpPr>
+          <p:cNvPr id="3" name="Text Placeholder 2">
+            <a:extLst>
+              <a:ext uri="{FF2B5EF4-FFF2-40B4-BE49-F238E27FC236}">
+                <a16:creationId xmlns:a16="http://schemas.microsoft.com/office/drawing/2014/main" id="{59D71BA2-2A2B-08D4-222D-A3B41EA7E3C2}"/>
+              </a:ext>
+            </a:extLst>
+          </p:cNvPr>
+          <p:cNvSpPr>
+            <a:spLocks noGrp="1"/>
+          </p:cNvSpPr>
+          <p:nvPr>
+            <p:ph type="body" sz="quarter" idx="10"/>
+          </p:nvPr>
+        </p:nvSpPr>
+        <p:spPr/>
+        <p:txBody>
+          <a:bodyPr/>
+          <a:lstStyle/>
+          <a:p>
+            <a:r>
+              <a:rPr lang="bg-BG" dirty="0"/>
+              <a:t>Създаваме още една таблица с името </a:t>
+            </a:r>
+            <a:r>
+              <a:rPr lang="en-US" dirty="0"/>
+              <a:t>"</a:t>
+            </a:r>
+            <a:r>
+              <a:rPr lang="en-US" b="1" dirty="0"/>
+              <a:t>Enrollments</a:t>
+            </a:r>
+            <a:r>
+              <a:rPr lang="en-US" dirty="0"/>
+              <a:t>"</a:t>
+            </a:r>
+            <a:r>
+              <a:rPr lang="bg-BG" dirty="0"/>
+              <a:t>, която ще съдържа следните </a:t>
+            </a:r>
+            <a:r>
+              <a:rPr lang="bg-BG" b="1" dirty="0"/>
+              <a:t>колони</a:t>
+            </a:r>
+            <a:r>
+              <a:rPr lang="bg-BG" dirty="0"/>
+              <a:t>:</a:t>
+            </a:r>
+            <a:endParaRPr lang="en-US" dirty="0"/>
+          </a:p>
+        </p:txBody>
+      </p:sp>
+      <p:sp>
+        <p:nvSpPr>
+          <p:cNvPr id="4" name="Title 3">
+            <a:extLst>
+              <a:ext uri="{FF2B5EF4-FFF2-40B4-BE49-F238E27FC236}">
+                <a16:creationId xmlns:a16="http://schemas.microsoft.com/office/drawing/2014/main" id="{F0FCDF89-1E9B-B037-99AE-3E4770F33989}"/>
+              </a:ext>
+            </a:extLst>
+          </p:cNvPr>
+          <p:cNvSpPr>
+            <a:spLocks noGrp="1"/>
+          </p:cNvSpPr>
+          <p:nvPr>
+            <p:ph type="title"/>
+          </p:nvPr>
+        </p:nvSpPr>
+        <p:spPr/>
+        <p:txBody>
+          <a:bodyPr/>
+          <a:lstStyle/>
+          <a:p>
+            <a:r>
+              <a:rPr lang="bg-BG" dirty="0"/>
+              <a:t>Създаване на таблици</a:t>
+            </a:r>
+            <a:r>
+              <a:rPr lang="en-US" dirty="0"/>
+              <a:t> (5)</a:t>
+            </a:r>
+          </a:p>
+        </p:txBody>
+      </p:sp>
+      <p:pic>
+        <p:nvPicPr>
+          <p:cNvPr id="8" name="Picture 7">
+            <a:extLst>
+              <a:ext uri="{FF2B5EF4-FFF2-40B4-BE49-F238E27FC236}">
+                <a16:creationId xmlns:a16="http://schemas.microsoft.com/office/drawing/2014/main" id="{FA6D0C90-9C33-DC0A-2B74-077081CFD547}"/>
+              </a:ext>
+            </a:extLst>
+          </p:cNvPr>
+          <p:cNvPicPr>
+            <a:picLocks noChangeAspect="1"/>
+          </p:cNvPicPr>
+          <p:nvPr/>
+        </p:nvPicPr>
+        <p:blipFill>
+          <a:blip r:embed="rId2"/>
+          <a:stretch>
+            <a:fillRect/>
+          </a:stretch>
+        </p:blipFill>
+        <p:spPr>
+          <a:xfrm>
+            <a:off x="3376400" y="3159000"/>
+            <a:ext cx="5439201" cy="2279152"/>
+          </a:xfrm>
+          <a:prstGeom prst="rect">
+            <a:avLst/>
+          </a:prstGeom>
+          <a:ln>
+            <a:solidFill>
+              <a:schemeClr val="bg2">
+                <a:lumMod val="75000"/>
+              </a:schemeClr>
+            </a:solidFill>
+          </a:ln>
+        </p:spPr>
+      </p:pic>
+    </p:spTree>
+    <p:extLst>
+      <p:ext uri="{BB962C8B-B14F-4D97-AF65-F5344CB8AC3E}">
+        <p14:creationId xmlns:p14="http://schemas.microsoft.com/office/powerpoint/2010/main" val="2459869213"/>
+      </p:ext>
+    </p:extLst>
+  </p:cSld>
+  <p:clrMapOvr>
+    <a:masterClrMapping/>
+  </p:clrMapOvr>
+  <mc:AlternateContent xmlns:mc="http://schemas.openxmlformats.org/markup-compatibility/2006" xmlns:p14="http://schemas.microsoft.com/office/powerpoint/2010/main">
+    <mc:Choice Requires="p14">
+      <p:transition spd="slow" p14:dur="2000" advClick="0" advTm="5000"/>
+    </mc:Choice>
+    <mc:Fallback xmlns="">
+      <p:transition spd="slow" advClick="0" advTm="5000"/>
+    </mc:Fallback>
+  </mc:AlternateContent>
+</p:sld>
+</file>
+
+<file path=ppt/slides/slide22.xml><?xml version="1.0" encoding="utf-8"?>
+<p:sld xmlns:a="http://schemas.openxmlformats.org/drawingml/2006/main" xmlns:r="http://schemas.openxmlformats.org/officeDocument/2006/relationships" xmlns:p="http://schemas.openxmlformats.org/presentationml/2006/main">
+  <p:cSld>
+    <p:spTree>
+      <p:nvGrpSpPr>
+        <p:cNvPr id="1" name=""/>
+        <p:cNvGrpSpPr/>
+        <p:nvPr/>
+      </p:nvGrpSpPr>
+      <p:grpSpPr>
+        <a:xfrm>
+          <a:off x="0" y="0"/>
+          <a:ext cx="0" cy="0"/>
+          <a:chOff x="0" y="0"/>
+          <a:chExt cx="0" cy="0"/>
+        </a:xfrm>
+      </p:grpSpPr>
+      <p:sp>
+        <p:nvSpPr>
+          <p:cNvPr id="2" name="Slide Number Placeholder 1">
+            <a:extLst>
+              <a:ext uri="{FF2B5EF4-FFF2-40B4-BE49-F238E27FC236}">
+                <a16:creationId xmlns:a16="http://schemas.microsoft.com/office/drawing/2014/main" id="{49418C4F-566E-018A-CF8F-4A4142B42CB8}"/>
+              </a:ext>
+            </a:extLst>
+          </p:cNvPr>
+          <p:cNvSpPr>
+            <a:spLocks noGrp="1"/>
+          </p:cNvSpPr>
+          <p:nvPr>
+            <p:ph type="sldNum" sz="quarter" idx="5"/>
+          </p:nvPr>
+        </p:nvSpPr>
+        <p:spPr/>
+        <p:txBody>
+          <a:bodyPr/>
+          <a:lstStyle/>
+          <a:p>
+            <a:fld id="{2BF067CD-8E6B-4360-9AA8-C5DF2A48A6D1}" type="slidenum">
+              <a:rPr lang="en-US" noProof="0" smtClean="0"/>
+              <a:pPr/>
+              <a:t>22</a:t>
+            </a:fld>
+            <a:endParaRPr lang="en-US" noProof="0" dirty="0"/>
+          </a:p>
+        </p:txBody>
+      </p:sp>
+      <p:sp>
+        <p:nvSpPr>
+          <p:cNvPr id="3" name="Text Placeholder 2">
+            <a:extLst>
+              <a:ext uri="{FF2B5EF4-FFF2-40B4-BE49-F238E27FC236}">
+                <a16:creationId xmlns:a16="http://schemas.microsoft.com/office/drawing/2014/main" id="{20DD3AE8-8DBB-D705-5EC5-18CD687895B7}"/>
+              </a:ext>
+            </a:extLst>
+          </p:cNvPr>
+          <p:cNvSpPr>
+            <a:spLocks noGrp="1"/>
+          </p:cNvSpPr>
+          <p:nvPr>
+            <p:ph type="body" sz="quarter" idx="10"/>
+          </p:nvPr>
+        </p:nvSpPr>
+        <p:spPr/>
+        <p:txBody>
+          <a:bodyPr/>
+          <a:lstStyle/>
+          <a:p>
+            <a:r>
+              <a:rPr lang="en-US" b="1" dirty="0">
+                <a:solidFill>
+                  <a:schemeClr val="bg1"/>
+                </a:solidFill>
+              </a:rPr>
+              <a:t>TODO</a:t>
+            </a:r>
+            <a:r>
+              <a:rPr lang="en-US" dirty="0"/>
+              <a:t>: Make a One-to-Many relationship for Students and Enrollments tables, using the SSMS UI</a:t>
+            </a:r>
+          </a:p>
+        </p:txBody>
+      </p:sp>
+      <p:sp>
+        <p:nvSpPr>
+          <p:cNvPr id="4" name="Title 3">
+            <a:extLst>
+              <a:ext uri="{FF2B5EF4-FFF2-40B4-BE49-F238E27FC236}">
+                <a16:creationId xmlns:a16="http://schemas.microsoft.com/office/drawing/2014/main" id="{625BBE64-D5EF-20E4-1D28-6CBAC5AE2B74}"/>
+              </a:ext>
+            </a:extLst>
+          </p:cNvPr>
+          <p:cNvSpPr>
+            <a:spLocks noGrp="1"/>
+          </p:cNvSpPr>
+          <p:nvPr>
+            <p:ph type="title"/>
+          </p:nvPr>
+        </p:nvSpPr>
+        <p:spPr/>
+        <p:txBody>
+          <a:bodyPr/>
+          <a:lstStyle/>
+          <a:p>
+            <a:r>
+              <a:rPr lang="bg-BG" dirty="0"/>
+              <a:t>Създаване на връзка между таблици</a:t>
+            </a:r>
+            <a:endParaRPr lang="en-US" dirty="0"/>
+          </a:p>
+        </p:txBody>
+      </p:sp>
+      <p:pic>
+        <p:nvPicPr>
+          <p:cNvPr id="2050" name="Picture 2">
+            <a:extLst>
+              <a:ext uri="{FF2B5EF4-FFF2-40B4-BE49-F238E27FC236}">
+                <a16:creationId xmlns:a16="http://schemas.microsoft.com/office/drawing/2014/main" id="{CB7FC4FF-961C-AB5D-D9F0-A7468796F55E}"/>
+              </a:ext>
+            </a:extLst>
+          </p:cNvPr>
+          <p:cNvPicPr>
+            <a:picLocks noChangeAspect="1" noChangeArrowheads="1"/>
+          </p:cNvPicPr>
+          <p:nvPr/>
+        </p:nvPicPr>
+        <p:blipFill>
+          <a:blip r:embed="rId2">
+            <a:extLst>
+              <a:ext uri="{28A0092B-C50C-407E-A947-70E740481C1C}">
+                <a14:useLocalDpi xmlns:a14="http://schemas.microsoft.com/office/drawing/2010/main" val="0"/>
+              </a:ext>
+            </a:extLst>
+          </a:blip>
+          <a:srcRect/>
+          <a:stretch>
+            <a:fillRect/>
+          </a:stretch>
+        </p:blipFill>
+        <p:spPr bwMode="auto">
+          <a:xfrm>
+            <a:off x="3351000" y="2807936"/>
+            <a:ext cx="4892310" cy="3699064"/>
+          </a:xfrm>
+          <a:prstGeom prst="rect">
+            <a:avLst/>
+          </a:prstGeom>
+          <a:noFill/>
+          <a:extLst>
+            <a:ext uri="{909E8E84-426E-40DD-AFC4-6F175D3DCCD1}">
+              <a14:hiddenFill xmlns:a14="http://schemas.microsoft.com/office/drawing/2010/main">
+                <a:solidFill>
+                  <a:srgbClr val="FFFFFF"/>
+                </a:solidFill>
+              </a14:hiddenFill>
+            </a:ext>
+          </a:extLst>
+        </p:spPr>
+      </p:pic>
+    </p:spTree>
+    <p:extLst>
+      <p:ext uri="{BB962C8B-B14F-4D97-AF65-F5344CB8AC3E}">
+        <p14:creationId xmlns:p14="http://schemas.microsoft.com/office/powerpoint/2010/main" val="3862278538"/>
+      </p:ext>
+    </p:extLst>
+  </p:cSld>
+  <p:clrMapOvr>
+    <a:masterClrMapping/>
+  </p:clrMapOvr>
+  <mc:AlternateContent xmlns:mc="http://schemas.openxmlformats.org/markup-compatibility/2006" xmlns:p14="http://schemas.microsoft.com/office/powerpoint/2010/main">
+    <mc:Choice Requires="p14">
+      <p:transition spd="slow" p14:dur="2000" advClick="0" advTm="5000"/>
+    </mc:Choice>
+    <mc:Fallback xmlns="">
+      <p:transition spd="slow" advClick="0" advTm="5000"/>
+    </mc:Fallback>
+  </mc:AlternateContent>
+</p:sld>
+</file>
+
+<file path=ppt/slides/slide23.xml><?xml version="1.0" encoding="utf-8"?>
+<p:sld xmlns:a="http://schemas.openxmlformats.org/drawingml/2006/main" xmlns:r="http://schemas.openxmlformats.org/officeDocument/2006/relationships" xmlns:p="http://schemas.openxmlformats.org/presentationml/2006/main">
+  <p:cSld>
+    <p:spTree>
+      <p:nvGrpSpPr>
+        <p:cNvPr id="1" name=""/>
+        <p:cNvGrpSpPr/>
+        <p:nvPr/>
+      </p:nvGrpSpPr>
+      <p:grpSpPr>
+        <a:xfrm>
+          <a:off x="0" y="0"/>
+          <a:ext cx="0" cy="0"/>
+          <a:chOff x="0" y="0"/>
+          <a:chExt cx="0" cy="0"/>
+        </a:xfrm>
+      </p:grpSpPr>
       <p:grpSp>
         <p:nvGrpSpPr>
           <p:cNvPr id="9" name="Summary Box Group">
@@ -13900,7 +16250,7 @@
             <a:fld id="{2BF067CD-8E6B-4360-9AA8-C5DF2A48A6D1}" type="slidenum">
               <a:rPr lang="en-US" noProof="0" smtClean="0"/>
               <a:pPr/>
-              <a:t>16</a:t>
+              <a:t>23</a:t>
             </a:fld>
             <a:endParaRPr lang="en-US" noProof="0" dirty="0"/>
           </a:p>
@@ -14135,7 +16485,7 @@
 </p:sld>
 </file>
 
-<file path=ppt/slides/slide17.xml><?xml version="1.0" encoding="utf-8"?>
+<file path=ppt/slides/slide24.xml><?xml version="1.0" encoding="utf-8"?>
 <p:sld xmlns:a="http://schemas.openxmlformats.org/drawingml/2006/main" xmlns:r="http://schemas.openxmlformats.org/officeDocument/2006/relationships" xmlns:p="http://schemas.openxmlformats.org/presentationml/2006/main">
   <p:cSld>
     <p:spTree>
@@ -14325,7 +16675,7 @@
 </p:sld>
 </file>
 
-<file path=ppt/slides/slide18.xml><?xml version="1.0" encoding="utf-8"?>
+<file path=ppt/slides/slide25.xml><?xml version="1.0" encoding="utf-8"?>
 <p:sld xmlns:a="http://schemas.openxmlformats.org/drawingml/2006/main" xmlns:r="http://schemas.openxmlformats.org/officeDocument/2006/relationships" xmlns:p="http://schemas.openxmlformats.org/presentationml/2006/main">
   <p:cSld>
     <p:spTree>
@@ -14681,7 +17031,7 @@
             <a:fld id="{2BF067CD-8E6B-4360-9AA8-C5DF2A48A6D1}" type="slidenum">
               <a:rPr lang="en-US" noProof="0" smtClean="0"/>
               <a:pPr/>
-              <a:t>18</a:t>
+              <a:t>25</a:t>
             </a:fld>
             <a:endParaRPr lang="en-US" noProof="0" dirty="0"/>
           </a:p>
@@ -14708,484 +17058,6 @@
 </p:sld>
 </file>
 
-<file path=ppt/slides/slide2.xml><?xml version="1.0" encoding="utf-8"?>
-<p:sld xmlns:a="http://schemas.openxmlformats.org/drawingml/2006/main" xmlns:r="http://schemas.openxmlformats.org/officeDocument/2006/relationships" xmlns:p="http://schemas.openxmlformats.org/presentationml/2006/main">
-  <p:cSld>
-    <p:spTree>
-      <p:nvGrpSpPr>
-        <p:cNvPr id="1" name=""/>
-        <p:cNvGrpSpPr/>
-        <p:nvPr/>
-      </p:nvGrpSpPr>
-      <p:grpSpPr>
-        <a:xfrm>
-          <a:off x="0" y="0"/>
-          <a:ext cx="0" cy="0"/>
-          <a:chOff x="0" y="0"/>
-          <a:chExt cx="0" cy="0"/>
-        </a:xfrm>
-      </p:grpSpPr>
-      <p:sp>
-        <p:nvSpPr>
-          <p:cNvPr id="444419" name="Slide Body"/>
-          <p:cNvSpPr>
-            <a:spLocks noGrp="1" noChangeArrowheads="1"/>
-          </p:cNvSpPr>
-          <p:nvPr>
-            <p:ph type="body" sz="quarter" idx="13"/>
-          </p:nvPr>
-        </p:nvSpPr>
-        <p:spPr>
-          <a:xfrm>
-            <a:off x="300812" y="1299604"/>
-            <a:ext cx="10671988" cy="5207396"/>
-          </a:xfrm>
-        </p:spPr>
-        <p:txBody>
-          <a:bodyPr>
-            <a:normAutofit/>
-          </a:bodyPr>
-          <a:lstStyle/>
-          <a:p>
-            <a:pPr fontAlgn="base">
-              <a:spcAft>
-                <a:spcPts val="1400"/>
-              </a:spcAft>
-            </a:pPr>
-            <a:r>
-              <a:rPr lang="bg-BG" dirty="0"/>
-              <a:t>Таблици и релации</a:t>
-            </a:r>
-          </a:p>
-          <a:p>
-            <a:pPr lvl="1" fontAlgn="base">
-              <a:spcAft>
-                <a:spcPts val="1400"/>
-              </a:spcAft>
-            </a:pPr>
-            <a:r>
-              <a:rPr lang="bg-BG" b="1" dirty="0"/>
-              <a:t>Основни елементи </a:t>
-            </a:r>
-            <a:r>
-              <a:rPr lang="bg-BG" dirty="0"/>
-              <a:t>на таблиците</a:t>
-            </a:r>
-          </a:p>
-          <a:p>
-            <a:pPr lvl="1" fontAlgn="base">
-              <a:spcAft>
-                <a:spcPts val="1400"/>
-              </a:spcAft>
-            </a:pPr>
-            <a:r>
-              <a:rPr lang="bg-BG" b="1" dirty="0"/>
-              <a:t>Релации</a:t>
-            </a:r>
-            <a:r>
-              <a:rPr lang="bg-BG" dirty="0"/>
-              <a:t> и видове </a:t>
-            </a:r>
-            <a:r>
-              <a:rPr lang="bg-BG" b="1" dirty="0"/>
-              <a:t>ключове</a:t>
-            </a:r>
-          </a:p>
-          <a:p>
-            <a:pPr>
-              <a:spcAft>
-                <a:spcPts val="1400"/>
-              </a:spcAft>
-            </a:pPr>
-            <a:r>
-              <a:rPr lang="ru-RU" dirty="0"/>
-              <a:t>Създаване на </a:t>
-            </a:r>
-            <a:r>
-              <a:rPr lang="ru-RU" b="1" dirty="0"/>
-              <a:t>прости таблици</a:t>
-            </a:r>
-          </a:p>
-          <a:p>
-            <a:pPr>
-              <a:spcAft>
-                <a:spcPts val="1400"/>
-              </a:spcAft>
-            </a:pPr>
-            <a:r>
-              <a:rPr lang="ru-RU" dirty="0"/>
-              <a:t>Създаване на </a:t>
-            </a:r>
-            <a:r>
-              <a:rPr lang="ru-RU" b="1" dirty="0"/>
-              <a:t>връзка между таблици</a:t>
-            </a:r>
-          </a:p>
-          <a:p>
-            <a:pPr fontAlgn="base">
-              <a:spcAft>
-                <a:spcPts val="1400"/>
-              </a:spcAft>
-            </a:pPr>
-            <a:endParaRPr lang="en-US" dirty="0"/>
-          </a:p>
-        </p:txBody>
-      </p:sp>
-      <p:sp>
-        <p:nvSpPr>
-          <p:cNvPr id="444418" name="Slide Title"/>
-          <p:cNvSpPr>
-            <a:spLocks noGrp="1" noChangeArrowheads="1"/>
-          </p:cNvSpPr>
-          <p:nvPr>
-            <p:ph type="title"/>
-          </p:nvPr>
-        </p:nvSpPr>
-        <p:spPr>
-          <a:xfrm>
-            <a:off x="190405" y="100750"/>
-            <a:ext cx="9669213" cy="882654"/>
-          </a:xfrm>
-        </p:spPr>
-        <p:txBody>
-          <a:bodyPr/>
-          <a:lstStyle/>
-          <a:p>
-            <a:r>
-              <a:rPr lang="bg-BG" dirty="0"/>
-              <a:t>Съдържание</a:t>
-            </a:r>
-          </a:p>
-        </p:txBody>
-      </p:sp>
-      <p:sp>
-        <p:nvSpPr>
-          <p:cNvPr id="2" name="Slide Number">
-            <a:extLst>
-              <a:ext uri="{FF2B5EF4-FFF2-40B4-BE49-F238E27FC236}">
-                <a16:creationId xmlns:a16="http://schemas.microsoft.com/office/drawing/2014/main" id="{92BA9744-0A08-051B-04A3-B4621547E8BF}"/>
-              </a:ext>
-            </a:extLst>
-          </p:cNvPr>
-          <p:cNvSpPr txBox="1">
-            <a:spLocks/>
-          </p:cNvSpPr>
-          <p:nvPr/>
-        </p:nvSpPr>
-        <p:spPr>
-          <a:xfrm>
-            <a:off x="11753030" y="6507000"/>
-            <a:ext cx="367414" cy="297000"/>
-          </a:xfrm>
-          <a:prstGeom prst="rect">
-            <a:avLst/>
-          </a:prstGeom>
-        </p:spPr>
-        <p:txBody>
-          <a:bodyPr vert="horz" lIns="91440" tIns="45720" rIns="91440" bIns="45720" rtlCol="0" anchor="b"/>
-          <a:lstStyle>
-            <a:defPPr>
-              <a:defRPr lang="en-US"/>
-            </a:defPPr>
-            <a:lvl1pPr marL="0" algn="r" defTabSz="914400" rtl="0" eaLnBrk="1" latinLnBrk="0" hangingPunct="1">
-              <a:defRPr sz="1000" kern="1200">
-                <a:solidFill>
-                  <a:schemeClr val="tx1"/>
-                </a:solidFill>
-                <a:latin typeface="+mn-lt"/>
-                <a:ea typeface="+mn-ea"/>
-                <a:cs typeface="+mn-cs"/>
-              </a:defRPr>
-            </a:lvl1pPr>
-            <a:lvl2pPr marL="457200" algn="l" defTabSz="914400" rtl="0" eaLnBrk="1" latinLnBrk="0" hangingPunct="1">
-              <a:defRPr sz="1800" kern="1200">
-                <a:solidFill>
-                  <a:schemeClr val="tx1"/>
-                </a:solidFill>
-                <a:latin typeface="+mn-lt"/>
-                <a:ea typeface="+mn-ea"/>
-                <a:cs typeface="+mn-cs"/>
-              </a:defRPr>
-            </a:lvl2pPr>
-            <a:lvl3pPr marL="914400" algn="l" defTabSz="914400" rtl="0" eaLnBrk="1" latinLnBrk="0" hangingPunct="1">
-              <a:defRPr sz="1800" kern="1200">
-                <a:solidFill>
-                  <a:schemeClr val="tx1"/>
-                </a:solidFill>
-                <a:latin typeface="+mn-lt"/>
-                <a:ea typeface="+mn-ea"/>
-                <a:cs typeface="+mn-cs"/>
-              </a:defRPr>
-            </a:lvl3pPr>
-            <a:lvl4pPr marL="1371600" algn="l" defTabSz="914400" rtl="0" eaLnBrk="1" latinLnBrk="0" hangingPunct="1">
-              <a:defRPr sz="1800" kern="1200">
-                <a:solidFill>
-                  <a:schemeClr val="tx1"/>
-                </a:solidFill>
-                <a:latin typeface="+mn-lt"/>
-                <a:ea typeface="+mn-ea"/>
-                <a:cs typeface="+mn-cs"/>
-              </a:defRPr>
-            </a:lvl4pPr>
-            <a:lvl5pPr marL="1828800" algn="l" defTabSz="914400" rtl="0" eaLnBrk="1" latinLnBrk="0" hangingPunct="1">
-              <a:defRPr sz="1800" kern="1200">
-                <a:solidFill>
-                  <a:schemeClr val="tx1"/>
-                </a:solidFill>
-                <a:latin typeface="+mn-lt"/>
-                <a:ea typeface="+mn-ea"/>
-                <a:cs typeface="+mn-cs"/>
-              </a:defRPr>
-            </a:lvl5pPr>
-            <a:lvl6pPr marL="2286000" algn="l" defTabSz="914400" rtl="0" eaLnBrk="1" latinLnBrk="0" hangingPunct="1">
-              <a:defRPr sz="1800" kern="1200">
-                <a:solidFill>
-                  <a:schemeClr val="tx1"/>
-                </a:solidFill>
-                <a:latin typeface="+mn-lt"/>
-                <a:ea typeface="+mn-ea"/>
-                <a:cs typeface="+mn-cs"/>
-              </a:defRPr>
-            </a:lvl6pPr>
-            <a:lvl7pPr marL="2743200" algn="l" defTabSz="914400" rtl="0" eaLnBrk="1" latinLnBrk="0" hangingPunct="1">
-              <a:defRPr sz="1800" kern="1200">
-                <a:solidFill>
-                  <a:schemeClr val="tx1"/>
-                </a:solidFill>
-                <a:latin typeface="+mn-lt"/>
-                <a:ea typeface="+mn-ea"/>
-                <a:cs typeface="+mn-cs"/>
-              </a:defRPr>
-            </a:lvl7pPr>
-            <a:lvl8pPr marL="3200400" algn="l" defTabSz="914400" rtl="0" eaLnBrk="1" latinLnBrk="0" hangingPunct="1">
-              <a:defRPr sz="1800" kern="1200">
-                <a:solidFill>
-                  <a:schemeClr val="tx1"/>
-                </a:solidFill>
-                <a:latin typeface="+mn-lt"/>
-                <a:ea typeface="+mn-ea"/>
-                <a:cs typeface="+mn-cs"/>
-              </a:defRPr>
-            </a:lvl8pPr>
-            <a:lvl9pPr marL="3657600" algn="l" defTabSz="914400" rtl="0" eaLnBrk="1" latinLnBrk="0" hangingPunct="1">
-              <a:defRPr sz="1800" kern="1200">
-                <a:solidFill>
-                  <a:schemeClr val="tx1"/>
-                </a:solidFill>
-                <a:latin typeface="+mn-lt"/>
-                <a:ea typeface="+mn-ea"/>
-                <a:cs typeface="+mn-cs"/>
-              </a:defRPr>
-            </a:lvl9pPr>
-          </a:lstStyle>
-          <a:p>
-            <a:fld id="{2BF067CD-8E6B-4360-9AA8-C5DF2A48A6D1}" type="slidenum">
-              <a:rPr lang="en-US" smtClean="0"/>
-              <a:pPr/>
-              <a:t>2</a:t>
-            </a:fld>
-            <a:endParaRPr lang="en-US" dirty="0"/>
-          </a:p>
-        </p:txBody>
-      </p:sp>
-    </p:spTree>
-    <p:extLst>
-      <p:ext uri="{BB962C8B-B14F-4D97-AF65-F5344CB8AC3E}">
-        <p14:creationId xmlns:p14="http://schemas.microsoft.com/office/powerpoint/2010/main" val="378861557"/>
-      </p:ext>
-    </p:extLst>
-  </p:cSld>
-  <p:clrMapOvr>
-    <a:masterClrMapping/>
-  </p:clrMapOvr>
-  <mc:AlternateContent xmlns:mc="http://schemas.openxmlformats.org/markup-compatibility/2006" xmlns:p14="http://schemas.microsoft.com/office/powerpoint/2010/main">
-    <mc:Choice Requires="p14">
-      <p:transition spd="slow" p14:dur="2000" advClick="0" advTm="5000"/>
-    </mc:Choice>
-    <mc:Fallback xmlns="">
-      <p:transition spd="slow" advClick="0" advTm="5000"/>
-    </mc:Fallback>
-  </mc:AlternateContent>
-  <p:timing>
-    <p:tnLst>
-      <p:par>
-        <p:cTn id="1" dur="indefinite" restart="never" nodeType="tmRoot">
-          <p:childTnLst>
-            <p:seq concurrent="1" nextAc="seek">
-              <p:cTn id="2" dur="indefinite" nodeType="mainSeq">
-                <p:childTnLst>
-                  <p:par>
-                    <p:cTn id="3" fill="hold">
-                      <p:stCondLst>
-                        <p:cond delay="indefinite"/>
-                      </p:stCondLst>
-                      <p:childTnLst>
-                        <p:par>
-                          <p:cTn id="4" fill="hold">
-                            <p:stCondLst>
-                              <p:cond delay="0"/>
-                            </p:stCondLst>
-                            <p:childTnLst>
-                              <p:par>
-                                <p:cTn id="5" presetID="1" presetClass="entr" presetSubtype="0" fill="hold" nodeType="clickEffect">
-                                  <p:stCondLst>
-                                    <p:cond delay="0"/>
-                                  </p:stCondLst>
-                                  <p:childTnLst>
-                                    <p:set>
-                                      <p:cBhvr>
-                                        <p:cTn id="6" dur="1" fill="hold">
-                                          <p:stCondLst>
-                                            <p:cond delay="0"/>
-                                          </p:stCondLst>
-                                        </p:cTn>
-                                        <p:tgtEl>
-                                          <p:spTgt spid="444419">
-                                            <p:txEl>
-                                              <p:pRg st="2" end="2"/>
-                                            </p:txEl>
-                                          </p:spTgt>
-                                        </p:tgtEl>
-                                        <p:attrNameLst>
-                                          <p:attrName>style.visibility</p:attrName>
-                                        </p:attrNameLst>
-                                      </p:cBhvr>
-                                      <p:to>
-                                        <p:strVal val="visible"/>
-                                      </p:to>
-                                    </p:set>
-                                  </p:childTnLst>
-                                </p:cTn>
-                              </p:par>
-                            </p:childTnLst>
-                          </p:cTn>
-                        </p:par>
-                      </p:childTnLst>
-                    </p:cTn>
-                  </p:par>
-                  <p:par>
-                    <p:cTn id="7" fill="hold">
-                      <p:stCondLst>
-                        <p:cond delay="indefinite"/>
-                      </p:stCondLst>
-                      <p:childTnLst>
-                        <p:par>
-                          <p:cTn id="8" fill="hold">
-                            <p:stCondLst>
-                              <p:cond delay="0"/>
-                            </p:stCondLst>
-                            <p:childTnLst>
-                              <p:par>
-                                <p:cTn id="9" presetID="1" presetClass="entr" presetSubtype="0" fill="hold" nodeType="clickEffect">
-                                  <p:stCondLst>
-                                    <p:cond delay="0"/>
-                                  </p:stCondLst>
-                                  <p:childTnLst>
-                                    <p:set>
-                                      <p:cBhvr>
-                                        <p:cTn id="10" dur="1" fill="hold">
-                                          <p:stCondLst>
-                                            <p:cond delay="0"/>
-                                          </p:stCondLst>
-                                        </p:cTn>
-                                        <p:tgtEl>
-                                          <p:spTgt spid="444419">
-                                            <p:txEl>
-                                              <p:pRg st="3" end="3"/>
-                                            </p:txEl>
-                                          </p:spTgt>
-                                        </p:tgtEl>
-                                        <p:attrNameLst>
-                                          <p:attrName>style.visibility</p:attrName>
-                                        </p:attrNameLst>
-                                      </p:cBhvr>
-                                      <p:to>
-                                        <p:strVal val="visible"/>
-                                      </p:to>
-                                    </p:set>
-                                  </p:childTnLst>
-                                </p:cTn>
-                              </p:par>
-                            </p:childTnLst>
-                          </p:cTn>
-                        </p:par>
-                      </p:childTnLst>
-                    </p:cTn>
-                  </p:par>
-                  <p:par>
-                    <p:cTn id="11" fill="hold">
-                      <p:stCondLst>
-                        <p:cond delay="indefinite"/>
-                      </p:stCondLst>
-                      <p:childTnLst>
-                        <p:par>
-                          <p:cTn id="12" fill="hold">
-                            <p:stCondLst>
-                              <p:cond delay="0"/>
-                            </p:stCondLst>
-                            <p:childTnLst>
-                              <p:par>
-                                <p:cTn id="13" presetID="1" presetClass="entr" presetSubtype="0" fill="hold" nodeType="clickEffect">
-                                  <p:stCondLst>
-                                    <p:cond delay="0"/>
-                                  </p:stCondLst>
-                                  <p:childTnLst>
-                                    <p:set>
-                                      <p:cBhvr>
-                                        <p:cTn id="14" dur="1" fill="hold">
-                                          <p:stCondLst>
-                                            <p:cond delay="0"/>
-                                          </p:stCondLst>
-                                        </p:cTn>
-                                        <p:tgtEl>
-                                          <p:spTgt spid="444419">
-                                            <p:txEl>
-                                              <p:pRg st="4" end="4"/>
-                                            </p:txEl>
-                                          </p:spTgt>
-                                        </p:tgtEl>
-                                        <p:attrNameLst>
-                                          <p:attrName>style.visibility</p:attrName>
-                                        </p:attrNameLst>
-                                      </p:cBhvr>
-                                      <p:to>
-                                        <p:strVal val="visible"/>
-                                      </p:to>
-                                    </p:set>
-                                  </p:childTnLst>
-                                </p:cTn>
-                              </p:par>
-                            </p:childTnLst>
-                          </p:cTn>
-                        </p:par>
-                      </p:childTnLst>
-                    </p:cTn>
-                  </p:par>
-                </p:childTnLst>
-              </p:cTn>
-              <p:prevCondLst>
-                <p:cond evt="onPrev" delay="0">
-                  <p:tgtEl>
-                    <p:sldTgt/>
-                  </p:tgtEl>
-                </p:cond>
-              </p:prevCondLst>
-              <p:nextCondLst>
-                <p:cond evt="onNext" delay="0">
-                  <p:tgtEl>
-                    <p:sldTgt/>
-                  </p:tgtEl>
-                </p:cond>
-              </p:nextCondLst>
-            </p:seq>
-          </p:childTnLst>
-        </p:cTn>
-      </p:par>
-    </p:tnLst>
-  </p:timing>
-</p:sld>
-</file>
-
 <file path=ppt/slides/slide3.xml><?xml version="1.0" encoding="utf-8"?>
 <p:sld xmlns:a="http://schemas.openxmlformats.org/drawingml/2006/main" xmlns:r="http://schemas.openxmlformats.org/officeDocument/2006/relationships" xmlns:p="http://schemas.openxmlformats.org/presentationml/2006/main">
   <p:cSld>
@@ -15203,34 +17075,6 @@
           <a:chExt cx="0" cy="0"/>
         </a:xfrm>
       </p:grpSpPr>
-      <p:pic>
-        <p:nvPicPr>
-          <p:cNvPr id="4" name="Picture 4" descr="https://o.remove.bg/downloads/4fea28bc-78a4-4ba2-b4aa-080d9d833290/r-db-removebg-preview.png"/>
-          <p:cNvPicPr>
-            <a:picLocks noChangeAspect="1" noChangeArrowheads="1"/>
-          </p:cNvPicPr>
-          <p:nvPr/>
-        </p:nvPicPr>
-        <p:blipFill>
-          <a:blip r:embed="rId3" cstate="print">
-            <a:lum bright="100000"/>
-          </a:blip>
-          <a:srcRect/>
-          <a:stretch>
-            <a:fillRect/>
-          </a:stretch>
-        </p:blipFill>
-        <p:spPr bwMode="auto">
-          <a:xfrm>
-            <a:off x="4366132" y="1447800"/>
-            <a:ext cx="3459737" cy="2230473"/>
-          </a:xfrm>
-          <a:prstGeom prst="rect">
-            <a:avLst/>
-          </a:prstGeom>
-          <a:noFill/>
-        </p:spPr>
-      </p:pic>
       <p:sp>
         <p:nvSpPr>
           <p:cNvPr id="6" name="Подзаглавие 5">
@@ -15298,6 +17142,41 @@
           </a:p>
         </p:txBody>
       </p:sp>
+      <p:pic>
+        <p:nvPicPr>
+          <p:cNvPr id="7" name="Picture 6" descr="A logo of a server&#10;&#10;Description automatically generated">
+            <a:extLst>
+              <a:ext uri="{FF2B5EF4-FFF2-40B4-BE49-F238E27FC236}">
+                <a16:creationId xmlns:a16="http://schemas.microsoft.com/office/drawing/2014/main" id="{2EEC3CFF-BA28-A5AD-EC33-50B275D5F6A3}"/>
+              </a:ext>
+            </a:extLst>
+          </p:cNvPr>
+          <p:cNvPicPr>
+            <a:picLocks noChangeAspect="1"/>
+          </p:cNvPicPr>
+          <p:nvPr/>
+        </p:nvPicPr>
+        <p:blipFill rotWithShape="1">
+          <a:blip r:embed="rId3">
+            <a:extLst>
+              <a:ext uri="{28A0092B-C50C-407E-A947-70E740481C1C}">
+                <a14:useLocalDpi xmlns:a14="http://schemas.microsoft.com/office/drawing/2010/main" val="0"/>
+              </a:ext>
+            </a:extLst>
+          </a:blip>
+          <a:srcRect l="8334" t="10714" r="10381" b="8334"/>
+          <a:stretch/>
+        </p:blipFill>
+        <p:spPr>
+          <a:xfrm>
+            <a:off x="4633500" y="1224000"/>
+            <a:ext cx="2925000" cy="2913061"/>
+          </a:xfrm>
+          <a:prstGeom prst="flowChartConnector">
+            <a:avLst/>
+          </a:prstGeom>
+        </p:spPr>
+      </p:pic>
     </p:spTree>
     <p:extLst>
       <p:ext uri="{BB962C8B-B14F-4D97-AF65-F5344CB8AC3E}">

</xml_diff>

<commit_message>
Updating slides for Modeling Databases
</commit_message>
<xml_diff>
--- a/Courses/Software-Sciences/Module-3-Databases-New/07-Modeling-Databases/06-Modeling-Databases.pptx
+++ b/Courses/Software-Sciences/Module-3-Databases-New/07-Modeling-Databases/06-Modeling-Databases.pptx
@@ -5,10 +5,10 @@
     <p:sldMasterId id="2147483675" r:id="rId1"/>
   </p:sldMasterIdLst>
   <p:notesMasterIdLst>
-    <p:notesMasterId r:id="rId27"/>
+    <p:notesMasterId r:id="rId34"/>
   </p:notesMasterIdLst>
   <p:handoutMasterIdLst>
-    <p:handoutMasterId r:id="rId28"/>
+    <p:handoutMasterId r:id="rId35"/>
   </p:handoutMasterIdLst>
   <p:sldIdLst>
     <p:sldId id="503" r:id="rId2"/>
@@ -32,10 +32,17 @@
     <p:sldId id="1260" r:id="rId20"/>
     <p:sldId id="1258" r:id="rId21"/>
     <p:sldId id="1259" r:id="rId22"/>
-    <p:sldId id="1261" r:id="rId23"/>
-    <p:sldId id="349" r:id="rId24"/>
-    <p:sldId id="504" r:id="rId25"/>
-    <p:sldId id="505" r:id="rId26"/>
+    <p:sldId id="1262" r:id="rId23"/>
+    <p:sldId id="1263" r:id="rId24"/>
+    <p:sldId id="1264" r:id="rId25"/>
+    <p:sldId id="1265" r:id="rId26"/>
+    <p:sldId id="1266" r:id="rId27"/>
+    <p:sldId id="1267" r:id="rId28"/>
+    <p:sldId id="1268" r:id="rId29"/>
+    <p:sldId id="1269" r:id="rId30"/>
+    <p:sldId id="349" r:id="rId31"/>
+    <p:sldId id="504" r:id="rId32"/>
+    <p:sldId id="505" r:id="rId33"/>
   </p:sldIdLst>
   <p:sldSz cx="12192000" cy="6858000"/>
   <p:notesSz cx="6858000" cy="9144000"/>
@@ -172,7 +179,14 @@
             <p14:sldId id="1260"/>
             <p14:sldId id="1258"/>
             <p14:sldId id="1259"/>
-            <p14:sldId id="1261"/>
+            <p14:sldId id="1262"/>
+            <p14:sldId id="1263"/>
+            <p14:sldId id="1264"/>
+            <p14:sldId id="1265"/>
+            <p14:sldId id="1266"/>
+            <p14:sldId id="1267"/>
+            <p14:sldId id="1268"/>
+            <p14:sldId id="1269"/>
           </p14:sldIdLst>
         </p14:section>
         <p14:section name="Обобщение" id="{775FCB14-B379-495B-B965-30B707A8FDA5}">
@@ -435,7 +449,7 @@
           <a:p>
             <a:fld id="{4E087215-0C8F-4762-A664-737A353EC9A4}" type="datetimeFigureOut">
               <a:rPr lang="bg-BG" smtClean="0"/>
-              <a:t>2.12.2023 г.</a:t>
+              <a:t>3.12.2023 г.</a:t>
             </a:fld>
             <a:endParaRPr lang="bg-BG"/>
           </a:p>
@@ -631,7 +645,7 @@
           <a:p>
             <a:fld id="{72D84649-876A-46C9-8472-14CB09C070D8}" type="datetimeFigureOut">
               <a:rPr lang="en-US" smtClean="0"/>
-              <a:t>12/2/2023</a:t>
+              <a:t>12/3/2023</a:t>
             </a:fld>
             <a:endParaRPr lang="en-US"/>
           </a:p>
@@ -1119,6 +1133,252 @@
           <a:bodyPr/>
           <a:lstStyle/>
           <a:p>
+            <a:endParaRPr lang="en-US" dirty="0"/>
+          </a:p>
+        </p:txBody>
+      </p:sp>
+      <p:sp>
+        <p:nvSpPr>
+          <p:cNvPr id="7" name="Slide Number Placeholder 5">
+            <a:extLst>
+              <a:ext uri="{FF2B5EF4-FFF2-40B4-BE49-F238E27FC236}">
+                <a16:creationId xmlns:a16="http://schemas.microsoft.com/office/drawing/2014/main" id="{5049B984-F964-47FF-8179-0A3007CE21CD}"/>
+              </a:ext>
+            </a:extLst>
+          </p:cNvPr>
+          <p:cNvSpPr txBox="1">
+            <a:spLocks/>
+          </p:cNvSpPr>
+          <p:nvPr/>
+        </p:nvSpPr>
+        <p:spPr>
+          <a:xfrm>
+            <a:off x="6488999" y="8847000"/>
+            <a:ext cx="367414" cy="297000"/>
+          </a:xfrm>
+          <a:prstGeom prst="rect">
+            <a:avLst/>
+          </a:prstGeom>
+        </p:spPr>
+        <p:txBody>
+          <a:bodyPr vert="horz" lIns="91440" tIns="45720" rIns="91440" bIns="45720" rtlCol="0" anchor="b"/>
+          <a:lstStyle>
+            <a:defPPr>
+              <a:defRPr lang="en-US"/>
+            </a:defPPr>
+            <a:lvl1pPr marL="0" algn="r" defTabSz="914400" rtl="0" eaLnBrk="1" latinLnBrk="0" hangingPunct="1">
+              <a:defRPr sz="1200" kern="1200">
+                <a:solidFill>
+                  <a:schemeClr val="tx1"/>
+                </a:solidFill>
+                <a:latin typeface="+mn-lt"/>
+                <a:ea typeface="+mn-ea"/>
+                <a:cs typeface="+mn-cs"/>
+              </a:defRPr>
+            </a:lvl1pPr>
+            <a:lvl2pPr marL="457200" algn="l" defTabSz="914400" rtl="0" eaLnBrk="1" latinLnBrk="0" hangingPunct="1">
+              <a:defRPr sz="1800" kern="1200">
+                <a:solidFill>
+                  <a:schemeClr val="tx1"/>
+                </a:solidFill>
+                <a:latin typeface="+mn-lt"/>
+                <a:ea typeface="+mn-ea"/>
+                <a:cs typeface="+mn-cs"/>
+              </a:defRPr>
+            </a:lvl2pPr>
+            <a:lvl3pPr marL="914400" algn="l" defTabSz="914400" rtl="0" eaLnBrk="1" latinLnBrk="0" hangingPunct="1">
+              <a:defRPr sz="1800" kern="1200">
+                <a:solidFill>
+                  <a:schemeClr val="tx1"/>
+                </a:solidFill>
+                <a:latin typeface="+mn-lt"/>
+                <a:ea typeface="+mn-ea"/>
+                <a:cs typeface="+mn-cs"/>
+              </a:defRPr>
+            </a:lvl3pPr>
+            <a:lvl4pPr marL="1371600" algn="l" defTabSz="914400" rtl="0" eaLnBrk="1" latinLnBrk="0" hangingPunct="1">
+              <a:defRPr sz="1800" kern="1200">
+                <a:solidFill>
+                  <a:schemeClr val="tx1"/>
+                </a:solidFill>
+                <a:latin typeface="+mn-lt"/>
+                <a:ea typeface="+mn-ea"/>
+                <a:cs typeface="+mn-cs"/>
+              </a:defRPr>
+            </a:lvl4pPr>
+            <a:lvl5pPr marL="1828800" algn="l" defTabSz="914400" rtl="0" eaLnBrk="1" latinLnBrk="0" hangingPunct="1">
+              <a:defRPr sz="1800" kern="1200">
+                <a:solidFill>
+                  <a:schemeClr val="tx1"/>
+                </a:solidFill>
+                <a:latin typeface="+mn-lt"/>
+                <a:ea typeface="+mn-ea"/>
+                <a:cs typeface="+mn-cs"/>
+              </a:defRPr>
+            </a:lvl5pPr>
+            <a:lvl6pPr marL="2286000" algn="l" defTabSz="914400" rtl="0" eaLnBrk="1" latinLnBrk="0" hangingPunct="1">
+              <a:defRPr sz="1800" kern="1200">
+                <a:solidFill>
+                  <a:schemeClr val="tx1"/>
+                </a:solidFill>
+                <a:latin typeface="+mn-lt"/>
+                <a:ea typeface="+mn-ea"/>
+                <a:cs typeface="+mn-cs"/>
+              </a:defRPr>
+            </a:lvl6pPr>
+            <a:lvl7pPr marL="2743200" algn="l" defTabSz="914400" rtl="0" eaLnBrk="1" latinLnBrk="0" hangingPunct="1">
+              <a:defRPr sz="1800" kern="1200">
+                <a:solidFill>
+                  <a:schemeClr val="tx1"/>
+                </a:solidFill>
+                <a:latin typeface="+mn-lt"/>
+                <a:ea typeface="+mn-ea"/>
+                <a:cs typeface="+mn-cs"/>
+              </a:defRPr>
+            </a:lvl7pPr>
+            <a:lvl8pPr marL="3200400" algn="l" defTabSz="914400" rtl="0" eaLnBrk="1" latinLnBrk="0" hangingPunct="1">
+              <a:defRPr sz="1800" kern="1200">
+                <a:solidFill>
+                  <a:schemeClr val="tx1"/>
+                </a:solidFill>
+                <a:latin typeface="+mn-lt"/>
+                <a:ea typeface="+mn-ea"/>
+                <a:cs typeface="+mn-cs"/>
+              </a:defRPr>
+            </a:lvl8pPr>
+            <a:lvl9pPr marL="3657600" algn="l" defTabSz="914400" rtl="0" eaLnBrk="1" latinLnBrk="0" hangingPunct="1">
+              <a:defRPr sz="1800" kern="1200">
+                <a:solidFill>
+                  <a:schemeClr val="tx1"/>
+                </a:solidFill>
+                <a:latin typeface="+mn-lt"/>
+                <a:ea typeface="+mn-ea"/>
+                <a:cs typeface="+mn-cs"/>
+              </a:defRPr>
+            </a:lvl9pPr>
+          </a:lstStyle>
+          <a:p>
+            <a:fld id="{3EBA5BD7-F043-4D1B-AA17-CD412FC534DE}" type="slidenum">
+              <a:rPr lang="en-US" smtClean="0"/>
+              <a:pPr/>
+              <a:t>31</a:t>
+            </a:fld>
+            <a:endParaRPr lang="en-US" dirty="0"/>
+          </a:p>
+        </p:txBody>
+      </p:sp>
+      <p:sp>
+        <p:nvSpPr>
+          <p:cNvPr id="5" name="Footer Placeholder 7">
+            <a:extLst>
+              <a:ext uri="{FF2B5EF4-FFF2-40B4-BE49-F238E27FC236}">
+                <a16:creationId xmlns:a16="http://schemas.microsoft.com/office/drawing/2014/main" id="{87873718-4EF7-D4BA-768F-C09AAEC16FC2}"/>
+              </a:ext>
+            </a:extLst>
+          </p:cNvPr>
+          <p:cNvSpPr>
+            <a:spLocks noGrp="1"/>
+          </p:cNvSpPr>
+          <p:nvPr>
+            <p:ph type="ftr" sz="quarter" idx="4"/>
+          </p:nvPr>
+        </p:nvSpPr>
+        <p:spPr>
+          <a:xfrm>
+            <a:off x="-1" y="8892000"/>
+            <a:ext cx="6488999" cy="252000"/>
+          </a:xfrm>
+          <a:prstGeom prst="rect">
+            <a:avLst/>
+          </a:prstGeom>
+        </p:spPr>
+        <p:txBody>
+          <a:bodyPr vert="horz" lIns="91440" tIns="45720" rIns="91440" bIns="45720" rtlCol="0" anchor="b"/>
+          <a:lstStyle>
+            <a:lvl1pPr algn="l">
+              <a:defRPr sz="1100"/>
+            </a:lvl1pPr>
+          </a:lstStyle>
+          <a:p>
+            <a:r>
+              <a:rPr lang="bg-BG" sz="1100" dirty="0"/>
+              <a:t>Работна група </a:t>
+            </a:r>
+            <a:r>
+              <a:rPr lang="bg-BG" dirty="0"/>
+              <a:t>"Образование по програмиране и ИТ"</a:t>
+            </a:r>
+            <a:r>
+              <a:rPr lang="bg-BG" sz="1100" dirty="0"/>
+              <a:t>, с подкрепата на </a:t>
+            </a:r>
+            <a:r>
+              <a:rPr lang="en-US" sz="1100" dirty="0">
+                <a:hlinkClick r:id="rId3"/>
+              </a:rPr>
+              <a:t>SoftUni</a:t>
+            </a:r>
+            <a:endParaRPr lang="en-US" sz="1100" dirty="0"/>
+          </a:p>
+        </p:txBody>
+      </p:sp>
+    </p:spTree>
+    <p:extLst>
+      <p:ext uri="{BB962C8B-B14F-4D97-AF65-F5344CB8AC3E}">
+        <p14:creationId xmlns:p14="http://schemas.microsoft.com/office/powerpoint/2010/main" val="2007979410"/>
+      </p:ext>
+    </p:extLst>
+  </p:cSld>
+  <p:clrMapOvr>
+    <a:masterClrMapping/>
+  </p:clrMapOvr>
+</p:notes>
+</file>
+
+<file path=ppt/notesSlides/notesSlide11.xml><?xml version="1.0" encoding="utf-8"?>
+<p:notes xmlns:a="http://schemas.openxmlformats.org/drawingml/2006/main" xmlns:r="http://schemas.openxmlformats.org/officeDocument/2006/relationships" xmlns:p="http://schemas.openxmlformats.org/presentationml/2006/main">
+  <p:cSld>
+    <p:spTree>
+      <p:nvGrpSpPr>
+        <p:cNvPr id="1" name=""/>
+        <p:cNvGrpSpPr/>
+        <p:nvPr/>
+      </p:nvGrpSpPr>
+      <p:grpSpPr>
+        <a:xfrm>
+          <a:off x="0" y="0"/>
+          <a:ext cx="0" cy="0"/>
+          <a:chOff x="0" y="0"/>
+          <a:chExt cx="0" cy="0"/>
+        </a:xfrm>
+      </p:grpSpPr>
+      <p:sp>
+        <p:nvSpPr>
+          <p:cNvPr id="2" name="Slide Image Placeholder 1"/>
+          <p:cNvSpPr>
+            <a:spLocks noGrp="1" noRot="1" noChangeAspect="1"/>
+          </p:cNvSpPr>
+          <p:nvPr>
+            <p:ph type="sldImg"/>
+          </p:nvPr>
+        </p:nvSpPr>
+        <p:spPr/>
+      </p:sp>
+      <p:sp>
+        <p:nvSpPr>
+          <p:cNvPr id="3" name="Notes Placeholder 2"/>
+          <p:cNvSpPr>
+            <a:spLocks noGrp="1"/>
+          </p:cNvSpPr>
+          <p:nvPr>
+            <p:ph type="body" idx="1"/>
+          </p:nvPr>
+        </p:nvSpPr>
+        <p:spPr/>
+        <p:txBody>
+          <a:bodyPr/>
+          <a:lstStyle/>
+          <a:p>
             <a:endParaRPr lang="en-US"/>
           </a:p>
         </p:txBody>
@@ -1247,7 +1507,7 @@
             <a:fld id="{3EBA5BD7-F043-4D1B-AA17-CD412FC534DE}" type="slidenum">
               <a:rPr lang="en-US" smtClean="0"/>
               <a:pPr/>
-              <a:t>25</a:t>
+              <a:t>32</a:t>
             </a:fld>
             <a:endParaRPr lang="en-US" dirty="0"/>
           </a:p>
@@ -2320,6 +2580,127 @@
       </p:sp>
       <p:sp>
         <p:nvSpPr>
+          <p:cNvPr id="4" name="Slide Number Placeholder 3"/>
+          <p:cNvSpPr>
+            <a:spLocks noGrp="1"/>
+          </p:cNvSpPr>
+          <p:nvPr>
+            <p:ph type="sldNum" sz="quarter" idx="5"/>
+          </p:nvPr>
+        </p:nvSpPr>
+        <p:spPr/>
+        <p:txBody>
+          <a:bodyPr/>
+          <a:lstStyle/>
+          <a:p>
+            <a:fld id="{2BF067CD-8E6B-4360-9AA8-C5DF2A48A6D1}" type="slidenum">
+              <a:rPr lang="en-US" smtClean="0"/>
+              <a:t>27</a:t>
+            </a:fld>
+            <a:endParaRPr lang="en-US" dirty="0"/>
+          </a:p>
+        </p:txBody>
+      </p:sp>
+      <p:sp>
+        <p:nvSpPr>
+          <p:cNvPr id="5" name="Footer Placeholder 4"/>
+          <p:cNvSpPr>
+            <a:spLocks noGrp="1"/>
+          </p:cNvSpPr>
+          <p:nvPr>
+            <p:ph type="ftr" sz="quarter" idx="4"/>
+          </p:nvPr>
+        </p:nvSpPr>
+        <p:spPr/>
+        <p:txBody>
+          <a:bodyPr/>
+          <a:lstStyle/>
+          <a:p>
+            <a:r>
+              <a:rPr lang="bg-BG" sz="1100"/>
+              <a:t>Работна група </a:t>
+            </a:r>
+            <a:r>
+              <a:rPr lang="bg-BG"/>
+              <a:t>"Образование по програмиране и ИТ"</a:t>
+            </a:r>
+            <a:r>
+              <a:rPr lang="bg-BG" sz="1100"/>
+              <a:t>, с подкрепата на </a:t>
+            </a:r>
+            <a:r>
+              <a:rPr lang="en-US" sz="1100">
+                <a:hlinkClick r:id="rId3"/>
+              </a:rPr>
+              <a:t>SoftUni</a:t>
+            </a:r>
+            <a:endParaRPr lang="en-US" sz="1100" dirty="0"/>
+          </a:p>
+        </p:txBody>
+      </p:sp>
+    </p:spTree>
+    <p:extLst>
+      <p:ext uri="{BB962C8B-B14F-4D97-AF65-F5344CB8AC3E}">
+        <p14:creationId xmlns:p14="http://schemas.microsoft.com/office/powerpoint/2010/main" val="1554603372"/>
+      </p:ext>
+    </p:extLst>
+  </p:cSld>
+  <p:clrMapOvr>
+    <a:masterClrMapping/>
+  </p:clrMapOvr>
+</p:notes>
+</file>
+
+<file path=ppt/notesSlides/notesSlide9.xml><?xml version="1.0" encoding="utf-8"?>
+<p:notes xmlns:a="http://schemas.openxmlformats.org/drawingml/2006/main" xmlns:r="http://schemas.openxmlformats.org/officeDocument/2006/relationships" xmlns:p="http://schemas.openxmlformats.org/presentationml/2006/main">
+  <p:cSld>
+    <p:spTree>
+      <p:nvGrpSpPr>
+        <p:cNvPr id="1" name=""/>
+        <p:cNvGrpSpPr/>
+        <p:nvPr/>
+      </p:nvGrpSpPr>
+      <p:grpSpPr>
+        <a:xfrm>
+          <a:off x="0" y="0"/>
+          <a:ext cx="0" cy="0"/>
+          <a:chOff x="0" y="0"/>
+          <a:chExt cx="0" cy="0"/>
+        </a:xfrm>
+      </p:grpSpPr>
+      <p:sp>
+        <p:nvSpPr>
+          <p:cNvPr id="2" name="Slide Image Placeholder 1"/>
+          <p:cNvSpPr>
+            <a:spLocks noGrp="1" noRot="1" noChangeAspect="1"/>
+          </p:cNvSpPr>
+          <p:nvPr>
+            <p:ph type="sldImg"/>
+          </p:nvPr>
+        </p:nvSpPr>
+        <p:spPr/>
+      </p:sp>
+      <p:sp>
+        <p:nvSpPr>
+          <p:cNvPr id="3" name="Notes Placeholder 2"/>
+          <p:cNvSpPr>
+            <a:spLocks noGrp="1"/>
+          </p:cNvSpPr>
+          <p:nvPr>
+            <p:ph type="body" idx="1"/>
+          </p:nvPr>
+        </p:nvSpPr>
+        <p:spPr/>
+        <p:txBody>
+          <a:bodyPr/>
+          <a:lstStyle/>
+          <a:p>
+            <a:endParaRPr lang="en-US" dirty="0"/>
+          </a:p>
+        </p:txBody>
+      </p:sp>
+      <p:sp>
+        <p:nvSpPr>
           <p:cNvPr id="7" name="Slide Number Placeholder 5">
             <a:extLst>
               <a:ext uri="{FF2B5EF4-FFF2-40B4-BE49-F238E27FC236}">
@@ -2442,7 +2823,7 @@
             <a:fld id="{3EBA5BD7-F043-4D1B-AA17-CD412FC534DE}" type="slidenum">
               <a:rPr lang="en-US" smtClean="0"/>
               <a:pPr/>
-              <a:t>23</a:t>
+              <a:t>30</a:t>
             </a:fld>
             <a:endParaRPr lang="en-US" dirty="0"/>
           </a:p>
@@ -2507,252 +2888,6 @@
     <p:extLst>
       <p:ext uri="{BB962C8B-B14F-4D97-AF65-F5344CB8AC3E}">
         <p14:creationId xmlns:p14="http://schemas.microsoft.com/office/powerpoint/2010/main" val="3533300824"/>
-      </p:ext>
-    </p:extLst>
-  </p:cSld>
-  <p:clrMapOvr>
-    <a:masterClrMapping/>
-  </p:clrMapOvr>
-</p:notes>
-</file>
-
-<file path=ppt/notesSlides/notesSlide9.xml><?xml version="1.0" encoding="utf-8"?>
-<p:notes xmlns:a="http://schemas.openxmlformats.org/drawingml/2006/main" xmlns:r="http://schemas.openxmlformats.org/officeDocument/2006/relationships" xmlns:p="http://schemas.openxmlformats.org/presentationml/2006/main">
-  <p:cSld>
-    <p:spTree>
-      <p:nvGrpSpPr>
-        <p:cNvPr id="1" name=""/>
-        <p:cNvGrpSpPr/>
-        <p:nvPr/>
-      </p:nvGrpSpPr>
-      <p:grpSpPr>
-        <a:xfrm>
-          <a:off x="0" y="0"/>
-          <a:ext cx="0" cy="0"/>
-          <a:chOff x="0" y="0"/>
-          <a:chExt cx="0" cy="0"/>
-        </a:xfrm>
-      </p:grpSpPr>
-      <p:sp>
-        <p:nvSpPr>
-          <p:cNvPr id="2" name="Slide Image Placeholder 1"/>
-          <p:cNvSpPr>
-            <a:spLocks noGrp="1" noRot="1" noChangeAspect="1"/>
-          </p:cNvSpPr>
-          <p:nvPr>
-            <p:ph type="sldImg"/>
-          </p:nvPr>
-        </p:nvSpPr>
-        <p:spPr/>
-      </p:sp>
-      <p:sp>
-        <p:nvSpPr>
-          <p:cNvPr id="3" name="Notes Placeholder 2"/>
-          <p:cNvSpPr>
-            <a:spLocks noGrp="1"/>
-          </p:cNvSpPr>
-          <p:nvPr>
-            <p:ph type="body" idx="1"/>
-          </p:nvPr>
-        </p:nvSpPr>
-        <p:spPr/>
-        <p:txBody>
-          <a:bodyPr/>
-          <a:lstStyle/>
-          <a:p>
-            <a:endParaRPr lang="en-US" dirty="0"/>
-          </a:p>
-        </p:txBody>
-      </p:sp>
-      <p:sp>
-        <p:nvSpPr>
-          <p:cNvPr id="7" name="Slide Number Placeholder 5">
-            <a:extLst>
-              <a:ext uri="{FF2B5EF4-FFF2-40B4-BE49-F238E27FC236}">
-                <a16:creationId xmlns:a16="http://schemas.microsoft.com/office/drawing/2014/main" id="{5049B984-F964-47FF-8179-0A3007CE21CD}"/>
-              </a:ext>
-            </a:extLst>
-          </p:cNvPr>
-          <p:cNvSpPr txBox="1">
-            <a:spLocks/>
-          </p:cNvSpPr>
-          <p:nvPr/>
-        </p:nvSpPr>
-        <p:spPr>
-          <a:xfrm>
-            <a:off x="6488999" y="8847000"/>
-            <a:ext cx="367414" cy="297000"/>
-          </a:xfrm>
-          <a:prstGeom prst="rect">
-            <a:avLst/>
-          </a:prstGeom>
-        </p:spPr>
-        <p:txBody>
-          <a:bodyPr vert="horz" lIns="91440" tIns="45720" rIns="91440" bIns="45720" rtlCol="0" anchor="b"/>
-          <a:lstStyle>
-            <a:defPPr>
-              <a:defRPr lang="en-US"/>
-            </a:defPPr>
-            <a:lvl1pPr marL="0" algn="r" defTabSz="914400" rtl="0" eaLnBrk="1" latinLnBrk="0" hangingPunct="1">
-              <a:defRPr sz="1200" kern="1200">
-                <a:solidFill>
-                  <a:schemeClr val="tx1"/>
-                </a:solidFill>
-                <a:latin typeface="+mn-lt"/>
-                <a:ea typeface="+mn-ea"/>
-                <a:cs typeface="+mn-cs"/>
-              </a:defRPr>
-            </a:lvl1pPr>
-            <a:lvl2pPr marL="457200" algn="l" defTabSz="914400" rtl="0" eaLnBrk="1" latinLnBrk="0" hangingPunct="1">
-              <a:defRPr sz="1800" kern="1200">
-                <a:solidFill>
-                  <a:schemeClr val="tx1"/>
-                </a:solidFill>
-                <a:latin typeface="+mn-lt"/>
-                <a:ea typeface="+mn-ea"/>
-                <a:cs typeface="+mn-cs"/>
-              </a:defRPr>
-            </a:lvl2pPr>
-            <a:lvl3pPr marL="914400" algn="l" defTabSz="914400" rtl="0" eaLnBrk="1" latinLnBrk="0" hangingPunct="1">
-              <a:defRPr sz="1800" kern="1200">
-                <a:solidFill>
-                  <a:schemeClr val="tx1"/>
-                </a:solidFill>
-                <a:latin typeface="+mn-lt"/>
-                <a:ea typeface="+mn-ea"/>
-                <a:cs typeface="+mn-cs"/>
-              </a:defRPr>
-            </a:lvl3pPr>
-            <a:lvl4pPr marL="1371600" algn="l" defTabSz="914400" rtl="0" eaLnBrk="1" latinLnBrk="0" hangingPunct="1">
-              <a:defRPr sz="1800" kern="1200">
-                <a:solidFill>
-                  <a:schemeClr val="tx1"/>
-                </a:solidFill>
-                <a:latin typeface="+mn-lt"/>
-                <a:ea typeface="+mn-ea"/>
-                <a:cs typeface="+mn-cs"/>
-              </a:defRPr>
-            </a:lvl4pPr>
-            <a:lvl5pPr marL="1828800" algn="l" defTabSz="914400" rtl="0" eaLnBrk="1" latinLnBrk="0" hangingPunct="1">
-              <a:defRPr sz="1800" kern="1200">
-                <a:solidFill>
-                  <a:schemeClr val="tx1"/>
-                </a:solidFill>
-                <a:latin typeface="+mn-lt"/>
-                <a:ea typeface="+mn-ea"/>
-                <a:cs typeface="+mn-cs"/>
-              </a:defRPr>
-            </a:lvl5pPr>
-            <a:lvl6pPr marL="2286000" algn="l" defTabSz="914400" rtl="0" eaLnBrk="1" latinLnBrk="0" hangingPunct="1">
-              <a:defRPr sz="1800" kern="1200">
-                <a:solidFill>
-                  <a:schemeClr val="tx1"/>
-                </a:solidFill>
-                <a:latin typeface="+mn-lt"/>
-                <a:ea typeface="+mn-ea"/>
-                <a:cs typeface="+mn-cs"/>
-              </a:defRPr>
-            </a:lvl6pPr>
-            <a:lvl7pPr marL="2743200" algn="l" defTabSz="914400" rtl="0" eaLnBrk="1" latinLnBrk="0" hangingPunct="1">
-              <a:defRPr sz="1800" kern="1200">
-                <a:solidFill>
-                  <a:schemeClr val="tx1"/>
-                </a:solidFill>
-                <a:latin typeface="+mn-lt"/>
-                <a:ea typeface="+mn-ea"/>
-                <a:cs typeface="+mn-cs"/>
-              </a:defRPr>
-            </a:lvl7pPr>
-            <a:lvl8pPr marL="3200400" algn="l" defTabSz="914400" rtl="0" eaLnBrk="1" latinLnBrk="0" hangingPunct="1">
-              <a:defRPr sz="1800" kern="1200">
-                <a:solidFill>
-                  <a:schemeClr val="tx1"/>
-                </a:solidFill>
-                <a:latin typeface="+mn-lt"/>
-                <a:ea typeface="+mn-ea"/>
-                <a:cs typeface="+mn-cs"/>
-              </a:defRPr>
-            </a:lvl8pPr>
-            <a:lvl9pPr marL="3657600" algn="l" defTabSz="914400" rtl="0" eaLnBrk="1" latinLnBrk="0" hangingPunct="1">
-              <a:defRPr sz="1800" kern="1200">
-                <a:solidFill>
-                  <a:schemeClr val="tx1"/>
-                </a:solidFill>
-                <a:latin typeface="+mn-lt"/>
-                <a:ea typeface="+mn-ea"/>
-                <a:cs typeface="+mn-cs"/>
-              </a:defRPr>
-            </a:lvl9pPr>
-          </a:lstStyle>
-          <a:p>
-            <a:fld id="{3EBA5BD7-F043-4D1B-AA17-CD412FC534DE}" type="slidenum">
-              <a:rPr lang="en-US" smtClean="0"/>
-              <a:pPr/>
-              <a:t>24</a:t>
-            </a:fld>
-            <a:endParaRPr lang="en-US" dirty="0"/>
-          </a:p>
-        </p:txBody>
-      </p:sp>
-      <p:sp>
-        <p:nvSpPr>
-          <p:cNvPr id="5" name="Footer Placeholder 7">
-            <a:extLst>
-              <a:ext uri="{FF2B5EF4-FFF2-40B4-BE49-F238E27FC236}">
-                <a16:creationId xmlns:a16="http://schemas.microsoft.com/office/drawing/2014/main" id="{87873718-4EF7-D4BA-768F-C09AAEC16FC2}"/>
-              </a:ext>
-            </a:extLst>
-          </p:cNvPr>
-          <p:cNvSpPr>
-            <a:spLocks noGrp="1"/>
-          </p:cNvSpPr>
-          <p:nvPr>
-            <p:ph type="ftr" sz="quarter" idx="4"/>
-          </p:nvPr>
-        </p:nvSpPr>
-        <p:spPr>
-          <a:xfrm>
-            <a:off x="-1" y="8892000"/>
-            <a:ext cx="6488999" cy="252000"/>
-          </a:xfrm>
-          <a:prstGeom prst="rect">
-            <a:avLst/>
-          </a:prstGeom>
-        </p:spPr>
-        <p:txBody>
-          <a:bodyPr vert="horz" lIns="91440" tIns="45720" rIns="91440" bIns="45720" rtlCol="0" anchor="b"/>
-          <a:lstStyle>
-            <a:lvl1pPr algn="l">
-              <a:defRPr sz="1100"/>
-            </a:lvl1pPr>
-          </a:lstStyle>
-          <a:p>
-            <a:r>
-              <a:rPr lang="bg-BG" sz="1100" dirty="0"/>
-              <a:t>Работна група </a:t>
-            </a:r>
-            <a:r>
-              <a:rPr lang="bg-BG" dirty="0"/>
-              <a:t>"Образование по програмиране и ИТ"</a:t>
-            </a:r>
-            <a:r>
-              <a:rPr lang="bg-BG" sz="1100" dirty="0"/>
-              <a:t>, с подкрепата на </a:t>
-            </a:r>
-            <a:r>
-              <a:rPr lang="en-US" sz="1100" dirty="0">
-                <a:hlinkClick r:id="rId3"/>
-              </a:rPr>
-              <a:t>SoftUni</a:t>
-            </a:r>
-            <a:endParaRPr lang="en-US" sz="1100" dirty="0"/>
-          </a:p>
-        </p:txBody>
-      </p:sp>
-    </p:spTree>
-    <p:extLst>
-      <p:ext uri="{BB962C8B-B14F-4D97-AF65-F5344CB8AC3E}">
-        <p14:creationId xmlns:p14="http://schemas.microsoft.com/office/powerpoint/2010/main" val="2007979410"/>
       </p:ext>
     </p:extLst>
   </p:cSld>
@@ -13711,6 +13846,129 @@
       <p:transition spd="slow" advClick="0" advTm="5000"/>
     </mc:Fallback>
   </mc:AlternateContent>
+  <p:timing>
+    <p:tnLst>
+      <p:par>
+        <p:cTn id="1" dur="indefinite" restart="never" nodeType="tmRoot">
+          <p:childTnLst>
+            <p:seq concurrent="1" nextAc="seek">
+              <p:cTn id="2" dur="indefinite" nodeType="mainSeq">
+                <p:childTnLst>
+                  <p:par>
+                    <p:cTn id="3" fill="hold">
+                      <p:stCondLst>
+                        <p:cond delay="indefinite"/>
+                      </p:stCondLst>
+                      <p:childTnLst>
+                        <p:par>
+                          <p:cTn id="4" fill="hold">
+                            <p:stCondLst>
+                              <p:cond delay="0"/>
+                            </p:stCondLst>
+                            <p:childTnLst>
+                              <p:par>
+                                <p:cTn id="5" presetID="1" presetClass="entr" presetSubtype="0" fill="hold" nodeType="clickEffect">
+                                  <p:stCondLst>
+                                    <p:cond delay="0"/>
+                                  </p:stCondLst>
+                                  <p:childTnLst>
+                                    <p:set>
+                                      <p:cBhvr>
+                                        <p:cTn id="6" dur="1" fill="hold">
+                                          <p:stCondLst>
+                                            <p:cond delay="0"/>
+                                          </p:stCondLst>
+                                        </p:cTn>
+                                        <p:tgtEl>
+                                          <p:spTgt spid="10"/>
+                                        </p:tgtEl>
+                                        <p:attrNameLst>
+                                          <p:attrName>style.visibility</p:attrName>
+                                        </p:attrNameLst>
+                                      </p:cBhvr>
+                                      <p:to>
+                                        <p:strVal val="visible"/>
+                                      </p:to>
+                                    </p:set>
+                                  </p:childTnLst>
+                                </p:cTn>
+                              </p:par>
+                            </p:childTnLst>
+                          </p:cTn>
+                        </p:par>
+                      </p:childTnLst>
+                    </p:cTn>
+                  </p:par>
+                  <p:par>
+                    <p:cTn id="7" fill="hold">
+                      <p:stCondLst>
+                        <p:cond delay="indefinite"/>
+                      </p:stCondLst>
+                      <p:childTnLst>
+                        <p:par>
+                          <p:cTn id="8" fill="hold">
+                            <p:stCondLst>
+                              <p:cond delay="0"/>
+                            </p:stCondLst>
+                            <p:childTnLst>
+                              <p:par>
+                                <p:cTn id="9" presetID="1" presetClass="entr" presetSubtype="0" fill="hold" grpId="0" nodeType="clickEffect">
+                                  <p:stCondLst>
+                                    <p:cond delay="0"/>
+                                  </p:stCondLst>
+                                  <p:childTnLst>
+                                    <p:set>
+                                      <p:cBhvr>
+                                        <p:cTn id="10" dur="1" fill="hold">
+                                          <p:stCondLst>
+                                            <p:cond delay="0"/>
+                                          </p:stCondLst>
+                                        </p:cTn>
+                                        <p:tgtEl>
+                                          <p:spTgt spid="11"/>
+                                        </p:tgtEl>
+                                        <p:attrNameLst>
+                                          <p:attrName>style.visibility</p:attrName>
+                                        </p:attrNameLst>
+                                      </p:cBhvr>
+                                      <p:to>
+                                        <p:strVal val="visible"/>
+                                      </p:to>
+                                    </p:set>
+                                  </p:childTnLst>
+                                </p:cTn>
+                              </p:par>
+                            </p:childTnLst>
+                          </p:cTn>
+                        </p:par>
+                      </p:childTnLst>
+                    </p:cTn>
+                  </p:par>
+                </p:childTnLst>
+              </p:cTn>
+              <p:prevCondLst>
+                <p:cond evt="onPrev" delay="0">
+                  <p:tgtEl>
+                    <p:sldTgt/>
+                  </p:tgtEl>
+                </p:cond>
+              </p:prevCondLst>
+              <p:nextCondLst>
+                <p:cond evt="onNext" delay="0">
+                  <p:tgtEl>
+                    <p:sldTgt/>
+                  </p:tgtEl>
+                </p:cond>
+              </p:nextCondLst>
+            </p:seq>
+          </p:childTnLst>
+        </p:cTn>
+      </p:par>
+    </p:tnLst>
+    <p:bldLst>
+      <p:bldP spid="11" grpId="0" animBg="1"/>
+    </p:bldLst>
+  </p:timing>
 </p:sld>
 </file>
 
@@ -13982,6 +14240,112 @@
       <p:transition spd="slow" advClick="0" advTm="5000"/>
     </mc:Fallback>
   </mc:AlternateContent>
+  <p:timing>
+    <p:tnLst>
+      <p:par>
+        <p:cTn id="1" dur="indefinite" restart="never" nodeType="tmRoot">
+          <p:childTnLst>
+            <p:seq concurrent="1" nextAc="seek">
+              <p:cTn id="2" dur="indefinite" nodeType="mainSeq">
+                <p:childTnLst>
+                  <p:par>
+                    <p:cTn id="3" fill="hold">
+                      <p:stCondLst>
+                        <p:cond delay="indefinite"/>
+                      </p:stCondLst>
+                      <p:childTnLst>
+                        <p:par>
+                          <p:cTn id="4" fill="hold">
+                            <p:stCondLst>
+                              <p:cond delay="0"/>
+                            </p:stCondLst>
+                            <p:childTnLst>
+                              <p:par>
+                                <p:cTn id="5" presetID="1" presetClass="entr" presetSubtype="0" fill="hold" nodeType="clickEffect">
+                                  <p:stCondLst>
+                                    <p:cond delay="0"/>
+                                  </p:stCondLst>
+                                  <p:childTnLst>
+                                    <p:set>
+                                      <p:cBhvr>
+                                        <p:cTn id="6" dur="1" fill="hold">
+                                          <p:stCondLst>
+                                            <p:cond delay="0"/>
+                                          </p:stCondLst>
+                                        </p:cTn>
+                                        <p:tgtEl>
+                                          <p:spTgt spid="3">
+                                            <p:txEl>
+                                              <p:pRg st="3" end="3"/>
+                                            </p:txEl>
+                                          </p:spTgt>
+                                        </p:tgtEl>
+                                        <p:attrNameLst>
+                                          <p:attrName>style.visibility</p:attrName>
+                                        </p:attrNameLst>
+                                      </p:cBhvr>
+                                      <p:to>
+                                        <p:strVal val="visible"/>
+                                      </p:to>
+                                    </p:set>
+                                  </p:childTnLst>
+                                </p:cTn>
+                              </p:par>
+                              <p:par>
+                                <p:cTn id="7" presetID="1" presetClass="entr" presetSubtype="0" fill="hold" nodeType="withEffect">
+                                  <p:stCondLst>
+                                    <p:cond delay="0"/>
+                                  </p:stCondLst>
+                                  <p:childTnLst>
+                                    <p:set>
+                                      <p:cBhvr>
+                                        <p:cTn id="8" dur="1" fill="hold">
+                                          <p:stCondLst>
+                                            <p:cond delay="0"/>
+                                          </p:stCondLst>
+                                        </p:cTn>
+                                        <p:tgtEl>
+                                          <p:spTgt spid="10"/>
+                                        </p:tgtEl>
+                                        <p:attrNameLst>
+                                          <p:attrName>style.visibility</p:attrName>
+                                        </p:attrNameLst>
+                                      </p:cBhvr>
+                                      <p:to>
+                                        <p:strVal val="visible"/>
+                                      </p:to>
+                                    </p:set>
+                                  </p:childTnLst>
+                                </p:cTn>
+                              </p:par>
+                            </p:childTnLst>
+                          </p:cTn>
+                        </p:par>
+                      </p:childTnLst>
+                    </p:cTn>
+                  </p:par>
+                </p:childTnLst>
+              </p:cTn>
+              <p:prevCondLst>
+                <p:cond evt="onPrev" delay="0">
+                  <p:tgtEl>
+                    <p:sldTgt/>
+                  </p:tgtEl>
+                </p:cond>
+              </p:prevCondLst>
+              <p:nextCondLst>
+                <p:cond evt="onNext" delay="0">
+                  <p:tgtEl>
+                    <p:sldTgt/>
+                  </p:tgtEl>
+                </p:cond>
+              </p:nextCondLst>
+            </p:seq>
+          </p:childTnLst>
+        </p:cTn>
+      </p:par>
+    </p:tnLst>
+  </p:timing>
 </p:sld>
 </file>
 
@@ -14172,8 +14536,8 @@
         </p:blipFill>
         <p:spPr>
           <a:xfrm>
-            <a:off x="3373500" y="3960508"/>
-            <a:ext cx="5444999" cy="1350000"/>
+            <a:off x="2573876" y="3707492"/>
+            <a:ext cx="7044248" cy="1746508"/>
           </a:xfrm>
           <a:prstGeom prst="rect">
             <a:avLst/>
@@ -14201,8 +14565,8 @@
         </p:nvSpPr>
         <p:spPr>
           <a:xfrm>
-            <a:off x="4431000" y="4734000"/>
-            <a:ext cx="4230000" cy="315000"/>
+            <a:off x="4026000" y="4697492"/>
+            <a:ext cx="5355000" cy="407519"/>
           </a:xfrm>
           <a:prstGeom prst="roundRect">
             <a:avLst>
@@ -14272,6 +14636,84 @@
       <p:transition spd="slow" advClick="0" advTm="5000"/>
     </mc:Fallback>
   </mc:AlternateContent>
+  <p:timing>
+    <p:tnLst>
+      <p:par>
+        <p:cTn id="1" dur="indefinite" restart="never" nodeType="tmRoot">
+          <p:childTnLst>
+            <p:seq concurrent="1" nextAc="seek">
+              <p:cTn id="2" dur="indefinite" nodeType="mainSeq">
+                <p:childTnLst>
+                  <p:par>
+                    <p:cTn id="3" fill="hold">
+                      <p:stCondLst>
+                        <p:cond delay="indefinite"/>
+                      </p:stCondLst>
+                      <p:childTnLst>
+                        <p:par>
+                          <p:cTn id="4" fill="hold">
+                            <p:stCondLst>
+                              <p:cond delay="0"/>
+                            </p:stCondLst>
+                            <p:childTnLst>
+                              <p:par>
+                                <p:cTn id="5" presetID="1" presetClass="entr" presetSubtype="0" fill="hold" grpId="0" nodeType="clickEffect">
+                                  <p:stCondLst>
+                                    <p:cond delay="0"/>
+                                  </p:stCondLst>
+                                  <p:childTnLst>
+                                    <p:set>
+                                      <p:cBhvr>
+                                        <p:cTn id="6" dur="1" fill="hold">
+                                          <p:stCondLst>
+                                            <p:cond delay="0"/>
+                                          </p:stCondLst>
+                                        </p:cTn>
+                                        <p:tgtEl>
+                                          <p:spTgt spid="7"/>
+                                        </p:tgtEl>
+                                        <p:attrNameLst>
+                                          <p:attrName>style.visibility</p:attrName>
+                                        </p:attrNameLst>
+                                      </p:cBhvr>
+                                      <p:to>
+                                        <p:strVal val="visible"/>
+                                      </p:to>
+                                    </p:set>
+                                  </p:childTnLst>
+                                </p:cTn>
+                              </p:par>
+                            </p:childTnLst>
+                          </p:cTn>
+                        </p:par>
+                      </p:childTnLst>
+                    </p:cTn>
+                  </p:par>
+                </p:childTnLst>
+              </p:cTn>
+              <p:prevCondLst>
+                <p:cond evt="onPrev" delay="0">
+                  <p:tgtEl>
+                    <p:sldTgt/>
+                  </p:tgtEl>
+                </p:cond>
+              </p:prevCondLst>
+              <p:nextCondLst>
+                <p:cond evt="onNext" delay="0">
+                  <p:tgtEl>
+                    <p:sldTgt/>
+                  </p:tgtEl>
+                </p:cond>
+              </p:nextCondLst>
+            </p:seq>
+          </p:childTnLst>
+        </p:cTn>
+      </p:par>
+    </p:tnLst>
+    <p:bldLst>
+      <p:bldP spid="7" grpId="0" animBg="1"/>
+    </p:bldLst>
+  </p:timing>
 </p:sld>
 </file>
 
@@ -15376,10 +15818,10 @@
       </p:sp>
       <p:pic>
         <p:nvPicPr>
-          <p:cNvPr id="8" name="Picture 7">
+          <p:cNvPr id="6" name="Picture 5">
             <a:extLst>
               <a:ext uri="{FF2B5EF4-FFF2-40B4-BE49-F238E27FC236}">
-                <a16:creationId xmlns:a16="http://schemas.microsoft.com/office/drawing/2014/main" id="{FA6D0C90-9C33-DC0A-2B74-077081CFD547}"/>
+                <a16:creationId xmlns:a16="http://schemas.microsoft.com/office/drawing/2014/main" id="{D952E07C-2E75-8C09-54A0-179CFB3C7318}"/>
               </a:ext>
             </a:extLst>
           </p:cNvPr>
@@ -15396,8 +15838,8 @@
         </p:blipFill>
         <p:spPr>
           <a:xfrm>
-            <a:off x="3376400" y="3159000"/>
-            <a:ext cx="5439201" cy="2279152"/>
+            <a:off x="3158120" y="3230005"/>
+            <a:ext cx="5875760" cy="2431870"/>
           </a:xfrm>
           <a:prstGeom prst="rect">
             <a:avLst/>
@@ -15454,7 +15896,7 @@
           <p:cNvPr id="2" name="Slide Number Placeholder 1">
             <a:extLst>
               <a:ext uri="{FF2B5EF4-FFF2-40B4-BE49-F238E27FC236}">
-                <a16:creationId xmlns:a16="http://schemas.microsoft.com/office/drawing/2014/main" id="{49418C4F-566E-018A-CF8F-4A4142B42CB8}"/>
+                <a16:creationId xmlns:a16="http://schemas.microsoft.com/office/drawing/2014/main" id="{7417689D-47F0-2B1F-DCBF-58AE71142B59}"/>
               </a:ext>
             </a:extLst>
           </p:cNvPr>
@@ -15484,7 +15926,7 @@
           <p:cNvPr id="3" name="Text Placeholder 2">
             <a:extLst>
               <a:ext uri="{FF2B5EF4-FFF2-40B4-BE49-F238E27FC236}">
-                <a16:creationId xmlns:a16="http://schemas.microsoft.com/office/drawing/2014/main" id="{20DD3AE8-8DBB-D705-5EC5-18CD687895B7}"/>
+                <a16:creationId xmlns:a16="http://schemas.microsoft.com/office/drawing/2014/main" id="{9335A8E8-F4F9-B819-8222-A10689F5A6DA}"/>
               </a:ext>
             </a:extLst>
           </p:cNvPr>
@@ -15501,17 +15943,107 @@
           <a:lstStyle/>
           <a:p>
             <a:r>
-              <a:rPr lang="en-US" b="1" dirty="0">
+              <a:rPr lang="bg-BG" dirty="0"/>
+              <a:t>Натиснете с десния бутон върху </a:t>
+            </a:r>
+            <a:r>
+              <a:rPr lang="en-US" dirty="0"/>
+              <a:t>"</a:t>
+            </a:r>
+            <a:r>
+              <a:rPr lang="en-US" b="1" dirty="0"/>
+              <a:t>Database Diagrams</a:t>
+            </a:r>
+            <a:r>
+              <a:rPr lang="en-US" dirty="0"/>
+              <a:t>" </a:t>
+            </a:r>
+            <a:r>
+              <a:rPr lang="bg-BG" dirty="0"/>
+              <a:t>и изберете </a:t>
+            </a:r>
+            <a:r>
+              <a:rPr lang="en-US" dirty="0"/>
+              <a:t>[</a:t>
+            </a:r>
+            <a:r>
+              <a:rPr lang="en-US" b="1" dirty="0"/>
+              <a:t>New Database Diagram</a:t>
+            </a:r>
+            <a:r>
+              <a:rPr lang="en-US" dirty="0"/>
+              <a:t>]</a:t>
+            </a:r>
+          </a:p>
+          <a:p>
+            <a:endParaRPr lang="en-US" dirty="0"/>
+          </a:p>
+          <a:p>
+            <a:endParaRPr lang="en-US" dirty="0"/>
+          </a:p>
+          <a:p>
+            <a:endParaRPr lang="bg-BG" dirty="0"/>
+          </a:p>
+          <a:p>
+            <a:endParaRPr lang="bg-BG" dirty="0"/>
+          </a:p>
+          <a:p>
+            <a:r>
+              <a:rPr lang="bg-BG" dirty="0"/>
+              <a:t>По този начин ще създадем </a:t>
+            </a:r>
+            <a:r>
+              <a:rPr lang="bg-BG" b="1" dirty="0">
                 <a:solidFill>
                   <a:schemeClr val="bg1"/>
                 </a:solidFill>
               </a:rPr>
-              <a:t>TODO</a:t>
-            </a:r>
-            <a:r>
-              <a:rPr lang="en-US" dirty="0"/>
-              <a:t>: Make a One-to-Many relationship for Students and Enrollments tables, using the SSMS UI</a:t>
-            </a:r>
+              <a:t>диаграма</a:t>
+            </a:r>
+            <a:r>
+              <a:rPr lang="bg-BG" dirty="0"/>
+              <a:t> на нашата </a:t>
+            </a:r>
+            <a:r>
+              <a:rPr lang="bg-BG" b="1" dirty="0">
+                <a:solidFill>
+                  <a:schemeClr val="bg1"/>
+                </a:solidFill>
+              </a:rPr>
+              <a:t>база данни</a:t>
+            </a:r>
+          </a:p>
+          <a:p>
+            <a:pPr lvl="1"/>
+            <a:r>
+              <a:rPr lang="bg-BG" dirty="0"/>
+              <a:t>Тя ще визуализира </a:t>
+            </a:r>
+            <a:r>
+              <a:rPr lang="bg-BG" b="1" dirty="0">
+                <a:solidFill>
+                  <a:schemeClr val="bg1"/>
+                </a:solidFill>
+              </a:rPr>
+              <a:t>таблиците</a:t>
+            </a:r>
+            <a:r>
+              <a:rPr lang="bg-BG" dirty="0"/>
+              <a:t> с техните </a:t>
+            </a:r>
+            <a:r>
+              <a:rPr lang="bg-BG" b="1" dirty="0">
+                <a:solidFill>
+                  <a:schemeClr val="bg1"/>
+                </a:solidFill>
+              </a:rPr>
+              <a:t>колони</a:t>
+            </a:r>
+            <a:endParaRPr lang="en-US" b="1" dirty="0">
+              <a:solidFill>
+                <a:schemeClr val="bg1"/>
+              </a:solidFill>
+            </a:endParaRPr>
           </a:p>
         </p:txBody>
       </p:sp>
@@ -15520,7 +16052,7 @@
           <p:cNvPr id="4" name="Title 3">
             <a:extLst>
               <a:ext uri="{FF2B5EF4-FFF2-40B4-BE49-F238E27FC236}">
-                <a16:creationId xmlns:a16="http://schemas.microsoft.com/office/drawing/2014/main" id="{625BBE64-D5EF-20E4-1D28-6CBAC5AE2B74}"/>
+                <a16:creationId xmlns:a16="http://schemas.microsoft.com/office/drawing/2014/main" id="{FD838546-F0B5-2F45-9BDF-A995D7F1F1C7}"/>
               </a:ext>
             </a:extLst>
           </p:cNvPr>
@@ -15538,7 +16070,7 @@
           <a:p>
             <a:r>
               <a:rPr lang="bg-BG" dirty="0"/>
-              <a:t>Създаване на връзка между таблици</a:t>
+              <a:t>Създаване на връзка между таблици (1)</a:t>
             </a:r>
             <a:endParaRPr lang="en-US" dirty="0"/>
           </a:p>
@@ -15546,55 +16078,3515 @@
       </p:sp>
       <p:pic>
         <p:nvPicPr>
-          <p:cNvPr id="2050" name="Picture 2">
+          <p:cNvPr id="10" name="Picture 9">
             <a:extLst>
               <a:ext uri="{FF2B5EF4-FFF2-40B4-BE49-F238E27FC236}">
-                <a16:creationId xmlns:a16="http://schemas.microsoft.com/office/drawing/2014/main" id="{CB7FC4FF-961C-AB5D-D9F0-A7468796F55E}"/>
+                <a16:creationId xmlns:a16="http://schemas.microsoft.com/office/drawing/2014/main" id="{76814D94-A342-4B67-C931-A729304A5A3F}"/>
               </a:ext>
             </a:extLst>
           </p:cNvPr>
           <p:cNvPicPr>
-            <a:picLocks noChangeAspect="1" noChangeArrowheads="1"/>
+            <a:picLocks noChangeAspect="1"/>
           </p:cNvPicPr>
           <p:nvPr/>
         </p:nvPicPr>
         <p:blipFill>
-          <a:blip r:embed="rId2">
+          <a:blip r:embed="rId2"/>
+          <a:stretch>
+            <a:fillRect/>
+          </a:stretch>
+        </p:blipFill>
+        <p:spPr>
+          <a:xfrm>
+            <a:off x="4052697" y="2529000"/>
+            <a:ext cx="4086605" cy="2482133"/>
+          </a:xfrm>
+          <a:prstGeom prst="rect">
+            <a:avLst/>
+          </a:prstGeom>
+          <a:ln>
+            <a:solidFill>
+              <a:schemeClr val="bg2">
+                <a:lumMod val="75000"/>
+              </a:schemeClr>
+            </a:solidFill>
+          </a:ln>
+        </p:spPr>
+      </p:pic>
+      <p:sp>
+        <p:nvSpPr>
+          <p:cNvPr id="11" name="Rectangle: Rounded Corners 10">
+            <a:extLst>
+              <a:ext uri="{FF2B5EF4-FFF2-40B4-BE49-F238E27FC236}">
+                <a16:creationId xmlns:a16="http://schemas.microsoft.com/office/drawing/2014/main" id="{41438DBB-4124-DB88-6755-05746B0F11F3}"/>
+              </a:ext>
+            </a:extLst>
+          </p:cNvPr>
+          <p:cNvSpPr/>
+          <p:nvPr/>
+        </p:nvSpPr>
+        <p:spPr>
+          <a:xfrm>
+            <a:off x="5241000" y="3024000"/>
+            <a:ext cx="2705645" cy="270000"/>
+          </a:xfrm>
+          <a:prstGeom prst="roundRect">
+            <a:avLst>
+              <a:gd name="adj" fmla="val 5385"/>
+            </a:avLst>
+          </a:prstGeom>
+          <a:noFill/>
+          <a:ln w="57150">
+            <a:solidFill>
+              <a:schemeClr val="tx1"/>
+            </a:solidFill>
+            <a:prstDash val="solid"/>
+          </a:ln>
+        </p:spPr>
+        <p:style>
+          <a:lnRef idx="2">
+            <a:schemeClr val="accent1">
+              <a:shade val="50000"/>
+            </a:schemeClr>
+          </a:lnRef>
+          <a:fillRef idx="1">
+            <a:schemeClr val="accent1"/>
+          </a:fillRef>
+          <a:effectRef idx="0">
+            <a:schemeClr val="accent1"/>
+          </a:effectRef>
+          <a:fontRef idx="minor">
+            <a:schemeClr val="lt1"/>
+          </a:fontRef>
+        </p:style>
+        <p:txBody>
+          <a:bodyPr rtlCol="0" anchor="t"/>
+          <a:lstStyle/>
+          <a:p>
+            <a:pPr algn="ctr"/>
+            <a:endParaRPr lang="en-US" sz="2799" b="1" dirty="0">
+              <a:solidFill>
+                <a:srgbClr val="FBEEDC"/>
+              </a:solidFill>
+              <a:effectLst>
+                <a:outerShdw blurRad="38100" dist="38100" dir="2700000" algn="tl">
+                  <a:srgbClr val="000000">
+                    <a:alpha val="43137"/>
+                  </a:srgbClr>
+                </a:outerShdw>
+              </a:effectLst>
+              <a:latin typeface="Consolas" panose="020B0609020204030204" pitchFamily="49" charset="0"/>
+            </a:endParaRPr>
+          </a:p>
+        </p:txBody>
+      </p:sp>
+    </p:spTree>
+    <p:extLst>
+      <p:ext uri="{BB962C8B-B14F-4D97-AF65-F5344CB8AC3E}">
+        <p14:creationId xmlns:p14="http://schemas.microsoft.com/office/powerpoint/2010/main" val="1678105520"/>
+      </p:ext>
+    </p:extLst>
+  </p:cSld>
+  <p:clrMapOvr>
+    <a:masterClrMapping/>
+  </p:clrMapOvr>
+  <mc:AlternateContent xmlns:mc="http://schemas.openxmlformats.org/markup-compatibility/2006" xmlns:p14="http://schemas.microsoft.com/office/powerpoint/2010/main">
+    <mc:Choice Requires="p14">
+      <p:transition spd="slow" p14:dur="2000" advClick="0" advTm="5000"/>
+    </mc:Choice>
+    <mc:Fallback xmlns="">
+      <p:transition spd="slow" advClick="0" advTm="5000"/>
+    </mc:Fallback>
+  </mc:AlternateContent>
+  <p:timing>
+    <p:tnLst>
+      <p:par>
+        <p:cTn id="1" dur="indefinite" restart="never" nodeType="tmRoot">
+          <p:childTnLst>
+            <p:seq concurrent="1" nextAc="seek">
+              <p:cTn id="2" dur="indefinite" nodeType="mainSeq">
+                <p:childTnLst>
+                  <p:par>
+                    <p:cTn id="3" fill="hold">
+                      <p:stCondLst>
+                        <p:cond delay="indefinite"/>
+                      </p:stCondLst>
+                      <p:childTnLst>
+                        <p:par>
+                          <p:cTn id="4" fill="hold">
+                            <p:stCondLst>
+                              <p:cond delay="0"/>
+                            </p:stCondLst>
+                            <p:childTnLst>
+                              <p:par>
+                                <p:cTn id="5" presetID="1" presetClass="entr" presetSubtype="0" fill="hold" grpId="0" nodeType="clickEffect">
+                                  <p:stCondLst>
+                                    <p:cond delay="0"/>
+                                  </p:stCondLst>
+                                  <p:childTnLst>
+                                    <p:set>
+                                      <p:cBhvr>
+                                        <p:cTn id="6" dur="1" fill="hold">
+                                          <p:stCondLst>
+                                            <p:cond delay="0"/>
+                                          </p:stCondLst>
+                                        </p:cTn>
+                                        <p:tgtEl>
+                                          <p:spTgt spid="11"/>
+                                        </p:tgtEl>
+                                        <p:attrNameLst>
+                                          <p:attrName>style.visibility</p:attrName>
+                                        </p:attrNameLst>
+                                      </p:cBhvr>
+                                      <p:to>
+                                        <p:strVal val="visible"/>
+                                      </p:to>
+                                    </p:set>
+                                  </p:childTnLst>
+                                </p:cTn>
+                              </p:par>
+                            </p:childTnLst>
+                          </p:cTn>
+                        </p:par>
+                      </p:childTnLst>
+                    </p:cTn>
+                  </p:par>
+                  <p:par>
+                    <p:cTn id="7" fill="hold">
+                      <p:stCondLst>
+                        <p:cond delay="indefinite"/>
+                      </p:stCondLst>
+                      <p:childTnLst>
+                        <p:par>
+                          <p:cTn id="8" fill="hold">
+                            <p:stCondLst>
+                              <p:cond delay="0"/>
+                            </p:stCondLst>
+                            <p:childTnLst>
+                              <p:par>
+                                <p:cTn id="9" presetID="1" presetClass="entr" presetSubtype="0" fill="hold" nodeType="clickEffect">
+                                  <p:stCondLst>
+                                    <p:cond delay="0"/>
+                                  </p:stCondLst>
+                                  <p:childTnLst>
+                                    <p:set>
+                                      <p:cBhvr>
+                                        <p:cTn id="10" dur="1" fill="hold">
+                                          <p:stCondLst>
+                                            <p:cond delay="0"/>
+                                          </p:stCondLst>
+                                        </p:cTn>
+                                        <p:tgtEl>
+                                          <p:spTgt spid="3">
+                                            <p:txEl>
+                                              <p:pRg st="5" end="5"/>
+                                            </p:txEl>
+                                          </p:spTgt>
+                                        </p:tgtEl>
+                                        <p:attrNameLst>
+                                          <p:attrName>style.visibility</p:attrName>
+                                        </p:attrNameLst>
+                                      </p:cBhvr>
+                                      <p:to>
+                                        <p:strVal val="visible"/>
+                                      </p:to>
+                                    </p:set>
+                                  </p:childTnLst>
+                                </p:cTn>
+                              </p:par>
+                              <p:par>
+                                <p:cTn id="11" presetID="1" presetClass="entr" presetSubtype="0" fill="hold" nodeType="withEffect">
+                                  <p:stCondLst>
+                                    <p:cond delay="0"/>
+                                  </p:stCondLst>
+                                  <p:childTnLst>
+                                    <p:set>
+                                      <p:cBhvr>
+                                        <p:cTn id="12" dur="1" fill="hold">
+                                          <p:stCondLst>
+                                            <p:cond delay="0"/>
+                                          </p:stCondLst>
+                                        </p:cTn>
+                                        <p:tgtEl>
+                                          <p:spTgt spid="3">
+                                            <p:txEl>
+                                              <p:pRg st="6" end="6"/>
+                                            </p:txEl>
+                                          </p:spTgt>
+                                        </p:tgtEl>
+                                        <p:attrNameLst>
+                                          <p:attrName>style.visibility</p:attrName>
+                                        </p:attrNameLst>
+                                      </p:cBhvr>
+                                      <p:to>
+                                        <p:strVal val="visible"/>
+                                      </p:to>
+                                    </p:set>
+                                  </p:childTnLst>
+                                </p:cTn>
+                              </p:par>
+                            </p:childTnLst>
+                          </p:cTn>
+                        </p:par>
+                      </p:childTnLst>
+                    </p:cTn>
+                  </p:par>
+                </p:childTnLst>
+              </p:cTn>
+              <p:prevCondLst>
+                <p:cond evt="onPrev" delay="0">
+                  <p:tgtEl>
+                    <p:sldTgt/>
+                  </p:tgtEl>
+                </p:cond>
+              </p:prevCondLst>
+              <p:nextCondLst>
+                <p:cond evt="onNext" delay="0">
+                  <p:tgtEl>
+                    <p:sldTgt/>
+                  </p:tgtEl>
+                </p:cond>
+              </p:nextCondLst>
+            </p:seq>
+          </p:childTnLst>
+        </p:cTn>
+      </p:par>
+    </p:tnLst>
+    <p:bldLst>
+      <p:bldP spid="11" grpId="0" animBg="1"/>
+    </p:bldLst>
+  </p:timing>
+</p:sld>
+</file>
+
+<file path=ppt/slides/slide23.xml><?xml version="1.0" encoding="utf-8"?>
+<p:sld xmlns:a="http://schemas.openxmlformats.org/drawingml/2006/main" xmlns:r="http://schemas.openxmlformats.org/officeDocument/2006/relationships" xmlns:p="http://schemas.openxmlformats.org/presentationml/2006/main">
+  <p:cSld>
+    <p:spTree>
+      <p:nvGrpSpPr>
+        <p:cNvPr id="1" name=""/>
+        <p:cNvGrpSpPr/>
+        <p:nvPr/>
+      </p:nvGrpSpPr>
+      <p:grpSpPr>
+        <a:xfrm>
+          <a:off x="0" y="0"/>
+          <a:ext cx="0" cy="0"/>
+          <a:chOff x="0" y="0"/>
+          <a:chExt cx="0" cy="0"/>
+        </a:xfrm>
+      </p:grpSpPr>
+      <p:sp>
+        <p:nvSpPr>
+          <p:cNvPr id="2" name="Slide Number Placeholder 1">
+            <a:extLst>
+              <a:ext uri="{FF2B5EF4-FFF2-40B4-BE49-F238E27FC236}">
+                <a16:creationId xmlns:a16="http://schemas.microsoft.com/office/drawing/2014/main" id="{3B9296B9-F998-DA51-13F5-A1CE07C7BA00}"/>
+              </a:ext>
+            </a:extLst>
+          </p:cNvPr>
+          <p:cNvSpPr>
+            <a:spLocks noGrp="1"/>
+          </p:cNvSpPr>
+          <p:nvPr>
+            <p:ph type="sldNum" sz="quarter" idx="5"/>
+          </p:nvPr>
+        </p:nvSpPr>
+        <p:spPr/>
+        <p:txBody>
+          <a:bodyPr/>
+          <a:lstStyle/>
+          <a:p>
+            <a:fld id="{2BF067CD-8E6B-4360-9AA8-C5DF2A48A6D1}" type="slidenum">
+              <a:rPr lang="en-US" noProof="0" smtClean="0"/>
+              <a:pPr/>
+              <a:t>23</a:t>
+            </a:fld>
+            <a:endParaRPr lang="en-US" noProof="0" dirty="0"/>
+          </a:p>
+        </p:txBody>
+      </p:sp>
+      <p:sp>
+        <p:nvSpPr>
+          <p:cNvPr id="3" name="Text Placeholder 2">
+            <a:extLst>
+              <a:ext uri="{FF2B5EF4-FFF2-40B4-BE49-F238E27FC236}">
+                <a16:creationId xmlns:a16="http://schemas.microsoft.com/office/drawing/2014/main" id="{908F889F-D1B9-BFDF-A37C-15D9538E3CD8}"/>
+              </a:ext>
+            </a:extLst>
+          </p:cNvPr>
+          <p:cNvSpPr>
+            <a:spLocks noGrp="1"/>
+          </p:cNvSpPr>
+          <p:nvPr>
+            <p:ph type="body" sz="quarter" idx="10"/>
+          </p:nvPr>
+        </p:nvSpPr>
+        <p:spPr/>
+        <p:txBody>
+          <a:bodyPr/>
+          <a:lstStyle/>
+          <a:p>
+            <a:r>
+              <a:rPr lang="bg-BG" dirty="0"/>
+              <a:t>Селектираме и </a:t>
+            </a:r>
+            <a:r>
+              <a:rPr lang="bg-BG" b="1" dirty="0">
+                <a:solidFill>
+                  <a:schemeClr val="bg1"/>
+                </a:solidFill>
+              </a:rPr>
+              <a:t>двете</a:t>
+            </a:r>
+            <a:r>
+              <a:rPr lang="bg-BG" dirty="0"/>
+              <a:t> таблици, след което натискаме </a:t>
+            </a:r>
+            <a:r>
+              <a:rPr lang="en-US" dirty="0"/>
+              <a:t>[</a:t>
+            </a:r>
+            <a:r>
+              <a:rPr lang="en-US" b="1" dirty="0">
+                <a:latin typeface="Consolas" panose="020B0609020204030204" pitchFamily="49" charset="0"/>
+              </a:rPr>
+              <a:t>Add</a:t>
+            </a:r>
+            <a:r>
+              <a:rPr lang="en-US" dirty="0"/>
+              <a:t>]</a:t>
+            </a:r>
+          </a:p>
+        </p:txBody>
+      </p:sp>
+      <p:sp>
+        <p:nvSpPr>
+          <p:cNvPr id="4" name="Title 3">
+            <a:extLst>
+              <a:ext uri="{FF2B5EF4-FFF2-40B4-BE49-F238E27FC236}">
+                <a16:creationId xmlns:a16="http://schemas.microsoft.com/office/drawing/2014/main" id="{5ABE97FC-003F-BAFD-FD2A-BF31B4CC25A3}"/>
+              </a:ext>
+            </a:extLst>
+          </p:cNvPr>
+          <p:cNvSpPr>
+            <a:spLocks noGrp="1"/>
+          </p:cNvSpPr>
+          <p:nvPr>
+            <p:ph type="title"/>
+          </p:nvPr>
+        </p:nvSpPr>
+        <p:spPr/>
+        <p:txBody>
+          <a:bodyPr/>
+          <a:lstStyle/>
+          <a:p>
+            <a:r>
+              <a:rPr lang="bg-BG" dirty="0"/>
+              <a:t>Създаване на връзка между таблици (2)</a:t>
+            </a:r>
+            <a:endParaRPr lang="en-US" dirty="0"/>
+          </a:p>
+        </p:txBody>
+      </p:sp>
+      <p:pic>
+        <p:nvPicPr>
+          <p:cNvPr id="9" name="Picture 8">
+            <a:extLst>
+              <a:ext uri="{FF2B5EF4-FFF2-40B4-BE49-F238E27FC236}">
+                <a16:creationId xmlns:a16="http://schemas.microsoft.com/office/drawing/2014/main" id="{0541ADAC-06E1-F878-BE2C-4EA951AC500E}"/>
+              </a:ext>
+            </a:extLst>
+          </p:cNvPr>
+          <p:cNvPicPr>
+            <a:picLocks noChangeAspect="1"/>
+          </p:cNvPicPr>
+          <p:nvPr/>
+        </p:nvPicPr>
+        <p:blipFill>
+          <a:blip r:embed="rId2"/>
+          <a:stretch>
+            <a:fillRect/>
+          </a:stretch>
+        </p:blipFill>
+        <p:spPr>
+          <a:xfrm>
+            <a:off x="3666000" y="2349000"/>
+            <a:ext cx="4553585" cy="3629532"/>
+          </a:xfrm>
+          <a:prstGeom prst="rect">
+            <a:avLst/>
+          </a:prstGeom>
+        </p:spPr>
+      </p:pic>
+      <p:sp>
+        <p:nvSpPr>
+          <p:cNvPr id="10" name="Rectangle: Rounded Corners 9">
+            <a:extLst>
+              <a:ext uri="{FF2B5EF4-FFF2-40B4-BE49-F238E27FC236}">
+                <a16:creationId xmlns:a16="http://schemas.microsoft.com/office/drawing/2014/main" id="{ADCFBC79-FFAA-771A-6407-E630F9BA896B}"/>
+              </a:ext>
+            </a:extLst>
+          </p:cNvPr>
+          <p:cNvSpPr/>
+          <p:nvPr/>
+        </p:nvSpPr>
+        <p:spPr>
+          <a:xfrm>
+            <a:off x="6321000" y="5526875"/>
+            <a:ext cx="855000" cy="270000"/>
+          </a:xfrm>
+          <a:prstGeom prst="roundRect">
+            <a:avLst>
+              <a:gd name="adj" fmla="val 5385"/>
+            </a:avLst>
+          </a:prstGeom>
+          <a:noFill/>
+          <a:ln w="57150">
+            <a:solidFill>
+              <a:schemeClr val="tx1"/>
+            </a:solidFill>
+            <a:prstDash val="solid"/>
+          </a:ln>
+        </p:spPr>
+        <p:style>
+          <a:lnRef idx="2">
+            <a:schemeClr val="accent1">
+              <a:shade val="50000"/>
+            </a:schemeClr>
+          </a:lnRef>
+          <a:fillRef idx="1">
+            <a:schemeClr val="accent1"/>
+          </a:fillRef>
+          <a:effectRef idx="0">
+            <a:schemeClr val="accent1"/>
+          </a:effectRef>
+          <a:fontRef idx="minor">
+            <a:schemeClr val="lt1"/>
+          </a:fontRef>
+        </p:style>
+        <p:txBody>
+          <a:bodyPr rtlCol="0" anchor="t"/>
+          <a:lstStyle/>
+          <a:p>
+            <a:pPr algn="ctr"/>
+            <a:endParaRPr lang="en-US" sz="2799" b="1" dirty="0">
+              <a:solidFill>
+                <a:srgbClr val="FBEEDC"/>
+              </a:solidFill>
+              <a:effectLst>
+                <a:outerShdw blurRad="38100" dist="38100" dir="2700000" algn="tl">
+                  <a:srgbClr val="000000">
+                    <a:alpha val="43137"/>
+                  </a:srgbClr>
+                </a:outerShdw>
+              </a:effectLst>
+              <a:latin typeface="Consolas" panose="020B0609020204030204" pitchFamily="49" charset="0"/>
+            </a:endParaRPr>
+          </a:p>
+        </p:txBody>
+      </p:sp>
+    </p:spTree>
+    <p:extLst>
+      <p:ext uri="{BB962C8B-B14F-4D97-AF65-F5344CB8AC3E}">
+        <p14:creationId xmlns:p14="http://schemas.microsoft.com/office/powerpoint/2010/main" val="3530684885"/>
+      </p:ext>
+    </p:extLst>
+  </p:cSld>
+  <p:clrMapOvr>
+    <a:masterClrMapping/>
+  </p:clrMapOvr>
+  <mc:AlternateContent xmlns:mc="http://schemas.openxmlformats.org/markup-compatibility/2006" xmlns:p14="http://schemas.microsoft.com/office/powerpoint/2010/main">
+    <mc:Choice Requires="p14">
+      <p:transition spd="slow" p14:dur="2000" advClick="0" advTm="5000"/>
+    </mc:Choice>
+    <mc:Fallback xmlns="">
+      <p:transition spd="slow" advClick="0" advTm="5000"/>
+    </mc:Fallback>
+  </mc:AlternateContent>
+  <p:timing>
+    <p:tnLst>
+      <p:par>
+        <p:cTn id="1" dur="indefinite" restart="never" nodeType="tmRoot">
+          <p:childTnLst>
+            <p:seq concurrent="1" nextAc="seek">
+              <p:cTn id="2" dur="indefinite" nodeType="mainSeq">
+                <p:childTnLst>
+                  <p:par>
+                    <p:cTn id="3" fill="hold">
+                      <p:stCondLst>
+                        <p:cond delay="indefinite"/>
+                      </p:stCondLst>
+                      <p:childTnLst>
+                        <p:par>
+                          <p:cTn id="4" fill="hold">
+                            <p:stCondLst>
+                              <p:cond delay="0"/>
+                            </p:stCondLst>
+                            <p:childTnLst>
+                              <p:par>
+                                <p:cTn id="5" presetID="1" presetClass="entr" presetSubtype="0" fill="hold" grpId="0" nodeType="clickEffect">
+                                  <p:stCondLst>
+                                    <p:cond delay="0"/>
+                                  </p:stCondLst>
+                                  <p:childTnLst>
+                                    <p:set>
+                                      <p:cBhvr>
+                                        <p:cTn id="6" dur="1" fill="hold">
+                                          <p:stCondLst>
+                                            <p:cond delay="0"/>
+                                          </p:stCondLst>
+                                        </p:cTn>
+                                        <p:tgtEl>
+                                          <p:spTgt spid="10"/>
+                                        </p:tgtEl>
+                                        <p:attrNameLst>
+                                          <p:attrName>style.visibility</p:attrName>
+                                        </p:attrNameLst>
+                                      </p:cBhvr>
+                                      <p:to>
+                                        <p:strVal val="visible"/>
+                                      </p:to>
+                                    </p:set>
+                                  </p:childTnLst>
+                                </p:cTn>
+                              </p:par>
+                            </p:childTnLst>
+                          </p:cTn>
+                        </p:par>
+                      </p:childTnLst>
+                    </p:cTn>
+                  </p:par>
+                </p:childTnLst>
+              </p:cTn>
+              <p:prevCondLst>
+                <p:cond evt="onPrev" delay="0">
+                  <p:tgtEl>
+                    <p:sldTgt/>
+                  </p:tgtEl>
+                </p:cond>
+              </p:prevCondLst>
+              <p:nextCondLst>
+                <p:cond evt="onNext" delay="0">
+                  <p:tgtEl>
+                    <p:sldTgt/>
+                  </p:tgtEl>
+                </p:cond>
+              </p:nextCondLst>
+            </p:seq>
+          </p:childTnLst>
+        </p:cTn>
+      </p:par>
+    </p:tnLst>
+    <p:bldLst>
+      <p:bldP spid="10" grpId="0" animBg="1"/>
+    </p:bldLst>
+  </p:timing>
+</p:sld>
+</file>
+
+<file path=ppt/slides/slide24.xml><?xml version="1.0" encoding="utf-8"?>
+<p:sld xmlns:a="http://schemas.openxmlformats.org/drawingml/2006/main" xmlns:r="http://schemas.openxmlformats.org/officeDocument/2006/relationships" xmlns:p="http://schemas.openxmlformats.org/presentationml/2006/main">
+  <p:cSld>
+    <p:spTree>
+      <p:nvGrpSpPr>
+        <p:cNvPr id="1" name=""/>
+        <p:cNvGrpSpPr/>
+        <p:nvPr/>
+      </p:nvGrpSpPr>
+      <p:grpSpPr>
+        <a:xfrm>
+          <a:off x="0" y="0"/>
+          <a:ext cx="0" cy="0"/>
+          <a:chOff x="0" y="0"/>
+          <a:chExt cx="0" cy="0"/>
+        </a:xfrm>
+      </p:grpSpPr>
+      <p:sp>
+        <p:nvSpPr>
+          <p:cNvPr id="2" name="Slide Number Placeholder 1">
+            <a:extLst>
+              <a:ext uri="{FF2B5EF4-FFF2-40B4-BE49-F238E27FC236}">
+                <a16:creationId xmlns:a16="http://schemas.microsoft.com/office/drawing/2014/main" id="{3B9296B9-F998-DA51-13F5-A1CE07C7BA00}"/>
+              </a:ext>
+            </a:extLst>
+          </p:cNvPr>
+          <p:cNvSpPr>
+            <a:spLocks noGrp="1"/>
+          </p:cNvSpPr>
+          <p:nvPr>
+            <p:ph type="sldNum" sz="quarter" idx="5"/>
+          </p:nvPr>
+        </p:nvSpPr>
+        <p:spPr/>
+        <p:txBody>
+          <a:bodyPr/>
+          <a:lstStyle/>
+          <a:p>
+            <a:fld id="{2BF067CD-8E6B-4360-9AA8-C5DF2A48A6D1}" type="slidenum">
+              <a:rPr lang="en-US" noProof="0" smtClean="0"/>
+              <a:pPr/>
+              <a:t>24</a:t>
+            </a:fld>
+            <a:endParaRPr lang="en-US" noProof="0" dirty="0"/>
+          </a:p>
+        </p:txBody>
+      </p:sp>
+      <p:sp>
+        <p:nvSpPr>
+          <p:cNvPr id="3" name="Text Placeholder 2">
+            <a:extLst>
+              <a:ext uri="{FF2B5EF4-FFF2-40B4-BE49-F238E27FC236}">
+                <a16:creationId xmlns:a16="http://schemas.microsoft.com/office/drawing/2014/main" id="{908F889F-D1B9-BFDF-A37C-15D9538E3CD8}"/>
+              </a:ext>
+            </a:extLst>
+          </p:cNvPr>
+          <p:cNvSpPr>
+            <a:spLocks noGrp="1"/>
+          </p:cNvSpPr>
+          <p:nvPr>
+            <p:ph type="body" sz="quarter" idx="10"/>
+          </p:nvPr>
+        </p:nvSpPr>
+        <p:spPr/>
+        <p:txBody>
+          <a:bodyPr/>
+          <a:lstStyle/>
+          <a:p>
+            <a:r>
+              <a:rPr lang="bg-BG" dirty="0"/>
+              <a:t>Визуализират се таблиците </a:t>
+            </a:r>
+            <a:r>
+              <a:rPr lang="en-US" dirty="0"/>
+              <a:t>"</a:t>
+            </a:r>
+            <a:r>
+              <a:rPr lang="en-US" b="1" dirty="0"/>
+              <a:t>Students</a:t>
+            </a:r>
+            <a:r>
+              <a:rPr lang="en-US" dirty="0"/>
+              <a:t>"</a:t>
+            </a:r>
+            <a:r>
+              <a:rPr lang="bg-BG" dirty="0"/>
+              <a:t> и </a:t>
+            </a:r>
+            <a:r>
+              <a:rPr lang="en-US" dirty="0"/>
+              <a:t>"</a:t>
+            </a:r>
+            <a:r>
+              <a:rPr lang="en-US" b="1" dirty="0"/>
+              <a:t>Enrollments</a:t>
+            </a:r>
+            <a:r>
+              <a:rPr lang="en-US" dirty="0"/>
+              <a:t>"</a:t>
+            </a:r>
+          </a:p>
+          <a:p>
+            <a:endParaRPr lang="en-US" dirty="0"/>
+          </a:p>
+          <a:p>
+            <a:endParaRPr lang="en-US" dirty="0"/>
+          </a:p>
+          <a:p>
+            <a:endParaRPr lang="en-US" dirty="0"/>
+          </a:p>
+          <a:p>
+            <a:endParaRPr lang="en-US" dirty="0"/>
+          </a:p>
+          <a:p>
+            <a:endParaRPr lang="en-US" dirty="0"/>
+          </a:p>
+          <a:p>
+            <a:r>
+              <a:rPr lang="bg-BG" dirty="0"/>
+              <a:t>В момента </a:t>
+            </a:r>
+            <a:r>
+              <a:rPr lang="bg-BG" b="1" dirty="0">
+                <a:solidFill>
+                  <a:schemeClr val="bg1"/>
+                </a:solidFill>
+              </a:rPr>
+              <a:t>няма връзка между тях </a:t>
+            </a:r>
+            <a:r>
+              <a:rPr lang="bg-BG" dirty="0"/>
+              <a:t>и предстои да </a:t>
+            </a:r>
+            <a:r>
+              <a:rPr lang="bg-BG" b="1" dirty="0">
+                <a:solidFill>
+                  <a:schemeClr val="bg1"/>
+                </a:solidFill>
+              </a:rPr>
+              <a:t>създадем</a:t>
+            </a:r>
+            <a:r>
+              <a:rPr lang="bg-BG" dirty="0"/>
+              <a:t> такава</a:t>
+            </a:r>
+            <a:endParaRPr lang="en-US" dirty="0"/>
+          </a:p>
+        </p:txBody>
+      </p:sp>
+      <p:sp>
+        <p:nvSpPr>
+          <p:cNvPr id="4" name="Title 3">
+            <a:extLst>
+              <a:ext uri="{FF2B5EF4-FFF2-40B4-BE49-F238E27FC236}">
+                <a16:creationId xmlns:a16="http://schemas.microsoft.com/office/drawing/2014/main" id="{5ABE97FC-003F-BAFD-FD2A-BF31B4CC25A3}"/>
+              </a:ext>
+            </a:extLst>
+          </p:cNvPr>
+          <p:cNvSpPr>
+            <a:spLocks noGrp="1"/>
+          </p:cNvSpPr>
+          <p:nvPr>
+            <p:ph type="title"/>
+          </p:nvPr>
+        </p:nvSpPr>
+        <p:spPr/>
+        <p:txBody>
+          <a:bodyPr/>
+          <a:lstStyle/>
+          <a:p>
+            <a:r>
+              <a:rPr lang="bg-BG" dirty="0"/>
+              <a:t>Създаване на връзка между таблици (</a:t>
+            </a:r>
+            <a:r>
+              <a:rPr lang="en-US" dirty="0"/>
+              <a:t>3</a:t>
+            </a:r>
+            <a:r>
+              <a:rPr lang="bg-BG" dirty="0"/>
+              <a:t>)</a:t>
+            </a:r>
+            <a:endParaRPr lang="en-US" dirty="0"/>
+          </a:p>
+        </p:txBody>
+      </p:sp>
+      <p:pic>
+        <p:nvPicPr>
+          <p:cNvPr id="6" name="Picture 5">
+            <a:extLst>
+              <a:ext uri="{FF2B5EF4-FFF2-40B4-BE49-F238E27FC236}">
+                <a16:creationId xmlns:a16="http://schemas.microsoft.com/office/drawing/2014/main" id="{9FF921E8-1579-5976-1A99-51F642421F14}"/>
+              </a:ext>
+            </a:extLst>
+          </p:cNvPr>
+          <p:cNvPicPr>
+            <a:picLocks noChangeAspect="1"/>
+          </p:cNvPicPr>
+          <p:nvPr/>
+        </p:nvPicPr>
+        <p:blipFill>
+          <a:blip r:embed="rId2"/>
+          <a:stretch>
+            <a:fillRect/>
+          </a:stretch>
+        </p:blipFill>
+        <p:spPr>
+          <a:xfrm>
+            <a:off x="2586669" y="2304000"/>
+            <a:ext cx="7018662" cy="2655000"/>
+          </a:xfrm>
+          <a:prstGeom prst="rect">
+            <a:avLst/>
+          </a:prstGeom>
+          <a:ln>
+            <a:solidFill>
+              <a:schemeClr val="bg2">
+                <a:lumMod val="75000"/>
+              </a:schemeClr>
+            </a:solidFill>
+          </a:ln>
+        </p:spPr>
+      </p:pic>
+    </p:spTree>
+    <p:extLst>
+      <p:ext uri="{BB962C8B-B14F-4D97-AF65-F5344CB8AC3E}">
+        <p14:creationId xmlns:p14="http://schemas.microsoft.com/office/powerpoint/2010/main" val="2387439982"/>
+      </p:ext>
+    </p:extLst>
+  </p:cSld>
+  <p:clrMapOvr>
+    <a:masterClrMapping/>
+  </p:clrMapOvr>
+  <mc:AlternateContent xmlns:mc="http://schemas.openxmlformats.org/markup-compatibility/2006" xmlns:p14="http://schemas.microsoft.com/office/powerpoint/2010/main">
+    <mc:Choice Requires="p14">
+      <p:transition spd="slow" p14:dur="2000" advClick="0" advTm="5000"/>
+    </mc:Choice>
+    <mc:Fallback xmlns="">
+      <p:transition spd="slow" advClick="0" advTm="5000"/>
+    </mc:Fallback>
+  </mc:AlternateContent>
+  <p:timing>
+    <p:tnLst>
+      <p:par>
+        <p:cTn id="1" dur="indefinite" restart="never" nodeType="tmRoot">
+          <p:childTnLst>
+            <p:seq concurrent="1" nextAc="seek">
+              <p:cTn id="2" dur="indefinite" nodeType="mainSeq">
+                <p:childTnLst>
+                  <p:par>
+                    <p:cTn id="3" fill="hold">
+                      <p:stCondLst>
+                        <p:cond delay="indefinite"/>
+                      </p:stCondLst>
+                      <p:childTnLst>
+                        <p:par>
+                          <p:cTn id="4" fill="hold">
+                            <p:stCondLst>
+                              <p:cond delay="0"/>
+                            </p:stCondLst>
+                            <p:childTnLst>
+                              <p:par>
+                                <p:cTn id="5" presetID="1" presetClass="entr" presetSubtype="0" fill="hold" nodeType="clickEffect">
+                                  <p:stCondLst>
+                                    <p:cond delay="0"/>
+                                  </p:stCondLst>
+                                  <p:childTnLst>
+                                    <p:set>
+                                      <p:cBhvr>
+                                        <p:cTn id="6" dur="1" fill="hold">
+                                          <p:stCondLst>
+                                            <p:cond delay="0"/>
+                                          </p:stCondLst>
+                                        </p:cTn>
+                                        <p:tgtEl>
+                                          <p:spTgt spid="3">
+                                            <p:txEl>
+                                              <p:pRg st="6" end="6"/>
+                                            </p:txEl>
+                                          </p:spTgt>
+                                        </p:tgtEl>
+                                        <p:attrNameLst>
+                                          <p:attrName>style.visibility</p:attrName>
+                                        </p:attrNameLst>
+                                      </p:cBhvr>
+                                      <p:to>
+                                        <p:strVal val="visible"/>
+                                      </p:to>
+                                    </p:set>
+                                  </p:childTnLst>
+                                </p:cTn>
+                              </p:par>
+                            </p:childTnLst>
+                          </p:cTn>
+                        </p:par>
+                      </p:childTnLst>
+                    </p:cTn>
+                  </p:par>
+                </p:childTnLst>
+              </p:cTn>
+              <p:prevCondLst>
+                <p:cond evt="onPrev" delay="0">
+                  <p:tgtEl>
+                    <p:sldTgt/>
+                  </p:tgtEl>
+                </p:cond>
+              </p:prevCondLst>
+              <p:nextCondLst>
+                <p:cond evt="onNext" delay="0">
+                  <p:tgtEl>
+                    <p:sldTgt/>
+                  </p:tgtEl>
+                </p:cond>
+              </p:nextCondLst>
+            </p:seq>
+          </p:childTnLst>
+        </p:cTn>
+      </p:par>
+    </p:tnLst>
+  </p:timing>
+</p:sld>
+</file>
+
+<file path=ppt/slides/slide25.xml><?xml version="1.0" encoding="utf-8"?>
+<p:sld xmlns:a="http://schemas.openxmlformats.org/drawingml/2006/main" xmlns:r="http://schemas.openxmlformats.org/officeDocument/2006/relationships" xmlns:p="http://schemas.openxmlformats.org/presentationml/2006/main">
+  <p:cSld>
+    <p:spTree>
+      <p:nvGrpSpPr>
+        <p:cNvPr id="1" name=""/>
+        <p:cNvGrpSpPr/>
+        <p:nvPr/>
+      </p:nvGrpSpPr>
+      <p:grpSpPr>
+        <a:xfrm>
+          <a:off x="0" y="0"/>
+          <a:ext cx="0" cy="0"/>
+          <a:chOff x="0" y="0"/>
+          <a:chExt cx="0" cy="0"/>
+        </a:xfrm>
+      </p:grpSpPr>
+      <p:sp>
+        <p:nvSpPr>
+          <p:cNvPr id="2" name="Slide Number Placeholder 1">
+            <a:extLst>
+              <a:ext uri="{FF2B5EF4-FFF2-40B4-BE49-F238E27FC236}">
+                <a16:creationId xmlns:a16="http://schemas.microsoft.com/office/drawing/2014/main" id="{30C89A89-44A2-5386-AB44-822BF79E090A}"/>
+              </a:ext>
+            </a:extLst>
+          </p:cNvPr>
+          <p:cNvSpPr>
+            <a:spLocks noGrp="1"/>
+          </p:cNvSpPr>
+          <p:nvPr>
+            <p:ph type="sldNum" sz="quarter" idx="5"/>
+          </p:nvPr>
+        </p:nvSpPr>
+        <p:spPr/>
+        <p:txBody>
+          <a:bodyPr/>
+          <a:lstStyle/>
+          <a:p>
+            <a:fld id="{2BF067CD-8E6B-4360-9AA8-C5DF2A48A6D1}" type="slidenum">
+              <a:rPr lang="en-US" noProof="0" smtClean="0"/>
+              <a:pPr/>
+              <a:t>25</a:t>
+            </a:fld>
+            <a:endParaRPr lang="en-US" noProof="0" dirty="0"/>
+          </a:p>
+        </p:txBody>
+      </p:sp>
+      <p:sp>
+        <p:nvSpPr>
+          <p:cNvPr id="3" name="Text Placeholder 2">
+            <a:extLst>
+              <a:ext uri="{FF2B5EF4-FFF2-40B4-BE49-F238E27FC236}">
+                <a16:creationId xmlns:a16="http://schemas.microsoft.com/office/drawing/2014/main" id="{FD11FFCF-8B42-3BDA-3332-504AF3BCF20E}"/>
+              </a:ext>
+            </a:extLst>
+          </p:cNvPr>
+          <p:cNvSpPr>
+            <a:spLocks noGrp="1"/>
+          </p:cNvSpPr>
+          <p:nvPr>
+            <p:ph type="body" sz="quarter" idx="10"/>
+          </p:nvPr>
+        </p:nvSpPr>
+        <p:spPr/>
+        <p:txBody>
+          <a:bodyPr/>
+          <a:lstStyle/>
+          <a:p>
+            <a:r>
+              <a:rPr lang="bg-BG" dirty="0"/>
+              <a:t>Натискаме върху колоната </a:t>
+            </a:r>
+            <a:r>
+              <a:rPr lang="en-US" dirty="0">
+                <a:latin typeface="+mj-lt"/>
+              </a:rPr>
+              <a:t>"</a:t>
+            </a:r>
+            <a:r>
+              <a:rPr lang="en-US" b="1" dirty="0">
+                <a:latin typeface="Consolas" panose="020B0609020204030204" pitchFamily="49" charset="0"/>
+              </a:rPr>
+              <a:t>StudentId</a:t>
+            </a:r>
+            <a:r>
+              <a:rPr lang="en-US" dirty="0">
+                <a:latin typeface="+mj-lt"/>
+              </a:rPr>
+              <a:t>"</a:t>
+            </a:r>
+            <a:r>
+              <a:rPr lang="en-US" dirty="0"/>
+              <a:t> </a:t>
+            </a:r>
+            <a:r>
+              <a:rPr lang="bg-BG" dirty="0"/>
+              <a:t>в таблицата </a:t>
+            </a:r>
+            <a:r>
+              <a:rPr lang="en-US" dirty="0"/>
+              <a:t>"</a:t>
+            </a:r>
+            <a:r>
+              <a:rPr lang="en-US" b="1" dirty="0"/>
+              <a:t>Enrollments</a:t>
+            </a:r>
+            <a:r>
+              <a:rPr lang="en-US" dirty="0"/>
+              <a:t>" </a:t>
+            </a:r>
+            <a:r>
+              <a:rPr lang="bg-BG" dirty="0"/>
+              <a:t>и </a:t>
+            </a:r>
+            <a:r>
+              <a:rPr lang="bg-BG" b="1" dirty="0">
+                <a:solidFill>
+                  <a:schemeClr val="bg1"/>
+                </a:solidFill>
+              </a:rPr>
+              <a:t>задържаме</a:t>
+            </a:r>
+            <a:r>
+              <a:rPr lang="bg-BG" dirty="0"/>
+              <a:t> с мишката върху </a:t>
+            </a:r>
+            <a:r>
+              <a:rPr lang="bg-BG" b="1" dirty="0"/>
+              <a:t>стрелката</a:t>
+            </a:r>
+            <a:r>
+              <a:rPr lang="bg-BG" dirty="0"/>
+              <a:t>, която се показа</a:t>
+            </a:r>
+            <a:endParaRPr lang="en-US" dirty="0"/>
+          </a:p>
+          <a:p>
+            <a:r>
+              <a:rPr lang="bg-BG" dirty="0"/>
+              <a:t>След това </a:t>
+            </a:r>
+            <a:r>
+              <a:rPr lang="bg-BG" b="1" dirty="0">
+                <a:solidFill>
+                  <a:schemeClr val="bg1"/>
+                </a:solidFill>
+              </a:rPr>
+              <a:t>движим</a:t>
+            </a:r>
+            <a:r>
+              <a:rPr lang="bg-BG" dirty="0"/>
+              <a:t> прекъснатата лента до колоната </a:t>
+            </a:r>
+            <a:r>
+              <a:rPr lang="en-US" dirty="0">
+                <a:latin typeface="+mj-lt"/>
+              </a:rPr>
+              <a:t>"</a:t>
+            </a:r>
+            <a:r>
+              <a:rPr lang="en-US" b="1" dirty="0">
+                <a:latin typeface="Consolas" panose="020B0609020204030204" pitchFamily="49" charset="0"/>
+              </a:rPr>
+              <a:t>Id</a:t>
+            </a:r>
+            <a:r>
+              <a:rPr lang="en-US" dirty="0">
+                <a:latin typeface="+mj-lt"/>
+              </a:rPr>
+              <a:t>"</a:t>
+            </a:r>
+            <a:r>
+              <a:rPr lang="en-US" dirty="0"/>
+              <a:t> </a:t>
+            </a:r>
+            <a:r>
+              <a:rPr lang="bg-BG" dirty="0"/>
+              <a:t>в таблицата </a:t>
+            </a:r>
+            <a:r>
+              <a:rPr lang="en-US" dirty="0"/>
+              <a:t>"</a:t>
+            </a:r>
+            <a:r>
+              <a:rPr lang="en-US" b="1" dirty="0"/>
+              <a:t>Students</a:t>
+            </a:r>
+            <a:r>
+              <a:rPr lang="en-US" dirty="0"/>
+              <a:t>"</a:t>
+            </a:r>
+          </a:p>
+        </p:txBody>
+      </p:sp>
+      <p:sp>
+        <p:nvSpPr>
+          <p:cNvPr id="4" name="Title 3">
+            <a:extLst>
+              <a:ext uri="{FF2B5EF4-FFF2-40B4-BE49-F238E27FC236}">
+                <a16:creationId xmlns:a16="http://schemas.microsoft.com/office/drawing/2014/main" id="{8DBC1B8A-4DD9-A2B4-EABA-4CB4513B2EE5}"/>
+              </a:ext>
+            </a:extLst>
+          </p:cNvPr>
+          <p:cNvSpPr>
+            <a:spLocks noGrp="1"/>
+          </p:cNvSpPr>
+          <p:nvPr>
+            <p:ph type="title"/>
+          </p:nvPr>
+        </p:nvSpPr>
+        <p:spPr/>
+        <p:txBody>
+          <a:bodyPr/>
+          <a:lstStyle/>
+          <a:p>
+            <a:r>
+              <a:rPr lang="bg-BG" dirty="0"/>
+              <a:t>Създаване на връзка между таблици (</a:t>
+            </a:r>
+            <a:r>
+              <a:rPr lang="en-US" dirty="0"/>
+              <a:t>4</a:t>
+            </a:r>
+            <a:r>
+              <a:rPr lang="bg-BG" dirty="0"/>
+              <a:t>)</a:t>
+            </a:r>
+            <a:endParaRPr lang="en-US" dirty="0"/>
+          </a:p>
+        </p:txBody>
+      </p:sp>
+      <p:pic>
+        <p:nvPicPr>
+          <p:cNvPr id="6" name="Picture 5">
+            <a:extLst>
+              <a:ext uri="{FF2B5EF4-FFF2-40B4-BE49-F238E27FC236}">
+                <a16:creationId xmlns:a16="http://schemas.microsoft.com/office/drawing/2014/main" id="{0A5041A2-5CEB-89DA-430B-F39095982B54}"/>
+              </a:ext>
+            </a:extLst>
+          </p:cNvPr>
+          <p:cNvPicPr>
+            <a:picLocks noChangeAspect="1"/>
+          </p:cNvPicPr>
+          <p:nvPr/>
+        </p:nvPicPr>
+        <p:blipFill>
+          <a:blip r:embed="rId2"/>
+          <a:stretch>
+            <a:fillRect/>
+          </a:stretch>
+        </p:blipFill>
+        <p:spPr>
+          <a:xfrm>
+            <a:off x="1506000" y="4197347"/>
+            <a:ext cx="2569488" cy="2232875"/>
+          </a:xfrm>
+          <a:prstGeom prst="rect">
+            <a:avLst/>
+          </a:prstGeom>
+          <a:ln>
+            <a:solidFill>
+              <a:schemeClr val="bg2">
+                <a:lumMod val="75000"/>
+              </a:schemeClr>
+            </a:solidFill>
+          </a:ln>
+        </p:spPr>
+      </p:pic>
+      <p:pic>
+        <p:nvPicPr>
+          <p:cNvPr id="8" name="Picture 7">
+            <a:extLst>
+              <a:ext uri="{FF2B5EF4-FFF2-40B4-BE49-F238E27FC236}">
+                <a16:creationId xmlns:a16="http://schemas.microsoft.com/office/drawing/2014/main" id="{BD258EC0-E310-CD6E-F7AD-F43E60C4A4A7}"/>
+              </a:ext>
+            </a:extLst>
+          </p:cNvPr>
+          <p:cNvPicPr>
+            <a:picLocks noChangeAspect="1"/>
+          </p:cNvPicPr>
+          <p:nvPr/>
+        </p:nvPicPr>
+        <p:blipFill>
+          <a:blip r:embed="rId3"/>
+          <a:stretch>
+            <a:fillRect/>
+          </a:stretch>
+        </p:blipFill>
+        <p:spPr>
+          <a:xfrm>
+            <a:off x="5978802" y="4197348"/>
+            <a:ext cx="5764681" cy="2232875"/>
+          </a:xfrm>
+          <a:prstGeom prst="rect">
+            <a:avLst/>
+          </a:prstGeom>
+          <a:ln>
+            <a:solidFill>
+              <a:schemeClr val="bg2">
+                <a:lumMod val="75000"/>
+              </a:schemeClr>
+            </a:solidFill>
+          </a:ln>
+        </p:spPr>
+      </p:pic>
+      <p:sp>
+        <p:nvSpPr>
+          <p:cNvPr id="9" name="Arrow: Right 8">
+            <a:extLst>
+              <a:ext uri="{FF2B5EF4-FFF2-40B4-BE49-F238E27FC236}">
+                <a16:creationId xmlns:a16="http://schemas.microsoft.com/office/drawing/2014/main" id="{66773DC2-2B65-10AD-0691-8EB6CCBF0CC8}"/>
+              </a:ext>
+            </a:extLst>
+          </p:cNvPr>
+          <p:cNvSpPr/>
+          <p:nvPr/>
+        </p:nvSpPr>
+        <p:spPr bwMode="auto">
+          <a:xfrm>
+            <a:off x="4701000" y="4998784"/>
+            <a:ext cx="825086" cy="630000"/>
+          </a:xfrm>
+          <a:prstGeom prst="rightArrow">
+            <a:avLst/>
+          </a:prstGeom>
+          <a:solidFill>
+            <a:schemeClr val="dk2">
+              <a:alpha val="80000"/>
+            </a:schemeClr>
+          </a:solidFill>
+          <a:ln w="19050">
+            <a:solidFill>
+              <a:schemeClr val="tx1">
+                <a:lumMod val="75000"/>
+                <a:alpha val="80000"/>
+              </a:schemeClr>
+            </a:solidFill>
+          </a:ln>
+          <a:effectLst/>
+        </p:spPr>
+        <p:style>
+          <a:lnRef idx="2">
+            <a:schemeClr val="accent1">
+              <a:shade val="50000"/>
+            </a:schemeClr>
+          </a:lnRef>
+          <a:fillRef idx="1001">
+            <a:schemeClr val="dk2"/>
+          </a:fillRef>
+          <a:effectRef idx="0">
+            <a:schemeClr val="accent1"/>
+          </a:effectRef>
+          <a:fontRef idx="minor">
+            <a:schemeClr val="lt1"/>
+          </a:fontRef>
+        </p:style>
+        <p:txBody>
+          <a:bodyPr rot="0" spcFirstLastPara="0" vertOverflow="overflow" horzOverflow="overflow" vert="horz" wrap="square" lIns="91440" tIns="45720" rIns="91440" bIns="45720" numCol="1" spcCol="0" rtlCol="0" fromWordArt="0" anchor="ctr" anchorCtr="0" forceAA="0" compatLnSpc="1">
+            <a:prstTxWarp prst="textNoShape">
+              <a:avLst/>
+            </a:prstTxWarp>
+            <a:noAutofit/>
+          </a:bodyPr>
+          <a:lstStyle/>
+          <a:p>
+            <a:pPr algn="ctr"/>
+            <a:endParaRPr lang="en-US" sz="2800" b="1" dirty="0">
+              <a:solidFill>
+                <a:srgbClr val="FFFFFF"/>
+              </a:solidFill>
+              <a:effectLst>
+                <a:outerShdw blurRad="38100" dist="38100" dir="2700000" algn="tl">
+                  <a:srgbClr val="000000">
+                    <a:alpha val="43137"/>
+                  </a:srgbClr>
+                </a:outerShdw>
+              </a:effectLst>
+            </a:endParaRPr>
+          </a:p>
+        </p:txBody>
+      </p:sp>
+      <p:sp>
+        <p:nvSpPr>
+          <p:cNvPr id="10" name="Rectangle: Rounded Corners 9">
+            <a:extLst>
+              <a:ext uri="{FF2B5EF4-FFF2-40B4-BE49-F238E27FC236}">
+                <a16:creationId xmlns:a16="http://schemas.microsoft.com/office/drawing/2014/main" id="{651484C6-300E-5174-E9C6-7A831B22C5C0}"/>
+              </a:ext>
+            </a:extLst>
+          </p:cNvPr>
+          <p:cNvSpPr/>
+          <p:nvPr/>
+        </p:nvSpPr>
+        <p:spPr>
+          <a:xfrm>
+            <a:off x="1558375" y="5526874"/>
+            <a:ext cx="352626" cy="332125"/>
+          </a:xfrm>
+          <a:prstGeom prst="roundRect">
+            <a:avLst>
+              <a:gd name="adj" fmla="val 5385"/>
+            </a:avLst>
+          </a:prstGeom>
+          <a:noFill/>
+          <a:ln w="57150">
+            <a:solidFill>
+              <a:schemeClr val="tx1"/>
+            </a:solidFill>
+            <a:prstDash val="solid"/>
+          </a:ln>
+        </p:spPr>
+        <p:style>
+          <a:lnRef idx="2">
+            <a:schemeClr val="accent1">
+              <a:shade val="50000"/>
+            </a:schemeClr>
+          </a:lnRef>
+          <a:fillRef idx="1">
+            <a:schemeClr val="accent1"/>
+          </a:fillRef>
+          <a:effectRef idx="0">
+            <a:schemeClr val="accent1"/>
+          </a:effectRef>
+          <a:fontRef idx="minor">
+            <a:schemeClr val="lt1"/>
+          </a:fontRef>
+        </p:style>
+        <p:txBody>
+          <a:bodyPr rtlCol="0" anchor="t"/>
+          <a:lstStyle/>
+          <a:p>
+            <a:pPr algn="ctr"/>
+            <a:endParaRPr lang="en-US" sz="2799" b="1" dirty="0">
+              <a:solidFill>
+                <a:srgbClr val="FBEEDC"/>
+              </a:solidFill>
+              <a:effectLst>
+                <a:outerShdw blurRad="38100" dist="38100" dir="2700000" algn="tl">
+                  <a:srgbClr val="000000">
+                    <a:alpha val="43137"/>
+                  </a:srgbClr>
+                </a:outerShdw>
+              </a:effectLst>
+              <a:latin typeface="Consolas" panose="020B0609020204030204" pitchFamily="49" charset="0"/>
+            </a:endParaRPr>
+          </a:p>
+        </p:txBody>
+      </p:sp>
+      <p:sp>
+        <p:nvSpPr>
+          <p:cNvPr id="11" name="Rectangle: Rounded Corners 10">
+            <a:extLst>
+              <a:ext uri="{FF2B5EF4-FFF2-40B4-BE49-F238E27FC236}">
+                <a16:creationId xmlns:a16="http://schemas.microsoft.com/office/drawing/2014/main" id="{A21C5490-C430-A803-FE83-CDD5D47812C4}"/>
+              </a:ext>
+            </a:extLst>
+          </p:cNvPr>
+          <p:cNvSpPr/>
+          <p:nvPr/>
+        </p:nvSpPr>
+        <p:spPr>
+          <a:xfrm>
+            <a:off x="9336000" y="4648450"/>
+            <a:ext cx="2295000" cy="332125"/>
+          </a:xfrm>
+          <a:prstGeom prst="roundRect">
+            <a:avLst>
+              <a:gd name="adj" fmla="val 5385"/>
+            </a:avLst>
+          </a:prstGeom>
+          <a:noFill/>
+          <a:ln w="57150">
+            <a:solidFill>
+              <a:schemeClr val="tx1"/>
+            </a:solidFill>
+            <a:prstDash val="solid"/>
+          </a:ln>
+        </p:spPr>
+        <p:style>
+          <a:lnRef idx="2">
+            <a:schemeClr val="accent1">
+              <a:shade val="50000"/>
+            </a:schemeClr>
+          </a:lnRef>
+          <a:fillRef idx="1">
+            <a:schemeClr val="accent1"/>
+          </a:fillRef>
+          <a:effectRef idx="0">
+            <a:schemeClr val="accent1"/>
+          </a:effectRef>
+          <a:fontRef idx="minor">
+            <a:schemeClr val="lt1"/>
+          </a:fontRef>
+        </p:style>
+        <p:txBody>
+          <a:bodyPr rtlCol="0" anchor="t"/>
+          <a:lstStyle/>
+          <a:p>
+            <a:pPr algn="ctr"/>
+            <a:endParaRPr lang="en-US" sz="2799" b="1" dirty="0">
+              <a:solidFill>
+                <a:srgbClr val="FBEEDC"/>
+              </a:solidFill>
+              <a:effectLst>
+                <a:outerShdw blurRad="38100" dist="38100" dir="2700000" algn="tl">
+                  <a:srgbClr val="000000">
+                    <a:alpha val="43137"/>
+                  </a:srgbClr>
+                </a:outerShdw>
+              </a:effectLst>
+              <a:latin typeface="Consolas" panose="020B0609020204030204" pitchFamily="49" charset="0"/>
+            </a:endParaRPr>
+          </a:p>
+        </p:txBody>
+      </p:sp>
+    </p:spTree>
+    <p:extLst>
+      <p:ext uri="{BB962C8B-B14F-4D97-AF65-F5344CB8AC3E}">
+        <p14:creationId xmlns:p14="http://schemas.microsoft.com/office/powerpoint/2010/main" val="2521316769"/>
+      </p:ext>
+    </p:extLst>
+  </p:cSld>
+  <p:clrMapOvr>
+    <a:masterClrMapping/>
+  </p:clrMapOvr>
+  <mc:AlternateContent xmlns:mc="http://schemas.openxmlformats.org/markup-compatibility/2006" xmlns:p14="http://schemas.microsoft.com/office/powerpoint/2010/main">
+    <mc:Choice Requires="p14">
+      <p:transition spd="slow" p14:dur="2000" advClick="0" advTm="5000"/>
+    </mc:Choice>
+    <mc:Fallback xmlns="">
+      <p:transition spd="slow" advClick="0" advTm="5000"/>
+    </mc:Fallback>
+  </mc:AlternateContent>
+  <p:timing>
+    <p:tnLst>
+      <p:par>
+        <p:cTn id="1" dur="indefinite" restart="never" nodeType="tmRoot">
+          <p:childTnLst>
+            <p:seq concurrent="1" nextAc="seek">
+              <p:cTn id="2" dur="indefinite" nodeType="mainSeq">
+                <p:childTnLst>
+                  <p:par>
+                    <p:cTn id="3" fill="hold">
+                      <p:stCondLst>
+                        <p:cond delay="indefinite"/>
+                      </p:stCondLst>
+                      <p:childTnLst>
+                        <p:par>
+                          <p:cTn id="4" fill="hold">
+                            <p:stCondLst>
+                              <p:cond delay="0"/>
+                            </p:stCondLst>
+                            <p:childTnLst>
+                              <p:par>
+                                <p:cTn id="5" presetID="1" presetClass="entr" presetSubtype="0" fill="hold" grpId="0" nodeType="clickEffect">
+                                  <p:stCondLst>
+                                    <p:cond delay="0"/>
+                                  </p:stCondLst>
+                                  <p:childTnLst>
+                                    <p:set>
+                                      <p:cBhvr>
+                                        <p:cTn id="6" dur="1" fill="hold">
+                                          <p:stCondLst>
+                                            <p:cond delay="0"/>
+                                          </p:stCondLst>
+                                        </p:cTn>
+                                        <p:tgtEl>
+                                          <p:spTgt spid="10"/>
+                                        </p:tgtEl>
+                                        <p:attrNameLst>
+                                          <p:attrName>style.visibility</p:attrName>
+                                        </p:attrNameLst>
+                                      </p:cBhvr>
+                                      <p:to>
+                                        <p:strVal val="visible"/>
+                                      </p:to>
+                                    </p:set>
+                                  </p:childTnLst>
+                                </p:cTn>
+                              </p:par>
+                            </p:childTnLst>
+                          </p:cTn>
+                        </p:par>
+                      </p:childTnLst>
+                    </p:cTn>
+                  </p:par>
+                  <p:par>
+                    <p:cTn id="7" fill="hold">
+                      <p:stCondLst>
+                        <p:cond delay="indefinite"/>
+                      </p:stCondLst>
+                      <p:childTnLst>
+                        <p:par>
+                          <p:cTn id="8" fill="hold">
+                            <p:stCondLst>
+                              <p:cond delay="0"/>
+                            </p:stCondLst>
+                            <p:childTnLst>
+                              <p:par>
+                                <p:cTn id="9" presetID="1" presetClass="entr" presetSubtype="0" fill="hold" nodeType="clickEffect">
+                                  <p:stCondLst>
+                                    <p:cond delay="0"/>
+                                  </p:stCondLst>
+                                  <p:childTnLst>
+                                    <p:set>
+                                      <p:cBhvr>
+                                        <p:cTn id="10" dur="1" fill="hold">
+                                          <p:stCondLst>
+                                            <p:cond delay="0"/>
+                                          </p:stCondLst>
+                                        </p:cTn>
+                                        <p:tgtEl>
+                                          <p:spTgt spid="3">
+                                            <p:txEl>
+                                              <p:pRg st="1" end="1"/>
+                                            </p:txEl>
+                                          </p:spTgt>
+                                        </p:tgtEl>
+                                        <p:attrNameLst>
+                                          <p:attrName>style.visibility</p:attrName>
+                                        </p:attrNameLst>
+                                      </p:cBhvr>
+                                      <p:to>
+                                        <p:strVal val="visible"/>
+                                      </p:to>
+                                    </p:set>
+                                  </p:childTnLst>
+                                </p:cTn>
+                              </p:par>
+                            </p:childTnLst>
+                          </p:cTn>
+                        </p:par>
+                      </p:childTnLst>
+                    </p:cTn>
+                  </p:par>
+                  <p:par>
+                    <p:cTn id="11" fill="hold">
+                      <p:stCondLst>
+                        <p:cond delay="indefinite"/>
+                      </p:stCondLst>
+                      <p:childTnLst>
+                        <p:par>
+                          <p:cTn id="12" fill="hold">
+                            <p:stCondLst>
+                              <p:cond delay="0"/>
+                            </p:stCondLst>
+                            <p:childTnLst>
+                              <p:par>
+                                <p:cTn id="13" presetID="1" presetClass="entr" presetSubtype="0" fill="hold" grpId="0" nodeType="clickEffect">
+                                  <p:stCondLst>
+                                    <p:cond delay="0"/>
+                                  </p:stCondLst>
+                                  <p:childTnLst>
+                                    <p:set>
+                                      <p:cBhvr>
+                                        <p:cTn id="14" dur="1" fill="hold">
+                                          <p:stCondLst>
+                                            <p:cond delay="0"/>
+                                          </p:stCondLst>
+                                        </p:cTn>
+                                        <p:tgtEl>
+                                          <p:spTgt spid="9"/>
+                                        </p:tgtEl>
+                                        <p:attrNameLst>
+                                          <p:attrName>style.visibility</p:attrName>
+                                        </p:attrNameLst>
+                                      </p:cBhvr>
+                                      <p:to>
+                                        <p:strVal val="visible"/>
+                                      </p:to>
+                                    </p:set>
+                                  </p:childTnLst>
+                                </p:cTn>
+                              </p:par>
+                              <p:par>
+                                <p:cTn id="15" presetID="1" presetClass="entr" presetSubtype="0" fill="hold" nodeType="withEffect">
+                                  <p:stCondLst>
+                                    <p:cond delay="0"/>
+                                  </p:stCondLst>
+                                  <p:childTnLst>
+                                    <p:set>
+                                      <p:cBhvr>
+                                        <p:cTn id="16" dur="1" fill="hold">
+                                          <p:stCondLst>
+                                            <p:cond delay="0"/>
+                                          </p:stCondLst>
+                                        </p:cTn>
+                                        <p:tgtEl>
+                                          <p:spTgt spid="8"/>
+                                        </p:tgtEl>
+                                        <p:attrNameLst>
+                                          <p:attrName>style.visibility</p:attrName>
+                                        </p:attrNameLst>
+                                      </p:cBhvr>
+                                      <p:to>
+                                        <p:strVal val="visible"/>
+                                      </p:to>
+                                    </p:set>
+                                  </p:childTnLst>
+                                </p:cTn>
+                              </p:par>
+                            </p:childTnLst>
+                          </p:cTn>
+                        </p:par>
+                      </p:childTnLst>
+                    </p:cTn>
+                  </p:par>
+                  <p:par>
+                    <p:cTn id="17" fill="hold">
+                      <p:stCondLst>
+                        <p:cond delay="indefinite"/>
+                      </p:stCondLst>
+                      <p:childTnLst>
+                        <p:par>
+                          <p:cTn id="18" fill="hold">
+                            <p:stCondLst>
+                              <p:cond delay="0"/>
+                            </p:stCondLst>
+                            <p:childTnLst>
+                              <p:par>
+                                <p:cTn id="19" presetID="1" presetClass="entr" presetSubtype="0" fill="hold" grpId="0" nodeType="clickEffect">
+                                  <p:stCondLst>
+                                    <p:cond delay="0"/>
+                                  </p:stCondLst>
+                                  <p:childTnLst>
+                                    <p:set>
+                                      <p:cBhvr>
+                                        <p:cTn id="20" dur="1" fill="hold">
+                                          <p:stCondLst>
+                                            <p:cond delay="0"/>
+                                          </p:stCondLst>
+                                        </p:cTn>
+                                        <p:tgtEl>
+                                          <p:spTgt spid="11"/>
+                                        </p:tgtEl>
+                                        <p:attrNameLst>
+                                          <p:attrName>style.visibility</p:attrName>
+                                        </p:attrNameLst>
+                                      </p:cBhvr>
+                                      <p:to>
+                                        <p:strVal val="visible"/>
+                                      </p:to>
+                                    </p:set>
+                                  </p:childTnLst>
+                                </p:cTn>
+                              </p:par>
+                            </p:childTnLst>
+                          </p:cTn>
+                        </p:par>
+                      </p:childTnLst>
+                    </p:cTn>
+                  </p:par>
+                </p:childTnLst>
+              </p:cTn>
+              <p:prevCondLst>
+                <p:cond evt="onPrev" delay="0">
+                  <p:tgtEl>
+                    <p:sldTgt/>
+                  </p:tgtEl>
+                </p:cond>
+              </p:prevCondLst>
+              <p:nextCondLst>
+                <p:cond evt="onNext" delay="0">
+                  <p:tgtEl>
+                    <p:sldTgt/>
+                  </p:tgtEl>
+                </p:cond>
+              </p:nextCondLst>
+            </p:seq>
+          </p:childTnLst>
+        </p:cTn>
+      </p:par>
+    </p:tnLst>
+    <p:bldLst>
+      <p:bldP spid="9" grpId="0" animBg="1"/>
+      <p:bldP spid="10" grpId="0" animBg="1"/>
+      <p:bldP spid="11" grpId="0" animBg="1"/>
+    </p:bldLst>
+  </p:timing>
+</p:sld>
+</file>
+
+<file path=ppt/slides/slide26.xml><?xml version="1.0" encoding="utf-8"?>
+<p:sld xmlns:a="http://schemas.openxmlformats.org/drawingml/2006/main" xmlns:r="http://schemas.openxmlformats.org/officeDocument/2006/relationships" xmlns:p="http://schemas.openxmlformats.org/presentationml/2006/main">
+  <p:cSld>
+    <p:spTree>
+      <p:nvGrpSpPr>
+        <p:cNvPr id="1" name=""/>
+        <p:cNvGrpSpPr/>
+        <p:nvPr/>
+      </p:nvGrpSpPr>
+      <p:grpSpPr>
+        <a:xfrm>
+          <a:off x="0" y="0"/>
+          <a:ext cx="0" cy="0"/>
+          <a:chOff x="0" y="0"/>
+          <a:chExt cx="0" cy="0"/>
+        </a:xfrm>
+      </p:grpSpPr>
+      <p:sp>
+        <p:nvSpPr>
+          <p:cNvPr id="2" name="Slide Number Placeholder 1">
+            <a:extLst>
+              <a:ext uri="{FF2B5EF4-FFF2-40B4-BE49-F238E27FC236}">
+                <a16:creationId xmlns:a16="http://schemas.microsoft.com/office/drawing/2014/main" id="{954CEEF5-01C9-DDB7-8D9D-57BDA22A9021}"/>
+              </a:ext>
+            </a:extLst>
+          </p:cNvPr>
+          <p:cNvSpPr>
+            <a:spLocks noGrp="1"/>
+          </p:cNvSpPr>
+          <p:nvPr>
+            <p:ph type="sldNum" sz="quarter" idx="5"/>
+          </p:nvPr>
+        </p:nvSpPr>
+        <p:spPr/>
+        <p:txBody>
+          <a:bodyPr/>
+          <a:lstStyle/>
+          <a:p>
+            <a:fld id="{2BF067CD-8E6B-4360-9AA8-C5DF2A48A6D1}" type="slidenum">
+              <a:rPr lang="en-US" noProof="0" smtClean="0"/>
+              <a:pPr/>
+              <a:t>26</a:t>
+            </a:fld>
+            <a:endParaRPr lang="en-US" noProof="0" dirty="0"/>
+          </a:p>
+        </p:txBody>
+      </p:sp>
+      <p:sp>
+        <p:nvSpPr>
+          <p:cNvPr id="3" name="Text Placeholder 2">
+            <a:extLst>
+              <a:ext uri="{FF2B5EF4-FFF2-40B4-BE49-F238E27FC236}">
+                <a16:creationId xmlns:a16="http://schemas.microsoft.com/office/drawing/2014/main" id="{E1FDE106-BAB3-F21D-8A30-7D813379F418}"/>
+              </a:ext>
+            </a:extLst>
+          </p:cNvPr>
+          <p:cNvSpPr>
+            <a:spLocks noGrp="1"/>
+          </p:cNvSpPr>
+          <p:nvPr>
+            <p:ph type="body" sz="quarter" idx="10"/>
+          </p:nvPr>
+        </p:nvSpPr>
+        <p:spPr>
+          <a:xfrm>
+            <a:off x="156000" y="1196125"/>
+            <a:ext cx="11930042" cy="5528766"/>
+          </a:xfrm>
+        </p:spPr>
+        <p:txBody>
+          <a:bodyPr/>
+          <a:lstStyle/>
+          <a:p>
+            <a:r>
+              <a:rPr lang="bg-BG" sz="3200" dirty="0"/>
+              <a:t>Натискаме върху </a:t>
+            </a:r>
+            <a:r>
+              <a:rPr lang="en-US" sz="3200" dirty="0"/>
+              <a:t>[</a:t>
+            </a:r>
+            <a:r>
+              <a:rPr lang="en-US" sz="3200" b="1" dirty="0">
+                <a:latin typeface="Consolas" panose="020B0609020204030204" pitchFamily="49" charset="0"/>
+              </a:rPr>
+              <a:t>OK</a:t>
+            </a:r>
+            <a:r>
+              <a:rPr lang="en-US" sz="3200" dirty="0"/>
+              <a:t>], </a:t>
+            </a:r>
+            <a:r>
+              <a:rPr lang="bg-BG" sz="3200" dirty="0"/>
+              <a:t>за да </a:t>
+            </a:r>
+            <a:r>
+              <a:rPr lang="bg-BG" sz="3200" b="1" dirty="0">
+                <a:solidFill>
+                  <a:schemeClr val="bg1"/>
+                </a:solidFill>
+              </a:rPr>
+              <a:t>създадем релацията </a:t>
+            </a:r>
+            <a:r>
+              <a:rPr lang="bg-BG" sz="3200" dirty="0"/>
+              <a:t>с даденото име</a:t>
+            </a:r>
+          </a:p>
+          <a:p>
+            <a:pPr lvl="1"/>
+            <a:r>
+              <a:rPr lang="bg-BG" sz="2800" dirty="0"/>
+              <a:t>Натискаме </a:t>
+            </a:r>
+            <a:r>
+              <a:rPr lang="en-US" sz="2800" dirty="0"/>
+              <a:t>[</a:t>
+            </a:r>
+            <a:r>
+              <a:rPr lang="en-US" sz="3200" b="1" dirty="0">
+                <a:latin typeface="Consolas" panose="020B0609020204030204" pitchFamily="49" charset="0"/>
+              </a:rPr>
+              <a:t>OK</a:t>
+            </a:r>
+            <a:r>
+              <a:rPr lang="en-US" sz="2800" dirty="0"/>
+              <a:t>], </a:t>
+            </a:r>
+            <a:r>
+              <a:rPr lang="bg-BG" sz="2800" dirty="0"/>
+              <a:t>за да </a:t>
+            </a:r>
+            <a:r>
+              <a:rPr lang="bg-BG" sz="2800" b="1" dirty="0">
+                <a:solidFill>
+                  <a:schemeClr val="bg1"/>
+                </a:solidFill>
+              </a:rPr>
+              <a:t>изпълним свързването</a:t>
+            </a:r>
+            <a:endParaRPr lang="en-US" sz="2800" b="1" dirty="0">
+              <a:solidFill>
+                <a:schemeClr val="bg1"/>
+              </a:solidFill>
+            </a:endParaRPr>
+          </a:p>
+          <a:p>
+            <a:endParaRPr lang="en-US" dirty="0"/>
+          </a:p>
+          <a:p>
+            <a:pPr marL="0" indent="0">
+              <a:buNone/>
+            </a:pPr>
+            <a:endParaRPr lang="en-US" dirty="0"/>
+          </a:p>
+        </p:txBody>
+      </p:sp>
+      <p:sp>
+        <p:nvSpPr>
+          <p:cNvPr id="4" name="Title 3">
+            <a:extLst>
+              <a:ext uri="{FF2B5EF4-FFF2-40B4-BE49-F238E27FC236}">
+                <a16:creationId xmlns:a16="http://schemas.microsoft.com/office/drawing/2014/main" id="{D52697CA-7A2B-FB59-584F-57B7924313E9}"/>
+              </a:ext>
+            </a:extLst>
+          </p:cNvPr>
+          <p:cNvSpPr>
+            <a:spLocks noGrp="1"/>
+          </p:cNvSpPr>
+          <p:nvPr>
+            <p:ph type="title"/>
+          </p:nvPr>
+        </p:nvSpPr>
+        <p:spPr/>
+        <p:txBody>
+          <a:bodyPr/>
+          <a:lstStyle/>
+          <a:p>
+            <a:r>
+              <a:rPr lang="bg-BG" dirty="0"/>
+              <a:t>Създаване на връзка между таблици (5)</a:t>
+            </a:r>
+            <a:endParaRPr lang="en-US" dirty="0"/>
+          </a:p>
+        </p:txBody>
+      </p:sp>
+      <p:pic>
+        <p:nvPicPr>
+          <p:cNvPr id="6" name="Picture 5">
+            <a:extLst>
+              <a:ext uri="{FF2B5EF4-FFF2-40B4-BE49-F238E27FC236}">
+                <a16:creationId xmlns:a16="http://schemas.microsoft.com/office/drawing/2014/main" id="{85CA4338-02B5-5B7B-E321-A18CDDE597F6}"/>
+              </a:ext>
+            </a:extLst>
+          </p:cNvPr>
+          <p:cNvPicPr>
+            <a:picLocks noChangeAspect="1"/>
+          </p:cNvPicPr>
+          <p:nvPr/>
+        </p:nvPicPr>
+        <p:blipFill>
+          <a:blip r:embed="rId2"/>
+          <a:stretch>
+            <a:fillRect/>
+          </a:stretch>
+        </p:blipFill>
+        <p:spPr>
+          <a:xfrm>
+            <a:off x="336000" y="2830793"/>
+            <a:ext cx="4871211" cy="3703207"/>
+          </a:xfrm>
+          <a:prstGeom prst="rect">
+            <a:avLst/>
+          </a:prstGeom>
+          <a:ln>
+            <a:solidFill>
+              <a:schemeClr val="bg2">
+                <a:lumMod val="75000"/>
+              </a:schemeClr>
+            </a:solidFill>
+          </a:ln>
+        </p:spPr>
+      </p:pic>
+      <p:sp>
+        <p:nvSpPr>
+          <p:cNvPr id="7" name="Rectangle: Rounded Corners 6">
+            <a:extLst>
+              <a:ext uri="{FF2B5EF4-FFF2-40B4-BE49-F238E27FC236}">
+                <a16:creationId xmlns:a16="http://schemas.microsoft.com/office/drawing/2014/main" id="{00370A9C-86A5-F83B-3995-AF225FAAFADB}"/>
+              </a:ext>
+            </a:extLst>
+          </p:cNvPr>
+          <p:cNvSpPr/>
+          <p:nvPr/>
+        </p:nvSpPr>
+        <p:spPr>
+          <a:xfrm>
+            <a:off x="3441001" y="6174000"/>
+            <a:ext cx="765000" cy="225000"/>
+          </a:xfrm>
+          <a:prstGeom prst="roundRect">
+            <a:avLst>
+              <a:gd name="adj" fmla="val 5385"/>
+            </a:avLst>
+          </a:prstGeom>
+          <a:noFill/>
+          <a:ln w="57150">
+            <a:solidFill>
+              <a:schemeClr val="tx1"/>
+            </a:solidFill>
+            <a:prstDash val="solid"/>
+          </a:ln>
+        </p:spPr>
+        <p:style>
+          <a:lnRef idx="2">
+            <a:schemeClr val="accent1">
+              <a:shade val="50000"/>
+            </a:schemeClr>
+          </a:lnRef>
+          <a:fillRef idx="1">
+            <a:schemeClr val="accent1"/>
+          </a:fillRef>
+          <a:effectRef idx="0">
+            <a:schemeClr val="accent1"/>
+          </a:effectRef>
+          <a:fontRef idx="minor">
+            <a:schemeClr val="lt1"/>
+          </a:fontRef>
+        </p:style>
+        <p:txBody>
+          <a:bodyPr rtlCol="0" anchor="t"/>
+          <a:lstStyle/>
+          <a:p>
+            <a:pPr algn="ctr"/>
+            <a:endParaRPr lang="en-US" sz="2799" b="1" dirty="0">
+              <a:solidFill>
+                <a:srgbClr val="FBEEDC"/>
+              </a:solidFill>
+              <a:effectLst>
+                <a:outerShdw blurRad="38100" dist="38100" dir="2700000" algn="tl">
+                  <a:srgbClr val="000000">
+                    <a:alpha val="43137"/>
+                  </a:srgbClr>
+                </a:outerShdw>
+              </a:effectLst>
+              <a:latin typeface="Consolas" panose="020B0609020204030204" pitchFamily="49" charset="0"/>
+            </a:endParaRPr>
+          </a:p>
+        </p:txBody>
+      </p:sp>
+      <p:pic>
+        <p:nvPicPr>
+          <p:cNvPr id="9" name="Picture 8">
+            <a:extLst>
+              <a:ext uri="{FF2B5EF4-FFF2-40B4-BE49-F238E27FC236}">
+                <a16:creationId xmlns:a16="http://schemas.microsoft.com/office/drawing/2014/main" id="{136ADED4-43AA-ACB8-9483-9DB9E48C1612}"/>
+              </a:ext>
+            </a:extLst>
+          </p:cNvPr>
+          <p:cNvPicPr>
+            <a:picLocks noChangeAspect="1"/>
+          </p:cNvPicPr>
+          <p:nvPr/>
+        </p:nvPicPr>
+        <p:blipFill>
+          <a:blip r:embed="rId3"/>
+          <a:stretch>
+            <a:fillRect/>
+          </a:stretch>
+        </p:blipFill>
+        <p:spPr>
+          <a:xfrm>
+            <a:off x="5947810" y="2799000"/>
+            <a:ext cx="5799683" cy="3717070"/>
+          </a:xfrm>
+          <a:prstGeom prst="rect">
+            <a:avLst/>
+          </a:prstGeom>
+          <a:ln>
+            <a:solidFill>
+              <a:schemeClr val="bg2">
+                <a:lumMod val="75000"/>
+              </a:schemeClr>
+            </a:solidFill>
+          </a:ln>
+        </p:spPr>
+      </p:pic>
+      <p:sp>
+        <p:nvSpPr>
+          <p:cNvPr id="10" name="Rectangle: Rounded Corners 9">
+            <a:extLst>
+              <a:ext uri="{FF2B5EF4-FFF2-40B4-BE49-F238E27FC236}">
+                <a16:creationId xmlns:a16="http://schemas.microsoft.com/office/drawing/2014/main" id="{E41751D8-5AD3-FD42-AC81-3CE953ACE53D}"/>
+              </a:ext>
+            </a:extLst>
+          </p:cNvPr>
+          <p:cNvSpPr/>
+          <p:nvPr/>
+        </p:nvSpPr>
+        <p:spPr>
+          <a:xfrm>
+            <a:off x="10012058" y="6129000"/>
+            <a:ext cx="765000" cy="225000"/>
+          </a:xfrm>
+          <a:prstGeom prst="roundRect">
+            <a:avLst>
+              <a:gd name="adj" fmla="val 5385"/>
+            </a:avLst>
+          </a:prstGeom>
+          <a:noFill/>
+          <a:ln w="57150">
+            <a:solidFill>
+              <a:schemeClr val="tx1"/>
+            </a:solidFill>
+            <a:prstDash val="solid"/>
+          </a:ln>
+        </p:spPr>
+        <p:style>
+          <a:lnRef idx="2">
+            <a:schemeClr val="accent1">
+              <a:shade val="50000"/>
+            </a:schemeClr>
+          </a:lnRef>
+          <a:fillRef idx="1">
+            <a:schemeClr val="accent1"/>
+          </a:fillRef>
+          <a:effectRef idx="0">
+            <a:schemeClr val="accent1"/>
+          </a:effectRef>
+          <a:fontRef idx="minor">
+            <a:schemeClr val="lt1"/>
+          </a:fontRef>
+        </p:style>
+        <p:txBody>
+          <a:bodyPr rtlCol="0" anchor="t"/>
+          <a:lstStyle/>
+          <a:p>
+            <a:pPr algn="ctr"/>
+            <a:endParaRPr lang="en-US" sz="2799" b="1" dirty="0">
+              <a:solidFill>
+                <a:srgbClr val="FBEEDC"/>
+              </a:solidFill>
+              <a:effectLst>
+                <a:outerShdw blurRad="38100" dist="38100" dir="2700000" algn="tl">
+                  <a:srgbClr val="000000">
+                    <a:alpha val="43137"/>
+                  </a:srgbClr>
+                </a:outerShdw>
+              </a:effectLst>
+              <a:latin typeface="Consolas" panose="020B0609020204030204" pitchFamily="49" charset="0"/>
+            </a:endParaRPr>
+          </a:p>
+        </p:txBody>
+      </p:sp>
+    </p:spTree>
+    <p:extLst>
+      <p:ext uri="{BB962C8B-B14F-4D97-AF65-F5344CB8AC3E}">
+        <p14:creationId xmlns:p14="http://schemas.microsoft.com/office/powerpoint/2010/main" val="2943391358"/>
+      </p:ext>
+    </p:extLst>
+  </p:cSld>
+  <p:clrMapOvr>
+    <a:masterClrMapping/>
+  </p:clrMapOvr>
+  <mc:AlternateContent xmlns:mc="http://schemas.openxmlformats.org/markup-compatibility/2006" xmlns:p14="http://schemas.microsoft.com/office/powerpoint/2010/main">
+    <mc:Choice Requires="p14">
+      <p:transition spd="slow" p14:dur="2000" advClick="0" advTm="5000"/>
+    </mc:Choice>
+    <mc:Fallback xmlns="">
+      <p:transition spd="slow" advClick="0" advTm="5000"/>
+    </mc:Fallback>
+  </mc:AlternateContent>
+  <p:timing>
+    <p:tnLst>
+      <p:par>
+        <p:cTn id="1" dur="indefinite" restart="never" nodeType="tmRoot">
+          <p:childTnLst>
+            <p:seq concurrent="1" nextAc="seek">
+              <p:cTn id="2" dur="indefinite" nodeType="mainSeq">
+                <p:childTnLst>
+                  <p:par>
+                    <p:cTn id="3" fill="hold">
+                      <p:stCondLst>
+                        <p:cond delay="indefinite"/>
+                      </p:stCondLst>
+                      <p:childTnLst>
+                        <p:par>
+                          <p:cTn id="4" fill="hold">
+                            <p:stCondLst>
+                              <p:cond delay="0"/>
+                            </p:stCondLst>
+                            <p:childTnLst>
+                              <p:par>
+                                <p:cTn id="5" presetID="1" presetClass="entr" presetSubtype="0" fill="hold" grpId="0" nodeType="clickEffect">
+                                  <p:stCondLst>
+                                    <p:cond delay="0"/>
+                                  </p:stCondLst>
+                                  <p:childTnLst>
+                                    <p:set>
+                                      <p:cBhvr>
+                                        <p:cTn id="6" dur="1" fill="hold">
+                                          <p:stCondLst>
+                                            <p:cond delay="0"/>
+                                          </p:stCondLst>
+                                        </p:cTn>
+                                        <p:tgtEl>
+                                          <p:spTgt spid="7"/>
+                                        </p:tgtEl>
+                                        <p:attrNameLst>
+                                          <p:attrName>style.visibility</p:attrName>
+                                        </p:attrNameLst>
+                                      </p:cBhvr>
+                                      <p:to>
+                                        <p:strVal val="visible"/>
+                                      </p:to>
+                                    </p:set>
+                                  </p:childTnLst>
+                                </p:cTn>
+                              </p:par>
+                            </p:childTnLst>
+                          </p:cTn>
+                        </p:par>
+                      </p:childTnLst>
+                    </p:cTn>
+                  </p:par>
+                  <p:par>
+                    <p:cTn id="7" fill="hold">
+                      <p:stCondLst>
+                        <p:cond delay="indefinite"/>
+                      </p:stCondLst>
+                      <p:childTnLst>
+                        <p:par>
+                          <p:cTn id="8" fill="hold">
+                            <p:stCondLst>
+                              <p:cond delay="0"/>
+                            </p:stCondLst>
+                            <p:childTnLst>
+                              <p:par>
+                                <p:cTn id="9" presetID="1" presetClass="entr" presetSubtype="0" fill="hold" nodeType="clickEffect">
+                                  <p:stCondLst>
+                                    <p:cond delay="0"/>
+                                  </p:stCondLst>
+                                  <p:childTnLst>
+                                    <p:set>
+                                      <p:cBhvr>
+                                        <p:cTn id="10" dur="1" fill="hold">
+                                          <p:stCondLst>
+                                            <p:cond delay="0"/>
+                                          </p:stCondLst>
+                                        </p:cTn>
+                                        <p:tgtEl>
+                                          <p:spTgt spid="3">
+                                            <p:txEl>
+                                              <p:pRg st="1" end="1"/>
+                                            </p:txEl>
+                                          </p:spTgt>
+                                        </p:tgtEl>
+                                        <p:attrNameLst>
+                                          <p:attrName>style.visibility</p:attrName>
+                                        </p:attrNameLst>
+                                      </p:cBhvr>
+                                      <p:to>
+                                        <p:strVal val="visible"/>
+                                      </p:to>
+                                    </p:set>
+                                  </p:childTnLst>
+                                </p:cTn>
+                              </p:par>
+                              <p:par>
+                                <p:cTn id="11" presetID="1" presetClass="entr" presetSubtype="0" fill="hold" nodeType="withEffect">
+                                  <p:stCondLst>
+                                    <p:cond delay="0"/>
+                                  </p:stCondLst>
+                                  <p:childTnLst>
+                                    <p:set>
+                                      <p:cBhvr>
+                                        <p:cTn id="12" dur="1" fill="hold">
+                                          <p:stCondLst>
+                                            <p:cond delay="0"/>
+                                          </p:stCondLst>
+                                        </p:cTn>
+                                        <p:tgtEl>
+                                          <p:spTgt spid="9"/>
+                                        </p:tgtEl>
+                                        <p:attrNameLst>
+                                          <p:attrName>style.visibility</p:attrName>
+                                        </p:attrNameLst>
+                                      </p:cBhvr>
+                                      <p:to>
+                                        <p:strVal val="visible"/>
+                                      </p:to>
+                                    </p:set>
+                                  </p:childTnLst>
+                                </p:cTn>
+                              </p:par>
+                            </p:childTnLst>
+                          </p:cTn>
+                        </p:par>
+                      </p:childTnLst>
+                    </p:cTn>
+                  </p:par>
+                  <p:par>
+                    <p:cTn id="13" fill="hold">
+                      <p:stCondLst>
+                        <p:cond delay="indefinite"/>
+                      </p:stCondLst>
+                      <p:childTnLst>
+                        <p:par>
+                          <p:cTn id="14" fill="hold">
+                            <p:stCondLst>
+                              <p:cond delay="0"/>
+                            </p:stCondLst>
+                            <p:childTnLst>
+                              <p:par>
+                                <p:cTn id="15" presetID="1" presetClass="entr" presetSubtype="0" fill="hold" grpId="0" nodeType="clickEffect">
+                                  <p:stCondLst>
+                                    <p:cond delay="0"/>
+                                  </p:stCondLst>
+                                  <p:childTnLst>
+                                    <p:set>
+                                      <p:cBhvr>
+                                        <p:cTn id="16" dur="1" fill="hold">
+                                          <p:stCondLst>
+                                            <p:cond delay="0"/>
+                                          </p:stCondLst>
+                                        </p:cTn>
+                                        <p:tgtEl>
+                                          <p:spTgt spid="10"/>
+                                        </p:tgtEl>
+                                        <p:attrNameLst>
+                                          <p:attrName>style.visibility</p:attrName>
+                                        </p:attrNameLst>
+                                      </p:cBhvr>
+                                      <p:to>
+                                        <p:strVal val="visible"/>
+                                      </p:to>
+                                    </p:set>
+                                  </p:childTnLst>
+                                </p:cTn>
+                              </p:par>
+                            </p:childTnLst>
+                          </p:cTn>
+                        </p:par>
+                      </p:childTnLst>
+                    </p:cTn>
+                  </p:par>
+                </p:childTnLst>
+              </p:cTn>
+              <p:prevCondLst>
+                <p:cond evt="onPrev" delay="0">
+                  <p:tgtEl>
+                    <p:sldTgt/>
+                  </p:tgtEl>
+                </p:cond>
+              </p:prevCondLst>
+              <p:nextCondLst>
+                <p:cond evt="onNext" delay="0">
+                  <p:tgtEl>
+                    <p:sldTgt/>
+                  </p:tgtEl>
+                </p:cond>
+              </p:nextCondLst>
+            </p:seq>
+          </p:childTnLst>
+        </p:cTn>
+      </p:par>
+    </p:tnLst>
+    <p:bldLst>
+      <p:bldP spid="7" grpId="0" animBg="1"/>
+      <p:bldP spid="10" grpId="0" animBg="1"/>
+    </p:bldLst>
+  </p:timing>
+</p:sld>
+</file>
+
+<file path=ppt/slides/slide27.xml><?xml version="1.0" encoding="utf-8"?>
+<p:sld xmlns:a="http://schemas.openxmlformats.org/drawingml/2006/main" xmlns:r="http://schemas.openxmlformats.org/officeDocument/2006/relationships" xmlns:p="http://schemas.openxmlformats.org/presentationml/2006/main">
+  <p:cSld>
+    <p:spTree>
+      <p:nvGrpSpPr>
+        <p:cNvPr id="1" name=""/>
+        <p:cNvGrpSpPr/>
+        <p:nvPr/>
+      </p:nvGrpSpPr>
+      <p:grpSpPr>
+        <a:xfrm>
+          <a:off x="0" y="0"/>
+          <a:ext cx="0" cy="0"/>
+          <a:chOff x="0" y="0"/>
+          <a:chExt cx="0" cy="0"/>
+        </a:xfrm>
+      </p:grpSpPr>
+      <p:sp>
+        <p:nvSpPr>
+          <p:cNvPr id="2" name="Slide Number Placeholder 1">
+            <a:extLst>
+              <a:ext uri="{FF2B5EF4-FFF2-40B4-BE49-F238E27FC236}">
+                <a16:creationId xmlns:a16="http://schemas.microsoft.com/office/drawing/2014/main" id="{EF68FCAD-1BFD-3441-DABA-CCBC1259E124}"/>
+              </a:ext>
+            </a:extLst>
+          </p:cNvPr>
+          <p:cNvSpPr>
+            <a:spLocks noGrp="1"/>
+          </p:cNvSpPr>
+          <p:nvPr>
+            <p:ph type="sldNum" sz="quarter" idx="5"/>
+          </p:nvPr>
+        </p:nvSpPr>
+        <p:spPr/>
+        <p:txBody>
+          <a:bodyPr/>
+          <a:lstStyle/>
+          <a:p>
+            <a:fld id="{2BF067CD-8E6B-4360-9AA8-C5DF2A48A6D1}" type="slidenum">
+              <a:rPr lang="en-US" noProof="0" smtClean="0"/>
+              <a:pPr/>
+              <a:t>27</a:t>
+            </a:fld>
+            <a:endParaRPr lang="en-US" noProof="0" dirty="0"/>
+          </a:p>
+        </p:txBody>
+      </p:sp>
+      <p:sp>
+        <p:nvSpPr>
+          <p:cNvPr id="3" name="Text Placeholder 2">
+            <a:extLst>
+              <a:ext uri="{FF2B5EF4-FFF2-40B4-BE49-F238E27FC236}">
+                <a16:creationId xmlns:a16="http://schemas.microsoft.com/office/drawing/2014/main" id="{C874C906-F877-6B4A-821F-72D06E3E8E42}"/>
+              </a:ext>
+            </a:extLst>
+          </p:cNvPr>
+          <p:cNvSpPr>
+            <a:spLocks noGrp="1"/>
+          </p:cNvSpPr>
+          <p:nvPr>
+            <p:ph type="body" sz="quarter" idx="10"/>
+          </p:nvPr>
+        </p:nvSpPr>
+        <p:spPr/>
+        <p:txBody>
+          <a:bodyPr/>
+          <a:lstStyle/>
+          <a:p>
+            <a:r>
+              <a:rPr lang="bg-BG" dirty="0"/>
+              <a:t>Сега избираме от </a:t>
+            </a:r>
+            <a:r>
+              <a:rPr lang="en-US" b="1" dirty="0">
+                <a:solidFill>
+                  <a:schemeClr val="bg1"/>
+                </a:solidFill>
+              </a:rPr>
+              <a:t>Object Explorer </a:t>
+            </a:r>
+            <a:r>
+              <a:rPr lang="en-US" dirty="0"/>
+              <a:t>[</a:t>
+            </a:r>
+            <a:r>
+              <a:rPr lang="en-US" b="1" dirty="0">
+                <a:latin typeface="Consolas" panose="020B0609020204030204" pitchFamily="49" charset="0"/>
+              </a:rPr>
+              <a:t>Tables</a:t>
+            </a:r>
+            <a:r>
+              <a:rPr lang="en-US" dirty="0"/>
+              <a:t>] -&gt; </a:t>
+            </a:r>
+            <a:r>
+              <a:rPr lang="bg-BG" b="1" dirty="0"/>
+              <a:t>десен бутон </a:t>
+            </a:r>
+            <a:r>
+              <a:rPr lang="bg-BG" dirty="0"/>
+              <a:t>върху таблицата </a:t>
+            </a:r>
+            <a:r>
+              <a:rPr lang="en-US" b="1" dirty="0">
+                <a:latin typeface="Consolas" panose="020B0609020204030204" pitchFamily="49" charset="0"/>
+              </a:rPr>
+              <a:t>Enrollments</a:t>
+            </a:r>
+            <a:r>
+              <a:rPr lang="en-US" dirty="0"/>
+              <a:t> </a:t>
+            </a:r>
+            <a:r>
+              <a:rPr lang="bg-BG" dirty="0"/>
+              <a:t>и </a:t>
+            </a:r>
+            <a:r>
+              <a:rPr lang="en-US" dirty="0"/>
+              <a:t>[</a:t>
+            </a:r>
+            <a:r>
+              <a:rPr lang="en-US" b="1" dirty="0">
+                <a:latin typeface="Consolas" panose="020B0609020204030204" pitchFamily="49" charset="0"/>
+              </a:rPr>
+              <a:t>Design</a:t>
+            </a:r>
+            <a:r>
+              <a:rPr lang="en-US" dirty="0"/>
+              <a:t>]</a:t>
+            </a:r>
+          </a:p>
+        </p:txBody>
+      </p:sp>
+      <p:sp>
+        <p:nvSpPr>
+          <p:cNvPr id="4" name="Title 3">
+            <a:extLst>
+              <a:ext uri="{FF2B5EF4-FFF2-40B4-BE49-F238E27FC236}">
+                <a16:creationId xmlns:a16="http://schemas.microsoft.com/office/drawing/2014/main" id="{B889D541-3BB1-2CFA-7737-404F1599283C}"/>
+              </a:ext>
+            </a:extLst>
+          </p:cNvPr>
+          <p:cNvSpPr>
+            <a:spLocks noGrp="1"/>
+          </p:cNvSpPr>
+          <p:nvPr>
+            <p:ph type="title"/>
+          </p:nvPr>
+        </p:nvSpPr>
+        <p:spPr/>
+        <p:txBody>
+          <a:bodyPr/>
+          <a:lstStyle/>
+          <a:p>
+            <a:r>
+              <a:rPr lang="bg-BG" dirty="0"/>
+              <a:t>Създаване на връзка между таблици (6)</a:t>
+            </a:r>
+            <a:endParaRPr lang="en-US" dirty="0"/>
+          </a:p>
+        </p:txBody>
+      </p:sp>
+      <p:pic>
+        <p:nvPicPr>
+          <p:cNvPr id="6" name="Picture 5">
+            <a:extLst>
+              <a:ext uri="{FF2B5EF4-FFF2-40B4-BE49-F238E27FC236}">
+                <a16:creationId xmlns:a16="http://schemas.microsoft.com/office/drawing/2014/main" id="{FBE9B69F-1AC6-131D-A145-5538C958A133}"/>
+              </a:ext>
+            </a:extLst>
+          </p:cNvPr>
+          <p:cNvPicPr>
+            <a:picLocks noChangeAspect="1"/>
+          </p:cNvPicPr>
+          <p:nvPr/>
+        </p:nvPicPr>
+        <p:blipFill>
+          <a:blip r:embed="rId3"/>
+          <a:stretch>
+            <a:fillRect/>
+          </a:stretch>
+        </p:blipFill>
+        <p:spPr>
+          <a:xfrm>
+            <a:off x="3700173" y="2844000"/>
+            <a:ext cx="4791654" cy="3285000"/>
+          </a:xfrm>
+          <a:prstGeom prst="rect">
+            <a:avLst/>
+          </a:prstGeom>
+          <a:ln>
+            <a:solidFill>
+              <a:schemeClr val="bg2">
+                <a:lumMod val="75000"/>
+              </a:schemeClr>
+            </a:solidFill>
+          </a:ln>
+        </p:spPr>
+      </p:pic>
+      <p:sp>
+        <p:nvSpPr>
+          <p:cNvPr id="7" name="Rectangle: Rounded Corners 6">
+            <a:extLst>
+              <a:ext uri="{FF2B5EF4-FFF2-40B4-BE49-F238E27FC236}">
+                <a16:creationId xmlns:a16="http://schemas.microsoft.com/office/drawing/2014/main" id="{9BF81485-5B14-3A2F-5F08-C0329C03BABE}"/>
+              </a:ext>
+            </a:extLst>
+          </p:cNvPr>
+          <p:cNvSpPr/>
+          <p:nvPr/>
+        </p:nvSpPr>
+        <p:spPr>
+          <a:xfrm>
+            <a:off x="5304804" y="4779000"/>
+            <a:ext cx="2861196" cy="225000"/>
+          </a:xfrm>
+          <a:prstGeom prst="roundRect">
+            <a:avLst>
+              <a:gd name="adj" fmla="val 5385"/>
+            </a:avLst>
+          </a:prstGeom>
+          <a:noFill/>
+          <a:ln w="57150">
+            <a:solidFill>
+              <a:schemeClr val="tx1"/>
+            </a:solidFill>
+            <a:prstDash val="solid"/>
+          </a:ln>
+        </p:spPr>
+        <p:style>
+          <a:lnRef idx="2">
+            <a:schemeClr val="accent1">
+              <a:shade val="50000"/>
+            </a:schemeClr>
+          </a:lnRef>
+          <a:fillRef idx="1">
+            <a:schemeClr val="accent1"/>
+          </a:fillRef>
+          <a:effectRef idx="0">
+            <a:schemeClr val="accent1"/>
+          </a:effectRef>
+          <a:fontRef idx="minor">
+            <a:schemeClr val="lt1"/>
+          </a:fontRef>
+        </p:style>
+        <p:txBody>
+          <a:bodyPr rtlCol="0" anchor="t"/>
+          <a:lstStyle/>
+          <a:p>
+            <a:pPr algn="ctr"/>
+            <a:endParaRPr lang="en-US" sz="2799" b="1" dirty="0">
+              <a:solidFill>
+                <a:srgbClr val="FBEEDC"/>
+              </a:solidFill>
+              <a:effectLst>
+                <a:outerShdw blurRad="38100" dist="38100" dir="2700000" algn="tl">
+                  <a:srgbClr val="000000">
+                    <a:alpha val="43137"/>
+                  </a:srgbClr>
+                </a:outerShdw>
+              </a:effectLst>
+              <a:latin typeface="Consolas" panose="020B0609020204030204" pitchFamily="49" charset="0"/>
+            </a:endParaRPr>
+          </a:p>
+        </p:txBody>
+      </p:sp>
+    </p:spTree>
+    <p:extLst>
+      <p:ext uri="{BB962C8B-B14F-4D97-AF65-F5344CB8AC3E}">
+        <p14:creationId xmlns:p14="http://schemas.microsoft.com/office/powerpoint/2010/main" val="4202413272"/>
+      </p:ext>
+    </p:extLst>
+  </p:cSld>
+  <p:clrMapOvr>
+    <a:masterClrMapping/>
+  </p:clrMapOvr>
+  <mc:AlternateContent xmlns:mc="http://schemas.openxmlformats.org/markup-compatibility/2006" xmlns:p14="http://schemas.microsoft.com/office/powerpoint/2010/main">
+    <mc:Choice Requires="p14">
+      <p:transition spd="slow" p14:dur="2000" advClick="0" advTm="5000"/>
+    </mc:Choice>
+    <mc:Fallback xmlns="">
+      <p:transition spd="slow" advClick="0" advTm="5000"/>
+    </mc:Fallback>
+  </mc:AlternateContent>
+  <p:timing>
+    <p:tnLst>
+      <p:par>
+        <p:cTn id="1" dur="indefinite" restart="never" nodeType="tmRoot">
+          <p:childTnLst>
+            <p:seq concurrent="1" nextAc="seek">
+              <p:cTn id="2" dur="indefinite" nodeType="mainSeq">
+                <p:childTnLst>
+                  <p:par>
+                    <p:cTn id="3" fill="hold">
+                      <p:stCondLst>
+                        <p:cond delay="indefinite"/>
+                      </p:stCondLst>
+                      <p:childTnLst>
+                        <p:par>
+                          <p:cTn id="4" fill="hold">
+                            <p:stCondLst>
+                              <p:cond delay="0"/>
+                            </p:stCondLst>
+                            <p:childTnLst>
+                              <p:par>
+                                <p:cTn id="5" presetID="1" presetClass="entr" presetSubtype="0" fill="hold" grpId="0" nodeType="clickEffect">
+                                  <p:stCondLst>
+                                    <p:cond delay="0"/>
+                                  </p:stCondLst>
+                                  <p:childTnLst>
+                                    <p:set>
+                                      <p:cBhvr>
+                                        <p:cTn id="6" dur="1" fill="hold">
+                                          <p:stCondLst>
+                                            <p:cond delay="0"/>
+                                          </p:stCondLst>
+                                        </p:cTn>
+                                        <p:tgtEl>
+                                          <p:spTgt spid="7"/>
+                                        </p:tgtEl>
+                                        <p:attrNameLst>
+                                          <p:attrName>style.visibility</p:attrName>
+                                        </p:attrNameLst>
+                                      </p:cBhvr>
+                                      <p:to>
+                                        <p:strVal val="visible"/>
+                                      </p:to>
+                                    </p:set>
+                                  </p:childTnLst>
+                                </p:cTn>
+                              </p:par>
+                            </p:childTnLst>
+                          </p:cTn>
+                        </p:par>
+                      </p:childTnLst>
+                    </p:cTn>
+                  </p:par>
+                </p:childTnLst>
+              </p:cTn>
+              <p:prevCondLst>
+                <p:cond evt="onPrev" delay="0">
+                  <p:tgtEl>
+                    <p:sldTgt/>
+                  </p:tgtEl>
+                </p:cond>
+              </p:prevCondLst>
+              <p:nextCondLst>
+                <p:cond evt="onNext" delay="0">
+                  <p:tgtEl>
+                    <p:sldTgt/>
+                  </p:tgtEl>
+                </p:cond>
+              </p:nextCondLst>
+            </p:seq>
+          </p:childTnLst>
+        </p:cTn>
+      </p:par>
+    </p:tnLst>
+    <p:bldLst>
+      <p:bldP spid="7" grpId="0" animBg="1"/>
+    </p:bldLst>
+  </p:timing>
+</p:sld>
+</file>
+
+<file path=ppt/slides/slide28.xml><?xml version="1.0" encoding="utf-8"?>
+<p:sld xmlns:a="http://schemas.openxmlformats.org/drawingml/2006/main" xmlns:r="http://schemas.openxmlformats.org/officeDocument/2006/relationships" xmlns:p="http://schemas.openxmlformats.org/presentationml/2006/main">
+  <p:cSld>
+    <p:spTree>
+      <p:nvGrpSpPr>
+        <p:cNvPr id="1" name=""/>
+        <p:cNvGrpSpPr/>
+        <p:nvPr/>
+      </p:nvGrpSpPr>
+      <p:grpSpPr>
+        <a:xfrm>
+          <a:off x="0" y="0"/>
+          <a:ext cx="0" cy="0"/>
+          <a:chOff x="0" y="0"/>
+          <a:chExt cx="0" cy="0"/>
+        </a:xfrm>
+      </p:grpSpPr>
+      <p:sp>
+        <p:nvSpPr>
+          <p:cNvPr id="2" name="Slide Number Placeholder 1">
+            <a:extLst>
+              <a:ext uri="{FF2B5EF4-FFF2-40B4-BE49-F238E27FC236}">
+                <a16:creationId xmlns:a16="http://schemas.microsoft.com/office/drawing/2014/main" id="{6B96C410-2984-9D52-1C4A-7AECF2A14996}"/>
+              </a:ext>
+            </a:extLst>
+          </p:cNvPr>
+          <p:cNvSpPr>
+            <a:spLocks noGrp="1"/>
+          </p:cNvSpPr>
+          <p:nvPr>
+            <p:ph type="sldNum" sz="quarter" idx="5"/>
+          </p:nvPr>
+        </p:nvSpPr>
+        <p:spPr/>
+        <p:txBody>
+          <a:bodyPr/>
+          <a:lstStyle/>
+          <a:p>
+            <a:fld id="{2BF067CD-8E6B-4360-9AA8-C5DF2A48A6D1}" type="slidenum">
+              <a:rPr lang="en-US" noProof="0" smtClean="0"/>
+              <a:pPr/>
+              <a:t>28</a:t>
+            </a:fld>
+            <a:endParaRPr lang="en-US" noProof="0" dirty="0"/>
+          </a:p>
+        </p:txBody>
+      </p:sp>
+      <p:sp>
+        <p:nvSpPr>
+          <p:cNvPr id="3" name="Text Placeholder 2">
+            <a:extLst>
+              <a:ext uri="{FF2B5EF4-FFF2-40B4-BE49-F238E27FC236}">
+                <a16:creationId xmlns:a16="http://schemas.microsoft.com/office/drawing/2014/main" id="{16E76285-FEA7-2C6C-943C-59C55FA2E3B4}"/>
+              </a:ext>
+            </a:extLst>
+          </p:cNvPr>
+          <p:cNvSpPr>
+            <a:spLocks noGrp="1"/>
+          </p:cNvSpPr>
+          <p:nvPr>
+            <p:ph type="body" sz="quarter" idx="10"/>
+          </p:nvPr>
+        </p:nvSpPr>
+        <p:spPr/>
+        <p:txBody>
+          <a:bodyPr/>
+          <a:lstStyle/>
+          <a:p>
+            <a:r>
+              <a:rPr lang="bg-BG" dirty="0"/>
+              <a:t>Натискаме с </a:t>
+            </a:r>
+            <a:r>
+              <a:rPr lang="bg-BG" b="1" dirty="0"/>
+              <a:t>десен бутон</a:t>
+            </a:r>
+            <a:r>
+              <a:rPr lang="bg-BG" dirty="0"/>
+              <a:t>, извън таблицата, и избираме </a:t>
+            </a:r>
+            <a:r>
+              <a:rPr lang="en-US" dirty="0"/>
+              <a:t>[</a:t>
+            </a:r>
+            <a:r>
+              <a:rPr lang="en-US" b="1" dirty="0">
+                <a:latin typeface="Consolas" panose="020B0609020204030204" pitchFamily="49" charset="0"/>
+              </a:rPr>
+              <a:t>Relationships</a:t>
+            </a:r>
+            <a:r>
+              <a:rPr lang="en-US" dirty="0"/>
+              <a:t>]</a:t>
+            </a:r>
+          </a:p>
+        </p:txBody>
+      </p:sp>
+      <p:sp>
+        <p:nvSpPr>
+          <p:cNvPr id="4" name="Title 3">
+            <a:extLst>
+              <a:ext uri="{FF2B5EF4-FFF2-40B4-BE49-F238E27FC236}">
+                <a16:creationId xmlns:a16="http://schemas.microsoft.com/office/drawing/2014/main" id="{190798C0-A472-FC18-D063-1E2A1EB8E6D1}"/>
+              </a:ext>
+            </a:extLst>
+          </p:cNvPr>
+          <p:cNvSpPr>
+            <a:spLocks noGrp="1"/>
+          </p:cNvSpPr>
+          <p:nvPr>
+            <p:ph type="title"/>
+          </p:nvPr>
+        </p:nvSpPr>
+        <p:spPr/>
+        <p:txBody>
+          <a:bodyPr/>
+          <a:lstStyle/>
+          <a:p>
+            <a:r>
+              <a:rPr lang="bg-BG" dirty="0"/>
+              <a:t>Създаване на връзка между таблици (</a:t>
+            </a:r>
+            <a:r>
+              <a:rPr lang="en-US" dirty="0"/>
+              <a:t>7</a:t>
+            </a:r>
+            <a:r>
+              <a:rPr lang="bg-BG" dirty="0"/>
+              <a:t>)</a:t>
+            </a:r>
+            <a:endParaRPr lang="en-US" dirty="0"/>
+          </a:p>
+        </p:txBody>
+      </p:sp>
+      <p:pic>
+        <p:nvPicPr>
+          <p:cNvPr id="6" name="Picture 5">
+            <a:extLst>
+              <a:ext uri="{FF2B5EF4-FFF2-40B4-BE49-F238E27FC236}">
+                <a16:creationId xmlns:a16="http://schemas.microsoft.com/office/drawing/2014/main" id="{22F0AA16-9363-4BF7-16A2-907EE133E4D6}"/>
+              </a:ext>
+            </a:extLst>
+          </p:cNvPr>
+          <p:cNvPicPr>
+            <a:picLocks noChangeAspect="1"/>
+          </p:cNvPicPr>
+          <p:nvPr/>
+        </p:nvPicPr>
+        <p:blipFill>
+          <a:blip r:embed="rId2"/>
+          <a:stretch>
+            <a:fillRect/>
+          </a:stretch>
+        </p:blipFill>
+        <p:spPr>
+          <a:xfrm>
+            <a:off x="2537916" y="2799000"/>
+            <a:ext cx="7116168" cy="3486637"/>
+          </a:xfrm>
+          <a:prstGeom prst="rect">
+            <a:avLst/>
+          </a:prstGeom>
+          <a:ln>
+            <a:solidFill>
+              <a:schemeClr val="bg2">
+                <a:lumMod val="75000"/>
+              </a:schemeClr>
+            </a:solidFill>
+          </a:ln>
+        </p:spPr>
+      </p:pic>
+      <p:sp>
+        <p:nvSpPr>
+          <p:cNvPr id="7" name="Rectangle: Rounded Corners 6">
+            <a:extLst>
+              <a:ext uri="{FF2B5EF4-FFF2-40B4-BE49-F238E27FC236}">
+                <a16:creationId xmlns:a16="http://schemas.microsoft.com/office/drawing/2014/main" id="{2D19D88C-4600-1806-1A09-3037077E429A}"/>
+              </a:ext>
+            </a:extLst>
+          </p:cNvPr>
+          <p:cNvSpPr/>
+          <p:nvPr/>
+        </p:nvSpPr>
+        <p:spPr>
+          <a:xfrm>
+            <a:off x="6906000" y="4429818"/>
+            <a:ext cx="2655000" cy="225000"/>
+          </a:xfrm>
+          <a:prstGeom prst="roundRect">
+            <a:avLst>
+              <a:gd name="adj" fmla="val 5385"/>
+            </a:avLst>
+          </a:prstGeom>
+          <a:noFill/>
+          <a:ln w="57150">
+            <a:solidFill>
+              <a:schemeClr val="tx1"/>
+            </a:solidFill>
+            <a:prstDash val="solid"/>
+          </a:ln>
+        </p:spPr>
+        <p:style>
+          <a:lnRef idx="2">
+            <a:schemeClr val="accent1">
+              <a:shade val="50000"/>
+            </a:schemeClr>
+          </a:lnRef>
+          <a:fillRef idx="1">
+            <a:schemeClr val="accent1"/>
+          </a:fillRef>
+          <a:effectRef idx="0">
+            <a:schemeClr val="accent1"/>
+          </a:effectRef>
+          <a:fontRef idx="minor">
+            <a:schemeClr val="lt1"/>
+          </a:fontRef>
+        </p:style>
+        <p:txBody>
+          <a:bodyPr rtlCol="0" anchor="t"/>
+          <a:lstStyle/>
+          <a:p>
+            <a:pPr algn="ctr"/>
+            <a:endParaRPr lang="en-US" sz="2799" b="1" dirty="0">
+              <a:solidFill>
+                <a:srgbClr val="FBEEDC"/>
+              </a:solidFill>
+              <a:effectLst>
+                <a:outerShdw blurRad="38100" dist="38100" dir="2700000" algn="tl">
+                  <a:srgbClr val="000000">
+                    <a:alpha val="43137"/>
+                  </a:srgbClr>
+                </a:outerShdw>
+              </a:effectLst>
+              <a:latin typeface="Consolas" panose="020B0609020204030204" pitchFamily="49" charset="0"/>
+            </a:endParaRPr>
+          </a:p>
+        </p:txBody>
+      </p:sp>
+    </p:spTree>
+    <p:extLst>
+      <p:ext uri="{BB962C8B-B14F-4D97-AF65-F5344CB8AC3E}">
+        <p14:creationId xmlns:p14="http://schemas.microsoft.com/office/powerpoint/2010/main" val="1965273606"/>
+      </p:ext>
+    </p:extLst>
+  </p:cSld>
+  <p:clrMapOvr>
+    <a:masterClrMapping/>
+  </p:clrMapOvr>
+  <mc:AlternateContent xmlns:mc="http://schemas.openxmlformats.org/markup-compatibility/2006" xmlns:p14="http://schemas.microsoft.com/office/powerpoint/2010/main">
+    <mc:Choice Requires="p14">
+      <p:transition spd="slow" p14:dur="2000" advClick="0" advTm="5000"/>
+    </mc:Choice>
+    <mc:Fallback xmlns="">
+      <p:transition spd="slow" advClick="0" advTm="5000"/>
+    </mc:Fallback>
+  </mc:AlternateContent>
+  <p:timing>
+    <p:tnLst>
+      <p:par>
+        <p:cTn id="1" dur="indefinite" restart="never" nodeType="tmRoot">
+          <p:childTnLst>
+            <p:seq concurrent="1" nextAc="seek">
+              <p:cTn id="2" dur="indefinite" nodeType="mainSeq">
+                <p:childTnLst>
+                  <p:par>
+                    <p:cTn id="3" fill="hold">
+                      <p:stCondLst>
+                        <p:cond delay="indefinite"/>
+                      </p:stCondLst>
+                      <p:childTnLst>
+                        <p:par>
+                          <p:cTn id="4" fill="hold">
+                            <p:stCondLst>
+                              <p:cond delay="0"/>
+                            </p:stCondLst>
+                            <p:childTnLst>
+                              <p:par>
+                                <p:cTn id="5" presetID="1" presetClass="entr" presetSubtype="0" fill="hold" grpId="0" nodeType="clickEffect">
+                                  <p:stCondLst>
+                                    <p:cond delay="0"/>
+                                  </p:stCondLst>
+                                  <p:childTnLst>
+                                    <p:set>
+                                      <p:cBhvr>
+                                        <p:cTn id="6" dur="1" fill="hold">
+                                          <p:stCondLst>
+                                            <p:cond delay="0"/>
+                                          </p:stCondLst>
+                                        </p:cTn>
+                                        <p:tgtEl>
+                                          <p:spTgt spid="7"/>
+                                        </p:tgtEl>
+                                        <p:attrNameLst>
+                                          <p:attrName>style.visibility</p:attrName>
+                                        </p:attrNameLst>
+                                      </p:cBhvr>
+                                      <p:to>
+                                        <p:strVal val="visible"/>
+                                      </p:to>
+                                    </p:set>
+                                  </p:childTnLst>
+                                </p:cTn>
+                              </p:par>
+                            </p:childTnLst>
+                          </p:cTn>
+                        </p:par>
+                      </p:childTnLst>
+                    </p:cTn>
+                  </p:par>
+                </p:childTnLst>
+              </p:cTn>
+              <p:prevCondLst>
+                <p:cond evt="onPrev" delay="0">
+                  <p:tgtEl>
+                    <p:sldTgt/>
+                  </p:tgtEl>
+                </p:cond>
+              </p:prevCondLst>
+              <p:nextCondLst>
+                <p:cond evt="onNext" delay="0">
+                  <p:tgtEl>
+                    <p:sldTgt/>
+                  </p:tgtEl>
+                </p:cond>
+              </p:nextCondLst>
+            </p:seq>
+          </p:childTnLst>
+        </p:cTn>
+      </p:par>
+    </p:tnLst>
+    <p:bldLst>
+      <p:bldP spid="7" grpId="0" animBg="1"/>
+    </p:bldLst>
+  </p:timing>
+</p:sld>
+</file>
+
+<file path=ppt/slides/slide29.xml><?xml version="1.0" encoding="utf-8"?>
+<p:sld xmlns:a="http://schemas.openxmlformats.org/drawingml/2006/main" xmlns:r="http://schemas.openxmlformats.org/officeDocument/2006/relationships" xmlns:p="http://schemas.openxmlformats.org/presentationml/2006/main">
+  <p:cSld>
+    <p:spTree>
+      <p:nvGrpSpPr>
+        <p:cNvPr id="1" name=""/>
+        <p:cNvGrpSpPr/>
+        <p:nvPr/>
+      </p:nvGrpSpPr>
+      <p:grpSpPr>
+        <a:xfrm>
+          <a:off x="0" y="0"/>
+          <a:ext cx="0" cy="0"/>
+          <a:chOff x="0" y="0"/>
+          <a:chExt cx="0" cy="0"/>
+        </a:xfrm>
+      </p:grpSpPr>
+      <p:sp>
+        <p:nvSpPr>
+          <p:cNvPr id="2" name="Slide Number Placeholder 1">
+            <a:extLst>
+              <a:ext uri="{FF2B5EF4-FFF2-40B4-BE49-F238E27FC236}">
+                <a16:creationId xmlns:a16="http://schemas.microsoft.com/office/drawing/2014/main" id="{238C0FC9-427A-96A8-8F58-B6E73FFA868E}"/>
+              </a:ext>
+            </a:extLst>
+          </p:cNvPr>
+          <p:cNvSpPr>
+            <a:spLocks noGrp="1"/>
+          </p:cNvSpPr>
+          <p:nvPr>
+            <p:ph type="sldNum" sz="quarter" idx="5"/>
+          </p:nvPr>
+        </p:nvSpPr>
+        <p:spPr/>
+        <p:txBody>
+          <a:bodyPr/>
+          <a:lstStyle/>
+          <a:p>
+            <a:fld id="{2BF067CD-8E6B-4360-9AA8-C5DF2A48A6D1}" type="slidenum">
+              <a:rPr lang="en-US" noProof="0" smtClean="0"/>
+              <a:pPr/>
+              <a:t>29</a:t>
+            </a:fld>
+            <a:endParaRPr lang="en-US" noProof="0" dirty="0"/>
+          </a:p>
+        </p:txBody>
+      </p:sp>
+      <p:sp>
+        <p:nvSpPr>
+          <p:cNvPr id="3" name="Text Placeholder 2">
+            <a:extLst>
+              <a:ext uri="{FF2B5EF4-FFF2-40B4-BE49-F238E27FC236}">
+                <a16:creationId xmlns:a16="http://schemas.microsoft.com/office/drawing/2014/main" id="{FD1B098B-7A2F-36E5-EB81-FAC862CBE650}"/>
+              </a:ext>
+            </a:extLst>
+          </p:cNvPr>
+          <p:cNvSpPr>
+            <a:spLocks noGrp="1"/>
+          </p:cNvSpPr>
+          <p:nvPr>
+            <p:ph type="body" sz="quarter" idx="10"/>
+          </p:nvPr>
+        </p:nvSpPr>
+        <p:spPr>
+          <a:xfrm>
+            <a:off x="-24000" y="1126734"/>
+            <a:ext cx="12474027" cy="5528766"/>
+          </a:xfrm>
+        </p:spPr>
+        <p:txBody>
+          <a:bodyPr/>
+          <a:lstStyle/>
+          <a:p>
+            <a:r>
+              <a:rPr lang="bg-BG" dirty="0"/>
+              <a:t>Показана е новосъздадената </a:t>
+            </a:r>
+            <a:r>
+              <a:rPr lang="bg-BG" b="1" dirty="0">
+                <a:solidFill>
+                  <a:schemeClr val="bg1"/>
+                </a:solidFill>
+              </a:rPr>
+              <a:t>връзка</a:t>
+            </a:r>
+            <a:r>
+              <a:rPr lang="bg-BG" dirty="0"/>
+              <a:t> </a:t>
+            </a:r>
+            <a:r>
+              <a:rPr lang="en-US" dirty="0"/>
+              <a:t>"</a:t>
+            </a:r>
+            <a:r>
+              <a:rPr lang="en-US" b="1" dirty="0"/>
+              <a:t>FK_Enrollments_Students</a:t>
+            </a:r>
+            <a:r>
+              <a:rPr lang="en-US" dirty="0"/>
+              <a:t>"</a:t>
+            </a:r>
+          </a:p>
+          <a:p>
+            <a:pPr lvl="1"/>
+            <a:r>
+              <a:rPr lang="bg-BG" dirty="0"/>
+              <a:t>Това означава, че </a:t>
+            </a:r>
+            <a:r>
+              <a:rPr lang="bg-BG" b="1" dirty="0">
+                <a:solidFill>
+                  <a:schemeClr val="bg1"/>
+                </a:solidFill>
+              </a:rPr>
+              <a:t>успешно</a:t>
+            </a:r>
+            <a:r>
+              <a:rPr lang="bg-BG" dirty="0"/>
+              <a:t> сме </a:t>
+            </a:r>
+            <a:r>
+              <a:rPr lang="bg-BG" b="1" dirty="0">
+                <a:solidFill>
+                  <a:schemeClr val="bg1"/>
+                </a:solidFill>
+              </a:rPr>
+              <a:t>свързали</a:t>
+            </a:r>
+            <a:r>
+              <a:rPr lang="bg-BG" dirty="0"/>
+              <a:t> двете таблици</a:t>
+            </a:r>
+            <a:endParaRPr lang="en-US" dirty="0"/>
+          </a:p>
+        </p:txBody>
+      </p:sp>
+      <p:sp>
+        <p:nvSpPr>
+          <p:cNvPr id="4" name="Title 3">
+            <a:extLst>
+              <a:ext uri="{FF2B5EF4-FFF2-40B4-BE49-F238E27FC236}">
+                <a16:creationId xmlns:a16="http://schemas.microsoft.com/office/drawing/2014/main" id="{6D8BED58-F4F9-567E-B688-2DD06034DBC8}"/>
+              </a:ext>
+            </a:extLst>
+          </p:cNvPr>
+          <p:cNvSpPr>
+            <a:spLocks noGrp="1"/>
+          </p:cNvSpPr>
+          <p:nvPr>
+            <p:ph type="title"/>
+          </p:nvPr>
+        </p:nvSpPr>
+        <p:spPr/>
+        <p:txBody>
+          <a:bodyPr/>
+          <a:lstStyle/>
+          <a:p>
+            <a:endParaRPr lang="en-US" dirty="0"/>
+          </a:p>
+        </p:txBody>
+      </p:sp>
+      <p:pic>
+        <p:nvPicPr>
+          <p:cNvPr id="6" name="Picture 5">
+            <a:extLst>
+              <a:ext uri="{FF2B5EF4-FFF2-40B4-BE49-F238E27FC236}">
+                <a16:creationId xmlns:a16="http://schemas.microsoft.com/office/drawing/2014/main" id="{99C9CF5D-1C44-091A-7226-F9D1EBA3DB75}"/>
+              </a:ext>
+            </a:extLst>
+          </p:cNvPr>
+          <p:cNvPicPr>
+            <a:picLocks noChangeAspect="1"/>
+          </p:cNvPicPr>
+          <p:nvPr/>
+        </p:nvPicPr>
+        <p:blipFill>
+          <a:blip r:embed="rId2"/>
+          <a:stretch>
+            <a:fillRect/>
+          </a:stretch>
+        </p:blipFill>
+        <p:spPr>
+          <a:xfrm>
+            <a:off x="2894049" y="2422087"/>
+            <a:ext cx="6403901" cy="4084913"/>
+          </a:xfrm>
+          <a:prstGeom prst="rect">
+            <a:avLst/>
+          </a:prstGeom>
+        </p:spPr>
+      </p:pic>
+      <p:sp>
+        <p:nvSpPr>
+          <p:cNvPr id="7" name="Rectangle: Rounded Corners 6">
+            <a:extLst>
+              <a:ext uri="{FF2B5EF4-FFF2-40B4-BE49-F238E27FC236}">
+                <a16:creationId xmlns:a16="http://schemas.microsoft.com/office/drawing/2014/main" id="{3E5EACD5-14C6-C25F-568F-C8595A9D313F}"/>
+              </a:ext>
+            </a:extLst>
+          </p:cNvPr>
+          <p:cNvSpPr/>
+          <p:nvPr/>
+        </p:nvSpPr>
+        <p:spPr>
+          <a:xfrm>
+            <a:off x="3081000" y="3069000"/>
+            <a:ext cx="1395000" cy="225000"/>
+          </a:xfrm>
+          <a:prstGeom prst="roundRect">
+            <a:avLst>
+              <a:gd name="adj" fmla="val 5385"/>
+            </a:avLst>
+          </a:prstGeom>
+          <a:noFill/>
+          <a:ln w="57150">
+            <a:solidFill>
+              <a:schemeClr val="tx1"/>
+            </a:solidFill>
+            <a:prstDash val="solid"/>
+          </a:ln>
+        </p:spPr>
+        <p:style>
+          <a:lnRef idx="2">
+            <a:schemeClr val="accent1">
+              <a:shade val="50000"/>
+            </a:schemeClr>
+          </a:lnRef>
+          <a:fillRef idx="1">
+            <a:schemeClr val="accent1"/>
+          </a:fillRef>
+          <a:effectRef idx="0">
+            <a:schemeClr val="accent1"/>
+          </a:effectRef>
+          <a:fontRef idx="minor">
+            <a:schemeClr val="lt1"/>
+          </a:fontRef>
+        </p:style>
+        <p:txBody>
+          <a:bodyPr rtlCol="0" anchor="t"/>
+          <a:lstStyle/>
+          <a:p>
+            <a:pPr algn="ctr"/>
+            <a:endParaRPr lang="en-US" sz="2799" b="1" dirty="0">
+              <a:solidFill>
+                <a:srgbClr val="FBEEDC"/>
+              </a:solidFill>
+              <a:effectLst>
+                <a:outerShdw blurRad="38100" dist="38100" dir="2700000" algn="tl">
+                  <a:srgbClr val="000000">
+                    <a:alpha val="43137"/>
+                  </a:srgbClr>
+                </a:outerShdw>
+              </a:effectLst>
+              <a:latin typeface="Consolas" panose="020B0609020204030204" pitchFamily="49" charset="0"/>
+            </a:endParaRPr>
+          </a:p>
+        </p:txBody>
+      </p:sp>
+    </p:spTree>
+    <p:extLst>
+      <p:ext uri="{BB962C8B-B14F-4D97-AF65-F5344CB8AC3E}">
+        <p14:creationId xmlns:p14="http://schemas.microsoft.com/office/powerpoint/2010/main" val="567789378"/>
+      </p:ext>
+    </p:extLst>
+  </p:cSld>
+  <p:clrMapOvr>
+    <a:masterClrMapping/>
+  </p:clrMapOvr>
+  <mc:AlternateContent xmlns:mc="http://schemas.openxmlformats.org/markup-compatibility/2006" xmlns:p14="http://schemas.microsoft.com/office/powerpoint/2010/main">
+    <mc:Choice Requires="p14">
+      <p:transition spd="slow" p14:dur="2000" advClick="0" advTm="5000"/>
+    </mc:Choice>
+    <mc:Fallback xmlns="">
+      <p:transition spd="slow" advClick="0" advTm="5000"/>
+    </mc:Fallback>
+  </mc:AlternateContent>
+  <p:timing>
+    <p:tnLst>
+      <p:par>
+        <p:cTn id="1" dur="indefinite" restart="never" nodeType="tmRoot">
+          <p:childTnLst>
+            <p:seq concurrent="1" nextAc="seek">
+              <p:cTn id="2" dur="indefinite" nodeType="mainSeq">
+                <p:childTnLst>
+                  <p:par>
+                    <p:cTn id="3" fill="hold">
+                      <p:stCondLst>
+                        <p:cond delay="indefinite"/>
+                      </p:stCondLst>
+                      <p:childTnLst>
+                        <p:par>
+                          <p:cTn id="4" fill="hold">
+                            <p:stCondLst>
+                              <p:cond delay="0"/>
+                            </p:stCondLst>
+                            <p:childTnLst>
+                              <p:par>
+                                <p:cTn id="5" presetID="1" presetClass="entr" presetSubtype="0" fill="hold" grpId="0" nodeType="clickEffect">
+                                  <p:stCondLst>
+                                    <p:cond delay="0"/>
+                                  </p:stCondLst>
+                                  <p:childTnLst>
+                                    <p:set>
+                                      <p:cBhvr>
+                                        <p:cTn id="6" dur="1" fill="hold">
+                                          <p:stCondLst>
+                                            <p:cond delay="0"/>
+                                          </p:stCondLst>
+                                        </p:cTn>
+                                        <p:tgtEl>
+                                          <p:spTgt spid="7"/>
+                                        </p:tgtEl>
+                                        <p:attrNameLst>
+                                          <p:attrName>style.visibility</p:attrName>
+                                        </p:attrNameLst>
+                                      </p:cBhvr>
+                                      <p:to>
+                                        <p:strVal val="visible"/>
+                                      </p:to>
+                                    </p:set>
+                                  </p:childTnLst>
+                                </p:cTn>
+                              </p:par>
+                            </p:childTnLst>
+                          </p:cTn>
+                        </p:par>
+                      </p:childTnLst>
+                    </p:cTn>
+                  </p:par>
+                </p:childTnLst>
+              </p:cTn>
+              <p:prevCondLst>
+                <p:cond evt="onPrev" delay="0">
+                  <p:tgtEl>
+                    <p:sldTgt/>
+                  </p:tgtEl>
+                </p:cond>
+              </p:prevCondLst>
+              <p:nextCondLst>
+                <p:cond evt="onNext" delay="0">
+                  <p:tgtEl>
+                    <p:sldTgt/>
+                  </p:tgtEl>
+                </p:cond>
+              </p:nextCondLst>
+            </p:seq>
+          </p:childTnLst>
+        </p:cTn>
+      </p:par>
+    </p:tnLst>
+    <p:bldLst>
+      <p:bldP spid="7" grpId="0" animBg="1"/>
+    </p:bldLst>
+  </p:timing>
+</p:sld>
+</file>
+
+<file path=ppt/slides/slide3.xml><?xml version="1.0" encoding="utf-8"?>
+<p:sld xmlns:a="http://schemas.openxmlformats.org/drawingml/2006/main" xmlns:r="http://schemas.openxmlformats.org/officeDocument/2006/relationships" xmlns:p="http://schemas.openxmlformats.org/presentationml/2006/main">
+  <p:cSld>
+    <p:spTree>
+      <p:nvGrpSpPr>
+        <p:cNvPr id="1" name=""/>
+        <p:cNvGrpSpPr/>
+        <p:nvPr/>
+      </p:nvGrpSpPr>
+      <p:grpSpPr>
+        <a:xfrm>
+          <a:off x="0" y="0"/>
+          <a:ext cx="0" cy="0"/>
+          <a:chOff x="0" y="0"/>
+          <a:chExt cx="0" cy="0"/>
+        </a:xfrm>
+      </p:grpSpPr>
+      <p:sp>
+        <p:nvSpPr>
+          <p:cNvPr id="6" name="Подзаглавие 5">
+            <a:extLst>
+              <a:ext uri="{FF2B5EF4-FFF2-40B4-BE49-F238E27FC236}">
+                <a16:creationId xmlns:a16="http://schemas.microsoft.com/office/drawing/2014/main" id="{A54C885A-4871-D987-D618-691E72C67688}"/>
+              </a:ext>
+            </a:extLst>
+          </p:cNvPr>
+          <p:cNvSpPr>
+            <a:spLocks noGrp="1"/>
+          </p:cNvSpPr>
+          <p:nvPr>
+            <p:ph type="subTitle" sz="quarter" idx="11"/>
+          </p:nvPr>
+        </p:nvSpPr>
+        <p:spPr>
+          <a:xfrm>
+            <a:off x="615109" y="5855916"/>
+            <a:ext cx="10961783" cy="768084"/>
+          </a:xfrm>
+        </p:spPr>
+        <p:txBody>
+          <a:bodyPr/>
+          <a:lstStyle/>
+          <a:p>
+            <a:r>
+              <a:rPr lang="bg-BG" dirty="0"/>
+              <a:t>Таблици, редове, колони</a:t>
+            </a:r>
+          </a:p>
+        </p:txBody>
+      </p:sp>
+      <p:sp>
+        <p:nvSpPr>
+          <p:cNvPr id="8" name="Заглавие 7">
+            <a:extLst>
+              <a:ext uri="{FF2B5EF4-FFF2-40B4-BE49-F238E27FC236}">
+                <a16:creationId xmlns:a16="http://schemas.microsoft.com/office/drawing/2014/main" id="{A621C059-58CF-09A1-46D3-0B4A3F54F7F0}"/>
+              </a:ext>
+            </a:extLst>
+          </p:cNvPr>
+          <p:cNvSpPr>
+            <a:spLocks noGrp="1"/>
+          </p:cNvSpPr>
+          <p:nvPr>
+            <p:ph type="title" sz="quarter" idx="10"/>
+          </p:nvPr>
+        </p:nvSpPr>
+        <p:spPr>
+          <a:xfrm>
+            <a:off x="615109" y="4779000"/>
+            <a:ext cx="10961783" cy="768084"/>
+          </a:xfrm>
+        </p:spPr>
+        <p:txBody>
+          <a:bodyPr/>
+          <a:lstStyle/>
+          <a:p>
+            <a:r>
+              <a:rPr lang="ru-RU" dirty="0"/>
+              <a:t>Таблици, първичен ключ и външен ключ</a:t>
+            </a:r>
+            <a:endParaRPr lang="bg-BG" dirty="0"/>
+          </a:p>
+        </p:txBody>
+      </p:sp>
+      <p:pic>
+        <p:nvPicPr>
+          <p:cNvPr id="7" name="Picture 6" descr="A logo of a server&#10;&#10;Description automatically generated">
+            <a:extLst>
+              <a:ext uri="{FF2B5EF4-FFF2-40B4-BE49-F238E27FC236}">
+                <a16:creationId xmlns:a16="http://schemas.microsoft.com/office/drawing/2014/main" id="{2EEC3CFF-BA28-A5AD-EC33-50B275D5F6A3}"/>
+              </a:ext>
+            </a:extLst>
+          </p:cNvPr>
+          <p:cNvPicPr>
+            <a:picLocks noChangeAspect="1"/>
+          </p:cNvPicPr>
+          <p:nvPr/>
+        </p:nvPicPr>
+        <p:blipFill rotWithShape="1">
+          <a:blip r:embed="rId3">
             <a:extLst>
               <a:ext uri="{28A0092B-C50C-407E-A947-70E740481C1C}">
                 <a14:useLocalDpi xmlns:a14="http://schemas.microsoft.com/office/drawing/2010/main" val="0"/>
               </a:ext>
             </a:extLst>
           </a:blip>
-          <a:srcRect/>
-          <a:stretch>
-            <a:fillRect/>
-          </a:stretch>
+          <a:srcRect l="8334" t="10714" r="10381" b="8334"/>
+          <a:stretch/>
         </p:blipFill>
-        <p:spPr bwMode="auto">
+        <p:spPr>
           <a:xfrm>
-            <a:off x="3351000" y="2807936"/>
-            <a:ext cx="4892310" cy="3699064"/>
+            <a:off x="4633500" y="1224000"/>
+            <a:ext cx="2925000" cy="2913061"/>
           </a:xfrm>
-          <a:prstGeom prst="rect">
+          <a:prstGeom prst="flowChartConnector">
             <a:avLst/>
           </a:prstGeom>
-          <a:noFill/>
-          <a:extLst>
-            <a:ext uri="{909E8E84-426E-40DD-AFC4-6F175D3DCCD1}">
-              <a14:hiddenFill xmlns:a14="http://schemas.microsoft.com/office/drawing/2010/main">
-                <a:solidFill>
-                  <a:srgbClr val="FFFFFF"/>
-                </a:solidFill>
-              </a14:hiddenFill>
-            </a:ext>
-          </a:extLst>
         </p:spPr>
       </p:pic>
     </p:spTree>
     <p:extLst>
       <p:ext uri="{BB962C8B-B14F-4D97-AF65-F5344CB8AC3E}">
-        <p14:creationId xmlns:p14="http://schemas.microsoft.com/office/powerpoint/2010/main" val="3862278538"/>
+        <p14:creationId xmlns:p14="http://schemas.microsoft.com/office/powerpoint/2010/main" val="3270496735"/>
       </p:ext>
     </p:extLst>
   </p:cSld>
@@ -15612,7 +19604,7 @@
 </p:sld>
 </file>
 
-<file path=ppt/slides/slide23.xml><?xml version="1.0" encoding="utf-8"?>
+<file path=ppt/slides/slide30.xml><?xml version="1.0" encoding="utf-8"?>
 <p:sld xmlns:a="http://schemas.openxmlformats.org/drawingml/2006/main" xmlns:r="http://schemas.openxmlformats.org/officeDocument/2006/relationships" xmlns:p="http://schemas.openxmlformats.org/presentationml/2006/main">
   <p:cSld>
     <p:spTree>
@@ -16250,7 +20242,7 @@
             <a:fld id="{2BF067CD-8E6B-4360-9AA8-C5DF2A48A6D1}" type="slidenum">
               <a:rPr lang="en-US" noProof="0" smtClean="0"/>
               <a:pPr/>
-              <a:t>23</a:t>
+              <a:t>30</a:t>
             </a:fld>
             <a:endParaRPr lang="en-US" noProof="0" dirty="0"/>
           </a:p>
@@ -16485,7 +20477,7 @@
 </p:sld>
 </file>
 
-<file path=ppt/slides/slide24.xml><?xml version="1.0" encoding="utf-8"?>
+<file path=ppt/slides/slide31.xml><?xml version="1.0" encoding="utf-8"?>
 <p:sld xmlns:a="http://schemas.openxmlformats.org/drawingml/2006/main" xmlns:r="http://schemas.openxmlformats.org/officeDocument/2006/relationships" xmlns:p="http://schemas.openxmlformats.org/presentationml/2006/main">
   <p:cSld>
     <p:spTree>
@@ -16675,7 +20667,7 @@
 </p:sld>
 </file>
 
-<file path=ppt/slides/slide25.xml><?xml version="1.0" encoding="utf-8"?>
+<file path=ppt/slides/slide32.xml><?xml version="1.0" encoding="utf-8"?>
 <p:sld xmlns:a="http://schemas.openxmlformats.org/drawingml/2006/main" xmlns:r="http://schemas.openxmlformats.org/officeDocument/2006/relationships" xmlns:p="http://schemas.openxmlformats.org/presentationml/2006/main">
   <p:cSld>
     <p:spTree>
@@ -17031,7 +21023,7 @@
             <a:fld id="{2BF067CD-8E6B-4360-9AA8-C5DF2A48A6D1}" type="slidenum">
               <a:rPr lang="en-US" noProof="0" smtClean="0"/>
               <a:pPr/>
-              <a:t>25</a:t>
+              <a:t>32</a:t>
             </a:fld>
             <a:endParaRPr lang="en-US" noProof="0" dirty="0"/>
           </a:p>
@@ -17041,146 +21033,6 @@
     <p:extLst>
       <p:ext uri="{BB962C8B-B14F-4D97-AF65-F5344CB8AC3E}">
         <p14:creationId xmlns:p14="http://schemas.microsoft.com/office/powerpoint/2010/main" val="1732859079"/>
-      </p:ext>
-    </p:extLst>
-  </p:cSld>
-  <p:clrMapOvr>
-    <a:masterClrMapping/>
-  </p:clrMapOvr>
-  <mc:AlternateContent xmlns:mc="http://schemas.openxmlformats.org/markup-compatibility/2006" xmlns:p14="http://schemas.microsoft.com/office/powerpoint/2010/main">
-    <mc:Choice Requires="p14">
-      <p:transition spd="slow" p14:dur="2000" advClick="0" advTm="5000"/>
-    </mc:Choice>
-    <mc:Fallback xmlns="">
-      <p:transition spd="slow" advClick="0" advTm="5000"/>
-    </mc:Fallback>
-  </mc:AlternateContent>
-</p:sld>
-</file>
-
-<file path=ppt/slides/slide3.xml><?xml version="1.0" encoding="utf-8"?>
-<p:sld xmlns:a="http://schemas.openxmlformats.org/drawingml/2006/main" xmlns:r="http://schemas.openxmlformats.org/officeDocument/2006/relationships" xmlns:p="http://schemas.openxmlformats.org/presentationml/2006/main">
-  <p:cSld>
-    <p:spTree>
-      <p:nvGrpSpPr>
-        <p:cNvPr id="1" name=""/>
-        <p:cNvGrpSpPr/>
-        <p:nvPr/>
-      </p:nvGrpSpPr>
-      <p:grpSpPr>
-        <a:xfrm>
-          <a:off x="0" y="0"/>
-          <a:ext cx="0" cy="0"/>
-          <a:chOff x="0" y="0"/>
-          <a:chExt cx="0" cy="0"/>
-        </a:xfrm>
-      </p:grpSpPr>
-      <p:sp>
-        <p:nvSpPr>
-          <p:cNvPr id="6" name="Подзаглавие 5">
-            <a:extLst>
-              <a:ext uri="{FF2B5EF4-FFF2-40B4-BE49-F238E27FC236}">
-                <a16:creationId xmlns:a16="http://schemas.microsoft.com/office/drawing/2014/main" id="{A54C885A-4871-D987-D618-691E72C67688}"/>
-              </a:ext>
-            </a:extLst>
-          </p:cNvPr>
-          <p:cNvSpPr>
-            <a:spLocks noGrp="1"/>
-          </p:cNvSpPr>
-          <p:nvPr>
-            <p:ph type="subTitle" sz="quarter" idx="11"/>
-          </p:nvPr>
-        </p:nvSpPr>
-        <p:spPr>
-          <a:xfrm>
-            <a:off x="615109" y="5855916"/>
-            <a:ext cx="10961783" cy="768084"/>
-          </a:xfrm>
-        </p:spPr>
-        <p:txBody>
-          <a:bodyPr/>
-          <a:lstStyle/>
-          <a:p>
-            <a:r>
-              <a:rPr lang="bg-BG" dirty="0"/>
-              <a:t>Таблици, редове, колони</a:t>
-            </a:r>
-          </a:p>
-        </p:txBody>
-      </p:sp>
-      <p:sp>
-        <p:nvSpPr>
-          <p:cNvPr id="8" name="Заглавие 7">
-            <a:extLst>
-              <a:ext uri="{FF2B5EF4-FFF2-40B4-BE49-F238E27FC236}">
-                <a16:creationId xmlns:a16="http://schemas.microsoft.com/office/drawing/2014/main" id="{A621C059-58CF-09A1-46D3-0B4A3F54F7F0}"/>
-              </a:ext>
-            </a:extLst>
-          </p:cNvPr>
-          <p:cNvSpPr>
-            <a:spLocks noGrp="1"/>
-          </p:cNvSpPr>
-          <p:nvPr>
-            <p:ph type="title" sz="quarter" idx="10"/>
-          </p:nvPr>
-        </p:nvSpPr>
-        <p:spPr>
-          <a:xfrm>
-            <a:off x="615109" y="4779000"/>
-            <a:ext cx="10961783" cy="768084"/>
-          </a:xfrm>
-        </p:spPr>
-        <p:txBody>
-          <a:bodyPr/>
-          <a:lstStyle/>
-          <a:p>
-            <a:r>
-              <a:rPr lang="ru-RU" dirty="0"/>
-              <a:t>Таблици, първичен ключ и външен ключ</a:t>
-            </a:r>
-            <a:endParaRPr lang="bg-BG" dirty="0"/>
-          </a:p>
-        </p:txBody>
-      </p:sp>
-      <p:pic>
-        <p:nvPicPr>
-          <p:cNvPr id="7" name="Picture 6" descr="A logo of a server&#10;&#10;Description automatically generated">
-            <a:extLst>
-              <a:ext uri="{FF2B5EF4-FFF2-40B4-BE49-F238E27FC236}">
-                <a16:creationId xmlns:a16="http://schemas.microsoft.com/office/drawing/2014/main" id="{2EEC3CFF-BA28-A5AD-EC33-50B275D5F6A3}"/>
-              </a:ext>
-            </a:extLst>
-          </p:cNvPr>
-          <p:cNvPicPr>
-            <a:picLocks noChangeAspect="1"/>
-          </p:cNvPicPr>
-          <p:nvPr/>
-        </p:nvPicPr>
-        <p:blipFill rotWithShape="1">
-          <a:blip r:embed="rId3">
-            <a:extLst>
-              <a:ext uri="{28A0092B-C50C-407E-A947-70E740481C1C}">
-                <a14:useLocalDpi xmlns:a14="http://schemas.microsoft.com/office/drawing/2010/main" val="0"/>
-              </a:ext>
-            </a:extLst>
-          </a:blip>
-          <a:srcRect l="8334" t="10714" r="10381" b="8334"/>
-          <a:stretch/>
-        </p:blipFill>
-        <p:spPr>
-          <a:xfrm>
-            <a:off x="4633500" y="1224000"/>
-            <a:ext cx="2925000" cy="2913061"/>
-          </a:xfrm>
-          <a:prstGeom prst="flowChartConnector">
-            <a:avLst/>
-          </a:prstGeom>
-        </p:spPr>
-      </p:pic>
-    </p:spTree>
-    <p:extLst>
-      <p:ext uri="{BB962C8B-B14F-4D97-AF65-F5344CB8AC3E}">
-        <p14:creationId xmlns:p14="http://schemas.microsoft.com/office/powerpoint/2010/main" val="3270496735"/>
       </p:ext>
     </p:extLst>
   </p:cSld>

</xml_diff>

<commit_message>
Fixing TODOs for Modeling Databases slides
</commit_message>
<xml_diff>
--- a/Courses/Software-Sciences/Module-3-Databases-New/07-Modeling-Databases/06-Modeling-Databases.pptx
+++ b/Courses/Software-Sciences/Module-3-Databases-New/07-Modeling-Databases/06-Modeling-Databases.pptx
@@ -469,7 +469,7 @@
           <a:p>
             <a:fld id="{4E087215-0C8F-4762-A664-737A353EC9A4}" type="datetimeFigureOut">
               <a:rPr lang="bg-BG" smtClean="0"/>
-              <a:t>18.1.2024 г.</a:t>
+              <a:t>20.1.2024 г.</a:t>
             </a:fld>
             <a:endParaRPr lang="bg-BG"/>
           </a:p>
@@ -665,7 +665,7 @@
           <a:p>
             <a:fld id="{72D84649-876A-46C9-8472-14CB09C070D8}" type="datetimeFigureOut">
               <a:rPr lang="en-US" smtClean="0"/>
-              <a:t>18-Jan-24</a:t>
+              <a:t>1/20/2024</a:t>
             </a:fld>
             <a:endParaRPr lang="en-US"/>
           </a:p>
@@ -1162,6 +1162,252 @@
           <p:cNvPr id="7" name="Slide Number Placeholder 5">
             <a:extLst>
               <a:ext uri="{FF2B5EF4-FFF2-40B4-BE49-F238E27FC236}">
+                <a16:creationId xmlns:a16="http://schemas.microsoft.com/office/drawing/2014/main" id="{E65F1CA9-65DC-416B-8882-B3A5E415CE67}"/>
+              </a:ext>
+            </a:extLst>
+          </p:cNvPr>
+          <p:cNvSpPr txBox="1">
+            <a:spLocks/>
+          </p:cNvSpPr>
+          <p:nvPr/>
+        </p:nvSpPr>
+        <p:spPr>
+          <a:xfrm>
+            <a:off x="6488999" y="8847000"/>
+            <a:ext cx="367414" cy="297000"/>
+          </a:xfrm>
+          <a:prstGeom prst="rect">
+            <a:avLst/>
+          </a:prstGeom>
+        </p:spPr>
+        <p:txBody>
+          <a:bodyPr vert="horz" lIns="91440" tIns="45720" rIns="91440" bIns="45720" rtlCol="0" anchor="b"/>
+          <a:lstStyle>
+            <a:defPPr>
+              <a:defRPr lang="en-US"/>
+            </a:defPPr>
+            <a:lvl1pPr marL="0" algn="r" defTabSz="914400" rtl="0" eaLnBrk="1" latinLnBrk="0" hangingPunct="1">
+              <a:defRPr sz="1200" kern="1200">
+                <a:solidFill>
+                  <a:schemeClr val="tx1"/>
+                </a:solidFill>
+                <a:latin typeface="+mn-lt"/>
+                <a:ea typeface="+mn-ea"/>
+                <a:cs typeface="+mn-cs"/>
+              </a:defRPr>
+            </a:lvl1pPr>
+            <a:lvl2pPr marL="457200" algn="l" defTabSz="914400" rtl="0" eaLnBrk="1" latinLnBrk="0" hangingPunct="1">
+              <a:defRPr sz="1800" kern="1200">
+                <a:solidFill>
+                  <a:schemeClr val="tx1"/>
+                </a:solidFill>
+                <a:latin typeface="+mn-lt"/>
+                <a:ea typeface="+mn-ea"/>
+                <a:cs typeface="+mn-cs"/>
+              </a:defRPr>
+            </a:lvl2pPr>
+            <a:lvl3pPr marL="914400" algn="l" defTabSz="914400" rtl="0" eaLnBrk="1" latinLnBrk="0" hangingPunct="1">
+              <a:defRPr sz="1800" kern="1200">
+                <a:solidFill>
+                  <a:schemeClr val="tx1"/>
+                </a:solidFill>
+                <a:latin typeface="+mn-lt"/>
+                <a:ea typeface="+mn-ea"/>
+                <a:cs typeface="+mn-cs"/>
+              </a:defRPr>
+            </a:lvl3pPr>
+            <a:lvl4pPr marL="1371600" algn="l" defTabSz="914400" rtl="0" eaLnBrk="1" latinLnBrk="0" hangingPunct="1">
+              <a:defRPr sz="1800" kern="1200">
+                <a:solidFill>
+                  <a:schemeClr val="tx1"/>
+                </a:solidFill>
+                <a:latin typeface="+mn-lt"/>
+                <a:ea typeface="+mn-ea"/>
+                <a:cs typeface="+mn-cs"/>
+              </a:defRPr>
+            </a:lvl4pPr>
+            <a:lvl5pPr marL="1828800" algn="l" defTabSz="914400" rtl="0" eaLnBrk="1" latinLnBrk="0" hangingPunct="1">
+              <a:defRPr sz="1800" kern="1200">
+                <a:solidFill>
+                  <a:schemeClr val="tx1"/>
+                </a:solidFill>
+                <a:latin typeface="+mn-lt"/>
+                <a:ea typeface="+mn-ea"/>
+                <a:cs typeface="+mn-cs"/>
+              </a:defRPr>
+            </a:lvl5pPr>
+            <a:lvl6pPr marL="2286000" algn="l" defTabSz="914400" rtl="0" eaLnBrk="1" latinLnBrk="0" hangingPunct="1">
+              <a:defRPr sz="1800" kern="1200">
+                <a:solidFill>
+                  <a:schemeClr val="tx1"/>
+                </a:solidFill>
+                <a:latin typeface="+mn-lt"/>
+                <a:ea typeface="+mn-ea"/>
+                <a:cs typeface="+mn-cs"/>
+              </a:defRPr>
+            </a:lvl6pPr>
+            <a:lvl7pPr marL="2743200" algn="l" defTabSz="914400" rtl="0" eaLnBrk="1" latinLnBrk="0" hangingPunct="1">
+              <a:defRPr sz="1800" kern="1200">
+                <a:solidFill>
+                  <a:schemeClr val="tx1"/>
+                </a:solidFill>
+                <a:latin typeface="+mn-lt"/>
+                <a:ea typeface="+mn-ea"/>
+                <a:cs typeface="+mn-cs"/>
+              </a:defRPr>
+            </a:lvl7pPr>
+            <a:lvl8pPr marL="3200400" algn="l" defTabSz="914400" rtl="0" eaLnBrk="1" latinLnBrk="0" hangingPunct="1">
+              <a:defRPr sz="1800" kern="1200">
+                <a:solidFill>
+                  <a:schemeClr val="tx1"/>
+                </a:solidFill>
+                <a:latin typeface="+mn-lt"/>
+                <a:ea typeface="+mn-ea"/>
+                <a:cs typeface="+mn-cs"/>
+              </a:defRPr>
+            </a:lvl8pPr>
+            <a:lvl9pPr marL="3657600" algn="l" defTabSz="914400" rtl="0" eaLnBrk="1" latinLnBrk="0" hangingPunct="1">
+              <a:defRPr sz="1800" kern="1200">
+                <a:solidFill>
+                  <a:schemeClr val="tx1"/>
+                </a:solidFill>
+                <a:latin typeface="+mn-lt"/>
+                <a:ea typeface="+mn-ea"/>
+                <a:cs typeface="+mn-cs"/>
+              </a:defRPr>
+            </a:lvl9pPr>
+          </a:lstStyle>
+          <a:p>
+            <a:fld id="{3EBA5BD7-F043-4D1B-AA17-CD412FC534DE}" type="slidenum">
+              <a:rPr lang="en-US" smtClean="0"/>
+              <a:pPr/>
+              <a:t>38</a:t>
+            </a:fld>
+            <a:endParaRPr lang="en-US" dirty="0"/>
+          </a:p>
+        </p:txBody>
+      </p:sp>
+      <p:sp>
+        <p:nvSpPr>
+          <p:cNvPr id="5" name="Footer Placeholder 7">
+            <a:extLst>
+              <a:ext uri="{FF2B5EF4-FFF2-40B4-BE49-F238E27FC236}">
+                <a16:creationId xmlns:a16="http://schemas.microsoft.com/office/drawing/2014/main" id="{B577705D-BA44-F03C-BC9C-444C2FFBFE76}"/>
+              </a:ext>
+            </a:extLst>
+          </p:cNvPr>
+          <p:cNvSpPr>
+            <a:spLocks noGrp="1"/>
+          </p:cNvSpPr>
+          <p:nvPr>
+            <p:ph type="ftr" sz="quarter" idx="4"/>
+          </p:nvPr>
+        </p:nvSpPr>
+        <p:spPr>
+          <a:xfrm>
+            <a:off x="-1" y="8892000"/>
+            <a:ext cx="6488999" cy="252000"/>
+          </a:xfrm>
+          <a:prstGeom prst="rect">
+            <a:avLst/>
+          </a:prstGeom>
+        </p:spPr>
+        <p:txBody>
+          <a:bodyPr vert="horz" lIns="91440" tIns="45720" rIns="91440" bIns="45720" rtlCol="0" anchor="b"/>
+          <a:lstStyle>
+            <a:lvl1pPr algn="l">
+              <a:defRPr sz="1100"/>
+            </a:lvl1pPr>
+          </a:lstStyle>
+          <a:p>
+            <a:r>
+              <a:rPr lang="bg-BG" sz="1100" dirty="0"/>
+              <a:t>Работна група </a:t>
+            </a:r>
+            <a:r>
+              <a:rPr lang="bg-BG" dirty="0"/>
+              <a:t>"Образование по програмиране и ИТ"</a:t>
+            </a:r>
+            <a:r>
+              <a:rPr lang="bg-BG" sz="1100" dirty="0"/>
+              <a:t>, с подкрепата на </a:t>
+            </a:r>
+            <a:r>
+              <a:rPr lang="en-US" sz="1100" dirty="0">
+                <a:hlinkClick r:id="rId3"/>
+              </a:rPr>
+              <a:t>SoftUni</a:t>
+            </a:r>
+            <a:endParaRPr lang="en-US" sz="1100" dirty="0"/>
+          </a:p>
+        </p:txBody>
+      </p:sp>
+    </p:spTree>
+    <p:extLst>
+      <p:ext uri="{BB962C8B-B14F-4D97-AF65-F5344CB8AC3E}">
+        <p14:creationId xmlns:p14="http://schemas.microsoft.com/office/powerpoint/2010/main" val="3533300824"/>
+      </p:ext>
+    </p:extLst>
+  </p:cSld>
+  <p:clrMapOvr>
+    <a:masterClrMapping/>
+  </p:clrMapOvr>
+</p:notes>
+</file>
+
+<file path=ppt/notesSlides/notesSlide11.xml><?xml version="1.0" encoding="utf-8"?>
+<p:notes xmlns:a="http://schemas.openxmlformats.org/drawingml/2006/main" xmlns:r="http://schemas.openxmlformats.org/officeDocument/2006/relationships" xmlns:p="http://schemas.openxmlformats.org/presentationml/2006/main">
+  <p:cSld>
+    <p:spTree>
+      <p:nvGrpSpPr>
+        <p:cNvPr id="1" name=""/>
+        <p:cNvGrpSpPr/>
+        <p:nvPr/>
+      </p:nvGrpSpPr>
+      <p:grpSpPr>
+        <a:xfrm>
+          <a:off x="0" y="0"/>
+          <a:ext cx="0" cy="0"/>
+          <a:chOff x="0" y="0"/>
+          <a:chExt cx="0" cy="0"/>
+        </a:xfrm>
+      </p:grpSpPr>
+      <p:sp>
+        <p:nvSpPr>
+          <p:cNvPr id="2" name="Slide Image Placeholder 1"/>
+          <p:cNvSpPr>
+            <a:spLocks noGrp="1" noRot="1" noChangeAspect="1"/>
+          </p:cNvSpPr>
+          <p:nvPr>
+            <p:ph type="sldImg"/>
+          </p:nvPr>
+        </p:nvSpPr>
+        <p:spPr/>
+      </p:sp>
+      <p:sp>
+        <p:nvSpPr>
+          <p:cNvPr id="3" name="Notes Placeholder 2"/>
+          <p:cNvSpPr>
+            <a:spLocks noGrp="1"/>
+          </p:cNvSpPr>
+          <p:nvPr>
+            <p:ph type="body" idx="1"/>
+          </p:nvPr>
+        </p:nvSpPr>
+        <p:spPr/>
+        <p:txBody>
+          <a:bodyPr/>
+          <a:lstStyle/>
+          <a:p>
+            <a:endParaRPr lang="en-US" dirty="0"/>
+          </a:p>
+        </p:txBody>
+      </p:sp>
+      <p:sp>
+        <p:nvSpPr>
+          <p:cNvPr id="7" name="Slide Number Placeholder 5">
+            <a:extLst>
+              <a:ext uri="{FF2B5EF4-FFF2-40B4-BE49-F238E27FC236}">
                 <a16:creationId xmlns:a16="http://schemas.microsoft.com/office/drawing/2014/main" id="{5049B984-F964-47FF-8179-0A3007CE21CD}"/>
               </a:ext>
             </a:extLst>
@@ -1355,7 +1601,7 @@
 </p:notes>
 </file>
 
-<file path=ppt/notesSlides/notesSlide11.xml><?xml version="1.0" encoding="utf-8"?>
+<file path=ppt/notesSlides/notesSlide12.xml><?xml version="1.0" encoding="utf-8"?>
 <p:notes xmlns:a="http://schemas.openxmlformats.org/drawingml/2006/main" xmlns:r="http://schemas.openxmlformats.org/officeDocument/2006/relationships" xmlns:p="http://schemas.openxmlformats.org/presentationml/2006/main">
   <p:cSld>
     <p:spTree>
@@ -2454,7 +2700,7 @@
           <a:bodyPr/>
           <a:lstStyle/>
           <a:p>
-            <a:endParaRPr lang="en-BG" dirty="0"/>
+            <a:endParaRPr lang="en-US" dirty="0"/>
           </a:p>
         </p:txBody>
       </p:sp>
@@ -2475,8 +2721,7 @@
           <a:p>
             <a:fld id="{2BF067CD-8E6B-4360-9AA8-C5DF2A48A6D1}" type="slidenum">
               <a:rPr lang="en-US" smtClean="0"/>
-              <a:pPr/>
-              <a:t>13</a:t>
+              <a:t>10</a:t>
             </a:fld>
             <a:endParaRPr lang="en-US" dirty="0"/>
           </a:p>
@@ -2484,13 +2729,7 @@
       </p:sp>
       <p:sp>
         <p:nvSpPr>
-          <p:cNvPr id="6" name="Footer Placeholder 7">
-            <a:extLst>
-              <a:ext uri="{FF2B5EF4-FFF2-40B4-BE49-F238E27FC236}">
-                <a16:creationId xmlns:a16="http://schemas.microsoft.com/office/drawing/2014/main" id="{4B3FA3B5-C031-EBE4-A6A9-FC0FED84C5ED}"/>
-              </a:ext>
-            </a:extLst>
-          </p:cNvPr>
+          <p:cNvPr id="5" name="Footer Placeholder 4"/>
           <p:cNvSpPr>
             <a:spLocks noGrp="1"/>
           </p:cNvSpPr>
@@ -2498,37 +2737,25 @@
             <p:ph type="ftr" sz="quarter" idx="4"/>
           </p:nvPr>
         </p:nvSpPr>
-        <p:spPr>
-          <a:xfrm>
-            <a:off x="-1" y="8892000"/>
-            <a:ext cx="6488999" cy="252000"/>
-          </a:xfrm>
-          <a:prstGeom prst="rect">
-            <a:avLst/>
-          </a:prstGeom>
-        </p:spPr>
+        <p:spPr/>
         <p:txBody>
-          <a:bodyPr vert="horz" lIns="91440" tIns="45720" rIns="91440" bIns="45720" rtlCol="0" anchor="b"/>
-          <a:lstStyle>
-            <a:lvl1pPr algn="l">
-              <a:defRPr sz="1100"/>
-            </a:lvl1pPr>
-          </a:lstStyle>
-          <a:p>
-            <a:r>
-              <a:rPr lang="bg-BG" sz="1100" dirty="0"/>
+          <a:bodyPr/>
+          <a:lstStyle/>
+          <a:p>
+            <a:r>
+              <a:rPr lang="bg-BG" sz="1100"/>
               <a:t>Работна група </a:t>
             </a:r>
             <a:r>
-              <a:rPr lang="bg-BG" dirty="0"/>
+              <a:rPr lang="bg-BG"/>
               <a:t>"Образование по програмиране и ИТ"</a:t>
             </a:r>
             <a:r>
-              <a:rPr lang="bg-BG" sz="1100" dirty="0"/>
+              <a:rPr lang="bg-BG" sz="1100"/>
               <a:t>, с подкрепата на </a:t>
             </a:r>
             <a:r>
-              <a:rPr lang="en-US" sz="1100" dirty="0">
+              <a:rPr lang="en-US" sz="1100">
                 <a:hlinkClick r:id="rId3"/>
               </a:rPr>
               <a:t>SoftUni</a:t>
@@ -2540,7 +2767,7 @@
     </p:spTree>
     <p:extLst>
       <p:ext uri="{BB962C8B-B14F-4D97-AF65-F5344CB8AC3E}">
-        <p14:creationId xmlns:p14="http://schemas.microsoft.com/office/powerpoint/2010/main" val="1101149423"/>
+        <p14:creationId xmlns:p14="http://schemas.microsoft.com/office/powerpoint/2010/main" val="1622292189"/>
       </p:ext>
     </p:extLst>
   </p:cSld>
@@ -2594,7 +2821,7 @@
           <a:bodyPr/>
           <a:lstStyle/>
           <a:p>
-            <a:endParaRPr lang="en-US" dirty="0"/>
+            <a:endParaRPr lang="en-BG" dirty="0"/>
           </a:p>
         </p:txBody>
       </p:sp>
@@ -2615,7 +2842,8 @@
           <a:p>
             <a:fld id="{2BF067CD-8E6B-4360-9AA8-C5DF2A48A6D1}" type="slidenum">
               <a:rPr lang="en-US" smtClean="0"/>
-              <a:t>30</a:t>
+              <a:pPr/>
+              <a:t>13</a:t>
             </a:fld>
             <a:endParaRPr lang="en-US" dirty="0"/>
           </a:p>
@@ -2623,7 +2851,13 @@
       </p:sp>
       <p:sp>
         <p:nvSpPr>
-          <p:cNvPr id="5" name="Footer Placeholder 4"/>
+          <p:cNvPr id="6" name="Footer Placeholder 7">
+            <a:extLst>
+              <a:ext uri="{FF2B5EF4-FFF2-40B4-BE49-F238E27FC236}">
+                <a16:creationId xmlns:a16="http://schemas.microsoft.com/office/drawing/2014/main" id="{4B3FA3B5-C031-EBE4-A6A9-FC0FED84C5ED}"/>
+              </a:ext>
+            </a:extLst>
+          </p:cNvPr>
           <p:cNvSpPr>
             <a:spLocks noGrp="1"/>
           </p:cNvSpPr>
@@ -2631,25 +2865,37 @@
             <p:ph type="ftr" sz="quarter" idx="4"/>
           </p:nvPr>
         </p:nvSpPr>
-        <p:spPr/>
+        <p:spPr>
+          <a:xfrm>
+            <a:off x="-1" y="8892000"/>
+            <a:ext cx="6488999" cy="252000"/>
+          </a:xfrm>
+          <a:prstGeom prst="rect">
+            <a:avLst/>
+          </a:prstGeom>
+        </p:spPr>
         <p:txBody>
-          <a:bodyPr/>
-          <a:lstStyle/>
-          <a:p>
-            <a:r>
-              <a:rPr lang="bg-BG" sz="1100"/>
+          <a:bodyPr vert="horz" lIns="91440" tIns="45720" rIns="91440" bIns="45720" rtlCol="0" anchor="b"/>
+          <a:lstStyle>
+            <a:lvl1pPr algn="l">
+              <a:defRPr sz="1100"/>
+            </a:lvl1pPr>
+          </a:lstStyle>
+          <a:p>
+            <a:r>
+              <a:rPr lang="bg-BG" sz="1100" dirty="0"/>
               <a:t>Работна група </a:t>
             </a:r>
             <a:r>
-              <a:rPr lang="bg-BG"/>
+              <a:rPr lang="bg-BG" dirty="0"/>
               <a:t>"Образование по програмиране и ИТ"</a:t>
             </a:r>
             <a:r>
-              <a:rPr lang="bg-BG" sz="1100"/>
+              <a:rPr lang="bg-BG" sz="1100" dirty="0"/>
               <a:t>, с подкрепата на </a:t>
             </a:r>
             <a:r>
-              <a:rPr lang="en-US" sz="1100">
+              <a:rPr lang="en-US" sz="1100" dirty="0">
                 <a:hlinkClick r:id="rId3"/>
               </a:rPr>
               <a:t>SoftUni</a:t>
@@ -2661,7 +2907,7 @@
     </p:spTree>
     <p:extLst>
       <p:ext uri="{BB962C8B-B14F-4D97-AF65-F5344CB8AC3E}">
-        <p14:creationId xmlns:p14="http://schemas.microsoft.com/office/powerpoint/2010/main" val="1554603372"/>
+        <p14:creationId xmlns:p14="http://schemas.microsoft.com/office/powerpoint/2010/main" val="1101149423"/>
       </p:ext>
     </p:extLst>
   </p:cSld>
@@ -2721,129 +2967,22 @@
       </p:sp>
       <p:sp>
         <p:nvSpPr>
-          <p:cNvPr id="7" name="Slide Number Placeholder 5">
-            <a:extLst>
-              <a:ext uri="{FF2B5EF4-FFF2-40B4-BE49-F238E27FC236}">
-                <a16:creationId xmlns:a16="http://schemas.microsoft.com/office/drawing/2014/main" id="{E65F1CA9-65DC-416B-8882-B3A5E415CE67}"/>
-              </a:ext>
-            </a:extLst>
-          </p:cNvPr>
-          <p:cNvSpPr txBox="1">
-            <a:spLocks/>
+          <p:cNvPr id="4" name="Slide Number Placeholder 3"/>
+          <p:cNvSpPr>
+            <a:spLocks noGrp="1"/>
           </p:cNvSpPr>
-          <p:nvPr/>
+          <p:nvPr>
+            <p:ph type="sldNum" sz="quarter" idx="5"/>
+          </p:nvPr>
         </p:nvSpPr>
-        <p:spPr>
-          <a:xfrm>
-            <a:off x="6488999" y="8847000"/>
-            <a:ext cx="367414" cy="297000"/>
-          </a:xfrm>
-          <a:prstGeom prst="rect">
-            <a:avLst/>
-          </a:prstGeom>
-        </p:spPr>
+        <p:spPr/>
         <p:txBody>
-          <a:bodyPr vert="horz" lIns="91440" tIns="45720" rIns="91440" bIns="45720" rtlCol="0" anchor="b"/>
-          <a:lstStyle>
-            <a:defPPr>
-              <a:defRPr lang="en-US"/>
-            </a:defPPr>
-            <a:lvl1pPr marL="0" algn="r" defTabSz="914400" rtl="0" eaLnBrk="1" latinLnBrk="0" hangingPunct="1">
-              <a:defRPr sz="1200" kern="1200">
-                <a:solidFill>
-                  <a:schemeClr val="tx1"/>
-                </a:solidFill>
-                <a:latin typeface="+mn-lt"/>
-                <a:ea typeface="+mn-ea"/>
-                <a:cs typeface="+mn-cs"/>
-              </a:defRPr>
-            </a:lvl1pPr>
-            <a:lvl2pPr marL="457200" algn="l" defTabSz="914400" rtl="0" eaLnBrk="1" latinLnBrk="0" hangingPunct="1">
-              <a:defRPr sz="1800" kern="1200">
-                <a:solidFill>
-                  <a:schemeClr val="tx1"/>
-                </a:solidFill>
-                <a:latin typeface="+mn-lt"/>
-                <a:ea typeface="+mn-ea"/>
-                <a:cs typeface="+mn-cs"/>
-              </a:defRPr>
-            </a:lvl2pPr>
-            <a:lvl3pPr marL="914400" algn="l" defTabSz="914400" rtl="0" eaLnBrk="1" latinLnBrk="0" hangingPunct="1">
-              <a:defRPr sz="1800" kern="1200">
-                <a:solidFill>
-                  <a:schemeClr val="tx1"/>
-                </a:solidFill>
-                <a:latin typeface="+mn-lt"/>
-                <a:ea typeface="+mn-ea"/>
-                <a:cs typeface="+mn-cs"/>
-              </a:defRPr>
-            </a:lvl3pPr>
-            <a:lvl4pPr marL="1371600" algn="l" defTabSz="914400" rtl="0" eaLnBrk="1" latinLnBrk="0" hangingPunct="1">
-              <a:defRPr sz="1800" kern="1200">
-                <a:solidFill>
-                  <a:schemeClr val="tx1"/>
-                </a:solidFill>
-                <a:latin typeface="+mn-lt"/>
-                <a:ea typeface="+mn-ea"/>
-                <a:cs typeface="+mn-cs"/>
-              </a:defRPr>
-            </a:lvl4pPr>
-            <a:lvl5pPr marL="1828800" algn="l" defTabSz="914400" rtl="0" eaLnBrk="1" latinLnBrk="0" hangingPunct="1">
-              <a:defRPr sz="1800" kern="1200">
-                <a:solidFill>
-                  <a:schemeClr val="tx1"/>
-                </a:solidFill>
-                <a:latin typeface="+mn-lt"/>
-                <a:ea typeface="+mn-ea"/>
-                <a:cs typeface="+mn-cs"/>
-              </a:defRPr>
-            </a:lvl5pPr>
-            <a:lvl6pPr marL="2286000" algn="l" defTabSz="914400" rtl="0" eaLnBrk="1" latinLnBrk="0" hangingPunct="1">
-              <a:defRPr sz="1800" kern="1200">
-                <a:solidFill>
-                  <a:schemeClr val="tx1"/>
-                </a:solidFill>
-                <a:latin typeface="+mn-lt"/>
-                <a:ea typeface="+mn-ea"/>
-                <a:cs typeface="+mn-cs"/>
-              </a:defRPr>
-            </a:lvl6pPr>
-            <a:lvl7pPr marL="2743200" algn="l" defTabSz="914400" rtl="0" eaLnBrk="1" latinLnBrk="0" hangingPunct="1">
-              <a:defRPr sz="1800" kern="1200">
-                <a:solidFill>
-                  <a:schemeClr val="tx1"/>
-                </a:solidFill>
-                <a:latin typeface="+mn-lt"/>
-                <a:ea typeface="+mn-ea"/>
-                <a:cs typeface="+mn-cs"/>
-              </a:defRPr>
-            </a:lvl7pPr>
-            <a:lvl8pPr marL="3200400" algn="l" defTabSz="914400" rtl="0" eaLnBrk="1" latinLnBrk="0" hangingPunct="1">
-              <a:defRPr sz="1800" kern="1200">
-                <a:solidFill>
-                  <a:schemeClr val="tx1"/>
-                </a:solidFill>
-                <a:latin typeface="+mn-lt"/>
-                <a:ea typeface="+mn-ea"/>
-                <a:cs typeface="+mn-cs"/>
-              </a:defRPr>
-            </a:lvl8pPr>
-            <a:lvl9pPr marL="3657600" algn="l" defTabSz="914400" rtl="0" eaLnBrk="1" latinLnBrk="0" hangingPunct="1">
-              <a:defRPr sz="1800" kern="1200">
-                <a:solidFill>
-                  <a:schemeClr val="tx1"/>
-                </a:solidFill>
-                <a:latin typeface="+mn-lt"/>
-                <a:ea typeface="+mn-ea"/>
-                <a:cs typeface="+mn-cs"/>
-              </a:defRPr>
-            </a:lvl9pPr>
-          </a:lstStyle>
-          <a:p>
-            <a:fld id="{3EBA5BD7-F043-4D1B-AA17-CD412FC534DE}" type="slidenum">
+          <a:bodyPr/>
+          <a:lstStyle/>
+          <a:p>
+            <a:fld id="{2BF067CD-8E6B-4360-9AA8-C5DF2A48A6D1}" type="slidenum">
               <a:rPr lang="en-US" smtClean="0"/>
-              <a:pPr/>
-              <a:t>38</a:t>
+              <a:t>30</a:t>
             </a:fld>
             <a:endParaRPr lang="en-US" dirty="0"/>
           </a:p>
@@ -2851,13 +2990,7 @@
       </p:sp>
       <p:sp>
         <p:nvSpPr>
-          <p:cNvPr id="5" name="Footer Placeholder 7">
-            <a:extLst>
-              <a:ext uri="{FF2B5EF4-FFF2-40B4-BE49-F238E27FC236}">
-                <a16:creationId xmlns:a16="http://schemas.microsoft.com/office/drawing/2014/main" id="{B577705D-BA44-F03C-BC9C-444C2FFBFE76}"/>
-              </a:ext>
-            </a:extLst>
-          </p:cNvPr>
+          <p:cNvPr id="5" name="Footer Placeholder 4"/>
           <p:cNvSpPr>
             <a:spLocks noGrp="1"/>
           </p:cNvSpPr>
@@ -2865,37 +2998,25 @@
             <p:ph type="ftr" sz="quarter" idx="4"/>
           </p:nvPr>
         </p:nvSpPr>
-        <p:spPr>
-          <a:xfrm>
-            <a:off x="-1" y="8892000"/>
-            <a:ext cx="6488999" cy="252000"/>
-          </a:xfrm>
-          <a:prstGeom prst="rect">
-            <a:avLst/>
-          </a:prstGeom>
-        </p:spPr>
+        <p:spPr/>
         <p:txBody>
-          <a:bodyPr vert="horz" lIns="91440" tIns="45720" rIns="91440" bIns="45720" rtlCol="0" anchor="b"/>
-          <a:lstStyle>
-            <a:lvl1pPr algn="l">
-              <a:defRPr sz="1100"/>
-            </a:lvl1pPr>
-          </a:lstStyle>
-          <a:p>
-            <a:r>
-              <a:rPr lang="bg-BG" sz="1100" dirty="0"/>
+          <a:bodyPr/>
+          <a:lstStyle/>
+          <a:p>
+            <a:r>
+              <a:rPr lang="bg-BG" sz="1100"/>
               <a:t>Работна група </a:t>
             </a:r>
             <a:r>
-              <a:rPr lang="bg-BG" dirty="0"/>
+              <a:rPr lang="bg-BG"/>
               <a:t>"Образование по програмиране и ИТ"</a:t>
             </a:r>
             <a:r>
-              <a:rPr lang="bg-BG" sz="1100" dirty="0"/>
+              <a:rPr lang="bg-BG" sz="1100"/>
               <a:t>, с подкрепата на </a:t>
             </a:r>
             <a:r>
-              <a:rPr lang="en-US" sz="1100" dirty="0">
+              <a:rPr lang="en-US" sz="1100">
                 <a:hlinkClick r:id="rId3"/>
               </a:rPr>
               <a:t>SoftUni</a:t>
@@ -2907,7 +3028,7 @@
     </p:spTree>
     <p:extLst>
       <p:ext uri="{BB962C8B-B14F-4D97-AF65-F5344CB8AC3E}">
-        <p14:creationId xmlns:p14="http://schemas.microsoft.com/office/powerpoint/2010/main" val="3533300824"/>
+        <p14:creationId xmlns:p14="http://schemas.microsoft.com/office/powerpoint/2010/main" val="1554603372"/>
       </p:ext>
     </p:extLst>
   </p:cSld>
@@ -8495,97 +8616,43 @@
           </a:p>
         </p:txBody>
       </p:sp>
-      <p:sp>
-        <p:nvSpPr>
-          <p:cNvPr id="5" name="Rectangle: Rounded Corners 4">
+      <p:pic>
+        <p:nvPicPr>
+          <p:cNvPr id="9" name="Picture 8">
             <a:extLst>
               <a:ext uri="{FF2B5EF4-FFF2-40B4-BE49-F238E27FC236}">
-                <a16:creationId xmlns:a16="http://schemas.microsoft.com/office/drawing/2014/main" id="{741C67C1-570E-1DED-0DDC-49A6FD77633F}"/>
+                <a16:creationId xmlns:a16="http://schemas.microsoft.com/office/drawing/2014/main" id="{ABF03B50-B498-F53A-EAD7-DC7AFC0BCC4F}"/>
               </a:ext>
             </a:extLst>
           </p:cNvPr>
-          <p:cNvSpPr/>
+          <p:cNvPicPr>
+            <a:picLocks noChangeAspect="1"/>
+          </p:cNvPicPr>
           <p:nvPr/>
-        </p:nvSpPr>
-        <p:spPr bwMode="auto">
+        </p:nvPicPr>
+        <p:blipFill>
+          <a:blip r:embed="rId3"/>
+          <a:stretch>
+            <a:fillRect/>
+          </a:stretch>
+        </p:blipFill>
+        <p:spPr>
           <a:xfrm>
-            <a:off x="3936000" y="4554000"/>
-            <a:ext cx="4140000" cy="1845000"/>
+            <a:off x="4207796" y="4227572"/>
+            <a:ext cx="3776408" cy="2576428"/>
           </a:xfrm>
-          <a:prstGeom prst="roundRect">
+          <a:prstGeom prst="rect">
             <a:avLst/>
           </a:prstGeom>
-          <a:solidFill>
-            <a:schemeClr val="dk2">
-              <a:alpha val="80000"/>
-            </a:schemeClr>
-          </a:solidFill>
-          <a:ln w="19050">
+          <a:ln>
             <a:solidFill>
-              <a:schemeClr val="tx1">
+              <a:schemeClr val="bg2">
                 <a:lumMod val="75000"/>
-                <a:alpha val="80000"/>
               </a:schemeClr>
             </a:solidFill>
           </a:ln>
-          <a:effectLst/>
         </p:spPr>
-        <p:style>
-          <a:lnRef idx="2">
-            <a:schemeClr val="accent1">
-              <a:shade val="50000"/>
-            </a:schemeClr>
-          </a:lnRef>
-          <a:fillRef idx="1001">
-            <a:schemeClr val="dk2"/>
-          </a:fillRef>
-          <a:effectRef idx="0">
-            <a:schemeClr val="accent1"/>
-          </a:effectRef>
-          <a:fontRef idx="minor">
-            <a:schemeClr val="lt1"/>
-          </a:fontRef>
-        </p:style>
-        <p:txBody>
-          <a:bodyPr rot="0" spcFirstLastPara="0" vertOverflow="overflow" horzOverflow="overflow" vert="horz" wrap="square" lIns="91440" tIns="45720" rIns="91440" bIns="45720" numCol="1" spcCol="0" rtlCol="0" fromWordArt="0" anchor="ctr" anchorCtr="0" forceAA="0" compatLnSpc="1">
-            <a:prstTxWarp prst="textNoShape">
-              <a:avLst/>
-            </a:prstTxWarp>
-            <a:noAutofit/>
-          </a:bodyPr>
-          <a:lstStyle/>
-          <a:p>
-            <a:pPr algn="ctr"/>
-            <a:r>
-              <a:rPr lang="bg-BG" sz="2800" b="1" dirty="0">
-                <a:solidFill>
-                  <a:srgbClr val="FFFFFF"/>
-                </a:solidFill>
-                <a:effectLst>
-                  <a:outerShdw blurRad="38100" dist="38100" dir="2700000" algn="tl">
-                    <a:srgbClr val="000000">
-                      <a:alpha val="43137"/>
-                    </a:srgbClr>
-                  </a:outerShdw>
-                </a:effectLst>
-              </a:rPr>
-              <a:t>диаграма с трите таблици</a:t>
-            </a:r>
-            <a:endParaRPr lang="en-US" sz="2800" b="1" dirty="0">
-              <a:solidFill>
-                <a:srgbClr val="FFFFFF"/>
-              </a:solidFill>
-              <a:effectLst>
-                <a:outerShdw blurRad="38100" dist="38100" dir="2700000" algn="tl">
-                  <a:srgbClr val="000000">
-                    <a:alpha val="43137"/>
-                  </a:srgbClr>
-                </a:outerShdw>
-              </a:effectLst>
-            </a:endParaRPr>
-          </a:p>
-        </p:txBody>
-      </p:sp>
+      </p:pic>
     </p:spTree>
     <p:extLst>
       <p:ext uri="{BB962C8B-B14F-4D97-AF65-F5344CB8AC3E}">
@@ -8692,6 +8759,33 @@
                                               <p:pRg st="3" end="3"/>
                                             </p:txEl>
                                           </p:spTgt>
+                                        </p:tgtEl>
+                                        <p:attrNameLst>
+                                          <p:attrName>style.visibility</p:attrName>
+                                        </p:attrNameLst>
+                                      </p:cBhvr>
+                                      <p:to>
+                                        <p:strVal val="visible"/>
+                                      </p:to>
+                                    </p:set>
+                                  </p:childTnLst>
+                                </p:cTn>
+                              </p:par>
+                              <p:par>
+                                <p:cTn id="11" presetID="1" presetClass="entr" presetSubtype="0" fill="hold" nodeType="withEffect">
+                                  <p:stCondLst>
+                                    <p:cond delay="0"/>
+                                  </p:stCondLst>
+                                  <p:childTnLst>
+                                    <p:set>
+                                      <p:cBhvr>
+                                        <p:cTn id="12" dur="1" fill="hold">
+                                          <p:stCondLst>
+                                            <p:cond delay="0"/>
+                                          </p:stCondLst>
+                                        </p:cTn>
+                                        <p:tgtEl>
+                                          <p:spTgt spid="9"/>
                                         </p:tgtEl>
                                         <p:attrNameLst>
                                           <p:attrName>style.visibility</p:attrName>
@@ -10065,9 +10159,16 @@
             <p:ph type="body" sz="quarter" idx="10"/>
           </p:nvPr>
         </p:nvSpPr>
-        <p:spPr/>
+        <p:spPr>
+          <a:xfrm>
+            <a:off x="190402" y="1196125"/>
+            <a:ext cx="8560598" cy="5528766"/>
+          </a:xfrm>
+        </p:spPr>
         <p:txBody>
-          <a:bodyPr/>
+          <a:bodyPr>
+            <a:normAutofit lnSpcReduction="10000"/>
+          </a:bodyPr>
           <a:lstStyle/>
           <a:p>
             <a:pPr>
@@ -10344,97 +10445,43 @@
           </a:p>
         </p:txBody>
       </p:sp>
-      <p:sp>
-        <p:nvSpPr>
-          <p:cNvPr id="5" name="Rectangle: Rounded Corners 4">
+      <p:pic>
+        <p:nvPicPr>
+          <p:cNvPr id="7" name="Picture 6">
             <a:extLst>
               <a:ext uri="{FF2B5EF4-FFF2-40B4-BE49-F238E27FC236}">
-                <a16:creationId xmlns:a16="http://schemas.microsoft.com/office/drawing/2014/main" id="{9C5DA134-DC59-5807-C71B-99DD205A8267}"/>
+                <a16:creationId xmlns:a16="http://schemas.microsoft.com/office/drawing/2014/main" id="{E1F3EFB7-A454-29F5-1357-54ED8B090EDE}"/>
               </a:ext>
             </a:extLst>
           </p:cNvPr>
-          <p:cNvSpPr/>
+          <p:cNvPicPr>
+            <a:picLocks noChangeAspect="1"/>
+          </p:cNvPicPr>
           <p:nvPr/>
-        </p:nvSpPr>
-        <p:spPr bwMode="auto">
+        </p:nvPicPr>
+        <p:blipFill>
+          <a:blip r:embed="rId2"/>
+          <a:stretch>
+            <a:fillRect/>
+          </a:stretch>
+        </p:blipFill>
+        <p:spPr>
           <a:xfrm>
-            <a:off x="7311000" y="4986875"/>
-            <a:ext cx="3870000" cy="1350000"/>
+            <a:off x="7626000" y="2214000"/>
+            <a:ext cx="4211652" cy="2655000"/>
           </a:xfrm>
-          <a:prstGeom prst="roundRect">
+          <a:prstGeom prst="rect">
             <a:avLst/>
           </a:prstGeom>
-          <a:solidFill>
-            <a:schemeClr val="dk2">
-              <a:alpha val="80000"/>
-            </a:schemeClr>
-          </a:solidFill>
-          <a:ln w="19050">
+          <a:ln>
             <a:solidFill>
-              <a:schemeClr val="tx1">
+              <a:schemeClr val="bg2">
                 <a:lumMod val="75000"/>
-                <a:alpha val="80000"/>
               </a:schemeClr>
             </a:solidFill>
           </a:ln>
-          <a:effectLst/>
         </p:spPr>
-        <p:style>
-          <a:lnRef idx="2">
-            <a:schemeClr val="accent1">
-              <a:shade val="50000"/>
-            </a:schemeClr>
-          </a:lnRef>
-          <a:fillRef idx="1001">
-            <a:schemeClr val="dk2"/>
-          </a:fillRef>
-          <a:effectRef idx="0">
-            <a:schemeClr val="accent1"/>
-          </a:effectRef>
-          <a:fontRef idx="minor">
-            <a:schemeClr val="lt1"/>
-          </a:fontRef>
-        </p:style>
-        <p:txBody>
-          <a:bodyPr rot="0" spcFirstLastPara="0" vertOverflow="overflow" horzOverflow="overflow" vert="horz" wrap="square" lIns="91440" tIns="45720" rIns="91440" bIns="45720" numCol="1" spcCol="0" rtlCol="0" fromWordArt="0" anchor="ctr" anchorCtr="0" forceAA="0" compatLnSpc="1">
-            <a:prstTxWarp prst="textNoShape">
-              <a:avLst/>
-            </a:prstTxWarp>
-            <a:noAutofit/>
-          </a:bodyPr>
-          <a:lstStyle/>
-          <a:p>
-            <a:pPr algn="ctr"/>
-            <a:r>
-              <a:rPr lang="bg-BG" sz="2800" b="1" dirty="0">
-                <a:solidFill>
-                  <a:srgbClr val="FFFFFF"/>
-                </a:solidFill>
-                <a:effectLst>
-                  <a:outerShdw blurRad="38100" dist="38100" dir="2700000" algn="tl">
-                    <a:srgbClr val="000000">
-                      <a:alpha val="43137"/>
-                    </a:srgbClr>
-                  </a:outerShdw>
-                </a:effectLst>
-              </a:rPr>
-              <a:t>диаграма с таблиците и връзките</a:t>
-            </a:r>
-            <a:endParaRPr lang="en-US" sz="2800" b="1" dirty="0">
-              <a:solidFill>
-                <a:srgbClr val="FFFFFF"/>
-              </a:solidFill>
-              <a:effectLst>
-                <a:outerShdw blurRad="38100" dist="38100" dir="2700000" algn="tl">
-                  <a:srgbClr val="000000">
-                    <a:alpha val="43137"/>
-                  </a:srgbClr>
-                </a:outerShdw>
-              </a:effectLst>
-            </a:endParaRPr>
-          </a:p>
-        </p:txBody>
-      </p:sp>
+      </p:pic>
     </p:spTree>
     <p:extLst>
       <p:ext uri="{BB962C8B-B14F-4D97-AF65-F5344CB8AC3E}">
@@ -10453,6 +10500,241 @@
       <p:transition spd="slow" advClick="0" advTm="5000"/>
     </mc:Fallback>
   </mc:AlternateContent>
+  <p:timing>
+    <p:tnLst>
+      <p:par>
+        <p:cTn id="1" dur="indefinite" restart="never" nodeType="tmRoot">
+          <p:childTnLst>
+            <p:seq concurrent="1" nextAc="seek">
+              <p:cTn id="2" dur="indefinite" nodeType="mainSeq">
+                <p:childTnLst>
+                  <p:par>
+                    <p:cTn id="3" fill="hold">
+                      <p:stCondLst>
+                        <p:cond delay="indefinite"/>
+                      </p:stCondLst>
+                      <p:childTnLst>
+                        <p:par>
+                          <p:cTn id="4" fill="hold">
+                            <p:stCondLst>
+                              <p:cond delay="0"/>
+                            </p:stCondLst>
+                            <p:childTnLst>
+                              <p:par>
+                                <p:cTn id="5" presetID="1" presetClass="entr" presetSubtype="0" fill="hold" nodeType="clickEffect">
+                                  <p:stCondLst>
+                                    <p:cond delay="0"/>
+                                  </p:stCondLst>
+                                  <p:childTnLst>
+                                    <p:set>
+                                      <p:cBhvr>
+                                        <p:cTn id="6" dur="1" fill="hold">
+                                          <p:stCondLst>
+                                            <p:cond delay="0"/>
+                                          </p:stCondLst>
+                                        </p:cTn>
+                                        <p:tgtEl>
+                                          <p:spTgt spid="3">
+                                            <p:txEl>
+                                              <p:pRg st="1" end="1"/>
+                                            </p:txEl>
+                                          </p:spTgt>
+                                        </p:tgtEl>
+                                        <p:attrNameLst>
+                                          <p:attrName>style.visibility</p:attrName>
+                                        </p:attrNameLst>
+                                      </p:cBhvr>
+                                      <p:to>
+                                        <p:strVal val="visible"/>
+                                      </p:to>
+                                    </p:set>
+                                  </p:childTnLst>
+                                </p:cTn>
+                              </p:par>
+                            </p:childTnLst>
+                          </p:cTn>
+                        </p:par>
+                      </p:childTnLst>
+                    </p:cTn>
+                  </p:par>
+                  <p:par>
+                    <p:cTn id="7" fill="hold">
+                      <p:stCondLst>
+                        <p:cond delay="indefinite"/>
+                      </p:stCondLst>
+                      <p:childTnLst>
+                        <p:par>
+                          <p:cTn id="8" fill="hold">
+                            <p:stCondLst>
+                              <p:cond delay="0"/>
+                            </p:stCondLst>
+                            <p:childTnLst>
+                              <p:par>
+                                <p:cTn id="9" presetID="1" presetClass="entr" presetSubtype="0" fill="hold" nodeType="clickEffect">
+                                  <p:stCondLst>
+                                    <p:cond delay="0"/>
+                                  </p:stCondLst>
+                                  <p:childTnLst>
+                                    <p:set>
+                                      <p:cBhvr>
+                                        <p:cTn id="10" dur="1" fill="hold">
+                                          <p:stCondLst>
+                                            <p:cond delay="0"/>
+                                          </p:stCondLst>
+                                        </p:cTn>
+                                        <p:tgtEl>
+                                          <p:spTgt spid="3">
+                                            <p:txEl>
+                                              <p:pRg st="2" end="2"/>
+                                            </p:txEl>
+                                          </p:spTgt>
+                                        </p:tgtEl>
+                                        <p:attrNameLst>
+                                          <p:attrName>style.visibility</p:attrName>
+                                        </p:attrNameLst>
+                                      </p:cBhvr>
+                                      <p:to>
+                                        <p:strVal val="visible"/>
+                                      </p:to>
+                                    </p:set>
+                                  </p:childTnLst>
+                                </p:cTn>
+                              </p:par>
+                              <p:par>
+                                <p:cTn id="11" presetID="1" presetClass="entr" presetSubtype="0" fill="hold" nodeType="withEffect">
+                                  <p:stCondLst>
+                                    <p:cond delay="0"/>
+                                  </p:stCondLst>
+                                  <p:childTnLst>
+                                    <p:set>
+                                      <p:cBhvr>
+                                        <p:cTn id="12" dur="1" fill="hold">
+                                          <p:stCondLst>
+                                            <p:cond delay="0"/>
+                                          </p:stCondLst>
+                                        </p:cTn>
+                                        <p:tgtEl>
+                                          <p:spTgt spid="3">
+                                            <p:txEl>
+                                              <p:pRg st="3" end="3"/>
+                                            </p:txEl>
+                                          </p:spTgt>
+                                        </p:tgtEl>
+                                        <p:attrNameLst>
+                                          <p:attrName>style.visibility</p:attrName>
+                                        </p:attrNameLst>
+                                      </p:cBhvr>
+                                      <p:to>
+                                        <p:strVal val="visible"/>
+                                      </p:to>
+                                    </p:set>
+                                  </p:childTnLst>
+                                </p:cTn>
+                              </p:par>
+                              <p:par>
+                                <p:cTn id="13" presetID="1" presetClass="entr" presetSubtype="0" fill="hold" nodeType="withEffect">
+                                  <p:stCondLst>
+                                    <p:cond delay="0"/>
+                                  </p:stCondLst>
+                                  <p:childTnLst>
+                                    <p:set>
+                                      <p:cBhvr>
+                                        <p:cTn id="14" dur="1" fill="hold">
+                                          <p:stCondLst>
+                                            <p:cond delay="0"/>
+                                          </p:stCondLst>
+                                        </p:cTn>
+                                        <p:tgtEl>
+                                          <p:spTgt spid="7"/>
+                                        </p:tgtEl>
+                                        <p:attrNameLst>
+                                          <p:attrName>style.visibility</p:attrName>
+                                        </p:attrNameLst>
+                                      </p:cBhvr>
+                                      <p:to>
+                                        <p:strVal val="visible"/>
+                                      </p:to>
+                                    </p:set>
+                                  </p:childTnLst>
+                                </p:cTn>
+                              </p:par>
+                            </p:childTnLst>
+                          </p:cTn>
+                        </p:par>
+                      </p:childTnLst>
+                    </p:cTn>
+                  </p:par>
+                  <p:par>
+                    <p:cTn id="15" fill="hold">
+                      <p:stCondLst>
+                        <p:cond delay="indefinite"/>
+                      </p:stCondLst>
+                      <p:childTnLst>
+                        <p:par>
+                          <p:cTn id="16" fill="hold">
+                            <p:stCondLst>
+                              <p:cond delay="0"/>
+                            </p:stCondLst>
+                            <p:childTnLst>
+                              <p:par>
+                                <p:cTn id="17" presetID="1" presetClass="entr" presetSubtype="0" fill="hold" nodeType="clickEffect">
+                                  <p:stCondLst>
+                                    <p:cond delay="0"/>
+                                  </p:stCondLst>
+                                  <p:childTnLst>
+                                    <p:set>
+                                      <p:cBhvr>
+                                        <p:cTn id="18" dur="1" fill="hold">
+                                          <p:stCondLst>
+                                            <p:cond delay="0"/>
+                                          </p:stCondLst>
+                                        </p:cTn>
+                                        <p:tgtEl>
+                                          <p:spTgt spid="3">
+                                            <p:txEl>
+                                              <p:pRg st="4" end="4"/>
+                                            </p:txEl>
+                                          </p:spTgt>
+                                        </p:tgtEl>
+                                        <p:attrNameLst>
+                                          <p:attrName>style.visibility</p:attrName>
+                                        </p:attrNameLst>
+                                      </p:cBhvr>
+                                      <p:to>
+                                        <p:strVal val="visible"/>
+                                      </p:to>
+                                    </p:set>
+                                  </p:childTnLst>
+                                </p:cTn>
+                              </p:par>
+                            </p:childTnLst>
+                          </p:cTn>
+                        </p:par>
+                      </p:childTnLst>
+                    </p:cTn>
+                  </p:par>
+                </p:childTnLst>
+              </p:cTn>
+              <p:prevCondLst>
+                <p:cond evt="onPrev" delay="0">
+                  <p:tgtEl>
+                    <p:sldTgt/>
+                  </p:tgtEl>
+                </p:cond>
+              </p:prevCondLst>
+              <p:nextCondLst>
+                <p:cond evt="onNext" delay="0">
+                  <p:tgtEl>
+                    <p:sldTgt/>
+                  </p:tgtEl>
+                </p:cond>
+              </p:nextCondLst>
+            </p:seq>
+          </p:childTnLst>
+        </p:cTn>
+      </p:par>
+    </p:tnLst>
+  </p:timing>
 </p:sld>
 </file>
 
@@ -14366,7 +14648,7 @@
                 <a:latin typeface="Consolas" pitchFamily="49" charset="0"/>
                 <a:cs typeface="Consolas" pitchFamily="49" charset="0"/>
               </a:rPr>
-              <a:t>IDENTITY</a:t>
+              <a:t>PRIMARY KEY IDENTITY</a:t>
             </a:r>
             <a:r>
               <a:rPr lang="en-US" sz="2400" b="1" noProof="1">
@@ -14383,24 +14665,7 @@
                 <a:latin typeface="Consolas" pitchFamily="49" charset="0"/>
                 <a:cs typeface="Consolas" pitchFamily="49" charset="0"/>
               </a:rPr>
-              <a:t>, 1), </a:t>
-            </a:r>
-            <a:r>
-              <a:rPr lang="en-US" sz="2400" b="1" noProof="1">
-                <a:solidFill>
-                  <a:schemeClr val="bg1"/>
-                </a:solidFill>
-                <a:latin typeface="Consolas" pitchFamily="49" charset="0"/>
-                <a:cs typeface="Consolas" pitchFamily="49" charset="0"/>
-              </a:rPr>
-              <a:t>PRIMARY KEY</a:t>
-            </a:r>
-            <a:r>
-              <a:rPr lang="en-US" sz="2400" b="1" noProof="1">
-                <a:latin typeface="Consolas" pitchFamily="49" charset="0"/>
-                <a:cs typeface="Consolas" pitchFamily="49" charset="0"/>
-              </a:rPr>
-              <a:t>,</a:t>
+              <a:t>, 1),</a:t>
             </a:r>
           </a:p>
           <a:p>
@@ -14531,7 +14796,7 @@
                 <a:latin typeface="Consolas" pitchFamily="49" charset="0"/>
                 <a:cs typeface="Consolas" pitchFamily="49" charset="0"/>
               </a:rPr>
-              <a:t>IDENTITY</a:t>
+              <a:t>PRIMARY KEY IDENTITY</a:t>
             </a:r>
             <a:r>
               <a:rPr lang="en-US" sz="2400" b="1" noProof="1">
@@ -14541,25 +14806,12 @@
                 <a:latin typeface="Consolas" pitchFamily="49" charset="0"/>
                 <a:cs typeface="Consolas" pitchFamily="49" charset="0"/>
               </a:rPr>
-              <a:t>(1, 1), </a:t>
-            </a:r>
-            <a:r>
-              <a:rPr lang="en-US" sz="2400" b="1" noProof="1">
-                <a:solidFill>
-                  <a:schemeClr val="bg1"/>
-                </a:solidFill>
-                <a:latin typeface="Consolas" pitchFamily="49" charset="0"/>
-                <a:cs typeface="Consolas" pitchFamily="49" charset="0"/>
-              </a:rPr>
-              <a:t>PRIMARY KEY</a:t>
-            </a:r>
-            <a:r>
-              <a:rPr lang="en-US" sz="2400" b="1" noProof="1">
-                <a:latin typeface="Consolas" pitchFamily="49" charset="0"/>
-                <a:cs typeface="Consolas" pitchFamily="49" charset="0"/>
-              </a:rPr>
-              <a:t>,</a:t>
-            </a:r>
+              <a:t>(1, 1),</a:t>
+            </a:r>
+            <a:endParaRPr lang="en-US" sz="2400" b="1" noProof="1">
+              <a:latin typeface="Consolas" pitchFamily="49" charset="0"/>
+              <a:cs typeface="Consolas" pitchFamily="49" charset="0"/>
+            </a:endParaRPr>
           </a:p>
           <a:p>
             <a:pPr eaLnBrk="0" hangingPunct="0">
@@ -15052,7 +15304,15 @@
             </a:r>
             <a:r>
               <a:rPr lang="bg-BG" dirty="0"/>
-              <a:t>можем да го добавим по-късно:</a:t>
+              <a:t>можем да го добавим </a:t>
+            </a:r>
+            <a:r>
+              <a:rPr lang="bg-BG" b="1" dirty="0"/>
+              <a:t>по-късно</a:t>
+            </a:r>
+            <a:r>
+              <a:rPr lang="bg-BG" dirty="0"/>
+              <a:t>:</a:t>
             </a:r>
           </a:p>
           <a:p>
@@ -15089,7 +15349,7 @@
         <p:spPr/>
         <p:txBody>
           <a:bodyPr>
-            <a:normAutofit/>
+            <a:normAutofit fontScale="90000"/>
           </a:bodyPr>
           <a:lstStyle/>
           <a:p>
@@ -15103,7 +15363,7 @@
             </a:r>
             <a:r>
               <a:rPr lang="bg-BG" sz="3800" dirty="0"/>
-              <a:t>махане на връзка между таблици</a:t>
+              <a:t>премахване на връзка между таблици</a:t>
             </a:r>
             <a:endParaRPr lang="en-US" sz="3800" dirty="0"/>
           </a:p>
@@ -15126,7 +15386,7 @@
         <p:spPr bwMode="auto">
           <a:xfrm>
             <a:off x="838500" y="2484000"/>
-            <a:ext cx="10548000" cy="1200329"/>
+            <a:ext cx="10207500" cy="1200329"/>
           </a:xfrm>
           <a:prstGeom prst="rect">
             <a:avLst/>
@@ -15153,212 +15413,94 @@
           </a:bodyPr>
           <a:lstStyle/>
           <a:p>
-            <a:pPr eaLnBrk="0" hangingPunct="0">
-              <a:buClr>
-                <a:schemeClr val="accent5">
-                  <a:lumMod val="40000"/>
-                  <a:lumOff val="60000"/>
-                </a:schemeClr>
-              </a:buClr>
-              <a:buSzPct val="70000"/>
-            </a:pPr>
-            <a:r>
-              <a:rPr lang="en-US" sz="2400" b="1" noProof="1">
+            <a:r>
+              <a:rPr lang="en-US" sz="2400" b="1" dirty="0">
                 <a:solidFill>
                   <a:schemeClr val="bg1"/>
                 </a:solidFill>
-                <a:latin typeface="Consolas" pitchFamily="49" charset="0"/>
-                <a:cs typeface="Consolas" pitchFamily="49" charset="0"/>
+                <a:latin typeface="Consolas" panose="020B0609020204030204" pitchFamily="49" charset="0"/>
               </a:rPr>
-              <a:t>ALTER TABLE </a:t>
-            </a:r>
-            <a:r>
-              <a:rPr lang="en-US" sz="2400" b="1" noProof="1">
-                <a:latin typeface="Consolas" pitchFamily="49" charset="0"/>
-                <a:cs typeface="Consolas" pitchFamily="49" charset="0"/>
+              <a:t>ALTER TABLE</a:t>
+            </a:r>
+            <a:r>
+              <a:rPr lang="en-US" sz="2400" b="1" dirty="0">
+                <a:latin typeface="Consolas" panose="020B0609020204030204" pitchFamily="49" charset="0"/>
               </a:rPr>
-              <a:t>Cities</a:t>
-            </a:r>
-            <a:br>
-              <a:rPr lang="en-US" sz="2400" b="1" noProof="1">
-                <a:latin typeface="Consolas" pitchFamily="49" charset="0"/>
-                <a:cs typeface="Consolas" pitchFamily="49" charset="0"/>
+              <a:t> Cities</a:t>
+            </a:r>
+          </a:p>
+          <a:p>
+            <a:r>
+              <a:rPr lang="en-US" sz="2400" b="1" dirty="0">
+                <a:solidFill>
+                  <a:schemeClr val="bg1"/>
+                </a:solidFill>
+                <a:latin typeface="Consolas" panose="020B0609020204030204" pitchFamily="49" charset="0"/>
               </a:rPr>
-            </a:br>
-            <a:r>
-              <a:rPr lang="en-US" sz="2400" b="1" noProof="1">
-                <a:solidFill>
-                  <a:schemeClr val="bg1"/>
-                </a:solidFill>
-                <a:latin typeface="Consolas" pitchFamily="49" charset="0"/>
-                <a:cs typeface="Consolas" pitchFamily="49" charset="0"/>
-              </a:rPr>
-              <a:t>ADD FOREIGN KEY</a:t>
-            </a:r>
-            <a:r>
-              <a:rPr lang="en-US" sz="2400" b="1" noProof="1">
-                <a:latin typeface="Consolas" pitchFamily="49" charset="0"/>
-                <a:cs typeface="Consolas" pitchFamily="49" charset="0"/>
+              <a:t>ADD CONSTRAINT</a:t>
+            </a:r>
+            <a:r>
+              <a:rPr lang="en-US" sz="2400" b="1" dirty="0">
+                <a:latin typeface="Consolas" panose="020B0609020204030204" pitchFamily="49" charset="0"/>
               </a:rPr>
               <a:t> </a:t>
             </a:r>
             <a:r>
-              <a:rPr lang="en-US" sz="2400" b="1" noProof="1">
-                <a:solidFill>
-                  <a:schemeClr val="bg1"/>
-                </a:solidFill>
-                <a:latin typeface="Consolas" pitchFamily="49" charset="0"/>
-                <a:cs typeface="Consolas" pitchFamily="49" charset="0"/>
+              <a:rPr lang="en-US" sz="2400" b="1" dirty="0" err="1">
+                <a:latin typeface="Consolas" panose="020B0609020204030204" pitchFamily="49" charset="0"/>
               </a:rPr>
               <a:t>FK_Cities_Countries</a:t>
             </a:r>
-            <a:br>
-              <a:rPr lang="en-US" sz="2400" b="1" noProof="1">
+            <a:endParaRPr lang="en-US" sz="2400" b="1" dirty="0">
+              <a:latin typeface="Consolas" panose="020B0609020204030204" pitchFamily="49" charset="0"/>
+            </a:endParaRPr>
+          </a:p>
+          <a:p>
+            <a:r>
+              <a:rPr lang="en-US" sz="2400" b="1" dirty="0">
                 <a:solidFill>
                   <a:schemeClr val="bg1"/>
                 </a:solidFill>
-                <a:latin typeface="Consolas" pitchFamily="49" charset="0"/>
-                <a:cs typeface="Consolas" pitchFamily="49" charset="0"/>
+                <a:latin typeface="Consolas" panose="020B0609020204030204" pitchFamily="49" charset="0"/>
               </a:rPr>
-            </a:br>
-            <a:r>
-              <a:rPr lang="en-US" sz="2400" b="1" noProof="1">
-                <a:latin typeface="Consolas" pitchFamily="49" charset="0"/>
-                <a:cs typeface="Consolas" pitchFamily="49" charset="0"/>
+              <a:t>FOREIGN KEY</a:t>
+            </a:r>
+            <a:r>
+              <a:rPr lang="en-US" sz="2400" b="1" dirty="0">
+                <a:latin typeface="Consolas" panose="020B0609020204030204" pitchFamily="49" charset="0"/>
               </a:rPr>
-              <a:t>(CountryId) </a:t>
-            </a:r>
-            <a:r>
-              <a:rPr lang="en-US" sz="2400" b="1" noProof="1">
+              <a:t> (</a:t>
+            </a:r>
+            <a:r>
+              <a:rPr lang="en-US" sz="2400" b="1" dirty="0" err="1">
+                <a:latin typeface="Consolas" panose="020B0609020204030204" pitchFamily="49" charset="0"/>
+              </a:rPr>
+              <a:t>CountryId</a:t>
+            </a:r>
+            <a:r>
+              <a:rPr lang="en-US" sz="2400" b="1" dirty="0">
+                <a:latin typeface="Consolas" panose="020B0609020204030204" pitchFamily="49" charset="0"/>
+              </a:rPr>
+              <a:t>) </a:t>
+            </a:r>
+            <a:r>
+              <a:rPr lang="en-US" sz="2400" b="1" dirty="0">
                 <a:solidFill>
                   <a:schemeClr val="bg1"/>
                 </a:solidFill>
-                <a:latin typeface="Consolas" pitchFamily="49" charset="0"/>
-                <a:cs typeface="Consolas" pitchFamily="49" charset="0"/>
+                <a:latin typeface="Consolas" panose="020B0609020204030204" pitchFamily="49" charset="0"/>
               </a:rPr>
               <a:t>REFERENCES</a:t>
             </a:r>
             <a:r>
-              <a:rPr lang="en-US" sz="2400" b="1" noProof="1">
-                <a:latin typeface="Consolas" pitchFamily="49" charset="0"/>
-                <a:cs typeface="Consolas" pitchFamily="49" charset="0"/>
+              <a:rPr lang="en-US" sz="2400" b="1" dirty="0">
+                <a:latin typeface="Consolas" panose="020B0609020204030204" pitchFamily="49" charset="0"/>
               </a:rPr>
-              <a:t> Countries(Id)</a:t>
-            </a:r>
-          </a:p>
-        </p:txBody>
-      </p:sp>
-      <p:sp>
-        <p:nvSpPr>
-          <p:cNvPr id="8" name="Rectangle: Rounded Corners 7">
-            <a:extLst>
-              <a:ext uri="{FF2B5EF4-FFF2-40B4-BE49-F238E27FC236}">
-                <a16:creationId xmlns:a16="http://schemas.microsoft.com/office/drawing/2014/main" id="{40353C5E-EA86-E60A-53EA-49EE0C6392BB}"/>
-              </a:ext>
-            </a:extLst>
-          </p:cNvPr>
-          <p:cNvSpPr/>
-          <p:nvPr/>
-        </p:nvSpPr>
-        <p:spPr bwMode="auto">
-          <a:xfrm>
-            <a:off x="7401000" y="2580164"/>
-            <a:ext cx="3969000" cy="1613836"/>
-          </a:xfrm>
-          <a:prstGeom prst="roundRect">
-            <a:avLst/>
-          </a:prstGeom>
-          <a:solidFill>
-            <a:schemeClr val="dk2">
-              <a:alpha val="80000"/>
-            </a:schemeClr>
-          </a:solidFill>
-          <a:ln w="19050">
-            <a:solidFill>
-              <a:schemeClr val="tx1">
-                <a:lumMod val="75000"/>
-                <a:alpha val="80000"/>
-              </a:schemeClr>
-            </a:solidFill>
-          </a:ln>
-          <a:effectLst/>
-        </p:spPr>
-        <p:style>
-          <a:lnRef idx="2">
-            <a:schemeClr val="accent1">
-              <a:shade val="50000"/>
-            </a:schemeClr>
-          </a:lnRef>
-          <a:fillRef idx="1001">
-            <a:schemeClr val="dk2"/>
-          </a:fillRef>
-          <a:effectRef idx="0">
-            <a:schemeClr val="accent1"/>
-          </a:effectRef>
-          <a:fontRef idx="minor">
-            <a:schemeClr val="lt1"/>
-          </a:fontRef>
-        </p:style>
-        <p:txBody>
-          <a:bodyPr rot="0" spcFirstLastPara="0" vertOverflow="overflow" horzOverflow="overflow" vert="horz" wrap="square" lIns="91440" tIns="45720" rIns="91440" bIns="45720" numCol="1" spcCol="0" rtlCol="0" fromWordArt="0" anchor="ctr" anchorCtr="0" forceAA="0" compatLnSpc="1">
-            <a:prstTxWarp prst="textNoShape">
-              <a:avLst/>
-            </a:prstTxWarp>
-            <a:noAutofit/>
-          </a:bodyPr>
-          <a:lstStyle/>
-          <a:p>
-            <a:pPr algn="ctr"/>
-            <a:r>
-              <a:rPr lang="en-US" sz="2800" b="1" dirty="0">
-                <a:solidFill>
-                  <a:schemeClr val="tx1"/>
-                </a:solidFill>
-                <a:effectLst>
-                  <a:outerShdw blurRad="38100" dist="38100" dir="2700000" algn="tl">
-                    <a:srgbClr val="000000">
-                      <a:alpha val="43137"/>
-                    </a:srgbClr>
-                  </a:outerShdw>
-                </a:effectLst>
-                <a:highlight>
-                  <a:srgbClr val="FFFF00"/>
-                </a:highlight>
-              </a:rPr>
-              <a:t>TODO:</a:t>
-            </a:r>
-            <a:r>
-              <a:rPr lang="bg-BG" sz="2800" b="1" dirty="0">
-                <a:solidFill>
-                  <a:schemeClr val="tx1"/>
-                </a:solidFill>
-                <a:effectLst>
-                  <a:outerShdw blurRad="38100" dist="38100" dir="2700000" algn="tl">
-                    <a:srgbClr val="000000">
-                      <a:alpha val="43137"/>
-                    </a:srgbClr>
-                  </a:outerShdw>
-                </a:effectLst>
-                <a:highlight>
-                  <a:srgbClr val="FFFF00"/>
-                </a:highlight>
-              </a:rPr>
-              <a:t> да се тества кода, за да се напише верният синтаксис</a:t>
-            </a:r>
-            <a:endParaRPr lang="en-US" sz="2800" b="1" dirty="0">
-              <a:solidFill>
-                <a:schemeClr val="tx1"/>
-              </a:solidFill>
-              <a:effectLst>
-                <a:outerShdw blurRad="38100" dist="38100" dir="2700000" algn="tl">
-                  <a:srgbClr val="000000">
-                    <a:alpha val="43137"/>
-                  </a:srgbClr>
-                </a:outerShdw>
-              </a:effectLst>
-              <a:highlight>
-                <a:srgbClr val="FFFF00"/>
-              </a:highlight>
+              <a:t> Countries(Id);</a:t>
+            </a:r>
+            <a:endParaRPr lang="en-US" sz="2400" b="1" noProof="1">
+              <a:latin typeface="Consolas" pitchFamily="49" charset="0"/>
+              <a:cs typeface="Consolas" pitchFamily="49" charset="0"/>
             </a:endParaRPr>
           </a:p>
         </p:txBody>
@@ -15380,7 +15522,7 @@
         <p:spPr bwMode="auto">
           <a:xfrm>
             <a:off x="822000" y="4668003"/>
-            <a:ext cx="10548000" cy="830997"/>
+            <a:ext cx="10224000" cy="830997"/>
           </a:xfrm>
           <a:prstGeom prst="rect">
             <a:avLst/>
@@ -15452,121 +15594,6 @@
             <a:endParaRPr lang="en-US" sz="2400" b="1" noProof="1">
               <a:latin typeface="Consolas" pitchFamily="49" charset="0"/>
               <a:cs typeface="Consolas" pitchFamily="49" charset="0"/>
-            </a:endParaRPr>
-          </a:p>
-        </p:txBody>
-      </p:sp>
-      <p:sp>
-        <p:nvSpPr>
-          <p:cNvPr id="12" name="Rectangle: Rounded Corners 11">
-            <a:extLst>
-              <a:ext uri="{FF2B5EF4-FFF2-40B4-BE49-F238E27FC236}">
-                <a16:creationId xmlns:a16="http://schemas.microsoft.com/office/drawing/2014/main" id="{AD53454A-B880-8F60-1646-DDBCBBAD202E}"/>
-              </a:ext>
-            </a:extLst>
-          </p:cNvPr>
-          <p:cNvSpPr/>
-          <p:nvPr/>
-        </p:nvSpPr>
-        <p:spPr bwMode="auto">
-          <a:xfrm>
-            <a:off x="7311000" y="5002029"/>
-            <a:ext cx="3969000" cy="1613836"/>
-          </a:xfrm>
-          <a:prstGeom prst="roundRect">
-            <a:avLst/>
-          </a:prstGeom>
-          <a:solidFill>
-            <a:schemeClr val="dk2">
-              <a:alpha val="80000"/>
-            </a:schemeClr>
-          </a:solidFill>
-          <a:ln w="19050">
-            <a:solidFill>
-              <a:schemeClr val="tx1">
-                <a:lumMod val="75000"/>
-                <a:alpha val="80000"/>
-              </a:schemeClr>
-            </a:solidFill>
-          </a:ln>
-          <a:effectLst/>
-        </p:spPr>
-        <p:style>
-          <a:lnRef idx="2">
-            <a:schemeClr val="accent1">
-              <a:shade val="50000"/>
-            </a:schemeClr>
-          </a:lnRef>
-          <a:fillRef idx="1001">
-            <a:schemeClr val="dk2"/>
-          </a:fillRef>
-          <a:effectRef idx="0">
-            <a:schemeClr val="accent1"/>
-          </a:effectRef>
-          <a:fontRef idx="minor">
-            <a:schemeClr val="lt1"/>
-          </a:fontRef>
-        </p:style>
-        <p:txBody>
-          <a:bodyPr rot="0" spcFirstLastPara="0" vertOverflow="overflow" horzOverflow="overflow" vert="horz" wrap="square" lIns="91440" tIns="45720" rIns="91440" bIns="45720" numCol="1" spcCol="0" rtlCol="0" fromWordArt="0" anchor="ctr" anchorCtr="0" forceAA="0" compatLnSpc="1">
-            <a:prstTxWarp prst="textNoShape">
-              <a:avLst/>
-            </a:prstTxWarp>
-            <a:noAutofit/>
-          </a:bodyPr>
-          <a:lstStyle/>
-          <a:p>
-            <a:pPr algn="ctr"/>
-            <a:r>
-              <a:rPr lang="en-US" sz="2800" b="1" dirty="0">
-                <a:solidFill>
-                  <a:schemeClr val="tx1"/>
-                </a:solidFill>
-                <a:effectLst>
-                  <a:outerShdw blurRad="38100" dist="38100" dir="2700000" algn="tl">
-                    <a:srgbClr val="000000">
-                      <a:alpha val="43137"/>
-                    </a:srgbClr>
-                  </a:outerShdw>
-                </a:effectLst>
-                <a:highlight>
-                  <a:srgbClr val="FFFF00"/>
-                </a:highlight>
-              </a:rPr>
-              <a:t>TODO:</a:t>
-            </a:r>
-            <a:r>
-              <a:rPr lang="bg-BG" sz="2800" b="1" dirty="0">
-                <a:solidFill>
-                  <a:schemeClr val="tx1"/>
-                </a:solidFill>
-                <a:effectLst>
-                  <a:outerShdw blurRad="38100" dist="38100" dir="2700000" algn="tl">
-                    <a:srgbClr val="000000">
-                      <a:alpha val="43137"/>
-                    </a:srgbClr>
-                  </a:outerShdw>
-                </a:effectLst>
-                <a:highlight>
-                  <a:srgbClr val="FFFF00"/>
-                </a:highlight>
-              </a:rPr>
-              <a:t> да се тества кода, за да се напише верният синтаксис</a:t>
-            </a:r>
-            <a:endParaRPr lang="en-US" sz="2800" b="1" dirty="0">
-              <a:solidFill>
-                <a:schemeClr val="tx1"/>
-              </a:solidFill>
-              <a:effectLst>
-                <a:outerShdw blurRad="38100" dist="38100" dir="2700000" algn="tl">
-                  <a:srgbClr val="000000">
-                    <a:alpha val="43137"/>
-                  </a:srgbClr>
-                </a:outerShdw>
-              </a:effectLst>
-              <a:highlight>
-                <a:srgbClr val="FFFF00"/>
-              </a:highlight>
             </a:endParaRPr>
           </a:p>
         </p:txBody>
@@ -15639,15 +15666,64 @@
                                   </p:childTnLst>
                                 </p:cTn>
                               </p:par>
+                            </p:childTnLst>
+                          </p:cTn>
+                        </p:par>
+                      </p:childTnLst>
+                    </p:cTn>
+                  </p:par>
+                  <p:par>
+                    <p:cTn id="7" fill="hold">
+                      <p:stCondLst>
+                        <p:cond delay="indefinite"/>
+                      </p:stCondLst>
+                      <p:childTnLst>
+                        <p:par>
+                          <p:cTn id="8" fill="hold">
+                            <p:stCondLst>
+                              <p:cond delay="0"/>
+                            </p:stCondLst>
+                            <p:childTnLst>
                               <p:par>
-                                <p:cTn id="7" presetID="1" presetClass="entr" presetSubtype="0" fill="hold" grpId="0" nodeType="withEffect">
+                                <p:cTn id="9" presetID="1" presetClass="entr" presetSubtype="0" fill="hold" nodeType="clickEffect">
                                   <p:stCondLst>
                                     <p:cond delay="0"/>
                                   </p:stCondLst>
                                   <p:childTnLst>
                                     <p:set>
                                       <p:cBhvr>
-                                        <p:cTn id="8" dur="1" fill="hold">
+                                        <p:cTn id="10" dur="1" fill="hold">
+                                          <p:stCondLst>
+                                            <p:cond delay="0"/>
+                                          </p:stCondLst>
+                                        </p:cTn>
+                                        <p:tgtEl>
+                                          <p:spTgt spid="3">
+                                            <p:txEl>
+                                              <p:pRg st="3" end="3"/>
+                                            </p:txEl>
+                                          </p:spTgt>
+                                        </p:tgtEl>
+                                        <p:attrNameLst>
+                                          <p:attrName>style.visibility</p:attrName>
+                                        </p:attrNameLst>
+                                      </p:cBhvr>
+                                      <p:to>
+                                        <p:strVal val="visible"/>
+                                      </p:to>
+                                    </p:set>
+                                  </p:childTnLst>
+                                </p:cTn>
+                              </p:par>
+                              <p:par>
+                                <p:cTn id="11" presetID="1" presetClass="entr" presetSubtype="0" fill="hold" grpId="0" nodeType="withEffect">
+                                  <p:stCondLst>
+                                    <p:cond delay="0"/>
+                                  </p:stCondLst>
+                                  <p:childTnLst>
+                                    <p:set>
+                                      <p:cBhvr>
+                                        <p:cTn id="12" dur="1" fill="hold">
                                           <p:stCondLst>
                                             <p:cond delay="0"/>
                                           </p:stCondLst>
@@ -18769,10 +18845,10 @@
       </p:sp>
       <p:pic>
         <p:nvPicPr>
-          <p:cNvPr id="9" name="Picture 8">
+          <p:cNvPr id="7" name="Picture 6">
             <a:extLst>
               <a:ext uri="{FF2B5EF4-FFF2-40B4-BE49-F238E27FC236}">
-                <a16:creationId xmlns:a16="http://schemas.microsoft.com/office/drawing/2014/main" id="{0541ADAC-06E1-F878-BE2C-4EA951AC500E}"/>
+                <a16:creationId xmlns:a16="http://schemas.microsoft.com/office/drawing/2014/main" id="{AA1ABEB6-719E-57C6-74FA-A959254812CE}"/>
               </a:ext>
             </a:extLst>
           </p:cNvPr>
@@ -18789,8 +18865,8 @@
         </p:blipFill>
         <p:spPr>
           <a:xfrm>
-            <a:off x="3666000" y="2349000"/>
-            <a:ext cx="4553585" cy="3629532"/>
+            <a:off x="2676000" y="2484000"/>
+            <a:ext cx="6840000" cy="3512184"/>
           </a:xfrm>
           <a:prstGeom prst="rect">
             <a:avLst/>
@@ -18799,10 +18875,10 @@
       </p:pic>
       <p:sp>
         <p:nvSpPr>
-          <p:cNvPr id="10" name="Rectangle: Rounded Corners 9">
+          <p:cNvPr id="8" name="Rectangle: Rounded Corners 7">
             <a:extLst>
               <a:ext uri="{FF2B5EF4-FFF2-40B4-BE49-F238E27FC236}">
-                <a16:creationId xmlns:a16="http://schemas.microsoft.com/office/drawing/2014/main" id="{ADCFBC79-FFAA-771A-6407-E630F9BA896B}"/>
+                <a16:creationId xmlns:a16="http://schemas.microsoft.com/office/drawing/2014/main" id="{C5F6702B-F4EF-9FA1-1270-AE4FDE3F2751}"/>
               </a:ext>
             </a:extLst>
           </p:cNvPr>
@@ -18811,8 +18887,8 @@
         </p:nvSpPr>
         <p:spPr>
           <a:xfrm>
-            <a:off x="6321000" y="5526875"/>
-            <a:ext cx="855000" cy="270000"/>
+            <a:off x="6636000" y="5384144"/>
+            <a:ext cx="1350000" cy="384856"/>
           </a:xfrm>
           <a:prstGeom prst="roundRect">
             <a:avLst>
@@ -18860,157 +18936,6 @@
                 </a:outerShdw>
               </a:effectLst>
               <a:latin typeface="Consolas" panose="020B0609020204030204" pitchFamily="49" charset="0"/>
-            </a:endParaRPr>
-          </a:p>
-        </p:txBody>
-      </p:sp>
-      <p:sp>
-        <p:nvSpPr>
-          <p:cNvPr id="5" name="Rectangle: Rounded Corners 4">
-            <a:extLst>
-              <a:ext uri="{FF2B5EF4-FFF2-40B4-BE49-F238E27FC236}">
-                <a16:creationId xmlns:a16="http://schemas.microsoft.com/office/drawing/2014/main" id="{5AB2C75F-E285-AD23-D39A-1F4B7A71A1BE}"/>
-              </a:ext>
-            </a:extLst>
-          </p:cNvPr>
-          <p:cNvSpPr/>
-          <p:nvPr/>
-        </p:nvSpPr>
-        <p:spPr bwMode="auto">
-          <a:xfrm>
-            <a:off x="8544768" y="3654000"/>
-            <a:ext cx="3150415" cy="1613836"/>
-          </a:xfrm>
-          <a:prstGeom prst="roundRect">
-            <a:avLst/>
-          </a:prstGeom>
-          <a:solidFill>
-            <a:schemeClr val="dk2">
-              <a:alpha val="80000"/>
-            </a:schemeClr>
-          </a:solidFill>
-          <a:ln w="19050">
-            <a:solidFill>
-              <a:schemeClr val="tx1">
-                <a:lumMod val="75000"/>
-                <a:alpha val="80000"/>
-              </a:schemeClr>
-            </a:solidFill>
-          </a:ln>
-          <a:effectLst/>
-        </p:spPr>
-        <p:style>
-          <a:lnRef idx="2">
-            <a:schemeClr val="accent1">
-              <a:shade val="50000"/>
-            </a:schemeClr>
-          </a:lnRef>
-          <a:fillRef idx="1001">
-            <a:schemeClr val="dk2"/>
-          </a:fillRef>
-          <a:effectRef idx="0">
-            <a:schemeClr val="accent1"/>
-          </a:effectRef>
-          <a:fontRef idx="minor">
-            <a:schemeClr val="lt1"/>
-          </a:fontRef>
-        </p:style>
-        <p:txBody>
-          <a:bodyPr rot="0" spcFirstLastPara="0" vertOverflow="overflow" horzOverflow="overflow" vert="horz" wrap="square" lIns="91440" tIns="45720" rIns="91440" bIns="45720" numCol="1" spcCol="0" rtlCol="0" fromWordArt="0" anchor="ctr" anchorCtr="0" forceAA="0" compatLnSpc="1">
-            <a:prstTxWarp prst="textNoShape">
-              <a:avLst/>
-            </a:prstTxWarp>
-            <a:noAutofit/>
-          </a:bodyPr>
-          <a:lstStyle/>
-          <a:p>
-            <a:pPr algn="ctr"/>
-            <a:r>
-              <a:rPr lang="en-US" sz="2800" b="1" dirty="0">
-                <a:solidFill>
-                  <a:schemeClr val="tx1"/>
-                </a:solidFill>
-                <a:effectLst>
-                  <a:outerShdw blurRad="38100" dist="38100" dir="2700000" algn="tl">
-                    <a:srgbClr val="000000">
-                      <a:alpha val="43137"/>
-                    </a:srgbClr>
-                  </a:outerShdw>
-                </a:effectLst>
-                <a:highlight>
-                  <a:srgbClr val="FFFF00"/>
-                </a:highlight>
-              </a:rPr>
-              <a:t>TODO:</a:t>
-            </a:r>
-            <a:r>
-              <a:rPr lang="bg-BG" sz="2800" b="1" dirty="0">
-                <a:solidFill>
-                  <a:schemeClr val="tx1"/>
-                </a:solidFill>
-                <a:effectLst>
-                  <a:outerShdw blurRad="38100" dist="38100" dir="2700000" algn="tl">
-                    <a:srgbClr val="000000">
-                      <a:alpha val="43137"/>
-                    </a:srgbClr>
-                  </a:outerShdw>
-                </a:effectLst>
-                <a:highlight>
-                  <a:srgbClr val="FFFF00"/>
-                </a:highlight>
-              </a:rPr>
-              <a:t> </a:t>
-            </a:r>
-            <a:r>
-              <a:rPr lang="en-US" sz="2800" b="1" dirty="0">
-                <a:solidFill>
-                  <a:schemeClr val="tx1"/>
-                </a:solidFill>
-                <a:effectLst>
-                  <a:outerShdw blurRad="38100" dist="38100" dir="2700000" algn="tl">
-                    <a:srgbClr val="000000">
-                      <a:alpha val="43137"/>
-                    </a:srgbClr>
-                  </a:outerShdw>
-                </a:effectLst>
-                <a:highlight>
-                  <a:srgbClr val="FFFF00"/>
-                </a:highlight>
-              </a:rPr>
-              <a:t>crop </a:t>
-            </a:r>
-            <a:r>
-              <a:rPr lang="bg-BG" sz="2800" b="1" dirty="0">
-                <a:solidFill>
-                  <a:schemeClr val="tx1"/>
-                </a:solidFill>
-                <a:effectLst>
-                  <a:outerShdw blurRad="38100" dist="38100" dir="2700000" algn="tl">
-                    <a:srgbClr val="000000">
-                      <a:alpha val="43137"/>
-                    </a:srgbClr>
-                  </a:outerShdw>
-                </a:effectLst>
-                <a:highlight>
-                  <a:srgbClr val="FFFF00"/>
-                </a:highlight>
-              </a:rPr>
-              <a:t>на картинката, за да стане по-едра</a:t>
-            </a:r>
-            <a:endParaRPr lang="en-US" sz="2800" b="1" dirty="0">
-              <a:solidFill>
-                <a:schemeClr val="tx1"/>
-              </a:solidFill>
-              <a:effectLst>
-                <a:outerShdw blurRad="38100" dist="38100" dir="2700000" algn="tl">
-                  <a:srgbClr val="000000">
-                    <a:alpha val="43137"/>
-                  </a:srgbClr>
-                </a:outerShdw>
-              </a:effectLst>
-              <a:highlight>
-                <a:srgbClr val="FFFF00"/>
-              </a:highlight>
             </a:endParaRPr>
           </a:p>
         </p:txBody>
@@ -19067,7 +18992,7 @@
                                           </p:stCondLst>
                                         </p:cTn>
                                         <p:tgtEl>
-                                          <p:spTgt spid="10"/>
+                                          <p:spTgt spid="8"/>
                                         </p:tgtEl>
                                         <p:attrNameLst>
                                           <p:attrName>style.visibility</p:attrName>
@@ -19108,7 +19033,7 @@
       </p:par>
     </p:tnLst>
     <p:bldLst>
-      <p:bldP spid="10" grpId="0" animBg="1"/>
+      <p:bldP spid="8" grpId="0" animBg="1"/>
     </p:bldLst>
   </p:timing>
 </p:sld>

</xml_diff>